<commit_message>
Fix buttons implementation, add Frequency Setup screen
</commit_message>
<xml_diff>
--- a/design/PCB Design.pptx
+++ b/design/PCB Design.pptx
@@ -105,13 +105,18 @@
       </a:defRPr>
     </a:lvl9pPr>
   </p:defaultTextStyle>
+  <p:extLst>
+    <p:ext uri="{EFAFB233-063F-42B5-8137-9DF3F51BA10A}">
+      <p15:sldGuideLst xmlns:p15="http://schemas.microsoft.com/office/powerpoint/2012/main"/>
+    </p:ext>
+  </p:extLst>
 </p:presentation>
 </file>
 
 <file path=ppt/revisionInfo.xml><?xml version="1.0" encoding="utf-8"?>
 <p1510:revInfo xmlns:a="http://schemas.openxmlformats.org/drawingml/2006/main" xmlns:r="http://schemas.openxmlformats.org/officeDocument/2006/relationships" xmlns:p1510="http://schemas.microsoft.com/office/powerpoint/2015/10/main">
   <p1510:revLst>
-    <p1510:client id="{C3A6CD6C-1DA5-47FB-A775-C4A3C3FB9D49}" v="77" dt="2023-05-24T08:39:27.867"/>
+    <p1510:client id="{C3A6CD6C-1DA5-47FB-A775-C4A3C3FB9D49}" v="90" dt="2023-05-26T03:40:05.558"/>
   </p1510:revLst>
 </p1510:revInfo>
 </file>
@@ -121,16 +126,56 @@
   <pc:docChgLst>
     <pc:chgData name="Olivier Grenadou" userId="02d4787ce9b02c5a" providerId="LiveId" clId="{C3A6CD6C-1DA5-47FB-A775-C4A3C3FB9D49}"/>
     <pc:docChg chg="undo custSel addSld modSld modMainMaster">
-      <pc:chgData name="Olivier Grenadou" userId="02d4787ce9b02c5a" providerId="LiveId" clId="{C3A6CD6C-1DA5-47FB-A775-C4A3C3FB9D49}" dt="2023-05-24T09:00:32.886" v="1402" actId="20577"/>
+      <pc:chgData name="Olivier Grenadou" userId="02d4787ce9b02c5a" providerId="LiveId" clId="{C3A6CD6C-1DA5-47FB-A775-C4A3C3FB9D49}" dt="2023-05-26T03:40:16.448" v="1571" actId="20577"/>
       <pc:docMkLst>
         <pc:docMk/>
       </pc:docMkLst>
       <pc:sldChg chg="addSp delSp modSp mod">
-        <pc:chgData name="Olivier Grenadou" userId="02d4787ce9b02c5a" providerId="LiveId" clId="{C3A6CD6C-1DA5-47FB-A775-C4A3C3FB9D49}" dt="2023-05-24T09:00:32.886" v="1402" actId="20577"/>
+        <pc:chgData name="Olivier Grenadou" userId="02d4787ce9b02c5a" providerId="LiveId" clId="{C3A6CD6C-1DA5-47FB-A775-C4A3C3FB9D49}" dt="2023-05-26T03:40:16.448" v="1571" actId="20577"/>
         <pc:sldMkLst>
           <pc:docMk/>
           <pc:sldMk cId="3274058770" sldId="256"/>
         </pc:sldMkLst>
+        <pc:spChg chg="add del">
+          <ac:chgData name="Olivier Grenadou" userId="02d4787ce9b02c5a" providerId="LiveId" clId="{C3A6CD6C-1DA5-47FB-A775-C4A3C3FB9D49}" dt="2023-05-26T03:28:18.819" v="1404" actId="478"/>
+          <ac:spMkLst>
+            <pc:docMk/>
+            <pc:sldMk cId="3274058770" sldId="256"/>
+            <ac:spMk id="2" creationId="{CED8D0A6-FDEC-76DA-DED6-919A84504A9B}"/>
+          </ac:spMkLst>
+        </pc:spChg>
+        <pc:spChg chg="add mod">
+          <ac:chgData name="Olivier Grenadou" userId="02d4787ce9b02c5a" providerId="LiveId" clId="{C3A6CD6C-1DA5-47FB-A775-C4A3C3FB9D49}" dt="2023-05-26T03:30:13.575" v="1414" actId="206"/>
+          <ac:spMkLst>
+            <pc:docMk/>
+            <pc:sldMk cId="3274058770" sldId="256"/>
+            <ac:spMk id="3" creationId="{BADB9E78-9A1F-91CF-5677-E1185D92FC4B}"/>
+          </ac:spMkLst>
+        </pc:spChg>
+        <pc:spChg chg="add del mod">
+          <ac:chgData name="Olivier Grenadou" userId="02d4787ce9b02c5a" providerId="LiveId" clId="{C3A6CD6C-1DA5-47FB-A775-C4A3C3FB9D49}" dt="2023-05-26T03:38:53.318" v="1509" actId="478"/>
+          <ac:spMkLst>
+            <pc:docMk/>
+            <pc:sldMk cId="3274058770" sldId="256"/>
+            <ac:spMk id="4" creationId="{DF3E8E3B-79BD-001A-EA58-FEF4FD494836}"/>
+          </ac:spMkLst>
+        </pc:spChg>
+        <pc:spChg chg="add del mod">
+          <ac:chgData name="Olivier Grenadou" userId="02d4787ce9b02c5a" providerId="LiveId" clId="{C3A6CD6C-1DA5-47FB-A775-C4A3C3FB9D49}" dt="2023-05-26T03:39:28.261" v="1529" actId="478"/>
+          <ac:spMkLst>
+            <pc:docMk/>
+            <pc:sldMk cId="3274058770" sldId="256"/>
+            <ac:spMk id="5" creationId="{0DE719BC-FAA1-3B3E-87C1-3AF8FD9C9901}"/>
+          </ac:spMkLst>
+        </pc:spChg>
+        <pc:spChg chg="add del mod">
+          <ac:chgData name="Olivier Grenadou" userId="02d4787ce9b02c5a" providerId="LiveId" clId="{C3A6CD6C-1DA5-47FB-A775-C4A3C3FB9D49}" dt="2023-05-26T03:39:28.261" v="1529" actId="478"/>
+          <ac:spMkLst>
+            <pc:docMk/>
+            <pc:sldMk cId="3274058770" sldId="256"/>
+            <ac:spMk id="6" creationId="{E957F14A-76C7-DF1C-4A35-A50DB11B77A3}"/>
+          </ac:spMkLst>
+        </pc:spChg>
         <pc:spChg chg="add mod">
           <ac:chgData name="Olivier Grenadou" userId="02d4787ce9b02c5a" providerId="LiveId" clId="{C3A6CD6C-1DA5-47FB-A775-C4A3C3FB9D49}" dt="2023-05-24T08:39:27.866" v="1396" actId="165"/>
           <ac:spMkLst>
@@ -145,6 +190,38 @@
             <pc:docMk/>
             <pc:sldMk cId="3274058770" sldId="256"/>
             <ac:spMk id="9" creationId="{CCB27FCD-A3C1-CD2B-4B3C-C8612C6DCBDF}"/>
+          </ac:spMkLst>
+        </pc:spChg>
+        <pc:spChg chg="add mod">
+          <ac:chgData name="Olivier Grenadou" userId="02d4787ce9b02c5a" providerId="LiveId" clId="{C3A6CD6C-1DA5-47FB-A775-C4A3C3FB9D49}" dt="2023-05-26T03:39:38.096" v="1532" actId="1076"/>
+          <ac:spMkLst>
+            <pc:docMk/>
+            <pc:sldMk cId="3274058770" sldId="256"/>
+            <ac:spMk id="10" creationId="{D38D9C20-8320-CF84-7253-5899D3024EFC}"/>
+          </ac:spMkLst>
+        </pc:spChg>
+        <pc:spChg chg="add mod">
+          <ac:chgData name="Olivier Grenadou" userId="02d4787ce9b02c5a" providerId="LiveId" clId="{C3A6CD6C-1DA5-47FB-A775-C4A3C3FB9D49}" dt="2023-05-26T03:39:45.840" v="1546" actId="20577"/>
+          <ac:spMkLst>
+            <pc:docMk/>
+            <pc:sldMk cId="3274058770" sldId="256"/>
+            <ac:spMk id="12" creationId="{9C3BFCD8-6AAC-B2B8-AE2A-8409B1A2A807}"/>
+          </ac:spMkLst>
+        </pc:spChg>
+        <pc:spChg chg="add mod">
+          <ac:chgData name="Olivier Grenadou" userId="02d4787ce9b02c5a" providerId="LiveId" clId="{C3A6CD6C-1DA5-47FB-A775-C4A3C3FB9D49}" dt="2023-05-26T03:40:01.102" v="1551" actId="20577"/>
+          <ac:spMkLst>
+            <pc:docMk/>
+            <pc:sldMk cId="3274058770" sldId="256"/>
+            <ac:spMk id="13" creationId="{8F0D0ECC-F7FB-4F5E-6439-C62F5BB3D12A}"/>
+          </ac:spMkLst>
+        </pc:spChg>
+        <pc:spChg chg="add mod">
+          <ac:chgData name="Olivier Grenadou" userId="02d4787ce9b02c5a" providerId="LiveId" clId="{C3A6CD6C-1DA5-47FB-A775-C4A3C3FB9D49}" dt="2023-05-26T03:40:16.448" v="1571" actId="20577"/>
+          <ac:spMkLst>
+            <pc:docMk/>
+            <pc:sldMk cId="3274058770" sldId="256"/>
+            <ac:spMk id="14" creationId="{9D2FCFA8-AE39-2395-470B-EF4C0AB2530E}"/>
           </ac:spMkLst>
         </pc:spChg>
         <pc:spChg chg="add mod">
@@ -2333,7 +2410,7 @@
           <a:p>
             <a:fld id="{57835532-65B2-471C-926A-3AB1E0464B52}" type="datetimeFigureOut">
               <a:rPr lang="en-US" smtClean="0"/>
-              <a:t>5/23/2023</a:t>
+              <a:t>5/26/2023</a:t>
             </a:fld>
             <a:endParaRPr lang="en-US"/>
           </a:p>
@@ -2503,7 +2580,7 @@
           <a:p>
             <a:fld id="{57835532-65B2-471C-926A-3AB1E0464B52}" type="datetimeFigureOut">
               <a:rPr lang="en-US" smtClean="0"/>
-              <a:t>5/23/2023</a:t>
+              <a:t>5/26/2023</a:t>
             </a:fld>
             <a:endParaRPr lang="en-US"/>
           </a:p>
@@ -2683,7 +2760,7 @@
           <a:p>
             <a:fld id="{57835532-65B2-471C-926A-3AB1E0464B52}" type="datetimeFigureOut">
               <a:rPr lang="en-US" smtClean="0"/>
-              <a:t>5/23/2023</a:t>
+              <a:t>5/26/2023</a:t>
             </a:fld>
             <a:endParaRPr lang="en-US"/>
           </a:p>
@@ -2853,7 +2930,7 @@
           <a:p>
             <a:fld id="{57835532-65B2-471C-926A-3AB1E0464B52}" type="datetimeFigureOut">
               <a:rPr lang="en-US" smtClean="0"/>
-              <a:t>5/23/2023</a:t>
+              <a:t>5/26/2023</a:t>
             </a:fld>
             <a:endParaRPr lang="en-US"/>
           </a:p>
@@ -3097,7 +3174,7 @@
           <a:p>
             <a:fld id="{57835532-65B2-471C-926A-3AB1E0464B52}" type="datetimeFigureOut">
               <a:rPr lang="en-US" smtClean="0"/>
-              <a:t>5/23/2023</a:t>
+              <a:t>5/26/2023</a:t>
             </a:fld>
             <a:endParaRPr lang="en-US"/>
           </a:p>
@@ -3329,7 +3406,7 @@
           <a:p>
             <a:fld id="{57835532-65B2-471C-926A-3AB1E0464B52}" type="datetimeFigureOut">
               <a:rPr lang="en-US" smtClean="0"/>
-              <a:t>5/23/2023</a:t>
+              <a:t>5/26/2023</a:t>
             </a:fld>
             <a:endParaRPr lang="en-US"/>
           </a:p>
@@ -3696,7 +3773,7 @@
           <a:p>
             <a:fld id="{57835532-65B2-471C-926A-3AB1E0464B52}" type="datetimeFigureOut">
               <a:rPr lang="en-US" smtClean="0"/>
-              <a:t>5/23/2023</a:t>
+              <a:t>5/26/2023</a:t>
             </a:fld>
             <a:endParaRPr lang="en-US"/>
           </a:p>
@@ -3814,7 +3891,7 @@
           <a:p>
             <a:fld id="{57835532-65B2-471C-926A-3AB1E0464B52}" type="datetimeFigureOut">
               <a:rPr lang="en-US" smtClean="0"/>
-              <a:t>5/23/2023</a:t>
+              <a:t>5/26/2023</a:t>
             </a:fld>
             <a:endParaRPr lang="en-US"/>
           </a:p>
@@ -3909,7 +3986,7 @@
           <a:p>
             <a:fld id="{57835532-65B2-471C-926A-3AB1E0464B52}" type="datetimeFigureOut">
               <a:rPr lang="en-US" smtClean="0"/>
-              <a:t>5/23/2023</a:t>
+              <a:t>5/26/2023</a:t>
             </a:fld>
             <a:endParaRPr lang="en-US"/>
           </a:p>
@@ -4186,7 +4263,7 @@
           <a:p>
             <a:fld id="{57835532-65B2-471C-926A-3AB1E0464B52}" type="datetimeFigureOut">
               <a:rPr lang="en-US" smtClean="0"/>
-              <a:t>5/23/2023</a:t>
+              <a:t>5/26/2023</a:t>
             </a:fld>
             <a:endParaRPr lang="en-US"/>
           </a:p>
@@ -4443,7 +4520,7 @@
           <a:p>
             <a:fld id="{57835532-65B2-471C-926A-3AB1E0464B52}" type="datetimeFigureOut">
               <a:rPr lang="en-US" smtClean="0"/>
-              <a:t>5/23/2023</a:t>
+              <a:t>5/26/2023</a:t>
             </a:fld>
             <a:endParaRPr lang="en-US"/>
           </a:p>
@@ -4656,7 +4733,7 @@
           <a:p>
             <a:fld id="{57835532-65B2-471C-926A-3AB1E0464B52}" type="datetimeFigureOut">
               <a:rPr lang="en-US" smtClean="0"/>
-              <a:t>5/23/2023</a:t>
+              <a:t>5/26/2023</a:t>
             </a:fld>
             <a:endParaRPr lang="en-US"/>
           </a:p>
@@ -13760,6 +13837,401 @@
           </a:fontRef>
         </p:style>
       </p:cxnSp>
+      <p:sp>
+        <p:nvSpPr>
+          <p:cNvPr id="3" name="Freeform: Shape 2">
+            <a:extLst>
+              <a:ext uri="{FF2B5EF4-FFF2-40B4-BE49-F238E27FC236}">
+                <a16:creationId xmlns:a16="http://schemas.microsoft.com/office/drawing/2014/main" id="{BADB9E78-9A1F-91CF-5677-E1185D92FC4B}"/>
+              </a:ext>
+            </a:extLst>
+          </p:cNvPr>
+          <p:cNvSpPr/>
+          <p:nvPr/>
+        </p:nvSpPr>
+        <p:spPr>
+          <a:xfrm>
+            <a:off x="1790701" y="2495551"/>
+            <a:ext cx="791556" cy="1466849"/>
+          </a:xfrm>
+          <a:custGeom>
+            <a:avLst/>
+            <a:gdLst>
+              <a:gd name="connsiteX0" fmla="*/ 0 w 283490"/>
+              <a:gd name="connsiteY0" fmla="*/ 1563810 h 1563810"/>
+              <a:gd name="connsiteX1" fmla="*/ 238125 w 283490"/>
+              <a:gd name="connsiteY1" fmla="*/ 863723 h 1563810"/>
+              <a:gd name="connsiteX2" fmla="*/ 252413 w 283490"/>
+              <a:gd name="connsiteY2" fmla="*/ 306510 h 1563810"/>
+              <a:gd name="connsiteX3" fmla="*/ 195263 w 283490"/>
+              <a:gd name="connsiteY3" fmla="*/ 92198 h 1563810"/>
+              <a:gd name="connsiteX0" fmla="*/ 0 w 263798"/>
+              <a:gd name="connsiteY0" fmla="*/ 1471612 h 1471612"/>
+              <a:gd name="connsiteX1" fmla="*/ 238125 w 263798"/>
+              <a:gd name="connsiteY1" fmla="*/ 771525 h 1471612"/>
+              <a:gd name="connsiteX2" fmla="*/ 252413 w 263798"/>
+              <a:gd name="connsiteY2" fmla="*/ 214312 h 1471612"/>
+              <a:gd name="connsiteX3" fmla="*/ 195263 w 263798"/>
+              <a:gd name="connsiteY3" fmla="*/ 0 h 1471612"/>
+              <a:gd name="connsiteX0" fmla="*/ 0 w 787211"/>
+              <a:gd name="connsiteY0" fmla="*/ 1466849 h 1466849"/>
+              <a:gd name="connsiteX1" fmla="*/ 238125 w 787211"/>
+              <a:gd name="connsiteY1" fmla="*/ 766762 h 1466849"/>
+              <a:gd name="connsiteX2" fmla="*/ 252413 w 787211"/>
+              <a:gd name="connsiteY2" fmla="*/ 209549 h 1466849"/>
+              <a:gd name="connsiteX3" fmla="*/ 785813 w 787211"/>
+              <a:gd name="connsiteY3" fmla="*/ 0 h 1466849"/>
+              <a:gd name="connsiteX0" fmla="*/ 0 w 786545"/>
+              <a:gd name="connsiteY0" fmla="*/ 1466849 h 1466849"/>
+              <a:gd name="connsiteX1" fmla="*/ 238125 w 786545"/>
+              <a:gd name="connsiteY1" fmla="*/ 766762 h 1466849"/>
+              <a:gd name="connsiteX2" fmla="*/ 252413 w 786545"/>
+              <a:gd name="connsiteY2" fmla="*/ 209549 h 1466849"/>
+              <a:gd name="connsiteX3" fmla="*/ 785813 w 786545"/>
+              <a:gd name="connsiteY3" fmla="*/ 0 h 1466849"/>
+              <a:gd name="connsiteX0" fmla="*/ 0 w 789143"/>
+              <a:gd name="connsiteY0" fmla="*/ 1466849 h 1466849"/>
+              <a:gd name="connsiteX1" fmla="*/ 238125 w 789143"/>
+              <a:gd name="connsiteY1" fmla="*/ 766762 h 1466849"/>
+              <a:gd name="connsiteX2" fmla="*/ 704851 w 789143"/>
+              <a:gd name="connsiteY2" fmla="*/ 585787 h 1466849"/>
+              <a:gd name="connsiteX3" fmla="*/ 785813 w 789143"/>
+              <a:gd name="connsiteY3" fmla="*/ 0 h 1466849"/>
+              <a:gd name="connsiteX0" fmla="*/ 0 w 789143"/>
+              <a:gd name="connsiteY0" fmla="*/ 1466849 h 1466849"/>
+              <a:gd name="connsiteX1" fmla="*/ 490538 w 789143"/>
+              <a:gd name="connsiteY1" fmla="*/ 1028699 h 1466849"/>
+              <a:gd name="connsiteX2" fmla="*/ 704851 w 789143"/>
+              <a:gd name="connsiteY2" fmla="*/ 585787 h 1466849"/>
+              <a:gd name="connsiteX3" fmla="*/ 785813 w 789143"/>
+              <a:gd name="connsiteY3" fmla="*/ 0 h 1466849"/>
+              <a:gd name="connsiteX0" fmla="*/ 0 w 791556"/>
+              <a:gd name="connsiteY0" fmla="*/ 1466849 h 1466849"/>
+              <a:gd name="connsiteX1" fmla="*/ 490538 w 791556"/>
+              <a:gd name="connsiteY1" fmla="*/ 1028699 h 1466849"/>
+              <a:gd name="connsiteX2" fmla="*/ 704851 w 791556"/>
+              <a:gd name="connsiteY2" fmla="*/ 585787 h 1466849"/>
+              <a:gd name="connsiteX3" fmla="*/ 785813 w 791556"/>
+              <a:gd name="connsiteY3" fmla="*/ 0 h 1466849"/>
+              <a:gd name="connsiteX0" fmla="*/ 0 w 791556"/>
+              <a:gd name="connsiteY0" fmla="*/ 1466849 h 1466849"/>
+              <a:gd name="connsiteX1" fmla="*/ 490538 w 791556"/>
+              <a:gd name="connsiteY1" fmla="*/ 1028699 h 1466849"/>
+              <a:gd name="connsiteX2" fmla="*/ 704851 w 791556"/>
+              <a:gd name="connsiteY2" fmla="*/ 585787 h 1466849"/>
+              <a:gd name="connsiteX3" fmla="*/ 785813 w 791556"/>
+              <a:gd name="connsiteY3" fmla="*/ 0 h 1466849"/>
+            </a:gdLst>
+            <a:ahLst/>
+            <a:cxnLst>
+              <a:cxn ang="0">
+                <a:pos x="connsiteX0" y="connsiteY0"/>
+              </a:cxn>
+              <a:cxn ang="0">
+                <a:pos x="connsiteX1" y="connsiteY1"/>
+              </a:cxn>
+              <a:cxn ang="0">
+                <a:pos x="connsiteX2" y="connsiteY2"/>
+              </a:cxn>
+              <a:cxn ang="0">
+                <a:pos x="connsiteX3" y="connsiteY3"/>
+              </a:cxn>
+            </a:cxnLst>
+            <a:rect l="l" t="t" r="r" b="b"/>
+            <a:pathLst>
+              <a:path w="791556" h="1466849">
+                <a:moveTo>
+                  <a:pt x="0" y="1466849"/>
+                </a:moveTo>
+                <a:cubicBezTo>
+                  <a:pt x="98028" y="1221580"/>
+                  <a:pt x="373063" y="1175543"/>
+                  <a:pt x="490538" y="1028699"/>
+                </a:cubicBezTo>
+                <a:cubicBezTo>
+                  <a:pt x="608013" y="881855"/>
+                  <a:pt x="673895" y="761999"/>
+                  <a:pt x="704851" y="585787"/>
+                </a:cubicBezTo>
+                <a:cubicBezTo>
+                  <a:pt x="754857" y="395286"/>
+                  <a:pt x="809625" y="207169"/>
+                  <a:pt x="785813" y="0"/>
+                </a:cubicBezTo>
+              </a:path>
+            </a:pathLst>
+          </a:custGeom>
+        </p:spPr>
+        <p:style>
+          <a:lnRef idx="3">
+            <a:schemeClr val="accent4"/>
+          </a:lnRef>
+          <a:fillRef idx="0">
+            <a:schemeClr val="accent4"/>
+          </a:fillRef>
+          <a:effectRef idx="2">
+            <a:schemeClr val="accent4"/>
+          </a:effectRef>
+          <a:fontRef idx="minor">
+            <a:schemeClr val="tx1"/>
+          </a:fontRef>
+        </p:style>
+        <p:txBody>
+          <a:bodyPr rtlCol="0" anchor="ctr"/>
+          <a:lstStyle/>
+          <a:p>
+            <a:pPr algn="ctr"/>
+            <a:endParaRPr lang="en-US"/>
+          </a:p>
+        </p:txBody>
+      </p:sp>
+      <p:sp>
+        <p:nvSpPr>
+          <p:cNvPr id="10" name="Arrow: Pentagon 9">
+            <a:extLst>
+              <a:ext uri="{FF2B5EF4-FFF2-40B4-BE49-F238E27FC236}">
+                <a16:creationId xmlns:a16="http://schemas.microsoft.com/office/drawing/2014/main" id="{D38D9C20-8320-CF84-7253-5899D3024EFC}"/>
+              </a:ext>
+            </a:extLst>
+          </p:cNvPr>
+          <p:cNvSpPr/>
+          <p:nvPr/>
+        </p:nvSpPr>
+        <p:spPr>
+          <a:xfrm rot="18881876">
+            <a:off x="828944" y="4508550"/>
+            <a:ext cx="834044" cy="132169"/>
+          </a:xfrm>
+          <a:prstGeom prst="homePlate">
+            <a:avLst/>
+          </a:prstGeom>
+          <a:ln>
+            <a:solidFill>
+              <a:schemeClr val="tx1"/>
+            </a:solidFill>
+          </a:ln>
+        </p:spPr>
+        <p:style>
+          <a:lnRef idx="1">
+            <a:schemeClr val="accent4"/>
+          </a:lnRef>
+          <a:fillRef idx="2">
+            <a:schemeClr val="accent4"/>
+          </a:fillRef>
+          <a:effectRef idx="1">
+            <a:schemeClr val="accent4"/>
+          </a:effectRef>
+          <a:fontRef idx="minor">
+            <a:schemeClr val="dk1"/>
+          </a:fontRef>
+        </p:style>
+        <p:txBody>
+          <a:bodyPr lIns="45720" tIns="0" rIns="0" bIns="0" rtlCol="0" anchor="ctr" anchorCtr="0"/>
+          <a:lstStyle/>
+          <a:p>
+            <a:r>
+              <a:rPr lang="en-US" sz="800" b="1" dirty="0">
+                <a:latin typeface="+mj-lt"/>
+                <a:cs typeface="Courier New" panose="02070309020205020404" pitchFamily="49" charset="0"/>
+              </a:rPr>
+              <a:t>Menu / </a:t>
+            </a:r>
+            <a:r>
+              <a:rPr lang="en-US" sz="800" b="1" dirty="0">
+                <a:solidFill>
+                  <a:schemeClr val="dk1"/>
+                </a:solidFill>
+                <a:latin typeface="+mj-lt"/>
+                <a:cs typeface="Courier New" panose="02070309020205020404" pitchFamily="49" charset="0"/>
+              </a:rPr>
+              <a:t>Mode</a:t>
+            </a:r>
+          </a:p>
+        </p:txBody>
+      </p:sp>
+      <p:sp>
+        <p:nvSpPr>
+          <p:cNvPr id="12" name="Arrow: Pentagon 11">
+            <a:extLst>
+              <a:ext uri="{FF2B5EF4-FFF2-40B4-BE49-F238E27FC236}">
+                <a16:creationId xmlns:a16="http://schemas.microsoft.com/office/drawing/2014/main" id="{9C3BFCD8-6AAC-B2B8-AE2A-8409B1A2A807}"/>
+              </a:ext>
+            </a:extLst>
+          </p:cNvPr>
+          <p:cNvSpPr/>
+          <p:nvPr/>
+        </p:nvSpPr>
+        <p:spPr>
+          <a:xfrm rot="18881876">
+            <a:off x="1265467" y="4508395"/>
+            <a:ext cx="834044" cy="132169"/>
+          </a:xfrm>
+          <a:prstGeom prst="homePlate">
+            <a:avLst/>
+          </a:prstGeom>
+          <a:ln>
+            <a:solidFill>
+              <a:schemeClr val="tx1"/>
+            </a:solidFill>
+          </a:ln>
+        </p:spPr>
+        <p:style>
+          <a:lnRef idx="1">
+            <a:schemeClr val="accent4"/>
+          </a:lnRef>
+          <a:fillRef idx="2">
+            <a:schemeClr val="accent4"/>
+          </a:fillRef>
+          <a:effectRef idx="1">
+            <a:schemeClr val="accent4"/>
+          </a:effectRef>
+          <a:fontRef idx="minor">
+            <a:schemeClr val="dk1"/>
+          </a:fontRef>
+        </p:style>
+        <p:txBody>
+          <a:bodyPr lIns="45720" tIns="0" rIns="0" bIns="0" rtlCol="0" anchor="ctr" anchorCtr="0"/>
+          <a:lstStyle/>
+          <a:p>
+            <a:r>
+              <a:rPr lang="en-US" sz="800" b="1" dirty="0">
+                <a:latin typeface="+mj-lt"/>
+                <a:cs typeface="Courier New" panose="02070309020205020404" pitchFamily="49" charset="0"/>
+              </a:rPr>
+              <a:t>- / Action A</a:t>
+            </a:r>
+            <a:endParaRPr lang="en-US" sz="800" b="1" dirty="0">
+              <a:solidFill>
+                <a:schemeClr val="dk1"/>
+              </a:solidFill>
+              <a:latin typeface="+mj-lt"/>
+              <a:cs typeface="Courier New" panose="02070309020205020404" pitchFamily="49" charset="0"/>
+            </a:endParaRPr>
+          </a:p>
+        </p:txBody>
+      </p:sp>
+      <p:sp>
+        <p:nvSpPr>
+          <p:cNvPr id="13" name="Arrow: Pentagon 12">
+            <a:extLst>
+              <a:ext uri="{FF2B5EF4-FFF2-40B4-BE49-F238E27FC236}">
+                <a16:creationId xmlns:a16="http://schemas.microsoft.com/office/drawing/2014/main" id="{8F0D0ECC-F7FB-4F5E-6439-C62F5BB3D12A}"/>
+              </a:ext>
+            </a:extLst>
+          </p:cNvPr>
+          <p:cNvSpPr/>
+          <p:nvPr/>
+        </p:nvSpPr>
+        <p:spPr>
+          <a:xfrm rot="18881876">
+            <a:off x="1641750" y="4519422"/>
+            <a:ext cx="834044" cy="132169"/>
+          </a:xfrm>
+          <a:prstGeom prst="homePlate">
+            <a:avLst/>
+          </a:prstGeom>
+          <a:ln>
+            <a:solidFill>
+              <a:schemeClr val="tx1"/>
+            </a:solidFill>
+          </a:ln>
+        </p:spPr>
+        <p:style>
+          <a:lnRef idx="1">
+            <a:schemeClr val="accent4"/>
+          </a:lnRef>
+          <a:fillRef idx="2">
+            <a:schemeClr val="accent4"/>
+          </a:fillRef>
+          <a:effectRef idx="1">
+            <a:schemeClr val="accent4"/>
+          </a:effectRef>
+          <a:fontRef idx="minor">
+            <a:schemeClr val="dk1"/>
+          </a:fontRef>
+        </p:style>
+        <p:txBody>
+          <a:bodyPr lIns="45720" tIns="0" rIns="0" bIns="0" rtlCol="0" anchor="ctr" anchorCtr="0"/>
+          <a:lstStyle/>
+          <a:p>
+            <a:r>
+              <a:rPr lang="en-US" sz="800" b="1" dirty="0">
+                <a:latin typeface="+mj-lt"/>
+                <a:cs typeface="Courier New" panose="02070309020205020404" pitchFamily="49" charset="0"/>
+              </a:rPr>
+              <a:t>+ / Action B</a:t>
+            </a:r>
+            <a:endParaRPr lang="en-US" sz="800" b="1" dirty="0">
+              <a:solidFill>
+                <a:schemeClr val="dk1"/>
+              </a:solidFill>
+              <a:latin typeface="+mj-lt"/>
+              <a:cs typeface="Courier New" panose="02070309020205020404" pitchFamily="49" charset="0"/>
+            </a:endParaRPr>
+          </a:p>
+        </p:txBody>
+      </p:sp>
+      <p:sp>
+        <p:nvSpPr>
+          <p:cNvPr id="14" name="Arrow: Pentagon 13">
+            <a:extLst>
+              <a:ext uri="{FF2B5EF4-FFF2-40B4-BE49-F238E27FC236}">
+                <a16:creationId xmlns:a16="http://schemas.microsoft.com/office/drawing/2014/main" id="{9D2FCFA8-AE39-2395-470B-EF4C0AB2530E}"/>
+              </a:ext>
+            </a:extLst>
+          </p:cNvPr>
+          <p:cNvSpPr/>
+          <p:nvPr/>
+        </p:nvSpPr>
+        <p:spPr>
+          <a:xfrm rot="18881876">
+            <a:off x="2041712" y="4519422"/>
+            <a:ext cx="834044" cy="132169"/>
+          </a:xfrm>
+          <a:prstGeom prst="homePlate">
+            <a:avLst/>
+          </a:prstGeom>
+          <a:ln>
+            <a:solidFill>
+              <a:schemeClr val="tx1"/>
+            </a:solidFill>
+          </a:ln>
+        </p:spPr>
+        <p:style>
+          <a:lnRef idx="1">
+            <a:schemeClr val="accent4"/>
+          </a:lnRef>
+          <a:fillRef idx="2">
+            <a:schemeClr val="accent4"/>
+          </a:fillRef>
+          <a:effectRef idx="1">
+            <a:schemeClr val="accent4"/>
+          </a:effectRef>
+          <a:fontRef idx="minor">
+            <a:schemeClr val="dk1"/>
+          </a:fontRef>
+        </p:style>
+        <p:txBody>
+          <a:bodyPr lIns="45720" tIns="0" rIns="0" bIns="0" rtlCol="0" anchor="ctr" anchorCtr="0"/>
+          <a:lstStyle/>
+          <a:p>
+            <a:r>
+              <a:rPr lang="en-US" sz="800" b="1">
+                <a:latin typeface="+mj-lt"/>
+                <a:cs typeface="Courier New" panose="02070309020205020404" pitchFamily="49" charset="0"/>
+              </a:rPr>
+              <a:t>Confirm / Cancel</a:t>
+            </a:r>
+            <a:endParaRPr lang="en-US" sz="800" b="1" dirty="0">
+              <a:solidFill>
+                <a:schemeClr val="dk1"/>
+              </a:solidFill>
+              <a:latin typeface="+mj-lt"/>
+              <a:cs typeface="Courier New" panose="02070309020205020404" pitchFamily="49" charset="0"/>
+            </a:endParaRPr>
+          </a:p>
+        </p:txBody>
+      </p:sp>
     </p:spTree>
     <p:extLst>
       <p:ext uri="{BB962C8B-B14F-4D97-AF65-F5344CB8AC3E}">

</xml_diff>

<commit_message>
Reboot & splash, Save Freq., On/Off pump LED
</commit_message>
<xml_diff>
--- a/design/PCB Design.pptx
+++ b/design/PCB Design.pptx
@@ -7,6 +7,7 @@
   <p:sldIdLst>
     <p:sldId id="256" r:id="rId2"/>
     <p:sldId id="257" r:id="rId3"/>
+    <p:sldId id="258" r:id="rId4"/>
   </p:sldIdLst>
   <p:sldSz cx="9144000" cy="6858000" type="screen4x3"/>
   <p:notesSz cx="6858000" cy="9144000"/>
@@ -116,7 +117,7 @@
 <file path=ppt/revisionInfo.xml><?xml version="1.0" encoding="utf-8"?>
 <p1510:revInfo xmlns:a="http://schemas.openxmlformats.org/drawingml/2006/main" xmlns:r="http://schemas.openxmlformats.org/officeDocument/2006/relationships" xmlns:p1510="http://schemas.microsoft.com/office/powerpoint/2015/10/main">
   <p1510:revLst>
-    <p1510:client id="{C3A6CD6C-1DA5-47FB-A775-C4A3C3FB9D49}" v="90" dt="2023-05-26T03:40:05.558"/>
+    <p1510:client id="{C3A6CD6C-1DA5-47FB-A775-C4A3C3FB9D49}" v="91" dt="2023-05-27T04:05:07.209"/>
   </p1510:revLst>
 </p1510:revInfo>
 </file>
@@ -126,7 +127,7 @@
   <pc:docChgLst>
     <pc:chgData name="Olivier Grenadou" userId="02d4787ce9b02c5a" providerId="LiveId" clId="{C3A6CD6C-1DA5-47FB-A775-C4A3C3FB9D49}"/>
     <pc:docChg chg="undo custSel addSld modSld modMainMaster">
-      <pc:chgData name="Olivier Grenadou" userId="02d4787ce9b02c5a" providerId="LiveId" clId="{C3A6CD6C-1DA5-47FB-A775-C4A3C3FB9D49}" dt="2023-05-26T03:40:16.448" v="1571" actId="20577"/>
+      <pc:chgData name="Olivier Grenadou" userId="02d4787ce9b02c5a" providerId="LiveId" clId="{C3A6CD6C-1DA5-47FB-A775-C4A3C3FB9D49}" dt="2023-05-27T04:05:07.209" v="1574"/>
       <pc:docMkLst>
         <pc:docMk/>
       </pc:docMkLst>
@@ -1997,6 +1998,37 @@
             <pc:docMk/>
             <pc:sldMk cId="3659786731" sldId="257"/>
             <ac:picMk id="5" creationId="{B4D397FD-FD49-B827-B25F-6270CEAE635D}"/>
+          </ac:picMkLst>
+        </pc:picChg>
+      </pc:sldChg>
+      <pc:sldChg chg="addSp delSp new mod">
+        <pc:chgData name="Olivier Grenadou" userId="02d4787ce9b02c5a" providerId="LiveId" clId="{C3A6CD6C-1DA5-47FB-A775-C4A3C3FB9D49}" dt="2023-05-27T04:05:07.209" v="1574"/>
+        <pc:sldMkLst>
+          <pc:docMk/>
+          <pc:sldMk cId="3606465028" sldId="258"/>
+        </pc:sldMkLst>
+        <pc:spChg chg="del">
+          <ac:chgData name="Olivier Grenadou" userId="02d4787ce9b02c5a" providerId="LiveId" clId="{C3A6CD6C-1DA5-47FB-A775-C4A3C3FB9D49}" dt="2023-05-27T04:05:03.894" v="1573" actId="478"/>
+          <ac:spMkLst>
+            <pc:docMk/>
+            <pc:sldMk cId="3606465028" sldId="258"/>
+            <ac:spMk id="2" creationId="{043CB589-4708-0169-A8CE-9700F9C0DEEF}"/>
+          </ac:spMkLst>
+        </pc:spChg>
+        <pc:spChg chg="del">
+          <ac:chgData name="Olivier Grenadou" userId="02d4787ce9b02c5a" providerId="LiveId" clId="{C3A6CD6C-1DA5-47FB-A775-C4A3C3FB9D49}" dt="2023-05-27T04:05:03.894" v="1573" actId="478"/>
+          <ac:spMkLst>
+            <pc:docMk/>
+            <pc:sldMk cId="3606465028" sldId="258"/>
+            <ac:spMk id="3" creationId="{77B31AEB-32B2-E140-FC78-D7B59F989B07}"/>
+          </ac:spMkLst>
+        </pc:spChg>
+        <pc:picChg chg="add">
+          <ac:chgData name="Olivier Grenadou" userId="02d4787ce9b02c5a" providerId="LiveId" clId="{C3A6CD6C-1DA5-47FB-A775-C4A3C3FB9D49}" dt="2023-05-27T04:05:07.209" v="1574"/>
+          <ac:picMkLst>
+            <pc:docMk/>
+            <pc:sldMk cId="3606465028" sldId="258"/>
+            <ac:picMk id="1026" creationId="{CBA7387B-05C4-EE56-E464-AFBD9E30D485}"/>
           </ac:picMkLst>
         </pc:picChg>
       </pc:sldChg>
@@ -2410,7 +2442,7 @@
           <a:p>
             <a:fld id="{57835532-65B2-471C-926A-3AB1E0464B52}" type="datetimeFigureOut">
               <a:rPr lang="en-US" smtClean="0"/>
-              <a:t>5/26/2023</a:t>
+              <a:t>5/27/2023</a:t>
             </a:fld>
             <a:endParaRPr lang="en-US"/>
           </a:p>
@@ -2580,7 +2612,7 @@
           <a:p>
             <a:fld id="{57835532-65B2-471C-926A-3AB1E0464B52}" type="datetimeFigureOut">
               <a:rPr lang="en-US" smtClean="0"/>
-              <a:t>5/26/2023</a:t>
+              <a:t>5/27/2023</a:t>
             </a:fld>
             <a:endParaRPr lang="en-US"/>
           </a:p>
@@ -2760,7 +2792,7 @@
           <a:p>
             <a:fld id="{57835532-65B2-471C-926A-3AB1E0464B52}" type="datetimeFigureOut">
               <a:rPr lang="en-US" smtClean="0"/>
-              <a:t>5/26/2023</a:t>
+              <a:t>5/27/2023</a:t>
             </a:fld>
             <a:endParaRPr lang="en-US"/>
           </a:p>
@@ -2930,7 +2962,7 @@
           <a:p>
             <a:fld id="{57835532-65B2-471C-926A-3AB1E0464B52}" type="datetimeFigureOut">
               <a:rPr lang="en-US" smtClean="0"/>
-              <a:t>5/26/2023</a:t>
+              <a:t>5/27/2023</a:t>
             </a:fld>
             <a:endParaRPr lang="en-US"/>
           </a:p>
@@ -3174,7 +3206,7 @@
           <a:p>
             <a:fld id="{57835532-65B2-471C-926A-3AB1E0464B52}" type="datetimeFigureOut">
               <a:rPr lang="en-US" smtClean="0"/>
-              <a:t>5/26/2023</a:t>
+              <a:t>5/27/2023</a:t>
             </a:fld>
             <a:endParaRPr lang="en-US"/>
           </a:p>
@@ -3406,7 +3438,7 @@
           <a:p>
             <a:fld id="{57835532-65B2-471C-926A-3AB1E0464B52}" type="datetimeFigureOut">
               <a:rPr lang="en-US" smtClean="0"/>
-              <a:t>5/26/2023</a:t>
+              <a:t>5/27/2023</a:t>
             </a:fld>
             <a:endParaRPr lang="en-US"/>
           </a:p>
@@ -3773,7 +3805,7 @@
           <a:p>
             <a:fld id="{57835532-65B2-471C-926A-3AB1E0464B52}" type="datetimeFigureOut">
               <a:rPr lang="en-US" smtClean="0"/>
-              <a:t>5/26/2023</a:t>
+              <a:t>5/27/2023</a:t>
             </a:fld>
             <a:endParaRPr lang="en-US"/>
           </a:p>
@@ -3891,7 +3923,7 @@
           <a:p>
             <a:fld id="{57835532-65B2-471C-926A-3AB1E0464B52}" type="datetimeFigureOut">
               <a:rPr lang="en-US" smtClean="0"/>
-              <a:t>5/26/2023</a:t>
+              <a:t>5/27/2023</a:t>
             </a:fld>
             <a:endParaRPr lang="en-US"/>
           </a:p>
@@ -3986,7 +4018,7 @@
           <a:p>
             <a:fld id="{57835532-65B2-471C-926A-3AB1E0464B52}" type="datetimeFigureOut">
               <a:rPr lang="en-US" smtClean="0"/>
-              <a:t>5/26/2023</a:t>
+              <a:t>5/27/2023</a:t>
             </a:fld>
             <a:endParaRPr lang="en-US"/>
           </a:p>
@@ -4263,7 +4295,7 @@
           <a:p>
             <a:fld id="{57835532-65B2-471C-926A-3AB1E0464B52}" type="datetimeFigureOut">
               <a:rPr lang="en-US" smtClean="0"/>
-              <a:t>5/26/2023</a:t>
+              <a:t>5/27/2023</a:t>
             </a:fld>
             <a:endParaRPr lang="en-US"/>
           </a:p>
@@ -4520,7 +4552,7 @@
           <a:p>
             <a:fld id="{57835532-65B2-471C-926A-3AB1E0464B52}" type="datetimeFigureOut">
               <a:rPr lang="en-US" smtClean="0"/>
-              <a:t>5/26/2023</a:t>
+              <a:t>5/27/2023</a:t>
             </a:fld>
             <a:endParaRPr lang="en-US"/>
           </a:p>
@@ -4733,7 +4765,7 @@
           <a:p>
             <a:fld id="{57835532-65B2-471C-926A-3AB1E0464B52}" type="datetimeFigureOut">
               <a:rPr lang="en-US" smtClean="0"/>
-              <a:t>5/26/2023</a:t>
+              <a:t>5/27/2023</a:t>
             </a:fld>
             <a:endParaRPr lang="en-US"/>
           </a:p>
@@ -14350,6 +14382,83 @@
 </p:sld>
 </file>
 
+<file path=ppt/slides/slide3.xml><?xml version="1.0" encoding="utf-8"?>
+<p:sld xmlns:a="http://schemas.openxmlformats.org/drawingml/2006/main" xmlns:r="http://schemas.openxmlformats.org/officeDocument/2006/relationships" xmlns:p="http://schemas.openxmlformats.org/presentationml/2006/main">
+  <p:cSld>
+    <p:spTree>
+      <p:nvGrpSpPr>
+        <p:cNvPr id="1" name=""/>
+        <p:cNvGrpSpPr/>
+        <p:nvPr/>
+      </p:nvGrpSpPr>
+      <p:grpSpPr>
+        <a:xfrm>
+          <a:off x="0" y="0"/>
+          <a:ext cx="0" cy="0"/>
+          <a:chOff x="0" y="0"/>
+          <a:chExt cx="0" cy="0"/>
+        </a:xfrm>
+      </p:grpSpPr>
+      <p:pic>
+        <p:nvPicPr>
+          <p:cNvPr id="1026" name="Picture 2">
+            <a:extLst>
+              <a:ext uri="{FF2B5EF4-FFF2-40B4-BE49-F238E27FC236}">
+                <a16:creationId xmlns:a16="http://schemas.microsoft.com/office/drawing/2014/main" id="{CBA7387B-05C4-EE56-E464-AFBD9E30D485}"/>
+              </a:ext>
+            </a:extLst>
+          </p:cNvPr>
+          <p:cNvPicPr>
+            <a:picLocks noChangeAspect="1" noChangeArrowheads="1"/>
+          </p:cNvPicPr>
+          <p:nvPr/>
+        </p:nvPicPr>
+        <p:blipFill>
+          <a:blip r:embed="rId2">
+            <a:extLst>
+              <a:ext uri="{28A0092B-C50C-407E-A947-70E740481C1C}">
+                <a14:useLocalDpi xmlns:a14="http://schemas.microsoft.com/office/drawing/2010/main" val="0"/>
+              </a:ext>
+            </a:extLst>
+          </a:blip>
+          <a:srcRect/>
+          <a:stretch>
+            <a:fillRect/>
+          </a:stretch>
+        </p:blipFill>
+        <p:spPr bwMode="auto">
+          <a:xfrm>
+            <a:off x="0" y="1500188"/>
+            <a:ext cx="9144000" cy="3857625"/>
+          </a:xfrm>
+          <a:prstGeom prst="rect">
+            <a:avLst/>
+          </a:prstGeom>
+          <a:noFill/>
+          <a:extLst>
+            <a:ext uri="{909E8E84-426E-40DD-AFC4-6F175D3DCCD1}">
+              <a14:hiddenFill xmlns:a14="http://schemas.microsoft.com/office/drawing/2010/main">
+                <a:solidFill>
+                  <a:srgbClr val="FFFFFF"/>
+                </a:solidFill>
+              </a14:hiddenFill>
+            </a:ext>
+          </a:extLst>
+        </p:spPr>
+      </p:pic>
+    </p:spTree>
+    <p:extLst>
+      <p:ext uri="{BB962C8B-B14F-4D97-AF65-F5344CB8AC3E}">
+        <p14:creationId xmlns:p14="http://schemas.microsoft.com/office/powerpoint/2010/main" val="3606465028"/>
+      </p:ext>
+    </p:extLst>
+  </p:cSld>
+  <p:clrMapOvr>
+    <a:masterClrMapping/>
+  </p:clrMapOvr>
+</p:sld>
+</file>
+
 <file path=ppt/theme/theme1.xml><?xml version="1.0" encoding="utf-8"?>
 <a:theme xmlns:a="http://schemas.openxmlformats.org/drawingml/2006/main" name="Office Theme">
   <a:themeElements>

</xml_diff>

<commit_message>
Fix documentation + Design PPTX document
</commit_message>
<xml_diff>
--- a/design/PCB Design.pptx
+++ b/design/PCB Design.pptx
@@ -117,7 +117,7 @@
 <file path=ppt/revisionInfo.xml><?xml version="1.0" encoding="utf-8"?>
 <p1510:revInfo xmlns:a="http://schemas.openxmlformats.org/drawingml/2006/main" xmlns:r="http://schemas.openxmlformats.org/officeDocument/2006/relationships" xmlns:p1510="http://schemas.microsoft.com/office/powerpoint/2015/10/main">
   <p1510:revLst>
-    <p1510:client id="{C3A6CD6C-1DA5-47FB-A775-C4A3C3FB9D49}" v="91" dt="2023-05-27T04:05:07.209"/>
+    <p1510:client id="{C3A6CD6C-1DA5-47FB-A775-C4A3C3FB9D49}" v="164" dt="2023-05-27T08:52:41.631"/>
   </p1510:revLst>
 </p1510:revInfo>
 </file>
@@ -127,16 +127,24 @@
   <pc:docChgLst>
     <pc:chgData name="Olivier Grenadou" userId="02d4787ce9b02c5a" providerId="LiveId" clId="{C3A6CD6C-1DA5-47FB-A775-C4A3C3FB9D49}"/>
     <pc:docChg chg="undo custSel addSld modSld modMainMaster">
-      <pc:chgData name="Olivier Grenadou" userId="02d4787ce9b02c5a" providerId="LiveId" clId="{C3A6CD6C-1DA5-47FB-A775-C4A3C3FB9D49}" dt="2023-05-27T04:05:07.209" v="1574"/>
+      <pc:chgData name="Olivier Grenadou" userId="02d4787ce9b02c5a" providerId="LiveId" clId="{C3A6CD6C-1DA5-47FB-A775-C4A3C3FB9D49}" dt="2023-05-27T08:52:41.630" v="1755" actId="206"/>
       <pc:docMkLst>
         <pc:docMk/>
       </pc:docMkLst>
       <pc:sldChg chg="addSp delSp modSp mod">
-        <pc:chgData name="Olivier Grenadou" userId="02d4787ce9b02c5a" providerId="LiveId" clId="{C3A6CD6C-1DA5-47FB-A775-C4A3C3FB9D49}" dt="2023-05-26T03:40:16.448" v="1571" actId="20577"/>
+        <pc:chgData name="Olivier Grenadou" userId="02d4787ce9b02c5a" providerId="LiveId" clId="{C3A6CD6C-1DA5-47FB-A775-C4A3C3FB9D49}" dt="2023-05-27T08:52:41.630" v="1755" actId="206"/>
         <pc:sldMkLst>
           <pc:docMk/>
           <pc:sldMk cId="3274058770" sldId="256"/>
         </pc:sldMkLst>
+        <pc:spChg chg="add mod">
+          <ac:chgData name="Olivier Grenadou" userId="02d4787ce9b02c5a" providerId="LiveId" clId="{C3A6CD6C-1DA5-47FB-A775-C4A3C3FB9D49}" dt="2023-05-27T08:12:37.659" v="1618" actId="108"/>
+          <ac:spMkLst>
+            <pc:docMk/>
+            <pc:sldMk cId="3274058770" sldId="256"/>
+            <ac:spMk id="2" creationId="{83613679-65B8-AEE2-63F7-F74B237B70FF}"/>
+          </ac:spMkLst>
+        </pc:spChg>
         <pc:spChg chg="add del">
           <ac:chgData name="Olivier Grenadou" userId="02d4787ce9b02c5a" providerId="LiveId" clId="{C3A6CD6C-1DA5-47FB-A775-C4A3C3FB9D49}" dt="2023-05-26T03:28:18.819" v="1404" actId="478"/>
           <ac:spMkLst>
@@ -146,11 +154,19 @@
           </ac:spMkLst>
         </pc:spChg>
         <pc:spChg chg="add mod">
-          <ac:chgData name="Olivier Grenadou" userId="02d4787ce9b02c5a" providerId="LiveId" clId="{C3A6CD6C-1DA5-47FB-A775-C4A3C3FB9D49}" dt="2023-05-26T03:30:13.575" v="1414" actId="206"/>
+          <ac:chgData name="Olivier Grenadou" userId="02d4787ce9b02c5a" providerId="LiveId" clId="{C3A6CD6C-1DA5-47FB-A775-C4A3C3FB9D49}" dt="2023-05-27T08:07:56.423" v="1578" actId="206"/>
           <ac:spMkLst>
             <pc:docMk/>
             <pc:sldMk cId="3274058770" sldId="256"/>
             <ac:spMk id="3" creationId="{BADB9E78-9A1F-91CF-5677-E1185D92FC4B}"/>
+          </ac:spMkLst>
+        </pc:spChg>
+        <pc:spChg chg="add mod">
+          <ac:chgData name="Olivier Grenadou" userId="02d4787ce9b02c5a" providerId="LiveId" clId="{C3A6CD6C-1DA5-47FB-A775-C4A3C3FB9D49}" dt="2023-05-27T08:10:44.995" v="1611" actId="1076"/>
+          <ac:spMkLst>
+            <pc:docMk/>
+            <pc:sldMk cId="3274058770" sldId="256"/>
+            <ac:spMk id="4" creationId="{A69DCEBF-3ADD-A5FE-432B-A4F2E6899BD4}"/>
           </ac:spMkLst>
         </pc:spChg>
         <pc:spChg chg="add del mod">
@@ -169,6 +185,22 @@
             <ac:spMk id="5" creationId="{0DE719BC-FAA1-3B3E-87C1-3AF8FD9C9901}"/>
           </ac:spMkLst>
         </pc:spChg>
+        <pc:spChg chg="add mod">
+          <ac:chgData name="Olivier Grenadou" userId="02d4787ce9b02c5a" providerId="LiveId" clId="{C3A6CD6C-1DA5-47FB-A775-C4A3C3FB9D49}" dt="2023-05-27T08:10:29.904" v="1608" actId="20577"/>
+          <ac:spMkLst>
+            <pc:docMk/>
+            <pc:sldMk cId="3274058770" sldId="256"/>
+            <ac:spMk id="5" creationId="{85BFD9A1-F1B0-0F7E-0E3D-48F6464F1316}"/>
+          </ac:spMkLst>
+        </pc:spChg>
+        <pc:spChg chg="add mod">
+          <ac:chgData name="Olivier Grenadou" userId="02d4787ce9b02c5a" providerId="LiveId" clId="{C3A6CD6C-1DA5-47FB-A775-C4A3C3FB9D49}" dt="2023-05-27T08:10:51.035" v="1612" actId="1076"/>
+          <ac:spMkLst>
+            <pc:docMk/>
+            <pc:sldMk cId="3274058770" sldId="256"/>
+            <ac:spMk id="6" creationId="{AE8A2E08-C470-985C-3CEA-EDCF06E272A0}"/>
+          </ac:spMkLst>
+        </pc:spChg>
         <pc:spChg chg="add del mod">
           <ac:chgData name="Olivier Grenadou" userId="02d4787ce9b02c5a" providerId="LiveId" clId="{C3A6CD6C-1DA5-47FB-A775-C4A3C3FB9D49}" dt="2023-05-26T03:39:28.261" v="1529" actId="478"/>
           <ac:spMkLst>
@@ -226,6 +258,22 @@
           </ac:spMkLst>
         </pc:spChg>
         <pc:spChg chg="add mod">
+          <ac:chgData name="Olivier Grenadou" userId="02d4787ce9b02c5a" providerId="LiveId" clId="{C3A6CD6C-1DA5-47FB-A775-C4A3C3FB9D49}" dt="2023-05-27T08:12:18.148" v="1616" actId="208"/>
+          <ac:spMkLst>
+            <pc:docMk/>
+            <pc:sldMk cId="3274058770" sldId="256"/>
+            <ac:spMk id="17" creationId="{F451F519-720D-A342-AC35-CA66EC0A07C4}"/>
+          </ac:spMkLst>
+        </pc:spChg>
+        <pc:spChg chg="add mod">
+          <ac:chgData name="Olivier Grenadou" userId="02d4787ce9b02c5a" providerId="LiveId" clId="{C3A6CD6C-1DA5-47FB-A775-C4A3C3FB9D49}" dt="2023-05-27T08:30:14.371" v="1679" actId="206"/>
+          <ac:spMkLst>
+            <pc:docMk/>
+            <pc:sldMk cId="3274058770" sldId="256"/>
+            <ac:spMk id="18" creationId="{589342D9-627F-4CFA-9402-96EBC35ED237}"/>
+          </ac:spMkLst>
+        </pc:spChg>
+        <pc:spChg chg="add mod">
           <ac:chgData name="Olivier Grenadou" userId="02d4787ce9b02c5a" providerId="LiveId" clId="{C3A6CD6C-1DA5-47FB-A775-C4A3C3FB9D49}" dt="2023-05-24T08:39:27.866" v="1396" actId="165"/>
           <ac:spMkLst>
             <pc:docMk/>
@@ -346,7 +394,7 @@
           </ac:spMkLst>
         </pc:spChg>
         <pc:spChg chg="add mod topLvl">
-          <ac:chgData name="Olivier Grenadou" userId="02d4787ce9b02c5a" providerId="LiveId" clId="{C3A6CD6C-1DA5-47FB-A775-C4A3C3FB9D49}" dt="2023-05-24T08:39:27.866" v="1396" actId="165"/>
+          <ac:chgData name="Olivier Grenadou" userId="02d4787ce9b02c5a" providerId="LiveId" clId="{C3A6CD6C-1DA5-47FB-A775-C4A3C3FB9D49}" dt="2023-05-27T08:43:20.603" v="1736" actId="14100"/>
           <ac:spMkLst>
             <pc:docMk/>
             <pc:sldMk cId="3274058770" sldId="256"/>
@@ -674,7 +722,7 @@
           </ac:spMkLst>
         </pc:spChg>
         <pc:spChg chg="add mod topLvl">
-          <ac:chgData name="Olivier Grenadou" userId="02d4787ce9b02c5a" providerId="LiveId" clId="{C3A6CD6C-1DA5-47FB-A775-C4A3C3FB9D49}" dt="2023-05-24T08:39:27.866" v="1396" actId="165"/>
+          <ac:chgData name="Olivier Grenadou" userId="02d4787ce9b02c5a" providerId="LiveId" clId="{C3A6CD6C-1DA5-47FB-A775-C4A3C3FB9D49}" dt="2023-05-27T08:43:17.708" v="1735" actId="14100"/>
           <ac:spMkLst>
             <pc:docMk/>
             <pc:sldMk cId="3274058770" sldId="256"/>
@@ -730,7 +778,7 @@
           </ac:spMkLst>
         </pc:spChg>
         <pc:spChg chg="add mod topLvl">
-          <ac:chgData name="Olivier Grenadou" userId="02d4787ce9b02c5a" providerId="LiveId" clId="{C3A6CD6C-1DA5-47FB-A775-C4A3C3FB9D49}" dt="2023-05-24T08:39:27.866" v="1396" actId="165"/>
+          <ac:chgData name="Olivier Grenadou" userId="02d4787ce9b02c5a" providerId="LiveId" clId="{C3A6CD6C-1DA5-47FB-A775-C4A3C3FB9D49}" dt="2023-05-27T08:43:14.905" v="1734" actId="14100"/>
           <ac:spMkLst>
             <pc:docMk/>
             <pc:sldMk cId="3274058770" sldId="256"/>
@@ -818,7 +866,7 @@
           </ac:spMkLst>
         </pc:spChg>
         <pc:spChg chg="add mod topLvl">
-          <ac:chgData name="Olivier Grenadou" userId="02d4787ce9b02c5a" providerId="LiveId" clId="{C3A6CD6C-1DA5-47FB-A775-C4A3C3FB9D49}" dt="2023-05-24T08:39:27.866" v="1396" actId="165"/>
+          <ac:chgData name="Olivier Grenadou" userId="02d4787ce9b02c5a" providerId="LiveId" clId="{C3A6CD6C-1DA5-47FB-A775-C4A3C3FB9D49}" dt="2023-05-27T08:16:34.580" v="1637" actId="208"/>
           <ac:spMkLst>
             <pc:docMk/>
             <pc:sldMk cId="3274058770" sldId="256"/>
@@ -826,11 +874,19 @@
           </ac:spMkLst>
         </pc:spChg>
         <pc:spChg chg="add mod topLvl">
-          <ac:chgData name="Olivier Grenadou" userId="02d4787ce9b02c5a" providerId="LiveId" clId="{C3A6CD6C-1DA5-47FB-A775-C4A3C3FB9D49}" dt="2023-05-24T08:39:27.866" v="1396" actId="165"/>
+          <ac:chgData name="Olivier Grenadou" userId="02d4787ce9b02c5a" providerId="LiveId" clId="{C3A6CD6C-1DA5-47FB-A775-C4A3C3FB9D49}" dt="2023-05-27T08:15:38.723" v="1631" actId="1076"/>
           <ac:spMkLst>
             <pc:docMk/>
             <pc:sldMk cId="3274058770" sldId="256"/>
             <ac:spMk id="1135" creationId="{15E65E57-28ED-86E5-0F3A-9937BE79A7FB}"/>
+          </ac:spMkLst>
+        </pc:spChg>
+        <pc:spChg chg="add mod">
+          <ac:chgData name="Olivier Grenadou" userId="02d4787ce9b02c5a" providerId="LiveId" clId="{C3A6CD6C-1DA5-47FB-A775-C4A3C3FB9D49}" dt="2023-05-27T08:36:20.071" v="1706" actId="206"/>
+          <ac:spMkLst>
+            <pc:docMk/>
+            <pc:sldMk cId="3274058770" sldId="256"/>
+            <ac:spMk id="1136" creationId="{773C9390-0835-5B4F-1078-93D1A4306FEF}"/>
           </ac:spMkLst>
         </pc:spChg>
         <pc:spChg chg="mod">
@@ -929,6 +985,14 @@
             <ac:spMk id="1154" creationId="{B1EA74C0-29C5-C80F-52BC-0DFE5D7C0A42}"/>
           </ac:spMkLst>
         </pc:spChg>
+        <pc:spChg chg="add mod">
+          <ac:chgData name="Olivier Grenadou" userId="02d4787ce9b02c5a" providerId="LiveId" clId="{C3A6CD6C-1DA5-47FB-A775-C4A3C3FB9D49}" dt="2023-05-27T08:19:56.392" v="1654" actId="14100"/>
+          <ac:spMkLst>
+            <pc:docMk/>
+            <pc:sldMk cId="3274058770" sldId="256"/>
+            <ac:spMk id="1155" creationId="{B33C3518-F04F-07DF-C1B0-58951A87492A}"/>
+          </ac:spMkLst>
+        </pc:spChg>
         <pc:spChg chg="mod">
           <ac:chgData name="Olivier Grenadou" userId="02d4787ce9b02c5a" providerId="LiveId" clId="{C3A6CD6C-1DA5-47FB-A775-C4A3C3FB9D49}" dt="2023-05-24T08:39:27.866" v="1396" actId="165"/>
           <ac:spMkLst>
@@ -1073,6 +1137,14 @@
             <ac:spMk id="1187" creationId="{8B7160D5-1E27-C5D1-2E33-860BF0600F22}"/>
           </ac:spMkLst>
         </pc:spChg>
+        <pc:spChg chg="add mod">
+          <ac:chgData name="Olivier Grenadou" userId="02d4787ce9b02c5a" providerId="LiveId" clId="{C3A6CD6C-1DA5-47FB-A775-C4A3C3FB9D49}" dt="2023-05-27T08:21:57.556" v="1656" actId="208"/>
+          <ac:spMkLst>
+            <pc:docMk/>
+            <pc:sldMk cId="3274058770" sldId="256"/>
+            <ac:spMk id="1189" creationId="{0A5E1C84-E347-35DC-9F71-0F24038D4FC0}"/>
+          </ac:spMkLst>
+        </pc:spChg>
         <pc:spChg chg="add del mod">
           <ac:chgData name="Olivier Grenadou" userId="02d4787ce9b02c5a" providerId="LiveId" clId="{C3A6CD6C-1DA5-47FB-A775-C4A3C3FB9D49}" dt="2023-05-24T07:36:35.008" v="1281" actId="478"/>
           <ac:spMkLst>
@@ -1210,11 +1282,75 @@
           </ac:spMkLst>
         </pc:spChg>
         <pc:spChg chg="add mod topLvl">
-          <ac:chgData name="Olivier Grenadou" userId="02d4787ce9b02c5a" providerId="LiveId" clId="{C3A6CD6C-1DA5-47FB-A775-C4A3C3FB9D49}" dt="2023-05-24T09:00:32.886" v="1402" actId="20577"/>
+          <ac:chgData name="Olivier Grenadou" userId="02d4787ce9b02c5a" providerId="LiveId" clId="{C3A6CD6C-1DA5-47FB-A775-C4A3C3FB9D49}" dt="2023-05-27T08:43:24.485" v="1737" actId="14100"/>
           <ac:spMkLst>
             <pc:docMk/>
             <pc:sldMk cId="3274058770" sldId="256"/>
             <ac:spMk id="1214" creationId="{6AB3D845-B806-61CD-44C5-F06D524D6962}"/>
+          </ac:spMkLst>
+        </pc:spChg>
+        <pc:spChg chg="add mod">
+          <ac:chgData name="Olivier Grenadou" userId="02d4787ce9b02c5a" providerId="LiveId" clId="{C3A6CD6C-1DA5-47FB-A775-C4A3C3FB9D49}" dt="2023-05-27T08:23:25.048" v="1658" actId="208"/>
+          <ac:spMkLst>
+            <pc:docMk/>
+            <pc:sldMk cId="3274058770" sldId="256"/>
+            <ac:spMk id="1215" creationId="{6DE34BF5-DEBE-F885-3D7E-EFC2B2CD45B7}"/>
+          </ac:spMkLst>
+        </pc:spChg>
+        <pc:spChg chg="add mod">
+          <ac:chgData name="Olivier Grenadou" userId="02d4787ce9b02c5a" providerId="LiveId" clId="{C3A6CD6C-1DA5-47FB-A775-C4A3C3FB9D49}" dt="2023-05-27T08:28:57.111" v="1660" actId="208"/>
+          <ac:spMkLst>
+            <pc:docMk/>
+            <pc:sldMk cId="3274058770" sldId="256"/>
+            <ac:spMk id="1216" creationId="{7C5B4BD5-5D29-09CD-C27A-65D7B0363B7C}"/>
+          </ac:spMkLst>
+        </pc:spChg>
+        <pc:spChg chg="add mod">
+          <ac:chgData name="Olivier Grenadou" userId="02d4787ce9b02c5a" providerId="LiveId" clId="{C3A6CD6C-1DA5-47FB-A775-C4A3C3FB9D49}" dt="2023-05-27T08:29:19.223" v="1666" actId="206"/>
+          <ac:spMkLst>
+            <pc:docMk/>
+            <pc:sldMk cId="3274058770" sldId="256"/>
+            <ac:spMk id="1217" creationId="{33B8243C-8A91-8BCF-DCD2-1F175D01AEC3}"/>
+          </ac:spMkLst>
+        </pc:spChg>
+        <pc:spChg chg="add mod">
+          <ac:chgData name="Olivier Grenadou" userId="02d4787ce9b02c5a" providerId="LiveId" clId="{C3A6CD6C-1DA5-47FB-A775-C4A3C3FB9D49}" dt="2023-05-27T08:31:34.963" v="1684" actId="206"/>
+          <ac:spMkLst>
+            <pc:docMk/>
+            <pc:sldMk cId="3274058770" sldId="256"/>
+            <ac:spMk id="1218" creationId="{44F1A6C0-5572-60CD-8B2A-7FFA3851FFED}"/>
+          </ac:spMkLst>
+        </pc:spChg>
+        <pc:spChg chg="add mod">
+          <ac:chgData name="Olivier Grenadou" userId="02d4787ce9b02c5a" providerId="LiveId" clId="{C3A6CD6C-1DA5-47FB-A775-C4A3C3FB9D49}" dt="2023-05-27T08:32:19.779" v="1690" actId="206"/>
+          <ac:spMkLst>
+            <pc:docMk/>
+            <pc:sldMk cId="3274058770" sldId="256"/>
+            <ac:spMk id="1220" creationId="{2B745B1A-8D86-686F-356E-4EB60D9A54B4}"/>
+          </ac:spMkLst>
+        </pc:spChg>
+        <pc:spChg chg="add mod">
+          <ac:chgData name="Olivier Grenadou" userId="02d4787ce9b02c5a" providerId="LiveId" clId="{C3A6CD6C-1DA5-47FB-A775-C4A3C3FB9D49}" dt="2023-05-27T08:37:40.023" v="1715" actId="206"/>
+          <ac:spMkLst>
+            <pc:docMk/>
+            <pc:sldMk cId="3274058770" sldId="256"/>
+            <ac:spMk id="1221" creationId="{5EB22906-593E-14DA-CB2B-670181DE6A2C}"/>
+          </ac:spMkLst>
+        </pc:spChg>
+        <pc:spChg chg="add mod">
+          <ac:chgData name="Olivier Grenadou" userId="02d4787ce9b02c5a" providerId="LiveId" clId="{C3A6CD6C-1DA5-47FB-A775-C4A3C3FB9D49}" dt="2023-05-27T08:36:51.008" v="1710" actId="20577"/>
+          <ac:spMkLst>
+            <pc:docMk/>
+            <pc:sldMk cId="3274058770" sldId="256"/>
+            <ac:spMk id="1222" creationId="{C25EC4A5-D032-2108-EF0D-E30088BA0E5E}"/>
+          </ac:spMkLst>
+        </pc:spChg>
+        <pc:spChg chg="add mod">
+          <ac:chgData name="Olivier Grenadou" userId="02d4787ce9b02c5a" providerId="LiveId" clId="{C3A6CD6C-1DA5-47FB-A775-C4A3C3FB9D49}" dt="2023-05-27T08:38:35.188" v="1717" actId="208"/>
+          <ac:spMkLst>
+            <pc:docMk/>
+            <pc:sldMk cId="3274058770" sldId="256"/>
+            <ac:spMk id="1223" creationId="{D0A9ADAF-86DE-DC2A-EF33-DFC0070D2BEA}"/>
           </ac:spMkLst>
         </pc:spChg>
         <pc:spChg chg="add mod topLvl">
@@ -1249,6 +1385,22 @@
             <ac:spMk id="1233" creationId="{DB918F86-CB7C-0E07-744E-0CFF4BE57FCC}"/>
           </ac:spMkLst>
         </pc:spChg>
+        <pc:spChg chg="add del mod">
+          <ac:chgData name="Olivier Grenadou" userId="02d4787ce9b02c5a" providerId="LiveId" clId="{C3A6CD6C-1DA5-47FB-A775-C4A3C3FB9D49}" dt="2023-05-27T08:51:00.432" v="1751" actId="478"/>
+          <ac:spMkLst>
+            <pc:docMk/>
+            <pc:sldMk cId="3274058770" sldId="256"/>
+            <ac:spMk id="1239" creationId="{36CC8B83-6042-B97E-1862-7E8469EC4783}"/>
+          </ac:spMkLst>
+        </pc:spChg>
+        <pc:spChg chg="add mod">
+          <ac:chgData name="Olivier Grenadou" userId="02d4787ce9b02c5a" providerId="LiveId" clId="{C3A6CD6C-1DA5-47FB-A775-C4A3C3FB9D49}" dt="2023-05-27T08:52:41.630" v="1755" actId="206"/>
+          <ac:spMkLst>
+            <pc:docMk/>
+            <pc:sldMk cId="3274058770" sldId="256"/>
+            <ac:spMk id="1240" creationId="{7D2A9A6B-1528-DDCC-1719-8EAF042DCF54}"/>
+          </ac:spMkLst>
+        </pc:spChg>
         <pc:grpChg chg="add mod topLvl">
           <ac:chgData name="Olivier Grenadou" userId="02d4787ce9b02c5a" providerId="LiveId" clId="{C3A6CD6C-1DA5-47FB-A775-C4A3C3FB9D49}" dt="2023-05-24T08:39:27.866" v="1396" actId="165"/>
           <ac:grpSpMkLst>
@@ -1490,7 +1642,7 @@
           </ac:grpSpMkLst>
         </pc:grpChg>
         <pc:grpChg chg="add mod topLvl">
-          <ac:chgData name="Olivier Grenadou" userId="02d4787ce9b02c5a" providerId="LiveId" clId="{C3A6CD6C-1DA5-47FB-A775-C4A3C3FB9D49}" dt="2023-05-24T08:39:27.866" v="1396" actId="165"/>
+          <ac:chgData name="Olivier Grenadou" userId="02d4787ce9b02c5a" providerId="LiveId" clId="{C3A6CD6C-1DA5-47FB-A775-C4A3C3FB9D49}" dt="2023-05-27T08:42:53.206" v="1729" actId="1035"/>
           <ac:grpSpMkLst>
             <pc:docMk/>
             <pc:sldMk cId="3274058770" sldId="256"/>
@@ -1498,7 +1650,7 @@
           </ac:grpSpMkLst>
         </pc:grpChg>
         <pc:grpChg chg="add mod topLvl">
-          <ac:chgData name="Olivier Grenadou" userId="02d4787ce9b02c5a" providerId="LiveId" clId="{C3A6CD6C-1DA5-47FB-A775-C4A3C3FB9D49}" dt="2023-05-24T08:39:27.866" v="1396" actId="165"/>
+          <ac:chgData name="Olivier Grenadou" userId="02d4787ce9b02c5a" providerId="LiveId" clId="{C3A6CD6C-1DA5-47FB-A775-C4A3C3FB9D49}" dt="2023-05-27T08:42:34.635" v="1724" actId="1076"/>
           <ac:grpSpMkLst>
             <pc:docMk/>
             <pc:sldMk cId="3274058770" sldId="256"/>
@@ -1506,7 +1658,7 @@
           </ac:grpSpMkLst>
         </pc:grpChg>
         <pc:grpChg chg="add mod topLvl">
-          <ac:chgData name="Olivier Grenadou" userId="02d4787ce9b02c5a" providerId="LiveId" clId="{C3A6CD6C-1DA5-47FB-A775-C4A3C3FB9D49}" dt="2023-05-24T08:39:27.866" v="1396" actId="165"/>
+          <ac:chgData name="Olivier Grenadou" userId="02d4787ce9b02c5a" providerId="LiveId" clId="{C3A6CD6C-1DA5-47FB-A775-C4A3C3FB9D49}" dt="2023-05-27T08:42:39.433" v="1725" actId="1036"/>
           <ac:grpSpMkLst>
             <pc:docMk/>
             <pc:sldMk cId="3274058770" sldId="256"/>
@@ -1522,7 +1674,7 @@
           </ac:grpSpMkLst>
         </pc:grpChg>
         <pc:grpChg chg="add mod topLvl">
-          <ac:chgData name="Olivier Grenadou" userId="02d4787ce9b02c5a" providerId="LiveId" clId="{C3A6CD6C-1DA5-47FB-A775-C4A3C3FB9D49}" dt="2023-05-24T08:39:27.866" v="1396" actId="165"/>
+          <ac:chgData name="Olivier Grenadou" userId="02d4787ce9b02c5a" providerId="LiveId" clId="{C3A6CD6C-1DA5-47FB-A775-C4A3C3FB9D49}" dt="2023-05-27T08:42:53.206" v="1729" actId="1035"/>
           <ac:grpSpMkLst>
             <pc:docMk/>
             <pc:sldMk cId="3274058770" sldId="256"/>
@@ -1530,7 +1682,7 @@
           </ac:grpSpMkLst>
         </pc:grpChg>
         <pc:grpChg chg="add mod topLvl">
-          <ac:chgData name="Olivier Grenadou" userId="02d4787ce9b02c5a" providerId="LiveId" clId="{C3A6CD6C-1DA5-47FB-A775-C4A3C3FB9D49}" dt="2023-05-24T08:39:27.866" v="1396" actId="165"/>
+          <ac:chgData name="Olivier Grenadou" userId="02d4787ce9b02c5a" providerId="LiveId" clId="{C3A6CD6C-1DA5-47FB-A775-C4A3C3FB9D49}" dt="2023-05-27T08:42:34.635" v="1724" actId="1076"/>
           <ac:grpSpMkLst>
             <pc:docMk/>
             <pc:sldMk cId="3274058770" sldId="256"/>
@@ -1658,7 +1810,7 @@
           </ac:grpSpMkLst>
         </pc:grpChg>
         <pc:grpChg chg="add mod topLvl">
-          <ac:chgData name="Olivier Grenadou" userId="02d4787ce9b02c5a" providerId="LiveId" clId="{C3A6CD6C-1DA5-47FB-A775-C4A3C3FB9D49}" dt="2023-05-24T08:39:27.866" v="1396" actId="165"/>
+          <ac:chgData name="Olivier Grenadou" userId="02d4787ce9b02c5a" providerId="LiveId" clId="{C3A6CD6C-1DA5-47FB-A775-C4A3C3FB9D49}" dt="2023-05-27T08:35:21.484" v="1694" actId="1076"/>
           <ac:grpSpMkLst>
             <pc:docMk/>
             <pc:sldMk cId="3274058770" sldId="256"/>
@@ -1674,7 +1826,7 @@
           </ac:grpSpMkLst>
         </pc:grpChg>
         <pc:grpChg chg="add mod topLvl">
-          <ac:chgData name="Olivier Grenadou" userId="02d4787ce9b02c5a" providerId="LiveId" clId="{C3A6CD6C-1DA5-47FB-A775-C4A3C3FB9D49}" dt="2023-05-24T08:39:27.866" v="1396" actId="165"/>
+          <ac:chgData name="Olivier Grenadou" userId="02d4787ce9b02c5a" providerId="LiveId" clId="{C3A6CD6C-1DA5-47FB-A775-C4A3C3FB9D49}" dt="2023-05-27T08:35:31.347" v="1702" actId="1037"/>
           <ac:grpSpMkLst>
             <pc:docMk/>
             <pc:sldMk cId="3274058770" sldId="256"/>
@@ -1690,7 +1842,7 @@
           </ac:grpSpMkLst>
         </pc:grpChg>
         <pc:grpChg chg="add mod topLvl">
-          <ac:chgData name="Olivier Grenadou" userId="02d4787ce9b02c5a" providerId="LiveId" clId="{C3A6CD6C-1DA5-47FB-A775-C4A3C3FB9D49}" dt="2023-05-24T08:39:27.866" v="1396" actId="165"/>
+          <ac:chgData name="Olivier Grenadou" userId="02d4787ce9b02c5a" providerId="LiveId" clId="{C3A6CD6C-1DA5-47FB-A775-C4A3C3FB9D49}" dt="2023-05-27T08:44:14.677" v="1742" actId="1036"/>
           <ac:grpSpMkLst>
             <pc:docMk/>
             <pc:sldMk cId="3274058770" sldId="256"/>
@@ -1706,7 +1858,7 @@
           </ac:grpSpMkLst>
         </pc:grpChg>
         <pc:grpChg chg="add mod topLvl">
-          <ac:chgData name="Olivier Grenadou" userId="02d4787ce9b02c5a" providerId="LiveId" clId="{C3A6CD6C-1DA5-47FB-A775-C4A3C3FB9D49}" dt="2023-05-24T08:39:27.866" v="1396" actId="165"/>
+          <ac:chgData name="Olivier Grenadou" userId="02d4787ce9b02c5a" providerId="LiveId" clId="{C3A6CD6C-1DA5-47FB-A775-C4A3C3FB9D49}" dt="2023-05-27T08:44:13.112" v="1741" actId="1037"/>
           <ac:grpSpMkLst>
             <pc:docMk/>
             <pc:sldMk cId="3274058770" sldId="256"/>
@@ -1786,7 +1938,7 @@
           </ac:picMkLst>
         </pc:picChg>
         <pc:picChg chg="add mod topLvl">
-          <ac:chgData name="Olivier Grenadou" userId="02d4787ce9b02c5a" providerId="LiveId" clId="{C3A6CD6C-1DA5-47FB-A775-C4A3C3FB9D49}" dt="2023-05-24T08:39:27.866" v="1396" actId="165"/>
+          <ac:chgData name="Olivier Grenadou" userId="02d4787ce9b02c5a" providerId="LiveId" clId="{C3A6CD6C-1DA5-47FB-A775-C4A3C3FB9D49}" dt="2023-05-27T08:15:28.231" v="1630" actId="1076"/>
           <ac:picMkLst>
             <pc:docMk/>
             <pc:sldMk cId="3274058770" sldId="256"/>
@@ -1794,7 +1946,7 @@
           </ac:picMkLst>
         </pc:picChg>
         <pc:picChg chg="add mod topLvl">
-          <ac:chgData name="Olivier Grenadou" userId="02d4787ce9b02c5a" providerId="LiveId" clId="{C3A6CD6C-1DA5-47FB-A775-C4A3C3FB9D49}" dt="2023-05-24T08:39:27.866" v="1396" actId="165"/>
+          <ac:chgData name="Olivier Grenadou" userId="02d4787ce9b02c5a" providerId="LiveId" clId="{C3A6CD6C-1DA5-47FB-A775-C4A3C3FB9D49}" dt="2023-05-27T08:15:22.975" v="1629" actId="1076"/>
           <ac:picMkLst>
             <pc:docMk/>
             <pc:sldMk cId="3274058770" sldId="256"/>
@@ -1913,6 +2065,22 @@
             <ac:cxnSpMk id="1028" creationId="{ADC112D6-5427-C052-9148-8CDA3EB10E62}"/>
           </ac:cxnSpMkLst>
         </pc:cxnChg>
+        <pc:cxnChg chg="add mod">
+          <ac:chgData name="Olivier Grenadou" userId="02d4787ce9b02c5a" providerId="LiveId" clId="{C3A6CD6C-1DA5-47FB-A775-C4A3C3FB9D49}" dt="2023-05-27T08:15:58.216" v="1634" actId="1582"/>
+          <ac:cxnSpMkLst>
+            <pc:docMk/>
+            <pc:sldMk cId="3274058770" sldId="256"/>
+            <ac:cxnSpMk id="1132" creationId="{6F85F173-99D2-533A-951D-1FF2A363BC26}"/>
+          </ac:cxnSpMkLst>
+        </pc:cxnChg>
+        <pc:cxnChg chg="add mod">
+          <ac:chgData name="Olivier Grenadou" userId="02d4787ce9b02c5a" providerId="LiveId" clId="{C3A6CD6C-1DA5-47FB-A775-C4A3C3FB9D49}" dt="2023-05-27T08:16:09.408" v="1636" actId="1076"/>
+          <ac:cxnSpMkLst>
+            <pc:docMk/>
+            <pc:sldMk cId="3274058770" sldId="256"/>
+            <ac:cxnSpMk id="1133" creationId="{7E38EC22-FB55-DEB2-749F-C4A74EE88B1F}"/>
+          </ac:cxnSpMkLst>
+        </pc:cxnChg>
         <pc:cxnChg chg="add del mod">
           <ac:chgData name="Olivier Grenadou" userId="02d4787ce9b02c5a" providerId="LiveId" clId="{C3A6CD6C-1DA5-47FB-A775-C4A3C3FB9D49}" dt="2023-05-24T07:38:47.104" v="1356" actId="478"/>
           <ac:cxnSpMkLst>
@@ -1930,23 +2098,39 @@
           </ac:cxnSpMkLst>
         </pc:cxnChg>
         <pc:cxnChg chg="add mod topLvl">
-          <ac:chgData name="Olivier Grenadou" userId="02d4787ce9b02c5a" providerId="LiveId" clId="{C3A6CD6C-1DA5-47FB-A775-C4A3C3FB9D49}" dt="2023-05-24T08:39:27.866" v="1396" actId="165"/>
+          <ac:chgData name="Olivier Grenadou" userId="02d4787ce9b02c5a" providerId="LiveId" clId="{C3A6CD6C-1DA5-47FB-A775-C4A3C3FB9D49}" dt="2023-05-27T08:43:24.485" v="1737" actId="14100"/>
           <ac:cxnSpMkLst>
             <pc:docMk/>
             <pc:sldMk cId="3274058770" sldId="256"/>
             <ac:cxnSpMk id="1224" creationId="{71D6933B-3F95-DF8D-D4E2-E943122E2287}"/>
           </ac:cxnSpMkLst>
         </pc:cxnChg>
+        <pc:cxnChg chg="add mod">
+          <ac:chgData name="Olivier Grenadou" userId="02d4787ce9b02c5a" providerId="LiveId" clId="{C3A6CD6C-1DA5-47FB-A775-C4A3C3FB9D49}" dt="2023-05-27T08:40:54.721" v="1720" actId="1582"/>
+          <ac:cxnSpMkLst>
+            <pc:docMk/>
+            <pc:sldMk cId="3274058770" sldId="256"/>
+            <ac:cxnSpMk id="1226" creationId="{D8249075-654F-4D00-B766-FF5828ABAB56}"/>
+          </ac:cxnSpMkLst>
+        </pc:cxnChg>
         <pc:cxnChg chg="add mod topLvl">
-          <ac:chgData name="Olivier Grenadou" userId="02d4787ce9b02c5a" providerId="LiveId" clId="{C3A6CD6C-1DA5-47FB-A775-C4A3C3FB9D49}" dt="2023-05-24T08:39:27.866" v="1396" actId="165"/>
+          <ac:chgData name="Olivier Grenadou" userId="02d4787ce9b02c5a" providerId="LiveId" clId="{C3A6CD6C-1DA5-47FB-A775-C4A3C3FB9D49}" dt="2023-05-27T08:43:14.905" v="1734" actId="14100"/>
           <ac:cxnSpMkLst>
             <pc:docMk/>
             <pc:sldMk cId="3274058770" sldId="256"/>
             <ac:cxnSpMk id="1227" creationId="{8086FF8C-053C-55D5-FC5B-4DD2E3CF0DBC}"/>
           </ac:cxnSpMkLst>
         </pc:cxnChg>
+        <pc:cxnChg chg="add mod">
+          <ac:chgData name="Olivier Grenadou" userId="02d4787ce9b02c5a" providerId="LiveId" clId="{C3A6CD6C-1DA5-47FB-A775-C4A3C3FB9D49}" dt="2023-05-27T08:41:01.216" v="1722" actId="1076"/>
+          <ac:cxnSpMkLst>
+            <pc:docMk/>
+            <pc:sldMk cId="3274058770" sldId="256"/>
+            <ac:cxnSpMk id="1228" creationId="{72507A51-F4B4-4C48-F81A-5BB149EEF802}"/>
+          </ac:cxnSpMkLst>
+        </pc:cxnChg>
         <pc:cxnChg chg="add mod topLvl">
-          <ac:chgData name="Olivier Grenadou" userId="02d4787ce9b02c5a" providerId="LiveId" clId="{C3A6CD6C-1DA5-47FB-A775-C4A3C3FB9D49}" dt="2023-05-24T08:39:27.866" v="1396" actId="165"/>
+          <ac:chgData name="Olivier Grenadou" userId="02d4787ce9b02c5a" providerId="LiveId" clId="{C3A6CD6C-1DA5-47FB-A775-C4A3C3FB9D49}" dt="2023-05-27T08:43:14.905" v="1734" actId="14100"/>
           <ac:cxnSpMkLst>
             <pc:docMk/>
             <pc:sldMk cId="3274058770" sldId="256"/>
@@ -1954,7 +2138,7 @@
           </ac:cxnSpMkLst>
         </pc:cxnChg>
         <pc:cxnChg chg="add mod topLvl">
-          <ac:chgData name="Olivier Grenadou" userId="02d4787ce9b02c5a" providerId="LiveId" clId="{C3A6CD6C-1DA5-47FB-A775-C4A3C3FB9D49}" dt="2023-05-24T08:39:27.866" v="1396" actId="165"/>
+          <ac:chgData name="Olivier Grenadou" userId="02d4787ce9b02c5a" providerId="LiveId" clId="{C3A6CD6C-1DA5-47FB-A775-C4A3C3FB9D49}" dt="2023-05-27T08:43:24.485" v="1737" actId="14100"/>
           <ac:cxnSpMkLst>
             <pc:docMk/>
             <pc:sldMk cId="3274058770" sldId="256"/>
@@ -6788,8 +6972,8 @@
         </p:nvSpPr>
         <p:spPr>
           <a:xfrm>
-            <a:off x="4221373" y="3136366"/>
-            <a:ext cx="975528" cy="140615"/>
+            <a:off x="4221373" y="3136367"/>
+            <a:ext cx="975528" cy="113092"/>
           </a:xfrm>
           <a:prstGeom prst="rect">
             <a:avLst/>
@@ -8809,7 +8993,7 @@
         <p:spPr>
           <a:xfrm>
             <a:off x="4215988" y="3564240"/>
-            <a:ext cx="975528" cy="140615"/>
+            <a:ext cx="975528" cy="118297"/>
           </a:xfrm>
           <a:prstGeom prst="rect">
             <a:avLst/>
@@ -9008,7 +9192,7 @@
         </p:nvGrpSpPr>
         <p:grpSpPr>
           <a:xfrm>
-            <a:off x="3805374" y="4099871"/>
+            <a:off x="3906558" y="4101037"/>
             <a:ext cx="96139" cy="86801"/>
             <a:chOff x="5638800" y="2824162"/>
             <a:chExt cx="111919" cy="97631"/>
@@ -9138,7 +9322,7 @@
         </p:nvGrpSpPr>
         <p:grpSpPr>
           <a:xfrm>
-            <a:off x="3903558" y="4099871"/>
+            <a:off x="3804747" y="4101355"/>
             <a:ext cx="96139" cy="86801"/>
             <a:chOff x="5638800" y="2824162"/>
             <a:chExt cx="111919" cy="97631"/>
@@ -9269,7 +9453,7 @@
         <p:spPr>
           <a:xfrm>
             <a:off x="4215988" y="3965365"/>
-            <a:ext cx="1044714" cy="219298"/>
+            <a:ext cx="1044714" cy="170389"/>
           </a:xfrm>
           <a:prstGeom prst="rect">
             <a:avLst/>
@@ -9319,7 +9503,7 @@
                 <a:latin typeface="Courier New" panose="02070309020205020404" pitchFamily="49" charset="0"/>
                 <a:cs typeface="Courier New" panose="02070309020205020404" pitchFamily="49" charset="0"/>
               </a:rPr>
-              <a:t>GND-VCC5V-VCC33-TRIGGER1</a:t>
+              <a:t>GND-VCC33-TRIGGER1-VCC5V</a:t>
             </a:r>
           </a:p>
           <a:p>
@@ -9333,7 +9517,7 @@
                 <a:latin typeface="Courier New" panose="02070309020205020404" pitchFamily="49" charset="0"/>
                 <a:cs typeface="Courier New" panose="02070309020205020404" pitchFamily="49" charset="0"/>
               </a:rPr>
-              <a:t>GND-VCC5V-VCC33-TRIGGER2</a:t>
+              <a:t>GND-VCC33-TRIGGER2-VCC5V</a:t>
             </a:r>
           </a:p>
           <a:p>
@@ -9363,7 +9547,7 @@
         </p:nvGrpSpPr>
         <p:grpSpPr>
           <a:xfrm>
-            <a:off x="3705486" y="4099087"/>
+            <a:off x="3705486" y="4102262"/>
             <a:ext cx="96139" cy="86801"/>
             <a:chOff x="5638800" y="2824162"/>
             <a:chExt cx="111919" cy="97631"/>
@@ -9623,7 +9807,7 @@
         </p:nvGrpSpPr>
         <p:grpSpPr>
           <a:xfrm>
-            <a:off x="3805374" y="3902018"/>
+            <a:off x="3906558" y="3903184"/>
             <a:ext cx="96139" cy="86801"/>
             <a:chOff x="5638800" y="2824162"/>
             <a:chExt cx="111919" cy="97631"/>
@@ -9753,7 +9937,7 @@
         </p:nvGrpSpPr>
         <p:grpSpPr>
           <a:xfrm>
-            <a:off x="3903558" y="3902018"/>
+            <a:off x="3804747" y="3903502"/>
             <a:ext cx="96139" cy="86801"/>
             <a:chOff x="5638800" y="2824162"/>
             <a:chExt cx="111919" cy="97631"/>
@@ -10020,8 +10204,13 @@
             <a:avLst/>
           </a:prstGeom>
           <a:solidFill>
-            <a:srgbClr val="00B0F0"/>
+            <a:srgbClr val="90F828"/>
           </a:solidFill>
+          <a:ln w="28575">
+            <a:solidFill>
+              <a:srgbClr val="00B050"/>
+            </a:solidFill>
+          </a:ln>
         </p:spPr>
         <p:style>
           <a:lnRef idx="1">
@@ -10060,15 +10249,20 @@
         </p:nvSpPr>
         <p:spPr>
           <a:xfrm>
-            <a:off x="3336189" y="4069536"/>
+            <a:off x="3137658" y="3871244"/>
             <a:ext cx="138729" cy="139552"/>
           </a:xfrm>
           <a:prstGeom prst="ellipse">
             <a:avLst/>
           </a:prstGeom>
           <a:solidFill>
-            <a:srgbClr val="00B0F0"/>
+            <a:srgbClr val="FF7C80"/>
           </a:solidFill>
+          <a:ln w="28575">
+            <a:solidFill>
+              <a:srgbClr val="FF0000"/>
+            </a:solidFill>
+          </a:ln>
         </p:spPr>
         <p:style>
           <a:lnRef idx="1">
@@ -10970,7 +11164,7 @@
         </p:blipFill>
         <p:spPr>
           <a:xfrm rot="5400000">
-            <a:off x="3212939" y="3589496"/>
+            <a:off x="3317522" y="3586671"/>
             <a:ext cx="283747" cy="90105"/>
           </a:xfrm>
           <a:prstGeom prst="rect">
@@ -11000,7 +11194,7 @@
         </p:blipFill>
         <p:spPr>
           <a:xfrm rot="5400000">
-            <a:off x="3112706" y="3589496"/>
+            <a:off x="3115592" y="3586672"/>
             <a:ext cx="283747" cy="90105"/>
           </a:xfrm>
           <a:prstGeom prst="rect">
@@ -12523,7 +12717,7 @@
         </p:nvGrpSpPr>
         <p:grpSpPr>
           <a:xfrm>
-            <a:off x="3408309" y="2653864"/>
+            <a:off x="3604680" y="2652923"/>
             <a:ext cx="96139" cy="86801"/>
             <a:chOff x="5638800" y="2824162"/>
             <a:chExt cx="111919" cy="97631"/>
@@ -12783,7 +12977,7 @@
         </p:nvGrpSpPr>
         <p:grpSpPr>
           <a:xfrm>
-            <a:off x="3604680" y="2653862"/>
+            <a:off x="3406350" y="2653176"/>
             <a:ext cx="96139" cy="86801"/>
             <a:chOff x="5638800" y="2824162"/>
             <a:chExt cx="111919" cy="97631"/>
@@ -13043,7 +13237,7 @@
         </p:nvGrpSpPr>
         <p:grpSpPr>
           <a:xfrm>
-            <a:off x="3408309" y="2846992"/>
+            <a:off x="3608044" y="2847754"/>
             <a:ext cx="96139" cy="86801"/>
             <a:chOff x="5638800" y="2824162"/>
             <a:chExt cx="111919" cy="97631"/>
@@ -13303,7 +13497,7 @@
         </p:nvGrpSpPr>
         <p:grpSpPr>
           <a:xfrm>
-            <a:off x="3604680" y="2846990"/>
+            <a:off x="3405969" y="2846990"/>
             <a:ext cx="96139" cy="86801"/>
             <a:chOff x="5638800" y="2824162"/>
             <a:chExt cx="111919" cy="97631"/>
@@ -13433,8 +13627,8 @@
         </p:nvSpPr>
         <p:spPr>
           <a:xfrm>
-            <a:off x="4196626" y="2809393"/>
-            <a:ext cx="1110319" cy="140615"/>
+            <a:off x="4196626" y="2809394"/>
+            <a:ext cx="1110319" cy="124398"/>
           </a:xfrm>
           <a:prstGeom prst="rect">
             <a:avLst/>
@@ -13533,6 +13727,7 @@
             </a:extLst>
           </p:cNvPr>
           <p:cNvCxnSpPr>
+            <a:cxnSpLocks/>
             <a:stCxn id="1214" idx="3"/>
             <a:endCxn id="1219" idx="1"/>
           </p:cNvCxnSpPr>
@@ -13540,8 +13735,8 @@
         </p:nvCxnSpPr>
         <p:spPr>
           <a:xfrm>
-            <a:off x="5306946" y="2879701"/>
-            <a:ext cx="1937252" cy="629553"/>
+            <a:off x="5306945" y="2871593"/>
+            <a:ext cx="1937253" cy="637660"/>
           </a:xfrm>
           <a:prstGeom prst="bentConnector3">
             <a:avLst>
@@ -13577,6 +13772,7 @@
             </a:extLst>
           </p:cNvPr>
           <p:cNvCxnSpPr>
+            <a:cxnSpLocks/>
             <a:stCxn id="1116" idx="3"/>
             <a:endCxn id="1173" idx="1"/>
           </p:cNvCxnSpPr>
@@ -13584,8 +13780,8 @@
         </p:nvCxnSpPr>
         <p:spPr>
           <a:xfrm>
-            <a:off x="5260702" y="4075014"/>
-            <a:ext cx="474072" cy="187876"/>
+            <a:off x="5260702" y="4050560"/>
+            <a:ext cx="474073" cy="212331"/>
           </a:xfrm>
           <a:prstGeom prst="bentConnector3">
             <a:avLst/>
@@ -13619,6 +13815,7 @@
             </a:extLst>
           </p:cNvPr>
           <p:cNvCxnSpPr>
+            <a:cxnSpLocks/>
             <a:stCxn id="1116" idx="3"/>
             <a:endCxn id="1188" idx="1"/>
           </p:cNvCxnSpPr>
@@ -13626,8 +13823,8 @@
         </p:nvCxnSpPr>
         <p:spPr>
           <a:xfrm>
-            <a:off x="5260701" y="4075014"/>
-            <a:ext cx="477369" cy="1052983"/>
+            <a:off x="5260702" y="4050560"/>
+            <a:ext cx="477369" cy="1077438"/>
           </a:xfrm>
           <a:prstGeom prst="bentConnector3">
             <a:avLst/>
@@ -13837,6 +14034,7 @@
             </a:extLst>
           </p:cNvPr>
           <p:cNvCxnSpPr>
+            <a:cxnSpLocks/>
             <a:stCxn id="1214" idx="3"/>
             <a:endCxn id="1172" idx="1"/>
           </p:cNvCxnSpPr>
@@ -13844,8 +14042,8 @@
         </p:nvCxnSpPr>
         <p:spPr>
           <a:xfrm flipV="1">
-            <a:off x="5306946" y="2591104"/>
-            <a:ext cx="1937252" cy="288597"/>
+            <a:off x="5306945" y="2591106"/>
+            <a:ext cx="1937253" cy="280487"/>
           </a:xfrm>
           <a:prstGeom prst="bentConnector3">
             <a:avLst/>
@@ -13883,8 +14081,8 @@
         </p:nvSpPr>
         <p:spPr>
           <a:xfrm>
-            <a:off x="1790701" y="2495551"/>
-            <a:ext cx="791556" cy="1466849"/>
+            <a:off x="1790701" y="1552577"/>
+            <a:ext cx="596730" cy="2409823"/>
           </a:xfrm>
           <a:custGeom>
             <a:avLst/>
@@ -13953,6 +14151,38 @@
               <a:gd name="connsiteY2" fmla="*/ 585787 h 1466849"/>
               <a:gd name="connsiteX3" fmla="*/ 785813 w 791556"/>
               <a:gd name="connsiteY3" fmla="*/ 0 h 1466849"/>
+              <a:gd name="connsiteX0" fmla="*/ 0 w 791556"/>
+              <a:gd name="connsiteY0" fmla="*/ 1466849 h 1466849"/>
+              <a:gd name="connsiteX1" fmla="*/ 257176 w 791556"/>
+              <a:gd name="connsiteY1" fmla="*/ 809624 h 1466849"/>
+              <a:gd name="connsiteX2" fmla="*/ 704851 w 791556"/>
+              <a:gd name="connsiteY2" fmla="*/ 585787 h 1466849"/>
+              <a:gd name="connsiteX3" fmla="*/ 785813 w 791556"/>
+              <a:gd name="connsiteY3" fmla="*/ 0 h 1466849"/>
+              <a:gd name="connsiteX0" fmla="*/ 0 w 720550"/>
+              <a:gd name="connsiteY0" fmla="*/ 2624136 h 2624136"/>
+              <a:gd name="connsiteX1" fmla="*/ 257176 w 720550"/>
+              <a:gd name="connsiteY1" fmla="*/ 1966911 h 2624136"/>
+              <a:gd name="connsiteX2" fmla="*/ 704851 w 720550"/>
+              <a:gd name="connsiteY2" fmla="*/ 1743074 h 2624136"/>
+              <a:gd name="connsiteX3" fmla="*/ 647701 w 720550"/>
+              <a:gd name="connsiteY3" fmla="*/ 0 h 2624136"/>
+              <a:gd name="connsiteX0" fmla="*/ 0 w 648908"/>
+              <a:gd name="connsiteY0" fmla="*/ 2624136 h 2624136"/>
+              <a:gd name="connsiteX1" fmla="*/ 257176 w 648908"/>
+              <a:gd name="connsiteY1" fmla="*/ 1966911 h 2624136"/>
+              <a:gd name="connsiteX2" fmla="*/ 285751 w 648908"/>
+              <a:gd name="connsiteY2" fmla="*/ 728662 h 2624136"/>
+              <a:gd name="connsiteX3" fmla="*/ 647701 w 648908"/>
+              <a:gd name="connsiteY3" fmla="*/ 0 h 2624136"/>
+              <a:gd name="connsiteX0" fmla="*/ 0 w 596730"/>
+              <a:gd name="connsiteY0" fmla="*/ 2409823 h 2409823"/>
+              <a:gd name="connsiteX1" fmla="*/ 257176 w 596730"/>
+              <a:gd name="connsiteY1" fmla="*/ 1752598 h 2409823"/>
+              <a:gd name="connsiteX2" fmla="*/ 285751 w 596730"/>
+              <a:gd name="connsiteY2" fmla="*/ 514349 h 2409823"/>
+              <a:gd name="connsiteX3" fmla="*/ 595313 w 596730"/>
+              <a:gd name="connsiteY3" fmla="*/ 0 h 2409823"/>
             </a:gdLst>
             <a:ahLst/>
             <a:cxnLst>
@@ -13971,24 +14201,24 @@
             </a:cxnLst>
             <a:rect l="l" t="t" r="r" b="b"/>
             <a:pathLst>
-              <a:path w="791556" h="1466849">
+              <a:path w="596730" h="2409823">
                 <a:moveTo>
-                  <a:pt x="0" y="1466849"/>
+                  <a:pt x="0" y="2409823"/>
                 </a:moveTo>
                 <a:cubicBezTo>
-                  <a:pt x="98028" y="1221580"/>
-                  <a:pt x="373063" y="1175543"/>
-                  <a:pt x="490538" y="1028699"/>
+                  <a:pt x="98028" y="2164554"/>
+                  <a:pt x="209551" y="2068510"/>
+                  <a:pt x="257176" y="1752598"/>
                 </a:cubicBezTo>
                 <a:cubicBezTo>
-                  <a:pt x="608013" y="881855"/>
-                  <a:pt x="673895" y="761999"/>
-                  <a:pt x="704851" y="585787"/>
+                  <a:pt x="304801" y="1436686"/>
+                  <a:pt x="254795" y="690561"/>
+                  <a:pt x="285751" y="514349"/>
                 </a:cubicBezTo>
                 <a:cubicBezTo>
-                  <a:pt x="754857" y="395286"/>
-                  <a:pt x="809625" y="207169"/>
-                  <a:pt x="785813" y="0"/>
+                  <a:pt x="335757" y="323848"/>
+                  <a:pt x="619125" y="207169"/>
+                  <a:pt x="595313" y="0"/>
                 </a:cubicBezTo>
               </a:path>
             </a:pathLst>
@@ -14261,6 +14491,2579 @@
               <a:latin typeface="+mj-lt"/>
               <a:cs typeface="Courier New" panose="02070309020205020404" pitchFamily="49" charset="0"/>
             </a:endParaRPr>
+          </a:p>
+        </p:txBody>
+      </p:sp>
+      <p:sp>
+        <p:nvSpPr>
+          <p:cNvPr id="2" name="Freeform: Shape 1">
+            <a:extLst>
+              <a:ext uri="{FF2B5EF4-FFF2-40B4-BE49-F238E27FC236}">
+                <a16:creationId xmlns:a16="http://schemas.microsoft.com/office/drawing/2014/main" id="{83613679-65B8-AEE2-63F7-F74B237B70FF}"/>
+              </a:ext>
+            </a:extLst>
+          </p:cNvPr>
+          <p:cNvSpPr/>
+          <p:nvPr/>
+        </p:nvSpPr>
+        <p:spPr>
+          <a:xfrm>
+            <a:off x="1967205" y="2477584"/>
+            <a:ext cx="219074" cy="1479603"/>
+          </a:xfrm>
+          <a:custGeom>
+            <a:avLst/>
+            <a:gdLst>
+              <a:gd name="connsiteX0" fmla="*/ 0 w 283490"/>
+              <a:gd name="connsiteY0" fmla="*/ 1563810 h 1563810"/>
+              <a:gd name="connsiteX1" fmla="*/ 238125 w 283490"/>
+              <a:gd name="connsiteY1" fmla="*/ 863723 h 1563810"/>
+              <a:gd name="connsiteX2" fmla="*/ 252413 w 283490"/>
+              <a:gd name="connsiteY2" fmla="*/ 306510 h 1563810"/>
+              <a:gd name="connsiteX3" fmla="*/ 195263 w 283490"/>
+              <a:gd name="connsiteY3" fmla="*/ 92198 h 1563810"/>
+              <a:gd name="connsiteX0" fmla="*/ 0 w 263798"/>
+              <a:gd name="connsiteY0" fmla="*/ 1471612 h 1471612"/>
+              <a:gd name="connsiteX1" fmla="*/ 238125 w 263798"/>
+              <a:gd name="connsiteY1" fmla="*/ 771525 h 1471612"/>
+              <a:gd name="connsiteX2" fmla="*/ 252413 w 263798"/>
+              <a:gd name="connsiteY2" fmla="*/ 214312 h 1471612"/>
+              <a:gd name="connsiteX3" fmla="*/ 195263 w 263798"/>
+              <a:gd name="connsiteY3" fmla="*/ 0 h 1471612"/>
+              <a:gd name="connsiteX0" fmla="*/ 0 w 787211"/>
+              <a:gd name="connsiteY0" fmla="*/ 1466849 h 1466849"/>
+              <a:gd name="connsiteX1" fmla="*/ 238125 w 787211"/>
+              <a:gd name="connsiteY1" fmla="*/ 766762 h 1466849"/>
+              <a:gd name="connsiteX2" fmla="*/ 252413 w 787211"/>
+              <a:gd name="connsiteY2" fmla="*/ 209549 h 1466849"/>
+              <a:gd name="connsiteX3" fmla="*/ 785813 w 787211"/>
+              <a:gd name="connsiteY3" fmla="*/ 0 h 1466849"/>
+              <a:gd name="connsiteX0" fmla="*/ 0 w 786545"/>
+              <a:gd name="connsiteY0" fmla="*/ 1466849 h 1466849"/>
+              <a:gd name="connsiteX1" fmla="*/ 238125 w 786545"/>
+              <a:gd name="connsiteY1" fmla="*/ 766762 h 1466849"/>
+              <a:gd name="connsiteX2" fmla="*/ 252413 w 786545"/>
+              <a:gd name="connsiteY2" fmla="*/ 209549 h 1466849"/>
+              <a:gd name="connsiteX3" fmla="*/ 785813 w 786545"/>
+              <a:gd name="connsiteY3" fmla="*/ 0 h 1466849"/>
+              <a:gd name="connsiteX0" fmla="*/ 0 w 789143"/>
+              <a:gd name="connsiteY0" fmla="*/ 1466849 h 1466849"/>
+              <a:gd name="connsiteX1" fmla="*/ 238125 w 789143"/>
+              <a:gd name="connsiteY1" fmla="*/ 766762 h 1466849"/>
+              <a:gd name="connsiteX2" fmla="*/ 704851 w 789143"/>
+              <a:gd name="connsiteY2" fmla="*/ 585787 h 1466849"/>
+              <a:gd name="connsiteX3" fmla="*/ 785813 w 789143"/>
+              <a:gd name="connsiteY3" fmla="*/ 0 h 1466849"/>
+              <a:gd name="connsiteX0" fmla="*/ 0 w 789143"/>
+              <a:gd name="connsiteY0" fmla="*/ 1466849 h 1466849"/>
+              <a:gd name="connsiteX1" fmla="*/ 490538 w 789143"/>
+              <a:gd name="connsiteY1" fmla="*/ 1028699 h 1466849"/>
+              <a:gd name="connsiteX2" fmla="*/ 704851 w 789143"/>
+              <a:gd name="connsiteY2" fmla="*/ 585787 h 1466849"/>
+              <a:gd name="connsiteX3" fmla="*/ 785813 w 789143"/>
+              <a:gd name="connsiteY3" fmla="*/ 0 h 1466849"/>
+              <a:gd name="connsiteX0" fmla="*/ 0 w 791556"/>
+              <a:gd name="connsiteY0" fmla="*/ 1466849 h 1466849"/>
+              <a:gd name="connsiteX1" fmla="*/ 490538 w 791556"/>
+              <a:gd name="connsiteY1" fmla="*/ 1028699 h 1466849"/>
+              <a:gd name="connsiteX2" fmla="*/ 704851 w 791556"/>
+              <a:gd name="connsiteY2" fmla="*/ 585787 h 1466849"/>
+              <a:gd name="connsiteX3" fmla="*/ 785813 w 791556"/>
+              <a:gd name="connsiteY3" fmla="*/ 0 h 1466849"/>
+              <a:gd name="connsiteX0" fmla="*/ 0 w 791556"/>
+              <a:gd name="connsiteY0" fmla="*/ 1466849 h 1466849"/>
+              <a:gd name="connsiteX1" fmla="*/ 490538 w 791556"/>
+              <a:gd name="connsiteY1" fmla="*/ 1028699 h 1466849"/>
+              <a:gd name="connsiteX2" fmla="*/ 704851 w 791556"/>
+              <a:gd name="connsiteY2" fmla="*/ 585787 h 1466849"/>
+              <a:gd name="connsiteX3" fmla="*/ 785813 w 791556"/>
+              <a:gd name="connsiteY3" fmla="*/ 0 h 1466849"/>
+              <a:gd name="connsiteX0" fmla="*/ 0 w 791556"/>
+              <a:gd name="connsiteY0" fmla="*/ 1466849 h 1466849"/>
+              <a:gd name="connsiteX1" fmla="*/ 257176 w 791556"/>
+              <a:gd name="connsiteY1" fmla="*/ 809624 h 1466849"/>
+              <a:gd name="connsiteX2" fmla="*/ 704851 w 791556"/>
+              <a:gd name="connsiteY2" fmla="*/ 585787 h 1466849"/>
+              <a:gd name="connsiteX3" fmla="*/ 785813 w 791556"/>
+              <a:gd name="connsiteY3" fmla="*/ 0 h 1466849"/>
+              <a:gd name="connsiteX0" fmla="*/ 0 w 720550"/>
+              <a:gd name="connsiteY0" fmla="*/ 2624136 h 2624136"/>
+              <a:gd name="connsiteX1" fmla="*/ 257176 w 720550"/>
+              <a:gd name="connsiteY1" fmla="*/ 1966911 h 2624136"/>
+              <a:gd name="connsiteX2" fmla="*/ 704851 w 720550"/>
+              <a:gd name="connsiteY2" fmla="*/ 1743074 h 2624136"/>
+              <a:gd name="connsiteX3" fmla="*/ 647701 w 720550"/>
+              <a:gd name="connsiteY3" fmla="*/ 0 h 2624136"/>
+              <a:gd name="connsiteX0" fmla="*/ 0 w 648908"/>
+              <a:gd name="connsiteY0" fmla="*/ 2624136 h 2624136"/>
+              <a:gd name="connsiteX1" fmla="*/ 257176 w 648908"/>
+              <a:gd name="connsiteY1" fmla="*/ 1966911 h 2624136"/>
+              <a:gd name="connsiteX2" fmla="*/ 285751 w 648908"/>
+              <a:gd name="connsiteY2" fmla="*/ 728662 h 2624136"/>
+              <a:gd name="connsiteX3" fmla="*/ 647701 w 648908"/>
+              <a:gd name="connsiteY3" fmla="*/ 0 h 2624136"/>
+              <a:gd name="connsiteX0" fmla="*/ 0 w 596730"/>
+              <a:gd name="connsiteY0" fmla="*/ 2409823 h 2409823"/>
+              <a:gd name="connsiteX1" fmla="*/ 257176 w 596730"/>
+              <a:gd name="connsiteY1" fmla="*/ 1752598 h 2409823"/>
+              <a:gd name="connsiteX2" fmla="*/ 285751 w 596730"/>
+              <a:gd name="connsiteY2" fmla="*/ 514349 h 2409823"/>
+              <a:gd name="connsiteX3" fmla="*/ 595313 w 596730"/>
+              <a:gd name="connsiteY3" fmla="*/ 0 h 2409823"/>
+              <a:gd name="connsiteX0" fmla="*/ 92264 w 688994"/>
+              <a:gd name="connsiteY0" fmla="*/ 2409823 h 2409823"/>
+              <a:gd name="connsiteX1" fmla="*/ 6540 w 688994"/>
+              <a:gd name="connsiteY1" fmla="*/ 1712513 h 2409823"/>
+              <a:gd name="connsiteX2" fmla="*/ 378015 w 688994"/>
+              <a:gd name="connsiteY2" fmla="*/ 514349 h 2409823"/>
+              <a:gd name="connsiteX3" fmla="*/ 687577 w 688994"/>
+              <a:gd name="connsiteY3" fmla="*/ 0 h 2409823"/>
+              <a:gd name="connsiteX0" fmla="*/ 205378 w 801232"/>
+              <a:gd name="connsiteY0" fmla="*/ 2409823 h 2409823"/>
+              <a:gd name="connsiteX1" fmla="*/ 119654 w 801232"/>
+              <a:gd name="connsiteY1" fmla="*/ 1712513 h 2409823"/>
+              <a:gd name="connsiteX2" fmla="*/ 5354 w 801232"/>
+              <a:gd name="connsiteY2" fmla="*/ 738816 h 2409823"/>
+              <a:gd name="connsiteX3" fmla="*/ 800691 w 801232"/>
+              <a:gd name="connsiteY3" fmla="*/ 0 h 2409823"/>
+              <a:gd name="connsiteX0" fmla="*/ 219074 w 251776"/>
+              <a:gd name="connsiteY0" fmla="*/ 2377756 h 2377756"/>
+              <a:gd name="connsiteX1" fmla="*/ 133350 w 251776"/>
+              <a:gd name="connsiteY1" fmla="*/ 1680446 h 2377756"/>
+              <a:gd name="connsiteX2" fmla="*/ 19050 w 251776"/>
+              <a:gd name="connsiteY2" fmla="*/ 706749 h 2377756"/>
+              <a:gd name="connsiteX3" fmla="*/ 0 w 251776"/>
+              <a:gd name="connsiteY3" fmla="*/ 0 h 2377756"/>
+              <a:gd name="connsiteX0" fmla="*/ 219074 w 251776"/>
+              <a:gd name="connsiteY0" fmla="*/ 2377756 h 2377756"/>
+              <a:gd name="connsiteX1" fmla="*/ 133350 w 251776"/>
+              <a:gd name="connsiteY1" fmla="*/ 1680446 h 2377756"/>
+              <a:gd name="connsiteX2" fmla="*/ 19050 w 251776"/>
+              <a:gd name="connsiteY2" fmla="*/ 706749 h 2377756"/>
+              <a:gd name="connsiteX3" fmla="*/ 0 w 251776"/>
+              <a:gd name="connsiteY3" fmla="*/ 0 h 2377756"/>
+              <a:gd name="connsiteX0" fmla="*/ 219074 w 262775"/>
+              <a:gd name="connsiteY0" fmla="*/ 2377756 h 2377756"/>
+              <a:gd name="connsiteX1" fmla="*/ 133350 w 262775"/>
+              <a:gd name="connsiteY1" fmla="*/ 1680446 h 2377756"/>
+              <a:gd name="connsiteX2" fmla="*/ 19050 w 262775"/>
+              <a:gd name="connsiteY2" fmla="*/ 706749 h 2377756"/>
+              <a:gd name="connsiteX3" fmla="*/ 0 w 262775"/>
+              <a:gd name="connsiteY3" fmla="*/ 0 h 2377756"/>
+              <a:gd name="connsiteX0" fmla="*/ 219074 w 253063"/>
+              <a:gd name="connsiteY0" fmla="*/ 2377756 h 2377756"/>
+              <a:gd name="connsiteX1" fmla="*/ 133350 w 253063"/>
+              <a:gd name="connsiteY1" fmla="*/ 1680446 h 2377756"/>
+              <a:gd name="connsiteX2" fmla="*/ 19050 w 253063"/>
+              <a:gd name="connsiteY2" fmla="*/ 706749 h 2377756"/>
+              <a:gd name="connsiteX3" fmla="*/ 0 w 253063"/>
+              <a:gd name="connsiteY3" fmla="*/ 0 h 2377756"/>
+              <a:gd name="connsiteX0" fmla="*/ 219074 w 219074"/>
+              <a:gd name="connsiteY0" fmla="*/ 2377756 h 2377756"/>
+              <a:gd name="connsiteX1" fmla="*/ 133350 w 219074"/>
+              <a:gd name="connsiteY1" fmla="*/ 1680446 h 2377756"/>
+              <a:gd name="connsiteX2" fmla="*/ 19050 w 219074"/>
+              <a:gd name="connsiteY2" fmla="*/ 706749 h 2377756"/>
+              <a:gd name="connsiteX3" fmla="*/ 0 w 219074"/>
+              <a:gd name="connsiteY3" fmla="*/ 0 h 2377756"/>
+              <a:gd name="connsiteX0" fmla="*/ 219074 w 219074"/>
+              <a:gd name="connsiteY0" fmla="*/ 2377756 h 2377756"/>
+              <a:gd name="connsiteX1" fmla="*/ 100013 w 219074"/>
+              <a:gd name="connsiteY1" fmla="*/ 1744580 h 2377756"/>
+              <a:gd name="connsiteX2" fmla="*/ 19050 w 219074"/>
+              <a:gd name="connsiteY2" fmla="*/ 706749 h 2377756"/>
+              <a:gd name="connsiteX3" fmla="*/ 0 w 219074"/>
+              <a:gd name="connsiteY3" fmla="*/ 0 h 2377756"/>
+            </a:gdLst>
+            <a:ahLst/>
+            <a:cxnLst>
+              <a:cxn ang="0">
+                <a:pos x="connsiteX0" y="connsiteY0"/>
+              </a:cxn>
+              <a:cxn ang="0">
+                <a:pos x="connsiteX1" y="connsiteY1"/>
+              </a:cxn>
+              <a:cxn ang="0">
+                <a:pos x="connsiteX2" y="connsiteY2"/>
+              </a:cxn>
+              <a:cxn ang="0">
+                <a:pos x="connsiteX3" y="connsiteY3"/>
+              </a:cxn>
+            </a:cxnLst>
+            <a:rect l="l" t="t" r="r" b="b"/>
+            <a:pathLst>
+              <a:path w="219074" h="2377756">
+                <a:moveTo>
+                  <a:pt x="219074" y="2377756"/>
+                </a:moveTo>
+                <a:cubicBezTo>
+                  <a:pt x="88502" y="2172570"/>
+                  <a:pt x="142875" y="1999030"/>
+                  <a:pt x="100013" y="1744580"/>
+                </a:cubicBezTo>
+                <a:cubicBezTo>
+                  <a:pt x="57151" y="1490130"/>
+                  <a:pt x="-11906" y="882961"/>
+                  <a:pt x="19050" y="706749"/>
+                </a:cubicBezTo>
+                <a:cubicBezTo>
+                  <a:pt x="11906" y="420048"/>
+                  <a:pt x="23812" y="207169"/>
+                  <a:pt x="0" y="0"/>
+                </a:cubicBezTo>
+              </a:path>
+            </a:pathLst>
+          </a:custGeom>
+          <a:noFill/>
+          <a:ln>
+            <a:solidFill>
+              <a:srgbClr val="FFFF00"/>
+            </a:solidFill>
+          </a:ln>
+        </p:spPr>
+        <p:style>
+          <a:lnRef idx="2">
+            <a:schemeClr val="accent1">
+              <a:shade val="50000"/>
+            </a:schemeClr>
+          </a:lnRef>
+          <a:fillRef idx="1">
+            <a:schemeClr val="accent1"/>
+          </a:fillRef>
+          <a:effectRef idx="0">
+            <a:schemeClr val="accent1"/>
+          </a:effectRef>
+          <a:fontRef idx="minor">
+            <a:schemeClr val="lt1"/>
+          </a:fontRef>
+        </p:style>
+        <p:txBody>
+          <a:bodyPr rtlCol="0" anchor="ctr"/>
+          <a:lstStyle/>
+          <a:p>
+            <a:pPr algn="ctr"/>
+            <a:endParaRPr lang="en-US">
+              <a:solidFill>
+                <a:schemeClr val="lt1"/>
+              </a:solidFill>
+            </a:endParaRPr>
+          </a:p>
+        </p:txBody>
+      </p:sp>
+      <p:sp>
+        <p:nvSpPr>
+          <p:cNvPr id="4" name="TextBox 3">
+            <a:extLst>
+              <a:ext uri="{FF2B5EF4-FFF2-40B4-BE49-F238E27FC236}">
+                <a16:creationId xmlns:a16="http://schemas.microsoft.com/office/drawing/2014/main" id="{A69DCEBF-3ADD-A5FE-432B-A4F2E6899BD4}"/>
+              </a:ext>
+            </a:extLst>
+          </p:cNvPr>
+          <p:cNvSpPr txBox="1"/>
+          <p:nvPr/>
+        </p:nvSpPr>
+        <p:spPr>
+          <a:xfrm>
+            <a:off x="1114540" y="4803771"/>
+            <a:ext cx="348172" cy="200055"/>
+          </a:xfrm>
+          <a:prstGeom prst="rect">
+            <a:avLst/>
+          </a:prstGeom>
+          <a:noFill/>
+        </p:spPr>
+        <p:txBody>
+          <a:bodyPr wrap="none" rtlCol="0">
+            <a:spAutoFit/>
+          </a:bodyPr>
+          <a:lstStyle/>
+          <a:p>
+            <a:r>
+              <a:rPr lang="en-US" sz="700" dirty="0">
+                <a:latin typeface="Courier New" panose="02070309020205020404" pitchFamily="49" charset="0"/>
+                <a:cs typeface="Courier New" panose="02070309020205020404" pitchFamily="49" charset="0"/>
+              </a:rPr>
+              <a:t>D15</a:t>
+            </a:r>
+          </a:p>
+        </p:txBody>
+      </p:sp>
+      <p:sp>
+        <p:nvSpPr>
+          <p:cNvPr id="5" name="TextBox 4">
+            <a:extLst>
+              <a:ext uri="{FF2B5EF4-FFF2-40B4-BE49-F238E27FC236}">
+                <a16:creationId xmlns:a16="http://schemas.microsoft.com/office/drawing/2014/main" id="{85BFD9A1-F1B0-0F7E-0E3D-48F6464F1316}"/>
+              </a:ext>
+            </a:extLst>
+          </p:cNvPr>
+          <p:cNvSpPr txBox="1"/>
+          <p:nvPr/>
+        </p:nvSpPr>
+        <p:spPr>
+          <a:xfrm>
+            <a:off x="645112" y="4803771"/>
+            <a:ext cx="348172" cy="200055"/>
+          </a:xfrm>
+          <a:prstGeom prst="rect">
+            <a:avLst/>
+          </a:prstGeom>
+          <a:noFill/>
+        </p:spPr>
+        <p:txBody>
+          <a:bodyPr wrap="none" rtlCol="0">
+            <a:spAutoFit/>
+          </a:bodyPr>
+          <a:lstStyle/>
+          <a:p>
+            <a:r>
+              <a:rPr lang="en-US" sz="700" dirty="0">
+                <a:latin typeface="Courier New" panose="02070309020205020404" pitchFamily="49" charset="0"/>
+                <a:cs typeface="Courier New" panose="02070309020205020404" pitchFamily="49" charset="0"/>
+              </a:rPr>
+              <a:t>D26</a:t>
+            </a:r>
+          </a:p>
+        </p:txBody>
+      </p:sp>
+      <p:sp>
+        <p:nvSpPr>
+          <p:cNvPr id="6" name="TextBox 5">
+            <a:extLst>
+              <a:ext uri="{FF2B5EF4-FFF2-40B4-BE49-F238E27FC236}">
+                <a16:creationId xmlns:a16="http://schemas.microsoft.com/office/drawing/2014/main" id="{AE8A2E08-C470-985C-3CEA-EDCF06E272A0}"/>
+              </a:ext>
+            </a:extLst>
+          </p:cNvPr>
+          <p:cNvSpPr txBox="1"/>
+          <p:nvPr/>
+        </p:nvSpPr>
+        <p:spPr>
+          <a:xfrm>
+            <a:off x="1486741" y="4800986"/>
+            <a:ext cx="348172" cy="200055"/>
+          </a:xfrm>
+          <a:prstGeom prst="rect">
+            <a:avLst/>
+          </a:prstGeom>
+          <a:noFill/>
+        </p:spPr>
+        <p:txBody>
+          <a:bodyPr wrap="none" rtlCol="0">
+            <a:spAutoFit/>
+          </a:bodyPr>
+          <a:lstStyle/>
+          <a:p>
+            <a:r>
+              <a:rPr lang="en-US" sz="700" dirty="0">
+                <a:latin typeface="Courier New" panose="02070309020205020404" pitchFamily="49" charset="0"/>
+                <a:cs typeface="Courier New" panose="02070309020205020404" pitchFamily="49" charset="0"/>
+              </a:rPr>
+              <a:t>D26</a:t>
+            </a:r>
+          </a:p>
+        </p:txBody>
+      </p:sp>
+      <p:sp>
+        <p:nvSpPr>
+          <p:cNvPr id="17" name="Freeform: Shape 16">
+            <a:extLst>
+              <a:ext uri="{FF2B5EF4-FFF2-40B4-BE49-F238E27FC236}">
+                <a16:creationId xmlns:a16="http://schemas.microsoft.com/office/drawing/2014/main" id="{F451F519-720D-A342-AC35-CA66EC0A07C4}"/>
+              </a:ext>
+            </a:extLst>
+          </p:cNvPr>
+          <p:cNvSpPr/>
+          <p:nvPr/>
+        </p:nvSpPr>
+        <p:spPr>
+          <a:xfrm>
+            <a:off x="2138212" y="2476500"/>
+            <a:ext cx="419251" cy="1476375"/>
+          </a:xfrm>
+          <a:custGeom>
+            <a:avLst/>
+            <a:gdLst>
+              <a:gd name="connsiteX0" fmla="*/ 419251 w 419251"/>
+              <a:gd name="connsiteY0" fmla="*/ 1476375 h 1476375"/>
+              <a:gd name="connsiteX1" fmla="*/ 38251 w 419251"/>
+              <a:gd name="connsiteY1" fmla="*/ 566738 h 1476375"/>
+              <a:gd name="connsiteX2" fmla="*/ 33488 w 419251"/>
+              <a:gd name="connsiteY2" fmla="*/ 0 h 1476375"/>
+            </a:gdLst>
+            <a:ahLst/>
+            <a:cxnLst>
+              <a:cxn ang="0">
+                <a:pos x="connsiteX0" y="connsiteY0"/>
+              </a:cxn>
+              <a:cxn ang="0">
+                <a:pos x="connsiteX1" y="connsiteY1"/>
+              </a:cxn>
+              <a:cxn ang="0">
+                <a:pos x="connsiteX2" y="connsiteY2"/>
+              </a:cxn>
+            </a:cxnLst>
+            <a:rect l="l" t="t" r="r" b="b"/>
+            <a:pathLst>
+              <a:path w="419251" h="1476375">
+                <a:moveTo>
+                  <a:pt x="419251" y="1476375"/>
+                </a:moveTo>
+                <a:cubicBezTo>
+                  <a:pt x="260898" y="1144587"/>
+                  <a:pt x="102545" y="812800"/>
+                  <a:pt x="38251" y="566738"/>
+                </a:cubicBezTo>
+                <a:cubicBezTo>
+                  <a:pt x="-26043" y="320675"/>
+                  <a:pt x="3722" y="160337"/>
+                  <a:pt x="33488" y="0"/>
+                </a:cubicBezTo>
+              </a:path>
+            </a:pathLst>
+          </a:custGeom>
+          <a:noFill/>
+          <a:ln>
+            <a:solidFill>
+              <a:srgbClr val="FFFF00"/>
+            </a:solidFill>
+          </a:ln>
+        </p:spPr>
+        <p:style>
+          <a:lnRef idx="2">
+            <a:schemeClr val="accent1">
+              <a:shade val="50000"/>
+            </a:schemeClr>
+          </a:lnRef>
+          <a:fillRef idx="1">
+            <a:schemeClr val="accent1"/>
+          </a:fillRef>
+          <a:effectRef idx="0">
+            <a:schemeClr val="accent1"/>
+          </a:effectRef>
+          <a:fontRef idx="minor">
+            <a:schemeClr val="lt1"/>
+          </a:fontRef>
+        </p:style>
+        <p:txBody>
+          <a:bodyPr rtlCol="0" anchor="ctr"/>
+          <a:lstStyle/>
+          <a:p>
+            <a:pPr algn="ctr"/>
+            <a:endParaRPr lang="en-US"/>
+          </a:p>
+        </p:txBody>
+      </p:sp>
+      <p:sp>
+        <p:nvSpPr>
+          <p:cNvPr id="18" name="Freeform: Shape 17">
+            <a:extLst>
+              <a:ext uri="{FF2B5EF4-FFF2-40B4-BE49-F238E27FC236}">
+                <a16:creationId xmlns:a16="http://schemas.microsoft.com/office/drawing/2014/main" id="{589342D9-627F-4CFA-9402-96EBC35ED237}"/>
+              </a:ext>
+            </a:extLst>
+          </p:cNvPr>
+          <p:cNvSpPr/>
+          <p:nvPr/>
+        </p:nvSpPr>
+        <p:spPr>
+          <a:xfrm>
+            <a:off x="2296497" y="2470970"/>
+            <a:ext cx="670167" cy="1476375"/>
+          </a:xfrm>
+          <a:custGeom>
+            <a:avLst/>
+            <a:gdLst>
+              <a:gd name="connsiteX0" fmla="*/ 419251 w 419251"/>
+              <a:gd name="connsiteY0" fmla="*/ 1476375 h 1476375"/>
+              <a:gd name="connsiteX1" fmla="*/ 38251 w 419251"/>
+              <a:gd name="connsiteY1" fmla="*/ 566738 h 1476375"/>
+              <a:gd name="connsiteX2" fmla="*/ 33488 w 419251"/>
+              <a:gd name="connsiteY2" fmla="*/ 0 h 1476375"/>
+              <a:gd name="connsiteX0" fmla="*/ 574108 w 574108"/>
+              <a:gd name="connsiteY0" fmla="*/ 1476375 h 1476375"/>
+              <a:gd name="connsiteX1" fmla="*/ 12133 w 574108"/>
+              <a:gd name="connsiteY1" fmla="*/ 661988 h 1476375"/>
+              <a:gd name="connsiteX2" fmla="*/ 188345 w 574108"/>
+              <a:gd name="connsiteY2" fmla="*/ 0 h 1476375"/>
+              <a:gd name="connsiteX0" fmla="*/ 612757 w 612757"/>
+              <a:gd name="connsiteY0" fmla="*/ 1476375 h 1476375"/>
+              <a:gd name="connsiteX1" fmla="*/ 50782 w 612757"/>
+              <a:gd name="connsiteY1" fmla="*/ 661988 h 1476375"/>
+              <a:gd name="connsiteX2" fmla="*/ 46391 w 612757"/>
+              <a:gd name="connsiteY2" fmla="*/ 653230 h 1476375"/>
+              <a:gd name="connsiteX3" fmla="*/ 226994 w 612757"/>
+              <a:gd name="connsiteY3" fmla="*/ 0 h 1476375"/>
+              <a:gd name="connsiteX0" fmla="*/ 629940 w 629940"/>
+              <a:gd name="connsiteY0" fmla="*/ 1476375 h 1476375"/>
+              <a:gd name="connsiteX1" fmla="*/ 67965 w 629940"/>
+              <a:gd name="connsiteY1" fmla="*/ 661988 h 1476375"/>
+              <a:gd name="connsiteX2" fmla="*/ 25474 w 629940"/>
+              <a:gd name="connsiteY2" fmla="*/ 389705 h 1476375"/>
+              <a:gd name="connsiteX3" fmla="*/ 244177 w 629940"/>
+              <a:gd name="connsiteY3" fmla="*/ 0 h 1476375"/>
+              <a:gd name="connsiteX0" fmla="*/ 658491 w 658491"/>
+              <a:gd name="connsiteY0" fmla="*/ 1476375 h 1476375"/>
+              <a:gd name="connsiteX1" fmla="*/ 96516 w 658491"/>
+              <a:gd name="connsiteY1" fmla="*/ 661988 h 1476375"/>
+              <a:gd name="connsiteX2" fmla="*/ 12750 w 658491"/>
+              <a:gd name="connsiteY2" fmla="*/ 269055 h 1476375"/>
+              <a:gd name="connsiteX3" fmla="*/ 272728 w 658491"/>
+              <a:gd name="connsiteY3" fmla="*/ 0 h 1476375"/>
+              <a:gd name="connsiteX0" fmla="*/ 663098 w 663098"/>
+              <a:gd name="connsiteY0" fmla="*/ 1476375 h 1476375"/>
+              <a:gd name="connsiteX1" fmla="*/ 82073 w 663098"/>
+              <a:gd name="connsiteY1" fmla="*/ 696913 h 1476375"/>
+              <a:gd name="connsiteX2" fmla="*/ 17357 w 663098"/>
+              <a:gd name="connsiteY2" fmla="*/ 269055 h 1476375"/>
+              <a:gd name="connsiteX3" fmla="*/ 277335 w 663098"/>
+              <a:gd name="connsiteY3" fmla="*/ 0 h 1476375"/>
+              <a:gd name="connsiteX0" fmla="*/ 663098 w 663098"/>
+              <a:gd name="connsiteY0" fmla="*/ 1476375 h 1476375"/>
+              <a:gd name="connsiteX1" fmla="*/ 82073 w 663098"/>
+              <a:gd name="connsiteY1" fmla="*/ 696913 h 1476375"/>
+              <a:gd name="connsiteX2" fmla="*/ 17357 w 663098"/>
+              <a:gd name="connsiteY2" fmla="*/ 269055 h 1476375"/>
+              <a:gd name="connsiteX3" fmla="*/ 277335 w 663098"/>
+              <a:gd name="connsiteY3" fmla="*/ 0 h 1476375"/>
+              <a:gd name="connsiteX0" fmla="*/ 663098 w 663098"/>
+              <a:gd name="connsiteY0" fmla="*/ 1476375 h 1476375"/>
+              <a:gd name="connsiteX1" fmla="*/ 452334 w 663098"/>
+              <a:gd name="connsiteY1" fmla="*/ 1158055 h 1476375"/>
+              <a:gd name="connsiteX2" fmla="*/ 82073 w 663098"/>
+              <a:gd name="connsiteY2" fmla="*/ 696913 h 1476375"/>
+              <a:gd name="connsiteX3" fmla="*/ 17357 w 663098"/>
+              <a:gd name="connsiteY3" fmla="*/ 269055 h 1476375"/>
+              <a:gd name="connsiteX4" fmla="*/ 277335 w 663098"/>
+              <a:gd name="connsiteY4" fmla="*/ 0 h 1476375"/>
+              <a:gd name="connsiteX0" fmla="*/ 663098 w 663098"/>
+              <a:gd name="connsiteY0" fmla="*/ 1476375 h 1476375"/>
+              <a:gd name="connsiteX1" fmla="*/ 338034 w 663098"/>
+              <a:gd name="connsiteY1" fmla="*/ 1253305 h 1476375"/>
+              <a:gd name="connsiteX2" fmla="*/ 82073 w 663098"/>
+              <a:gd name="connsiteY2" fmla="*/ 696913 h 1476375"/>
+              <a:gd name="connsiteX3" fmla="*/ 17357 w 663098"/>
+              <a:gd name="connsiteY3" fmla="*/ 269055 h 1476375"/>
+              <a:gd name="connsiteX4" fmla="*/ 277335 w 663098"/>
+              <a:gd name="connsiteY4" fmla="*/ 0 h 1476375"/>
+              <a:gd name="connsiteX0" fmla="*/ 663098 w 663098"/>
+              <a:gd name="connsiteY0" fmla="*/ 1476375 h 1476375"/>
+              <a:gd name="connsiteX1" fmla="*/ 338034 w 663098"/>
+              <a:gd name="connsiteY1" fmla="*/ 1253305 h 1476375"/>
+              <a:gd name="connsiteX2" fmla="*/ 82073 w 663098"/>
+              <a:gd name="connsiteY2" fmla="*/ 696913 h 1476375"/>
+              <a:gd name="connsiteX3" fmla="*/ 17357 w 663098"/>
+              <a:gd name="connsiteY3" fmla="*/ 269055 h 1476375"/>
+              <a:gd name="connsiteX4" fmla="*/ 277335 w 663098"/>
+              <a:gd name="connsiteY4" fmla="*/ 0 h 1476375"/>
+              <a:gd name="connsiteX0" fmla="*/ 663098 w 663098"/>
+              <a:gd name="connsiteY0" fmla="*/ 1476375 h 1476375"/>
+              <a:gd name="connsiteX1" fmla="*/ 338034 w 663098"/>
+              <a:gd name="connsiteY1" fmla="*/ 1253305 h 1476375"/>
+              <a:gd name="connsiteX2" fmla="*/ 82073 w 663098"/>
+              <a:gd name="connsiteY2" fmla="*/ 696913 h 1476375"/>
+              <a:gd name="connsiteX3" fmla="*/ 17357 w 663098"/>
+              <a:gd name="connsiteY3" fmla="*/ 269055 h 1476375"/>
+              <a:gd name="connsiteX4" fmla="*/ 277335 w 663098"/>
+              <a:gd name="connsiteY4" fmla="*/ 0 h 1476375"/>
+              <a:gd name="connsiteX0" fmla="*/ 682456 w 682456"/>
+              <a:gd name="connsiteY0" fmla="*/ 1476375 h 1476375"/>
+              <a:gd name="connsiteX1" fmla="*/ 357392 w 682456"/>
+              <a:gd name="connsiteY1" fmla="*/ 1253305 h 1476375"/>
+              <a:gd name="connsiteX2" fmla="*/ 56981 w 682456"/>
+              <a:gd name="connsiteY2" fmla="*/ 725488 h 1476375"/>
+              <a:gd name="connsiteX3" fmla="*/ 36715 w 682456"/>
+              <a:gd name="connsiteY3" fmla="*/ 269055 h 1476375"/>
+              <a:gd name="connsiteX4" fmla="*/ 296693 w 682456"/>
+              <a:gd name="connsiteY4" fmla="*/ 0 h 1476375"/>
+              <a:gd name="connsiteX0" fmla="*/ 670167 w 670167"/>
+              <a:gd name="connsiteY0" fmla="*/ 1476375 h 1476375"/>
+              <a:gd name="connsiteX1" fmla="*/ 345103 w 670167"/>
+              <a:gd name="connsiteY1" fmla="*/ 1253305 h 1476375"/>
+              <a:gd name="connsiteX2" fmla="*/ 44692 w 670167"/>
+              <a:gd name="connsiteY2" fmla="*/ 725488 h 1476375"/>
+              <a:gd name="connsiteX3" fmla="*/ 24426 w 670167"/>
+              <a:gd name="connsiteY3" fmla="*/ 269055 h 1476375"/>
+              <a:gd name="connsiteX4" fmla="*/ 284404 w 670167"/>
+              <a:gd name="connsiteY4" fmla="*/ 0 h 1476375"/>
+              <a:gd name="connsiteX0" fmla="*/ 670167 w 670167"/>
+              <a:gd name="connsiteY0" fmla="*/ 1476375 h 1476375"/>
+              <a:gd name="connsiteX1" fmla="*/ 345103 w 670167"/>
+              <a:gd name="connsiteY1" fmla="*/ 1253305 h 1476375"/>
+              <a:gd name="connsiteX2" fmla="*/ 44692 w 670167"/>
+              <a:gd name="connsiteY2" fmla="*/ 725488 h 1476375"/>
+              <a:gd name="connsiteX3" fmla="*/ 24426 w 670167"/>
+              <a:gd name="connsiteY3" fmla="*/ 269055 h 1476375"/>
+              <a:gd name="connsiteX4" fmla="*/ 284404 w 670167"/>
+              <a:gd name="connsiteY4" fmla="*/ 0 h 1476375"/>
+            </a:gdLst>
+            <a:ahLst/>
+            <a:cxnLst>
+              <a:cxn ang="0">
+                <a:pos x="connsiteX0" y="connsiteY0"/>
+              </a:cxn>
+              <a:cxn ang="0">
+                <a:pos x="connsiteX1" y="connsiteY1"/>
+              </a:cxn>
+              <a:cxn ang="0">
+                <a:pos x="connsiteX2" y="connsiteY2"/>
+              </a:cxn>
+              <a:cxn ang="0">
+                <a:pos x="connsiteX3" y="connsiteY3"/>
+              </a:cxn>
+              <a:cxn ang="0">
+                <a:pos x="connsiteX4" y="connsiteY4"/>
+              </a:cxn>
+            </a:cxnLst>
+            <a:rect l="l" t="t" r="r" b="b"/>
+            <a:pathLst>
+              <a:path w="670167" h="1476375">
+                <a:moveTo>
+                  <a:pt x="670167" y="1476375"/>
+                </a:moveTo>
+                <a:cubicBezTo>
+                  <a:pt x="635040" y="1423322"/>
+                  <a:pt x="492740" y="1272090"/>
+                  <a:pt x="345103" y="1253305"/>
+                </a:cubicBezTo>
+                <a:cubicBezTo>
+                  <a:pt x="162541" y="1129745"/>
+                  <a:pt x="88613" y="895880"/>
+                  <a:pt x="44692" y="725488"/>
+                </a:cubicBezTo>
+                <a:cubicBezTo>
+                  <a:pt x="-17952" y="550197"/>
+                  <a:pt x="-4943" y="379386"/>
+                  <a:pt x="24426" y="269055"/>
+                </a:cubicBezTo>
+                <a:cubicBezTo>
+                  <a:pt x="53795" y="158724"/>
+                  <a:pt x="254304" y="108872"/>
+                  <a:pt x="284404" y="0"/>
+                </a:cubicBezTo>
+              </a:path>
+            </a:pathLst>
+          </a:custGeom>
+          <a:noFill/>
+          <a:ln>
+            <a:solidFill>
+              <a:srgbClr val="FFFF00"/>
+            </a:solidFill>
+          </a:ln>
+        </p:spPr>
+        <p:style>
+          <a:lnRef idx="2">
+            <a:schemeClr val="accent1">
+              <a:shade val="50000"/>
+            </a:schemeClr>
+          </a:lnRef>
+          <a:fillRef idx="1">
+            <a:schemeClr val="accent1"/>
+          </a:fillRef>
+          <a:effectRef idx="0">
+            <a:schemeClr val="accent1"/>
+          </a:effectRef>
+          <a:fontRef idx="minor">
+            <a:schemeClr val="lt1"/>
+          </a:fontRef>
+        </p:style>
+        <p:txBody>
+          <a:bodyPr rtlCol="0" anchor="ctr"/>
+          <a:lstStyle/>
+          <a:p>
+            <a:pPr algn="ctr"/>
+            <a:endParaRPr lang="en-US"/>
+          </a:p>
+        </p:txBody>
+      </p:sp>
+      <p:cxnSp>
+        <p:nvCxnSpPr>
+          <p:cNvPr id="1132" name="Straight Connector 1131">
+            <a:extLst>
+              <a:ext uri="{FF2B5EF4-FFF2-40B4-BE49-F238E27FC236}">
+                <a16:creationId xmlns:a16="http://schemas.microsoft.com/office/drawing/2014/main" id="{6F85F173-99D2-533A-951D-1FF2A363BC26}"/>
+              </a:ext>
+            </a:extLst>
+          </p:cNvPr>
+          <p:cNvCxnSpPr>
+            <a:stCxn id="1135" idx="1"/>
+            <a:endCxn id="1135" idx="3"/>
+          </p:cNvCxnSpPr>
+          <p:nvPr/>
+        </p:nvCxnSpPr>
+        <p:spPr>
+          <a:xfrm>
+            <a:off x="3157974" y="3891681"/>
+            <a:ext cx="0" cy="98678"/>
+          </a:xfrm>
+          <a:prstGeom prst="line">
+            <a:avLst/>
+          </a:prstGeom>
+          <a:ln w="28575">
+            <a:solidFill>
+              <a:schemeClr val="tx1"/>
+            </a:solidFill>
+          </a:ln>
+        </p:spPr>
+        <p:style>
+          <a:lnRef idx="1">
+            <a:schemeClr val="accent1"/>
+          </a:lnRef>
+          <a:fillRef idx="0">
+            <a:schemeClr val="accent1"/>
+          </a:fillRef>
+          <a:effectRef idx="0">
+            <a:schemeClr val="accent1"/>
+          </a:effectRef>
+          <a:fontRef idx="minor">
+            <a:schemeClr val="tx1"/>
+          </a:fontRef>
+        </p:style>
+      </p:cxnSp>
+      <p:cxnSp>
+        <p:nvCxnSpPr>
+          <p:cNvPr id="1133" name="Straight Connector 1132">
+            <a:extLst>
+              <a:ext uri="{FF2B5EF4-FFF2-40B4-BE49-F238E27FC236}">
+                <a16:creationId xmlns:a16="http://schemas.microsoft.com/office/drawing/2014/main" id="{7E38EC22-FB55-DEB2-749F-C4A74EE88B1F}"/>
+              </a:ext>
+            </a:extLst>
+          </p:cNvPr>
+          <p:cNvCxnSpPr/>
+          <p:nvPr/>
+        </p:nvCxnSpPr>
+        <p:spPr>
+          <a:xfrm>
+            <a:off x="3356488" y="3891681"/>
+            <a:ext cx="0" cy="98678"/>
+          </a:xfrm>
+          <a:prstGeom prst="line">
+            <a:avLst/>
+          </a:prstGeom>
+          <a:ln w="28575">
+            <a:solidFill>
+              <a:schemeClr val="tx1"/>
+            </a:solidFill>
+          </a:ln>
+        </p:spPr>
+        <p:style>
+          <a:lnRef idx="1">
+            <a:schemeClr val="accent1"/>
+          </a:lnRef>
+          <a:fillRef idx="0">
+            <a:schemeClr val="accent1"/>
+          </a:fillRef>
+          <a:effectRef idx="0">
+            <a:schemeClr val="accent1"/>
+          </a:effectRef>
+          <a:fontRef idx="minor">
+            <a:schemeClr val="tx1"/>
+          </a:fontRef>
+        </p:style>
+      </p:cxnSp>
+      <p:sp>
+        <p:nvSpPr>
+          <p:cNvPr id="1136" name="Freeform: Shape 1135">
+            <a:extLst>
+              <a:ext uri="{FF2B5EF4-FFF2-40B4-BE49-F238E27FC236}">
+                <a16:creationId xmlns:a16="http://schemas.microsoft.com/office/drawing/2014/main" id="{773C9390-0835-5B4F-1078-93D1A4306FEF}"/>
+              </a:ext>
+            </a:extLst>
+          </p:cNvPr>
+          <p:cNvSpPr/>
+          <p:nvPr/>
+        </p:nvSpPr>
+        <p:spPr>
+          <a:xfrm>
+            <a:off x="2178051" y="1549400"/>
+            <a:ext cx="1094225" cy="1924050"/>
+          </a:xfrm>
+          <a:custGeom>
+            <a:avLst/>
+            <a:gdLst>
+              <a:gd name="connsiteX0" fmla="*/ 1147444 w 1149476"/>
+              <a:gd name="connsiteY0" fmla="*/ 1925124 h 1925124"/>
+              <a:gd name="connsiteX1" fmla="*/ 1109344 w 1149476"/>
+              <a:gd name="connsiteY1" fmla="*/ 1137724 h 1925124"/>
+              <a:gd name="connsiteX2" fmla="*/ 874394 w 1149476"/>
+              <a:gd name="connsiteY2" fmla="*/ 1036124 h 1925124"/>
+              <a:gd name="connsiteX3" fmla="*/ 80644 w 1149476"/>
+              <a:gd name="connsiteY3" fmla="*/ 166174 h 1925124"/>
+              <a:gd name="connsiteX4" fmla="*/ 67944 w 1149476"/>
+              <a:gd name="connsiteY4" fmla="*/ 1074 h 1925124"/>
+              <a:gd name="connsiteX0" fmla="*/ 1125023 w 1127055"/>
+              <a:gd name="connsiteY0" fmla="*/ 1924050 h 1924050"/>
+              <a:gd name="connsiteX1" fmla="*/ 1086923 w 1127055"/>
+              <a:gd name="connsiteY1" fmla="*/ 1136650 h 1924050"/>
+              <a:gd name="connsiteX2" fmla="*/ 851973 w 1127055"/>
+              <a:gd name="connsiteY2" fmla="*/ 1035050 h 1924050"/>
+              <a:gd name="connsiteX3" fmla="*/ 58223 w 1127055"/>
+              <a:gd name="connsiteY3" fmla="*/ 165100 h 1924050"/>
+              <a:gd name="connsiteX4" fmla="*/ 45523 w 1127055"/>
+              <a:gd name="connsiteY4" fmla="*/ 0 h 1924050"/>
+              <a:gd name="connsiteX0" fmla="*/ 1079500 w 1081532"/>
+              <a:gd name="connsiteY0" fmla="*/ 1924050 h 1924050"/>
+              <a:gd name="connsiteX1" fmla="*/ 1041400 w 1081532"/>
+              <a:gd name="connsiteY1" fmla="*/ 1136650 h 1924050"/>
+              <a:gd name="connsiteX2" fmla="*/ 806450 w 1081532"/>
+              <a:gd name="connsiteY2" fmla="*/ 1035050 h 1924050"/>
+              <a:gd name="connsiteX3" fmla="*/ 12700 w 1081532"/>
+              <a:gd name="connsiteY3" fmla="*/ 165100 h 1924050"/>
+              <a:gd name="connsiteX4" fmla="*/ 0 w 1081532"/>
+              <a:gd name="connsiteY4" fmla="*/ 0 h 1924050"/>
+              <a:gd name="connsiteX0" fmla="*/ 1079500 w 1089661"/>
+              <a:gd name="connsiteY0" fmla="*/ 1924050 h 1924050"/>
+              <a:gd name="connsiteX1" fmla="*/ 1041400 w 1089661"/>
+              <a:gd name="connsiteY1" fmla="*/ 1136650 h 1924050"/>
+              <a:gd name="connsiteX2" fmla="*/ 635000 w 1089661"/>
+              <a:gd name="connsiteY2" fmla="*/ 977900 h 1924050"/>
+              <a:gd name="connsiteX3" fmla="*/ 12700 w 1089661"/>
+              <a:gd name="connsiteY3" fmla="*/ 165100 h 1924050"/>
+              <a:gd name="connsiteX4" fmla="*/ 0 w 1089661"/>
+              <a:gd name="connsiteY4" fmla="*/ 0 h 1924050"/>
+              <a:gd name="connsiteX0" fmla="*/ 1079500 w 1089661"/>
+              <a:gd name="connsiteY0" fmla="*/ 1924050 h 1924050"/>
+              <a:gd name="connsiteX1" fmla="*/ 1041400 w 1089661"/>
+              <a:gd name="connsiteY1" fmla="*/ 1136650 h 1924050"/>
+              <a:gd name="connsiteX2" fmla="*/ 635000 w 1089661"/>
+              <a:gd name="connsiteY2" fmla="*/ 977900 h 1924050"/>
+              <a:gd name="connsiteX3" fmla="*/ 12700 w 1089661"/>
+              <a:gd name="connsiteY3" fmla="*/ 165100 h 1924050"/>
+              <a:gd name="connsiteX4" fmla="*/ 0 w 1089661"/>
+              <a:gd name="connsiteY4" fmla="*/ 0 h 1924050"/>
+              <a:gd name="connsiteX0" fmla="*/ 1079500 w 1089661"/>
+              <a:gd name="connsiteY0" fmla="*/ 1924050 h 1924050"/>
+              <a:gd name="connsiteX1" fmla="*/ 1041400 w 1089661"/>
+              <a:gd name="connsiteY1" fmla="*/ 1136650 h 1924050"/>
+              <a:gd name="connsiteX2" fmla="*/ 635000 w 1089661"/>
+              <a:gd name="connsiteY2" fmla="*/ 977900 h 1924050"/>
+              <a:gd name="connsiteX3" fmla="*/ 12700 w 1089661"/>
+              <a:gd name="connsiteY3" fmla="*/ 165100 h 1924050"/>
+              <a:gd name="connsiteX4" fmla="*/ 0 w 1089661"/>
+              <a:gd name="connsiteY4" fmla="*/ 0 h 1924050"/>
+              <a:gd name="connsiteX0" fmla="*/ 1079500 w 1089661"/>
+              <a:gd name="connsiteY0" fmla="*/ 1924050 h 1924050"/>
+              <a:gd name="connsiteX1" fmla="*/ 1041400 w 1089661"/>
+              <a:gd name="connsiteY1" fmla="*/ 1136650 h 1924050"/>
+              <a:gd name="connsiteX2" fmla="*/ 635000 w 1089661"/>
+              <a:gd name="connsiteY2" fmla="*/ 977900 h 1924050"/>
+              <a:gd name="connsiteX3" fmla="*/ 12700 w 1089661"/>
+              <a:gd name="connsiteY3" fmla="*/ 165100 h 1924050"/>
+              <a:gd name="connsiteX4" fmla="*/ 0 w 1089661"/>
+              <a:gd name="connsiteY4" fmla="*/ 0 h 1924050"/>
+              <a:gd name="connsiteX0" fmla="*/ 1079500 w 1094225"/>
+              <a:gd name="connsiteY0" fmla="*/ 1924050 h 1924050"/>
+              <a:gd name="connsiteX1" fmla="*/ 1041400 w 1094225"/>
+              <a:gd name="connsiteY1" fmla="*/ 1136650 h 1924050"/>
+              <a:gd name="connsiteX2" fmla="*/ 561975 w 1094225"/>
+              <a:gd name="connsiteY2" fmla="*/ 901700 h 1924050"/>
+              <a:gd name="connsiteX3" fmla="*/ 12700 w 1094225"/>
+              <a:gd name="connsiteY3" fmla="*/ 165100 h 1924050"/>
+              <a:gd name="connsiteX4" fmla="*/ 0 w 1094225"/>
+              <a:gd name="connsiteY4" fmla="*/ 0 h 1924050"/>
+            </a:gdLst>
+            <a:ahLst/>
+            <a:cxnLst>
+              <a:cxn ang="0">
+                <a:pos x="connsiteX0" y="connsiteY0"/>
+              </a:cxn>
+              <a:cxn ang="0">
+                <a:pos x="connsiteX1" y="connsiteY1"/>
+              </a:cxn>
+              <a:cxn ang="0">
+                <a:pos x="connsiteX2" y="connsiteY2"/>
+              </a:cxn>
+              <a:cxn ang="0">
+                <a:pos x="connsiteX3" y="connsiteY3"/>
+              </a:cxn>
+              <a:cxn ang="0">
+                <a:pos x="connsiteX4" y="connsiteY4"/>
+              </a:cxn>
+            </a:cxnLst>
+            <a:rect l="l" t="t" r="r" b="b"/>
+            <a:pathLst>
+              <a:path w="1094225" h="1924050">
+                <a:moveTo>
+                  <a:pt x="1079500" y="1924050"/>
+                </a:moveTo>
+                <a:cubicBezTo>
+                  <a:pt x="1083204" y="1604433"/>
+                  <a:pt x="1127654" y="1307042"/>
+                  <a:pt x="1041400" y="1136650"/>
+                </a:cubicBezTo>
+                <a:cubicBezTo>
+                  <a:pt x="955146" y="966258"/>
+                  <a:pt x="669925" y="1133475"/>
+                  <a:pt x="561975" y="901700"/>
+                </a:cubicBezTo>
+                <a:cubicBezTo>
+                  <a:pt x="454025" y="669925"/>
+                  <a:pt x="147108" y="337608"/>
+                  <a:pt x="12700" y="165100"/>
+                </a:cubicBezTo>
+                <a:cubicBezTo>
+                  <a:pt x="-1058" y="94192"/>
+                  <a:pt x="21696" y="148696"/>
+                  <a:pt x="0" y="0"/>
+                </a:cubicBezTo>
+              </a:path>
+            </a:pathLst>
+          </a:custGeom>
+          <a:noFill/>
+          <a:ln>
+            <a:solidFill>
+              <a:srgbClr val="FFFF00"/>
+            </a:solidFill>
+          </a:ln>
+        </p:spPr>
+        <p:style>
+          <a:lnRef idx="2">
+            <a:schemeClr val="accent1">
+              <a:shade val="50000"/>
+            </a:schemeClr>
+          </a:lnRef>
+          <a:fillRef idx="1">
+            <a:schemeClr val="accent1"/>
+          </a:fillRef>
+          <a:effectRef idx="0">
+            <a:schemeClr val="accent1"/>
+          </a:effectRef>
+          <a:fontRef idx="minor">
+            <a:schemeClr val="lt1"/>
+          </a:fontRef>
+        </p:style>
+        <p:txBody>
+          <a:bodyPr rtlCol="0" anchor="ctr"/>
+          <a:lstStyle/>
+          <a:p>
+            <a:pPr algn="ctr"/>
+            <a:endParaRPr lang="en-US"/>
+          </a:p>
+        </p:txBody>
+      </p:sp>
+      <p:sp>
+        <p:nvSpPr>
+          <p:cNvPr id="1155" name="Freeform: Shape 1154">
+            <a:extLst>
+              <a:ext uri="{FF2B5EF4-FFF2-40B4-BE49-F238E27FC236}">
+                <a16:creationId xmlns:a16="http://schemas.microsoft.com/office/drawing/2014/main" id="{B33C3518-F04F-07DF-C1B0-58951A87492A}"/>
+              </a:ext>
+            </a:extLst>
+          </p:cNvPr>
+          <p:cNvSpPr/>
+          <p:nvPr/>
+        </p:nvSpPr>
+        <p:spPr>
+          <a:xfrm>
+            <a:off x="2060211" y="1547162"/>
+            <a:ext cx="1393895" cy="1932966"/>
+          </a:xfrm>
+          <a:custGeom>
+            <a:avLst/>
+            <a:gdLst>
+              <a:gd name="connsiteX0" fmla="*/ 1147444 w 1149476"/>
+              <a:gd name="connsiteY0" fmla="*/ 1925124 h 1925124"/>
+              <a:gd name="connsiteX1" fmla="*/ 1109344 w 1149476"/>
+              <a:gd name="connsiteY1" fmla="*/ 1137724 h 1925124"/>
+              <a:gd name="connsiteX2" fmla="*/ 874394 w 1149476"/>
+              <a:gd name="connsiteY2" fmla="*/ 1036124 h 1925124"/>
+              <a:gd name="connsiteX3" fmla="*/ 80644 w 1149476"/>
+              <a:gd name="connsiteY3" fmla="*/ 166174 h 1925124"/>
+              <a:gd name="connsiteX4" fmla="*/ 67944 w 1149476"/>
+              <a:gd name="connsiteY4" fmla="*/ 1074 h 1925124"/>
+              <a:gd name="connsiteX0" fmla="*/ 1125023 w 1127055"/>
+              <a:gd name="connsiteY0" fmla="*/ 1924050 h 1924050"/>
+              <a:gd name="connsiteX1" fmla="*/ 1086923 w 1127055"/>
+              <a:gd name="connsiteY1" fmla="*/ 1136650 h 1924050"/>
+              <a:gd name="connsiteX2" fmla="*/ 851973 w 1127055"/>
+              <a:gd name="connsiteY2" fmla="*/ 1035050 h 1924050"/>
+              <a:gd name="connsiteX3" fmla="*/ 58223 w 1127055"/>
+              <a:gd name="connsiteY3" fmla="*/ 165100 h 1924050"/>
+              <a:gd name="connsiteX4" fmla="*/ 45523 w 1127055"/>
+              <a:gd name="connsiteY4" fmla="*/ 0 h 1924050"/>
+              <a:gd name="connsiteX0" fmla="*/ 1079500 w 1081532"/>
+              <a:gd name="connsiteY0" fmla="*/ 1924050 h 1924050"/>
+              <a:gd name="connsiteX1" fmla="*/ 1041400 w 1081532"/>
+              <a:gd name="connsiteY1" fmla="*/ 1136650 h 1924050"/>
+              <a:gd name="connsiteX2" fmla="*/ 806450 w 1081532"/>
+              <a:gd name="connsiteY2" fmla="*/ 1035050 h 1924050"/>
+              <a:gd name="connsiteX3" fmla="*/ 12700 w 1081532"/>
+              <a:gd name="connsiteY3" fmla="*/ 165100 h 1924050"/>
+              <a:gd name="connsiteX4" fmla="*/ 0 w 1081532"/>
+              <a:gd name="connsiteY4" fmla="*/ 0 h 1924050"/>
+              <a:gd name="connsiteX0" fmla="*/ 1079500 w 1089661"/>
+              <a:gd name="connsiteY0" fmla="*/ 1924050 h 1924050"/>
+              <a:gd name="connsiteX1" fmla="*/ 1041400 w 1089661"/>
+              <a:gd name="connsiteY1" fmla="*/ 1136650 h 1924050"/>
+              <a:gd name="connsiteX2" fmla="*/ 635000 w 1089661"/>
+              <a:gd name="connsiteY2" fmla="*/ 977900 h 1924050"/>
+              <a:gd name="connsiteX3" fmla="*/ 12700 w 1089661"/>
+              <a:gd name="connsiteY3" fmla="*/ 165100 h 1924050"/>
+              <a:gd name="connsiteX4" fmla="*/ 0 w 1089661"/>
+              <a:gd name="connsiteY4" fmla="*/ 0 h 1924050"/>
+              <a:gd name="connsiteX0" fmla="*/ 1337145 w 1347306"/>
+              <a:gd name="connsiteY0" fmla="*/ 1924050 h 1924050"/>
+              <a:gd name="connsiteX1" fmla="*/ 1299045 w 1347306"/>
+              <a:gd name="connsiteY1" fmla="*/ 1136650 h 1924050"/>
+              <a:gd name="connsiteX2" fmla="*/ 892645 w 1347306"/>
+              <a:gd name="connsiteY2" fmla="*/ 977900 h 1924050"/>
+              <a:gd name="connsiteX3" fmla="*/ 470 w 1347306"/>
+              <a:gd name="connsiteY3" fmla="*/ 266700 h 1924050"/>
+              <a:gd name="connsiteX4" fmla="*/ 257645 w 1347306"/>
+              <a:gd name="connsiteY4" fmla="*/ 0 h 1924050"/>
+              <a:gd name="connsiteX0" fmla="*/ 1393825 w 1403986"/>
+              <a:gd name="connsiteY0" fmla="*/ 1920875 h 1920875"/>
+              <a:gd name="connsiteX1" fmla="*/ 1355725 w 1403986"/>
+              <a:gd name="connsiteY1" fmla="*/ 1133475 h 1920875"/>
+              <a:gd name="connsiteX2" fmla="*/ 949325 w 1403986"/>
+              <a:gd name="connsiteY2" fmla="*/ 974725 h 1920875"/>
+              <a:gd name="connsiteX3" fmla="*/ 57150 w 1403986"/>
+              <a:gd name="connsiteY3" fmla="*/ 263525 h 1920875"/>
+              <a:gd name="connsiteX4" fmla="*/ 0 w 1403986"/>
+              <a:gd name="connsiteY4" fmla="*/ 0 h 1920875"/>
+              <a:gd name="connsiteX0" fmla="*/ 1393825 w 1403986"/>
+              <a:gd name="connsiteY0" fmla="*/ 1920875 h 1920875"/>
+              <a:gd name="connsiteX1" fmla="*/ 1355725 w 1403986"/>
+              <a:gd name="connsiteY1" fmla="*/ 1133475 h 1920875"/>
+              <a:gd name="connsiteX2" fmla="*/ 949325 w 1403986"/>
+              <a:gd name="connsiteY2" fmla="*/ 974725 h 1920875"/>
+              <a:gd name="connsiteX3" fmla="*/ 57150 w 1403986"/>
+              <a:gd name="connsiteY3" fmla="*/ 263525 h 1920875"/>
+              <a:gd name="connsiteX4" fmla="*/ 0 w 1403986"/>
+              <a:gd name="connsiteY4" fmla="*/ 0 h 1920875"/>
+              <a:gd name="connsiteX0" fmla="*/ 1393825 w 1403986"/>
+              <a:gd name="connsiteY0" fmla="*/ 1920875 h 1920875"/>
+              <a:gd name="connsiteX1" fmla="*/ 1355725 w 1403986"/>
+              <a:gd name="connsiteY1" fmla="*/ 1133475 h 1920875"/>
+              <a:gd name="connsiteX2" fmla="*/ 949325 w 1403986"/>
+              <a:gd name="connsiteY2" fmla="*/ 974725 h 1920875"/>
+              <a:gd name="connsiteX3" fmla="*/ 57150 w 1403986"/>
+              <a:gd name="connsiteY3" fmla="*/ 263525 h 1920875"/>
+              <a:gd name="connsiteX4" fmla="*/ 0 w 1403986"/>
+              <a:gd name="connsiteY4" fmla="*/ 0 h 1920875"/>
+              <a:gd name="connsiteX0" fmla="*/ 1393825 w 1399398"/>
+              <a:gd name="connsiteY0" fmla="*/ 1920875 h 1920875"/>
+              <a:gd name="connsiteX1" fmla="*/ 1355725 w 1399398"/>
+              <a:gd name="connsiteY1" fmla="*/ 1133475 h 1920875"/>
+              <a:gd name="connsiteX2" fmla="*/ 1031875 w 1399398"/>
+              <a:gd name="connsiteY2" fmla="*/ 581025 h 1920875"/>
+              <a:gd name="connsiteX3" fmla="*/ 57150 w 1399398"/>
+              <a:gd name="connsiteY3" fmla="*/ 263525 h 1920875"/>
+              <a:gd name="connsiteX4" fmla="*/ 0 w 1399398"/>
+              <a:gd name="connsiteY4" fmla="*/ 0 h 1920875"/>
+              <a:gd name="connsiteX0" fmla="*/ 1393825 w 1400212"/>
+              <a:gd name="connsiteY0" fmla="*/ 1920875 h 1920875"/>
+              <a:gd name="connsiteX1" fmla="*/ 1355725 w 1400212"/>
+              <a:gd name="connsiteY1" fmla="*/ 1133475 h 1920875"/>
+              <a:gd name="connsiteX2" fmla="*/ 1016000 w 1400212"/>
+              <a:gd name="connsiteY2" fmla="*/ 466725 h 1920875"/>
+              <a:gd name="connsiteX3" fmla="*/ 57150 w 1400212"/>
+              <a:gd name="connsiteY3" fmla="*/ 263525 h 1920875"/>
+              <a:gd name="connsiteX4" fmla="*/ 0 w 1400212"/>
+              <a:gd name="connsiteY4" fmla="*/ 0 h 1920875"/>
+              <a:gd name="connsiteX0" fmla="*/ 1393825 w 1400212"/>
+              <a:gd name="connsiteY0" fmla="*/ 1920875 h 1920875"/>
+              <a:gd name="connsiteX1" fmla="*/ 1355725 w 1400212"/>
+              <a:gd name="connsiteY1" fmla="*/ 1133475 h 1920875"/>
+              <a:gd name="connsiteX2" fmla="*/ 1016000 w 1400212"/>
+              <a:gd name="connsiteY2" fmla="*/ 466725 h 1920875"/>
+              <a:gd name="connsiteX3" fmla="*/ 57150 w 1400212"/>
+              <a:gd name="connsiteY3" fmla="*/ 263525 h 1920875"/>
+              <a:gd name="connsiteX4" fmla="*/ 0 w 1400212"/>
+              <a:gd name="connsiteY4" fmla="*/ 0 h 1920875"/>
+              <a:gd name="connsiteX0" fmla="*/ 1393825 w 1393925"/>
+              <a:gd name="connsiteY0" fmla="*/ 1920875 h 1920875"/>
+              <a:gd name="connsiteX1" fmla="*/ 1235075 w 1393925"/>
+              <a:gd name="connsiteY1" fmla="*/ 1228725 h 1920875"/>
+              <a:gd name="connsiteX2" fmla="*/ 1016000 w 1393925"/>
+              <a:gd name="connsiteY2" fmla="*/ 466725 h 1920875"/>
+              <a:gd name="connsiteX3" fmla="*/ 57150 w 1393925"/>
+              <a:gd name="connsiteY3" fmla="*/ 263525 h 1920875"/>
+              <a:gd name="connsiteX4" fmla="*/ 0 w 1393925"/>
+              <a:gd name="connsiteY4" fmla="*/ 0 h 1920875"/>
+              <a:gd name="connsiteX0" fmla="*/ 1393825 w 1393895"/>
+              <a:gd name="connsiteY0" fmla="*/ 1920875 h 1920875"/>
+              <a:gd name="connsiteX1" fmla="*/ 1235075 w 1393895"/>
+              <a:gd name="connsiteY1" fmla="*/ 1228725 h 1920875"/>
+              <a:gd name="connsiteX2" fmla="*/ 1016000 w 1393895"/>
+              <a:gd name="connsiteY2" fmla="*/ 466725 h 1920875"/>
+              <a:gd name="connsiteX3" fmla="*/ 57150 w 1393895"/>
+              <a:gd name="connsiteY3" fmla="*/ 263525 h 1920875"/>
+              <a:gd name="connsiteX4" fmla="*/ 0 w 1393895"/>
+              <a:gd name="connsiteY4" fmla="*/ 0 h 1920875"/>
+            </a:gdLst>
+            <a:ahLst/>
+            <a:cxnLst>
+              <a:cxn ang="0">
+                <a:pos x="connsiteX0" y="connsiteY0"/>
+              </a:cxn>
+              <a:cxn ang="0">
+                <a:pos x="connsiteX1" y="connsiteY1"/>
+              </a:cxn>
+              <a:cxn ang="0">
+                <a:pos x="connsiteX2" y="connsiteY2"/>
+              </a:cxn>
+              <a:cxn ang="0">
+                <a:pos x="connsiteX3" y="connsiteY3"/>
+              </a:cxn>
+              <a:cxn ang="0">
+                <a:pos x="connsiteX4" y="connsiteY4"/>
+              </a:cxn>
+            </a:cxnLst>
+            <a:rect l="l" t="t" r="r" b="b"/>
+            <a:pathLst>
+              <a:path w="1393895" h="1920875">
+                <a:moveTo>
+                  <a:pt x="1393825" y="1920875"/>
+                </a:moveTo>
+                <a:cubicBezTo>
+                  <a:pt x="1397529" y="1601258"/>
+                  <a:pt x="1253596" y="1550458"/>
+                  <a:pt x="1235075" y="1228725"/>
+                </a:cubicBezTo>
+                <a:cubicBezTo>
+                  <a:pt x="1216554" y="906992"/>
+                  <a:pt x="1212321" y="627592"/>
+                  <a:pt x="1016000" y="466725"/>
+                </a:cubicBezTo>
+                <a:cubicBezTo>
+                  <a:pt x="819679" y="305858"/>
+                  <a:pt x="191558" y="436033"/>
+                  <a:pt x="57150" y="263525"/>
+                </a:cubicBezTo>
+                <a:cubicBezTo>
+                  <a:pt x="17992" y="205317"/>
+                  <a:pt x="2646" y="151871"/>
+                  <a:pt x="0" y="0"/>
+                </a:cubicBezTo>
+              </a:path>
+            </a:pathLst>
+          </a:custGeom>
+          <a:noFill/>
+          <a:ln>
+            <a:solidFill>
+              <a:srgbClr val="FFFF00"/>
+            </a:solidFill>
+          </a:ln>
+        </p:spPr>
+        <p:style>
+          <a:lnRef idx="2">
+            <a:schemeClr val="accent1">
+              <a:shade val="50000"/>
+            </a:schemeClr>
+          </a:lnRef>
+          <a:fillRef idx="1">
+            <a:schemeClr val="accent1"/>
+          </a:fillRef>
+          <a:effectRef idx="0">
+            <a:schemeClr val="accent1"/>
+          </a:effectRef>
+          <a:fontRef idx="minor">
+            <a:schemeClr val="lt1"/>
+          </a:fontRef>
+        </p:style>
+        <p:txBody>
+          <a:bodyPr rtlCol="0" anchor="ctr"/>
+          <a:lstStyle/>
+          <a:p>
+            <a:pPr algn="ctr"/>
+            <a:endParaRPr lang="en-US"/>
+          </a:p>
+        </p:txBody>
+      </p:sp>
+      <p:sp>
+        <p:nvSpPr>
+          <p:cNvPr id="1189" name="Freeform: Shape 1188">
+            <a:extLst>
+              <a:ext uri="{FF2B5EF4-FFF2-40B4-BE49-F238E27FC236}">
+                <a16:creationId xmlns:a16="http://schemas.microsoft.com/office/drawing/2014/main" id="{0A5E1C84-E347-35DC-9F71-0F24038D4FC0}"/>
+              </a:ext>
+            </a:extLst>
+          </p:cNvPr>
+          <p:cNvSpPr/>
+          <p:nvPr/>
+        </p:nvSpPr>
+        <p:spPr>
+          <a:xfrm>
+            <a:off x="1466051" y="1251811"/>
+            <a:ext cx="1022481" cy="1986689"/>
+          </a:xfrm>
+          <a:custGeom>
+            <a:avLst/>
+            <a:gdLst>
+              <a:gd name="connsiteX0" fmla="*/ 223049 w 1022481"/>
+              <a:gd name="connsiteY0" fmla="*/ 1986689 h 1986689"/>
+              <a:gd name="connsiteX1" fmla="*/ 45249 w 1022481"/>
+              <a:gd name="connsiteY1" fmla="*/ 1764439 h 1986689"/>
+              <a:gd name="connsiteX2" fmla="*/ 7149 w 1022481"/>
+              <a:gd name="connsiteY2" fmla="*/ 1462814 h 1986689"/>
+              <a:gd name="connsiteX3" fmla="*/ 159549 w 1022481"/>
+              <a:gd name="connsiteY3" fmla="*/ 294414 h 1986689"/>
+              <a:gd name="connsiteX4" fmla="*/ 375449 w 1022481"/>
+              <a:gd name="connsiteY4" fmla="*/ 24539 h 1986689"/>
+              <a:gd name="connsiteX5" fmla="*/ 940599 w 1022481"/>
+              <a:gd name="connsiteY5" fmla="*/ 34064 h 1986689"/>
+              <a:gd name="connsiteX6" fmla="*/ 1007274 w 1022481"/>
+              <a:gd name="connsiteY6" fmla="*/ 215039 h 1986689"/>
+            </a:gdLst>
+            <a:ahLst/>
+            <a:cxnLst>
+              <a:cxn ang="0">
+                <a:pos x="connsiteX0" y="connsiteY0"/>
+              </a:cxn>
+              <a:cxn ang="0">
+                <a:pos x="connsiteX1" y="connsiteY1"/>
+              </a:cxn>
+              <a:cxn ang="0">
+                <a:pos x="connsiteX2" y="connsiteY2"/>
+              </a:cxn>
+              <a:cxn ang="0">
+                <a:pos x="connsiteX3" y="connsiteY3"/>
+              </a:cxn>
+              <a:cxn ang="0">
+                <a:pos x="connsiteX4" y="connsiteY4"/>
+              </a:cxn>
+              <a:cxn ang="0">
+                <a:pos x="connsiteX5" y="connsiteY5"/>
+              </a:cxn>
+              <a:cxn ang="0">
+                <a:pos x="connsiteX6" y="connsiteY6"/>
+              </a:cxn>
+            </a:cxnLst>
+            <a:rect l="l" t="t" r="r" b="b"/>
+            <a:pathLst>
+              <a:path w="1022481" h="1986689">
+                <a:moveTo>
+                  <a:pt x="223049" y="1986689"/>
+                </a:moveTo>
+                <a:cubicBezTo>
+                  <a:pt x="152140" y="1919220"/>
+                  <a:pt x="81232" y="1851751"/>
+                  <a:pt x="45249" y="1764439"/>
+                </a:cubicBezTo>
+                <a:cubicBezTo>
+                  <a:pt x="9266" y="1677126"/>
+                  <a:pt x="-11901" y="1707818"/>
+                  <a:pt x="7149" y="1462814"/>
+                </a:cubicBezTo>
+                <a:cubicBezTo>
+                  <a:pt x="26199" y="1217810"/>
+                  <a:pt x="98166" y="534126"/>
+                  <a:pt x="159549" y="294414"/>
+                </a:cubicBezTo>
+                <a:cubicBezTo>
+                  <a:pt x="220932" y="54702"/>
+                  <a:pt x="245274" y="67931"/>
+                  <a:pt x="375449" y="24539"/>
+                </a:cubicBezTo>
+                <a:cubicBezTo>
+                  <a:pt x="505624" y="-18853"/>
+                  <a:pt x="835295" y="2314"/>
+                  <a:pt x="940599" y="34064"/>
+                </a:cubicBezTo>
+                <a:cubicBezTo>
+                  <a:pt x="1045903" y="65814"/>
+                  <a:pt x="1026588" y="140426"/>
+                  <a:pt x="1007274" y="215039"/>
+                </a:cubicBezTo>
+              </a:path>
+            </a:pathLst>
+          </a:custGeom>
+          <a:noFill/>
+          <a:ln>
+            <a:solidFill>
+              <a:srgbClr val="FFFF00"/>
+            </a:solidFill>
+          </a:ln>
+        </p:spPr>
+        <p:style>
+          <a:lnRef idx="2">
+            <a:schemeClr val="accent1">
+              <a:shade val="50000"/>
+            </a:schemeClr>
+          </a:lnRef>
+          <a:fillRef idx="1">
+            <a:schemeClr val="accent1"/>
+          </a:fillRef>
+          <a:effectRef idx="0">
+            <a:schemeClr val="accent1"/>
+          </a:effectRef>
+          <a:fontRef idx="minor">
+            <a:schemeClr val="lt1"/>
+          </a:fontRef>
+        </p:style>
+        <p:txBody>
+          <a:bodyPr rtlCol="0" anchor="ctr"/>
+          <a:lstStyle/>
+          <a:p>
+            <a:pPr algn="ctr"/>
+            <a:endParaRPr lang="en-US"/>
+          </a:p>
+        </p:txBody>
+      </p:sp>
+      <p:sp>
+        <p:nvSpPr>
+          <p:cNvPr id="1215" name="Freeform: Shape 1214">
+            <a:extLst>
+              <a:ext uri="{FF2B5EF4-FFF2-40B4-BE49-F238E27FC236}">
+                <a16:creationId xmlns:a16="http://schemas.microsoft.com/office/drawing/2014/main" id="{6DE34BF5-DEBE-F885-3D7E-EFC2B2CD45B7}"/>
+              </a:ext>
+            </a:extLst>
+          </p:cNvPr>
+          <p:cNvSpPr/>
+          <p:nvPr/>
+        </p:nvSpPr>
+        <p:spPr>
+          <a:xfrm>
+            <a:off x="1659601" y="2242476"/>
+            <a:ext cx="816899" cy="519774"/>
+          </a:xfrm>
+          <a:custGeom>
+            <a:avLst/>
+            <a:gdLst>
+              <a:gd name="connsiteX0" fmla="*/ 124749 w 816899"/>
+              <a:gd name="connsiteY0" fmla="*/ 519774 h 519774"/>
+              <a:gd name="connsiteX1" fmla="*/ 924 w 816899"/>
+              <a:gd name="connsiteY1" fmla="*/ 173699 h 519774"/>
+              <a:gd name="connsiteX2" fmla="*/ 80299 w 816899"/>
+              <a:gd name="connsiteY2" fmla="*/ 21299 h 519774"/>
+              <a:gd name="connsiteX3" fmla="*/ 293024 w 816899"/>
+              <a:gd name="connsiteY3" fmla="*/ 8599 h 519774"/>
+              <a:gd name="connsiteX4" fmla="*/ 693074 w 816899"/>
+              <a:gd name="connsiteY4" fmla="*/ 5424 h 519774"/>
+              <a:gd name="connsiteX5" fmla="*/ 791499 w 816899"/>
+              <a:gd name="connsiteY5" fmla="*/ 84799 h 519774"/>
+              <a:gd name="connsiteX6" fmla="*/ 816899 w 816899"/>
+              <a:gd name="connsiteY6" fmla="*/ 141949 h 519774"/>
+            </a:gdLst>
+            <a:ahLst/>
+            <a:cxnLst>
+              <a:cxn ang="0">
+                <a:pos x="connsiteX0" y="connsiteY0"/>
+              </a:cxn>
+              <a:cxn ang="0">
+                <a:pos x="connsiteX1" y="connsiteY1"/>
+              </a:cxn>
+              <a:cxn ang="0">
+                <a:pos x="connsiteX2" y="connsiteY2"/>
+              </a:cxn>
+              <a:cxn ang="0">
+                <a:pos x="connsiteX3" y="connsiteY3"/>
+              </a:cxn>
+              <a:cxn ang="0">
+                <a:pos x="connsiteX4" y="connsiteY4"/>
+              </a:cxn>
+              <a:cxn ang="0">
+                <a:pos x="connsiteX5" y="connsiteY5"/>
+              </a:cxn>
+              <a:cxn ang="0">
+                <a:pos x="connsiteX6" y="connsiteY6"/>
+              </a:cxn>
+            </a:cxnLst>
+            <a:rect l="l" t="t" r="r" b="b"/>
+            <a:pathLst>
+              <a:path w="816899" h="519774">
+                <a:moveTo>
+                  <a:pt x="124749" y="519774"/>
+                </a:moveTo>
+                <a:cubicBezTo>
+                  <a:pt x="66540" y="388276"/>
+                  <a:pt x="8332" y="256778"/>
+                  <a:pt x="924" y="173699"/>
+                </a:cubicBezTo>
+                <a:cubicBezTo>
+                  <a:pt x="-6484" y="90620"/>
+                  <a:pt x="31616" y="48816"/>
+                  <a:pt x="80299" y="21299"/>
+                </a:cubicBezTo>
+                <a:cubicBezTo>
+                  <a:pt x="128982" y="-6218"/>
+                  <a:pt x="190895" y="11245"/>
+                  <a:pt x="293024" y="8599"/>
+                </a:cubicBezTo>
+                <a:cubicBezTo>
+                  <a:pt x="395153" y="5953"/>
+                  <a:pt x="609995" y="-7276"/>
+                  <a:pt x="693074" y="5424"/>
+                </a:cubicBezTo>
+                <a:cubicBezTo>
+                  <a:pt x="776153" y="18124"/>
+                  <a:pt x="770862" y="62045"/>
+                  <a:pt x="791499" y="84799"/>
+                </a:cubicBezTo>
+                <a:cubicBezTo>
+                  <a:pt x="812136" y="107553"/>
+                  <a:pt x="814517" y="124751"/>
+                  <a:pt x="816899" y="141949"/>
+                </a:cubicBezTo>
+              </a:path>
+            </a:pathLst>
+          </a:custGeom>
+          <a:noFill/>
+          <a:ln>
+            <a:solidFill>
+              <a:srgbClr val="FFFF00"/>
+            </a:solidFill>
+          </a:ln>
+        </p:spPr>
+        <p:style>
+          <a:lnRef idx="2">
+            <a:schemeClr val="accent1">
+              <a:shade val="50000"/>
+            </a:schemeClr>
+          </a:lnRef>
+          <a:fillRef idx="1">
+            <a:schemeClr val="accent1"/>
+          </a:fillRef>
+          <a:effectRef idx="0">
+            <a:schemeClr val="accent1"/>
+          </a:effectRef>
+          <a:fontRef idx="minor">
+            <a:schemeClr val="lt1"/>
+          </a:fontRef>
+        </p:style>
+        <p:txBody>
+          <a:bodyPr rtlCol="0" anchor="ctr"/>
+          <a:lstStyle/>
+          <a:p>
+            <a:pPr algn="ctr"/>
+            <a:endParaRPr lang="en-US"/>
+          </a:p>
+        </p:txBody>
+      </p:sp>
+      <p:sp>
+        <p:nvSpPr>
+          <p:cNvPr id="1216" name="Freeform: Shape 1215">
+            <a:extLst>
+              <a:ext uri="{FF2B5EF4-FFF2-40B4-BE49-F238E27FC236}">
+                <a16:creationId xmlns:a16="http://schemas.microsoft.com/office/drawing/2014/main" id="{7C5B4BD5-5D29-09CD-C27A-65D7B0363B7C}"/>
+              </a:ext>
+            </a:extLst>
+          </p:cNvPr>
+          <p:cNvSpPr/>
+          <p:nvPr/>
+        </p:nvSpPr>
+        <p:spPr>
+          <a:xfrm>
+            <a:off x="2835146" y="2486025"/>
+            <a:ext cx="914529" cy="1136650"/>
+          </a:xfrm>
+          <a:custGeom>
+            <a:avLst/>
+            <a:gdLst>
+              <a:gd name="connsiteX0" fmla="*/ 914529 w 914529"/>
+              <a:gd name="connsiteY0" fmla="*/ 1136650 h 1136650"/>
+              <a:gd name="connsiteX1" fmla="*/ 870079 w 914529"/>
+              <a:gd name="connsiteY1" fmla="*/ 1069975 h 1136650"/>
+              <a:gd name="connsiteX2" fmla="*/ 720854 w 914529"/>
+              <a:gd name="connsiteY2" fmla="*/ 1041400 h 1136650"/>
+              <a:gd name="connsiteX3" fmla="*/ 647829 w 914529"/>
+              <a:gd name="connsiteY3" fmla="*/ 841375 h 1136650"/>
+              <a:gd name="connsiteX4" fmla="*/ 266829 w 914529"/>
+              <a:gd name="connsiteY4" fmla="*/ 714375 h 1136650"/>
+              <a:gd name="connsiteX5" fmla="*/ 19179 w 914529"/>
+              <a:gd name="connsiteY5" fmla="*/ 387350 h 1136650"/>
+              <a:gd name="connsiteX6" fmla="*/ 35054 w 914529"/>
+              <a:gd name="connsiteY6" fmla="*/ 0 h 1136650"/>
+            </a:gdLst>
+            <a:ahLst/>
+            <a:cxnLst>
+              <a:cxn ang="0">
+                <a:pos x="connsiteX0" y="connsiteY0"/>
+              </a:cxn>
+              <a:cxn ang="0">
+                <a:pos x="connsiteX1" y="connsiteY1"/>
+              </a:cxn>
+              <a:cxn ang="0">
+                <a:pos x="connsiteX2" y="connsiteY2"/>
+              </a:cxn>
+              <a:cxn ang="0">
+                <a:pos x="connsiteX3" y="connsiteY3"/>
+              </a:cxn>
+              <a:cxn ang="0">
+                <a:pos x="connsiteX4" y="connsiteY4"/>
+              </a:cxn>
+              <a:cxn ang="0">
+                <a:pos x="connsiteX5" y="connsiteY5"/>
+              </a:cxn>
+              <a:cxn ang="0">
+                <a:pos x="connsiteX6" y="connsiteY6"/>
+              </a:cxn>
+            </a:cxnLst>
+            <a:rect l="l" t="t" r="r" b="b"/>
+            <a:pathLst>
+              <a:path w="914529" h="1136650">
+                <a:moveTo>
+                  <a:pt x="914529" y="1136650"/>
+                </a:moveTo>
+                <a:cubicBezTo>
+                  <a:pt x="908443" y="1111250"/>
+                  <a:pt x="902358" y="1085850"/>
+                  <a:pt x="870079" y="1069975"/>
+                </a:cubicBezTo>
+                <a:cubicBezTo>
+                  <a:pt x="837800" y="1054100"/>
+                  <a:pt x="757896" y="1079500"/>
+                  <a:pt x="720854" y="1041400"/>
+                </a:cubicBezTo>
+                <a:cubicBezTo>
+                  <a:pt x="683812" y="1003300"/>
+                  <a:pt x="723500" y="895879"/>
+                  <a:pt x="647829" y="841375"/>
+                </a:cubicBezTo>
+                <a:cubicBezTo>
+                  <a:pt x="572158" y="786871"/>
+                  <a:pt x="371604" y="790046"/>
+                  <a:pt x="266829" y="714375"/>
+                </a:cubicBezTo>
+                <a:cubicBezTo>
+                  <a:pt x="162054" y="638704"/>
+                  <a:pt x="57808" y="506412"/>
+                  <a:pt x="19179" y="387350"/>
+                </a:cubicBezTo>
+                <a:cubicBezTo>
+                  <a:pt x="-19450" y="268288"/>
+                  <a:pt x="7802" y="134144"/>
+                  <a:pt x="35054" y="0"/>
+                </a:cubicBezTo>
+              </a:path>
+            </a:pathLst>
+          </a:custGeom>
+          <a:noFill/>
+          <a:ln>
+            <a:solidFill>
+              <a:srgbClr val="90F828"/>
+            </a:solidFill>
+          </a:ln>
+        </p:spPr>
+        <p:style>
+          <a:lnRef idx="2">
+            <a:schemeClr val="accent1">
+              <a:shade val="50000"/>
+            </a:schemeClr>
+          </a:lnRef>
+          <a:fillRef idx="1">
+            <a:schemeClr val="accent1"/>
+          </a:fillRef>
+          <a:effectRef idx="0">
+            <a:schemeClr val="accent1"/>
+          </a:effectRef>
+          <a:fontRef idx="minor">
+            <a:schemeClr val="lt1"/>
+          </a:fontRef>
+        </p:style>
+        <p:txBody>
+          <a:bodyPr rtlCol="0" anchor="ctr"/>
+          <a:lstStyle/>
+          <a:p>
+            <a:pPr algn="ctr"/>
+            <a:endParaRPr lang="en-US"/>
+          </a:p>
+        </p:txBody>
+      </p:sp>
+      <p:sp>
+        <p:nvSpPr>
+          <p:cNvPr id="1217" name="Freeform: Shape 1216">
+            <a:extLst>
+              <a:ext uri="{FF2B5EF4-FFF2-40B4-BE49-F238E27FC236}">
+                <a16:creationId xmlns:a16="http://schemas.microsoft.com/office/drawing/2014/main" id="{33B8243C-8A91-8BCF-DCD2-1F175D01AEC3}"/>
+              </a:ext>
+            </a:extLst>
+          </p:cNvPr>
+          <p:cNvSpPr/>
+          <p:nvPr/>
+        </p:nvSpPr>
+        <p:spPr>
+          <a:xfrm>
+            <a:off x="2930588" y="2479775"/>
+            <a:ext cx="914529" cy="1136650"/>
+          </a:xfrm>
+          <a:custGeom>
+            <a:avLst/>
+            <a:gdLst>
+              <a:gd name="connsiteX0" fmla="*/ 914529 w 914529"/>
+              <a:gd name="connsiteY0" fmla="*/ 1136650 h 1136650"/>
+              <a:gd name="connsiteX1" fmla="*/ 870079 w 914529"/>
+              <a:gd name="connsiteY1" fmla="*/ 1069975 h 1136650"/>
+              <a:gd name="connsiteX2" fmla="*/ 720854 w 914529"/>
+              <a:gd name="connsiteY2" fmla="*/ 1041400 h 1136650"/>
+              <a:gd name="connsiteX3" fmla="*/ 647829 w 914529"/>
+              <a:gd name="connsiteY3" fmla="*/ 841375 h 1136650"/>
+              <a:gd name="connsiteX4" fmla="*/ 266829 w 914529"/>
+              <a:gd name="connsiteY4" fmla="*/ 714375 h 1136650"/>
+              <a:gd name="connsiteX5" fmla="*/ 19179 w 914529"/>
+              <a:gd name="connsiteY5" fmla="*/ 387350 h 1136650"/>
+              <a:gd name="connsiteX6" fmla="*/ 35054 w 914529"/>
+              <a:gd name="connsiteY6" fmla="*/ 0 h 1136650"/>
+              <a:gd name="connsiteX0" fmla="*/ 914529 w 914529"/>
+              <a:gd name="connsiteY0" fmla="*/ 1136650 h 1136650"/>
+              <a:gd name="connsiteX1" fmla="*/ 870079 w 914529"/>
+              <a:gd name="connsiteY1" fmla="*/ 1069975 h 1136650"/>
+              <a:gd name="connsiteX2" fmla="*/ 720854 w 914529"/>
+              <a:gd name="connsiteY2" fmla="*/ 1041400 h 1136650"/>
+              <a:gd name="connsiteX3" fmla="*/ 647829 w 914529"/>
+              <a:gd name="connsiteY3" fmla="*/ 841375 h 1136650"/>
+              <a:gd name="connsiteX4" fmla="*/ 244604 w 914529"/>
+              <a:gd name="connsiteY4" fmla="*/ 669925 h 1136650"/>
+              <a:gd name="connsiteX5" fmla="*/ 19179 w 914529"/>
+              <a:gd name="connsiteY5" fmla="*/ 387350 h 1136650"/>
+              <a:gd name="connsiteX6" fmla="*/ 35054 w 914529"/>
+              <a:gd name="connsiteY6" fmla="*/ 0 h 1136650"/>
+              <a:gd name="connsiteX0" fmla="*/ 914529 w 914529"/>
+              <a:gd name="connsiteY0" fmla="*/ 1136650 h 1136650"/>
+              <a:gd name="connsiteX1" fmla="*/ 870079 w 914529"/>
+              <a:gd name="connsiteY1" fmla="*/ 1069975 h 1136650"/>
+              <a:gd name="connsiteX2" fmla="*/ 720854 w 914529"/>
+              <a:gd name="connsiteY2" fmla="*/ 1041400 h 1136650"/>
+              <a:gd name="connsiteX3" fmla="*/ 590679 w 914529"/>
+              <a:gd name="connsiteY3" fmla="*/ 800100 h 1136650"/>
+              <a:gd name="connsiteX4" fmla="*/ 244604 w 914529"/>
+              <a:gd name="connsiteY4" fmla="*/ 669925 h 1136650"/>
+              <a:gd name="connsiteX5" fmla="*/ 19179 w 914529"/>
+              <a:gd name="connsiteY5" fmla="*/ 387350 h 1136650"/>
+              <a:gd name="connsiteX6" fmla="*/ 35054 w 914529"/>
+              <a:gd name="connsiteY6" fmla="*/ 0 h 1136650"/>
+              <a:gd name="connsiteX0" fmla="*/ 914529 w 914529"/>
+              <a:gd name="connsiteY0" fmla="*/ 1136650 h 1136650"/>
+              <a:gd name="connsiteX1" fmla="*/ 870079 w 914529"/>
+              <a:gd name="connsiteY1" fmla="*/ 1069975 h 1136650"/>
+              <a:gd name="connsiteX2" fmla="*/ 673229 w 914529"/>
+              <a:gd name="connsiteY2" fmla="*/ 1006475 h 1136650"/>
+              <a:gd name="connsiteX3" fmla="*/ 590679 w 914529"/>
+              <a:gd name="connsiteY3" fmla="*/ 800100 h 1136650"/>
+              <a:gd name="connsiteX4" fmla="*/ 244604 w 914529"/>
+              <a:gd name="connsiteY4" fmla="*/ 669925 h 1136650"/>
+              <a:gd name="connsiteX5" fmla="*/ 19179 w 914529"/>
+              <a:gd name="connsiteY5" fmla="*/ 387350 h 1136650"/>
+              <a:gd name="connsiteX6" fmla="*/ 35054 w 914529"/>
+              <a:gd name="connsiteY6" fmla="*/ 0 h 1136650"/>
+              <a:gd name="connsiteX0" fmla="*/ 914529 w 914529"/>
+              <a:gd name="connsiteY0" fmla="*/ 1136650 h 1136650"/>
+              <a:gd name="connsiteX1" fmla="*/ 828804 w 914529"/>
+              <a:gd name="connsiteY1" fmla="*/ 1038225 h 1136650"/>
+              <a:gd name="connsiteX2" fmla="*/ 673229 w 914529"/>
+              <a:gd name="connsiteY2" fmla="*/ 1006475 h 1136650"/>
+              <a:gd name="connsiteX3" fmla="*/ 590679 w 914529"/>
+              <a:gd name="connsiteY3" fmla="*/ 800100 h 1136650"/>
+              <a:gd name="connsiteX4" fmla="*/ 244604 w 914529"/>
+              <a:gd name="connsiteY4" fmla="*/ 669925 h 1136650"/>
+              <a:gd name="connsiteX5" fmla="*/ 19179 w 914529"/>
+              <a:gd name="connsiteY5" fmla="*/ 387350 h 1136650"/>
+              <a:gd name="connsiteX6" fmla="*/ 35054 w 914529"/>
+              <a:gd name="connsiteY6" fmla="*/ 0 h 1136650"/>
+            </a:gdLst>
+            <a:ahLst/>
+            <a:cxnLst>
+              <a:cxn ang="0">
+                <a:pos x="connsiteX0" y="connsiteY0"/>
+              </a:cxn>
+              <a:cxn ang="0">
+                <a:pos x="connsiteX1" y="connsiteY1"/>
+              </a:cxn>
+              <a:cxn ang="0">
+                <a:pos x="connsiteX2" y="connsiteY2"/>
+              </a:cxn>
+              <a:cxn ang="0">
+                <a:pos x="connsiteX3" y="connsiteY3"/>
+              </a:cxn>
+              <a:cxn ang="0">
+                <a:pos x="connsiteX4" y="connsiteY4"/>
+              </a:cxn>
+              <a:cxn ang="0">
+                <a:pos x="connsiteX5" y="connsiteY5"/>
+              </a:cxn>
+              <a:cxn ang="0">
+                <a:pos x="connsiteX6" y="connsiteY6"/>
+              </a:cxn>
+            </a:cxnLst>
+            <a:rect l="l" t="t" r="r" b="b"/>
+            <a:pathLst>
+              <a:path w="914529" h="1136650">
+                <a:moveTo>
+                  <a:pt x="914529" y="1136650"/>
+                </a:moveTo>
+                <a:cubicBezTo>
+                  <a:pt x="908443" y="1111250"/>
+                  <a:pt x="869020" y="1059921"/>
+                  <a:pt x="828804" y="1038225"/>
+                </a:cubicBezTo>
+                <a:cubicBezTo>
+                  <a:pt x="788588" y="1016529"/>
+                  <a:pt x="712916" y="1046162"/>
+                  <a:pt x="673229" y="1006475"/>
+                </a:cubicBezTo>
+                <a:cubicBezTo>
+                  <a:pt x="633542" y="966788"/>
+                  <a:pt x="662116" y="856192"/>
+                  <a:pt x="590679" y="800100"/>
+                </a:cubicBezTo>
+                <a:cubicBezTo>
+                  <a:pt x="519242" y="744008"/>
+                  <a:pt x="339854" y="738717"/>
+                  <a:pt x="244604" y="669925"/>
+                </a:cubicBezTo>
+                <a:cubicBezTo>
+                  <a:pt x="149354" y="601133"/>
+                  <a:pt x="57808" y="506412"/>
+                  <a:pt x="19179" y="387350"/>
+                </a:cubicBezTo>
+                <a:cubicBezTo>
+                  <a:pt x="-19450" y="268288"/>
+                  <a:pt x="7802" y="134144"/>
+                  <a:pt x="35054" y="0"/>
+                </a:cubicBezTo>
+              </a:path>
+            </a:pathLst>
+          </a:custGeom>
+          <a:noFill/>
+          <a:ln>
+            <a:solidFill>
+              <a:srgbClr val="90F828"/>
+            </a:solidFill>
+          </a:ln>
+        </p:spPr>
+        <p:style>
+          <a:lnRef idx="2">
+            <a:schemeClr val="accent1">
+              <a:shade val="50000"/>
+            </a:schemeClr>
+          </a:lnRef>
+          <a:fillRef idx="1">
+            <a:schemeClr val="accent1"/>
+          </a:fillRef>
+          <a:effectRef idx="0">
+            <a:schemeClr val="accent1"/>
+          </a:effectRef>
+          <a:fontRef idx="minor">
+            <a:schemeClr val="lt1"/>
+          </a:fontRef>
+        </p:style>
+        <p:txBody>
+          <a:bodyPr rtlCol="0" anchor="ctr"/>
+          <a:lstStyle/>
+          <a:p>
+            <a:pPr algn="ctr"/>
+            <a:endParaRPr lang="en-US"/>
+          </a:p>
+        </p:txBody>
+      </p:sp>
+      <p:sp>
+        <p:nvSpPr>
+          <p:cNvPr id="1218" name="Freeform: Shape 1217">
+            <a:extLst>
+              <a:ext uri="{FF2B5EF4-FFF2-40B4-BE49-F238E27FC236}">
+                <a16:creationId xmlns:a16="http://schemas.microsoft.com/office/drawing/2014/main" id="{44F1A6C0-5572-60CD-8B2A-7FFA3851FFED}"/>
+              </a:ext>
+            </a:extLst>
+          </p:cNvPr>
+          <p:cNvSpPr/>
+          <p:nvPr/>
+        </p:nvSpPr>
+        <p:spPr>
+          <a:xfrm>
+            <a:off x="2651125" y="2492374"/>
+            <a:ext cx="428625" cy="225425"/>
+          </a:xfrm>
+          <a:custGeom>
+            <a:avLst/>
+            <a:gdLst>
+              <a:gd name="connsiteX0" fmla="*/ 0 w 428625"/>
+              <a:gd name="connsiteY0" fmla="*/ 225425 h 252042"/>
+              <a:gd name="connsiteX1" fmla="*/ 44450 w 428625"/>
+              <a:gd name="connsiteY1" fmla="*/ 142875 h 252042"/>
+              <a:gd name="connsiteX2" fmla="*/ 139700 w 428625"/>
+              <a:gd name="connsiteY2" fmla="*/ 203200 h 252042"/>
+              <a:gd name="connsiteX3" fmla="*/ 361950 w 428625"/>
+              <a:gd name="connsiteY3" fmla="*/ 241300 h 252042"/>
+              <a:gd name="connsiteX4" fmla="*/ 428625 w 428625"/>
+              <a:gd name="connsiteY4" fmla="*/ 0 h 252042"/>
+              <a:gd name="connsiteX0" fmla="*/ 0 w 428625"/>
+              <a:gd name="connsiteY0" fmla="*/ 225425 h 225425"/>
+              <a:gd name="connsiteX1" fmla="*/ 44450 w 428625"/>
+              <a:gd name="connsiteY1" fmla="*/ 142875 h 225425"/>
+              <a:gd name="connsiteX2" fmla="*/ 139700 w 428625"/>
+              <a:gd name="connsiteY2" fmla="*/ 203200 h 225425"/>
+              <a:gd name="connsiteX3" fmla="*/ 365125 w 428625"/>
+              <a:gd name="connsiteY3" fmla="*/ 161925 h 225425"/>
+              <a:gd name="connsiteX4" fmla="*/ 428625 w 428625"/>
+              <a:gd name="connsiteY4" fmla="*/ 0 h 225425"/>
+              <a:gd name="connsiteX0" fmla="*/ 0 w 428625"/>
+              <a:gd name="connsiteY0" fmla="*/ 225425 h 225425"/>
+              <a:gd name="connsiteX1" fmla="*/ 44450 w 428625"/>
+              <a:gd name="connsiteY1" fmla="*/ 142875 h 225425"/>
+              <a:gd name="connsiteX2" fmla="*/ 139700 w 428625"/>
+              <a:gd name="connsiteY2" fmla="*/ 155575 h 225425"/>
+              <a:gd name="connsiteX3" fmla="*/ 365125 w 428625"/>
+              <a:gd name="connsiteY3" fmla="*/ 161925 h 225425"/>
+              <a:gd name="connsiteX4" fmla="*/ 428625 w 428625"/>
+              <a:gd name="connsiteY4" fmla="*/ 0 h 225425"/>
+              <a:gd name="connsiteX0" fmla="*/ 0 w 428625"/>
+              <a:gd name="connsiteY0" fmla="*/ 225425 h 225425"/>
+              <a:gd name="connsiteX1" fmla="*/ 34925 w 428625"/>
+              <a:gd name="connsiteY1" fmla="*/ 155575 h 225425"/>
+              <a:gd name="connsiteX2" fmla="*/ 139700 w 428625"/>
+              <a:gd name="connsiteY2" fmla="*/ 155575 h 225425"/>
+              <a:gd name="connsiteX3" fmla="*/ 365125 w 428625"/>
+              <a:gd name="connsiteY3" fmla="*/ 161925 h 225425"/>
+              <a:gd name="connsiteX4" fmla="*/ 428625 w 428625"/>
+              <a:gd name="connsiteY4" fmla="*/ 0 h 225425"/>
+            </a:gdLst>
+            <a:ahLst/>
+            <a:cxnLst>
+              <a:cxn ang="0">
+                <a:pos x="connsiteX0" y="connsiteY0"/>
+              </a:cxn>
+              <a:cxn ang="0">
+                <a:pos x="connsiteX1" y="connsiteY1"/>
+              </a:cxn>
+              <a:cxn ang="0">
+                <a:pos x="connsiteX2" y="connsiteY2"/>
+              </a:cxn>
+              <a:cxn ang="0">
+                <a:pos x="connsiteX3" y="connsiteY3"/>
+              </a:cxn>
+              <a:cxn ang="0">
+                <a:pos x="connsiteX4" y="connsiteY4"/>
+              </a:cxn>
+            </a:cxnLst>
+            <a:rect l="l" t="t" r="r" b="b"/>
+            <a:pathLst>
+              <a:path w="428625" h="225425">
+                <a:moveTo>
+                  <a:pt x="0" y="225425"/>
+                </a:moveTo>
+                <a:cubicBezTo>
+                  <a:pt x="10583" y="186002"/>
+                  <a:pt x="11642" y="167217"/>
+                  <a:pt x="34925" y="155575"/>
+                </a:cubicBezTo>
+                <a:cubicBezTo>
+                  <a:pt x="58208" y="143933"/>
+                  <a:pt x="84667" y="154517"/>
+                  <a:pt x="139700" y="155575"/>
+                </a:cubicBezTo>
+                <a:cubicBezTo>
+                  <a:pt x="194733" y="156633"/>
+                  <a:pt x="316971" y="195792"/>
+                  <a:pt x="365125" y="161925"/>
+                </a:cubicBezTo>
+                <a:cubicBezTo>
+                  <a:pt x="413279" y="128058"/>
+                  <a:pt x="419364" y="103716"/>
+                  <a:pt x="428625" y="0"/>
+                </a:cubicBezTo>
+              </a:path>
+            </a:pathLst>
+          </a:custGeom>
+          <a:noFill/>
+          <a:ln>
+            <a:solidFill>
+              <a:srgbClr val="FFFF00"/>
+            </a:solidFill>
+          </a:ln>
+        </p:spPr>
+        <p:style>
+          <a:lnRef idx="2">
+            <a:schemeClr val="accent1">
+              <a:shade val="50000"/>
+            </a:schemeClr>
+          </a:lnRef>
+          <a:fillRef idx="1">
+            <a:schemeClr val="accent1"/>
+          </a:fillRef>
+          <a:effectRef idx="0">
+            <a:schemeClr val="accent1"/>
+          </a:effectRef>
+          <a:fontRef idx="minor">
+            <a:schemeClr val="lt1"/>
+          </a:fontRef>
+        </p:style>
+        <p:txBody>
+          <a:bodyPr rtlCol="0" anchor="ctr"/>
+          <a:lstStyle/>
+          <a:p>
+            <a:pPr algn="ctr"/>
+            <a:endParaRPr lang="en-US"/>
+          </a:p>
+        </p:txBody>
+      </p:sp>
+      <p:sp>
+        <p:nvSpPr>
+          <p:cNvPr id="1220" name="Freeform: Shape 1219">
+            <a:extLst>
+              <a:ext uri="{FF2B5EF4-FFF2-40B4-BE49-F238E27FC236}">
+                <a16:creationId xmlns:a16="http://schemas.microsoft.com/office/drawing/2014/main" id="{2B745B1A-8D86-686F-356E-4EB60D9A54B4}"/>
+              </a:ext>
+            </a:extLst>
+          </p:cNvPr>
+          <p:cNvSpPr/>
+          <p:nvPr/>
+        </p:nvSpPr>
+        <p:spPr>
+          <a:xfrm>
+            <a:off x="2695575" y="2501900"/>
+            <a:ext cx="57150" cy="206375"/>
+          </a:xfrm>
+          <a:custGeom>
+            <a:avLst/>
+            <a:gdLst>
+              <a:gd name="connsiteX0" fmla="*/ 15875 w 15875"/>
+              <a:gd name="connsiteY0" fmla="*/ 206375 h 206375"/>
+              <a:gd name="connsiteX1" fmla="*/ 0 w 15875"/>
+              <a:gd name="connsiteY1" fmla="*/ 95250 h 206375"/>
+              <a:gd name="connsiteX2" fmla="*/ 15875 w 15875"/>
+              <a:gd name="connsiteY2" fmla="*/ 0 h 206375"/>
+              <a:gd name="connsiteX0" fmla="*/ 57150 w 57150"/>
+              <a:gd name="connsiteY0" fmla="*/ 206375 h 206375"/>
+              <a:gd name="connsiteX1" fmla="*/ 0 w 57150"/>
+              <a:gd name="connsiteY1" fmla="*/ 101600 h 206375"/>
+              <a:gd name="connsiteX2" fmla="*/ 57150 w 57150"/>
+              <a:gd name="connsiteY2" fmla="*/ 0 h 206375"/>
+              <a:gd name="connsiteX0" fmla="*/ 57150 w 57150"/>
+              <a:gd name="connsiteY0" fmla="*/ 206375 h 206375"/>
+              <a:gd name="connsiteX1" fmla="*/ 0 w 57150"/>
+              <a:gd name="connsiteY1" fmla="*/ 101600 h 206375"/>
+              <a:gd name="connsiteX2" fmla="*/ 57150 w 57150"/>
+              <a:gd name="connsiteY2" fmla="*/ 0 h 206375"/>
+              <a:gd name="connsiteX0" fmla="*/ 57150 w 57150"/>
+              <a:gd name="connsiteY0" fmla="*/ 206375 h 206375"/>
+              <a:gd name="connsiteX1" fmla="*/ 0 w 57150"/>
+              <a:gd name="connsiteY1" fmla="*/ 101600 h 206375"/>
+              <a:gd name="connsiteX2" fmla="*/ 57150 w 57150"/>
+              <a:gd name="connsiteY2" fmla="*/ 0 h 206375"/>
+            </a:gdLst>
+            <a:ahLst/>
+            <a:cxnLst>
+              <a:cxn ang="0">
+                <a:pos x="connsiteX0" y="connsiteY0"/>
+              </a:cxn>
+              <a:cxn ang="0">
+                <a:pos x="connsiteX1" y="connsiteY1"/>
+              </a:cxn>
+              <a:cxn ang="0">
+                <a:pos x="connsiteX2" y="connsiteY2"/>
+              </a:cxn>
+            </a:cxnLst>
+            <a:rect l="l" t="t" r="r" b="b"/>
+            <a:pathLst>
+              <a:path w="57150" h="206375">
+                <a:moveTo>
+                  <a:pt x="57150" y="206375"/>
+                </a:moveTo>
+                <a:cubicBezTo>
+                  <a:pt x="49212" y="168010"/>
+                  <a:pt x="25400" y="145521"/>
+                  <a:pt x="0" y="101600"/>
+                </a:cubicBezTo>
+                <a:cubicBezTo>
+                  <a:pt x="28575" y="38629"/>
+                  <a:pt x="48683" y="16404"/>
+                  <a:pt x="57150" y="0"/>
+                </a:cubicBezTo>
+              </a:path>
+            </a:pathLst>
+          </a:custGeom>
+          <a:noFill/>
+          <a:ln>
+            <a:solidFill>
+              <a:srgbClr val="90F828"/>
+            </a:solidFill>
+          </a:ln>
+        </p:spPr>
+        <p:style>
+          <a:lnRef idx="2">
+            <a:schemeClr val="accent1">
+              <a:shade val="50000"/>
+            </a:schemeClr>
+          </a:lnRef>
+          <a:fillRef idx="1">
+            <a:schemeClr val="accent1"/>
+          </a:fillRef>
+          <a:effectRef idx="0">
+            <a:schemeClr val="accent1"/>
+          </a:effectRef>
+          <a:fontRef idx="minor">
+            <a:schemeClr val="lt1"/>
+          </a:fontRef>
+        </p:style>
+        <p:txBody>
+          <a:bodyPr rtlCol="0" anchor="ctr"/>
+          <a:lstStyle/>
+          <a:p>
+            <a:pPr algn="ctr"/>
+            <a:endParaRPr lang="en-US"/>
+          </a:p>
+        </p:txBody>
+      </p:sp>
+      <p:sp>
+        <p:nvSpPr>
+          <p:cNvPr id="1221" name="Freeform: Shape 1220">
+            <a:extLst>
+              <a:ext uri="{FF2B5EF4-FFF2-40B4-BE49-F238E27FC236}">
+                <a16:creationId xmlns:a16="http://schemas.microsoft.com/office/drawing/2014/main" id="{5EB22906-593E-14DA-CB2B-670181DE6A2C}"/>
+              </a:ext>
+            </a:extLst>
+          </p:cNvPr>
+          <p:cNvSpPr/>
+          <p:nvPr/>
+        </p:nvSpPr>
+        <p:spPr>
+          <a:xfrm>
+            <a:off x="2669064" y="2136725"/>
+            <a:ext cx="789530" cy="523925"/>
+          </a:xfrm>
+          <a:custGeom>
+            <a:avLst/>
+            <a:gdLst>
+              <a:gd name="connsiteX0" fmla="*/ 866775 w 876753"/>
+              <a:gd name="connsiteY0" fmla="*/ 701086 h 701086"/>
+              <a:gd name="connsiteX1" fmla="*/ 850900 w 876753"/>
+              <a:gd name="connsiteY1" fmla="*/ 266111 h 701086"/>
+              <a:gd name="connsiteX2" fmla="*/ 644525 w 876753"/>
+              <a:gd name="connsiteY2" fmla="*/ 2586 h 701086"/>
+              <a:gd name="connsiteX3" fmla="*/ 107950 w 876753"/>
+              <a:gd name="connsiteY3" fmla="*/ 148636 h 701086"/>
+              <a:gd name="connsiteX4" fmla="*/ 0 w 876753"/>
+              <a:gd name="connsiteY4" fmla="*/ 421686 h 701086"/>
+              <a:gd name="connsiteX0" fmla="*/ 866775 w 876753"/>
+              <a:gd name="connsiteY0" fmla="*/ 698502 h 698502"/>
+              <a:gd name="connsiteX1" fmla="*/ 850900 w 876753"/>
+              <a:gd name="connsiteY1" fmla="*/ 263527 h 698502"/>
+              <a:gd name="connsiteX2" fmla="*/ 644525 w 876753"/>
+              <a:gd name="connsiteY2" fmla="*/ 2 h 698502"/>
+              <a:gd name="connsiteX3" fmla="*/ 282260 w 876753"/>
+              <a:gd name="connsiteY3" fmla="*/ 266702 h 698502"/>
+              <a:gd name="connsiteX4" fmla="*/ 0 w 876753"/>
+              <a:gd name="connsiteY4" fmla="*/ 419102 h 698502"/>
+              <a:gd name="connsiteX0" fmla="*/ 831913 w 841891"/>
+              <a:gd name="connsiteY0" fmla="*/ 698502 h 698502"/>
+              <a:gd name="connsiteX1" fmla="*/ 816038 w 841891"/>
+              <a:gd name="connsiteY1" fmla="*/ 263527 h 698502"/>
+              <a:gd name="connsiteX2" fmla="*/ 609663 w 841891"/>
+              <a:gd name="connsiteY2" fmla="*/ 2 h 698502"/>
+              <a:gd name="connsiteX3" fmla="*/ 247398 w 841891"/>
+              <a:gd name="connsiteY3" fmla="*/ 266702 h 698502"/>
+              <a:gd name="connsiteX4" fmla="*/ 0 w 841891"/>
+              <a:gd name="connsiteY4" fmla="*/ 428627 h 698502"/>
+              <a:gd name="connsiteX0" fmla="*/ 856316 w 866294"/>
+              <a:gd name="connsiteY0" fmla="*/ 698502 h 698502"/>
+              <a:gd name="connsiteX1" fmla="*/ 840441 w 866294"/>
+              <a:gd name="connsiteY1" fmla="*/ 263527 h 698502"/>
+              <a:gd name="connsiteX2" fmla="*/ 634066 w 866294"/>
+              <a:gd name="connsiteY2" fmla="*/ 2 h 698502"/>
+              <a:gd name="connsiteX3" fmla="*/ 271801 w 866294"/>
+              <a:gd name="connsiteY3" fmla="*/ 266702 h 698502"/>
+              <a:gd name="connsiteX4" fmla="*/ 0 w 866294"/>
+              <a:gd name="connsiteY4" fmla="*/ 419102 h 698502"/>
+              <a:gd name="connsiteX0" fmla="*/ 856316 w 866915"/>
+              <a:gd name="connsiteY0" fmla="*/ 523925 h 523925"/>
+              <a:gd name="connsiteX1" fmla="*/ 840441 w 866915"/>
+              <a:gd name="connsiteY1" fmla="*/ 88950 h 523925"/>
+              <a:gd name="connsiteX2" fmla="*/ 623608 w 866915"/>
+              <a:gd name="connsiteY2" fmla="*/ 50 h 523925"/>
+              <a:gd name="connsiteX3" fmla="*/ 271801 w 866915"/>
+              <a:gd name="connsiteY3" fmla="*/ 92125 h 523925"/>
+              <a:gd name="connsiteX4" fmla="*/ 0 w 866915"/>
+              <a:gd name="connsiteY4" fmla="*/ 244525 h 523925"/>
+            </a:gdLst>
+            <a:ahLst/>
+            <a:cxnLst>
+              <a:cxn ang="0">
+                <a:pos x="connsiteX0" y="connsiteY0"/>
+              </a:cxn>
+              <a:cxn ang="0">
+                <a:pos x="connsiteX1" y="connsiteY1"/>
+              </a:cxn>
+              <a:cxn ang="0">
+                <a:pos x="connsiteX2" y="connsiteY2"/>
+              </a:cxn>
+              <a:cxn ang="0">
+                <a:pos x="connsiteX3" y="connsiteY3"/>
+              </a:cxn>
+              <a:cxn ang="0">
+                <a:pos x="connsiteX4" y="connsiteY4"/>
+              </a:cxn>
+            </a:cxnLst>
+            <a:rect l="l" t="t" r="r" b="b"/>
+            <a:pathLst>
+              <a:path w="866915" h="523925">
+                <a:moveTo>
+                  <a:pt x="856316" y="523925"/>
+                </a:moveTo>
+                <a:cubicBezTo>
+                  <a:pt x="866899" y="364646"/>
+                  <a:pt x="879226" y="176263"/>
+                  <a:pt x="840441" y="88950"/>
+                </a:cubicBezTo>
+                <a:cubicBezTo>
+                  <a:pt x="801656" y="1638"/>
+                  <a:pt x="718381" y="-479"/>
+                  <a:pt x="623608" y="50"/>
+                </a:cubicBezTo>
+                <a:cubicBezTo>
+                  <a:pt x="528835" y="579"/>
+                  <a:pt x="379222" y="22275"/>
+                  <a:pt x="271801" y="92125"/>
+                </a:cubicBezTo>
+                <a:cubicBezTo>
+                  <a:pt x="164380" y="161975"/>
+                  <a:pt x="264" y="142925"/>
+                  <a:pt x="0" y="244525"/>
+                </a:cubicBezTo>
+              </a:path>
+            </a:pathLst>
+          </a:custGeom>
+          <a:noFill/>
+          <a:ln>
+            <a:solidFill>
+              <a:srgbClr val="FFFF00"/>
+            </a:solidFill>
+          </a:ln>
+        </p:spPr>
+        <p:style>
+          <a:lnRef idx="2">
+            <a:schemeClr val="accent1">
+              <a:shade val="50000"/>
+            </a:schemeClr>
+          </a:lnRef>
+          <a:fillRef idx="1">
+            <a:schemeClr val="accent1"/>
+          </a:fillRef>
+          <a:effectRef idx="0">
+            <a:schemeClr val="accent1"/>
+          </a:effectRef>
+          <a:fontRef idx="minor">
+            <a:schemeClr val="lt1"/>
+          </a:fontRef>
+        </p:style>
+        <p:txBody>
+          <a:bodyPr rtlCol="0" anchor="ctr"/>
+          <a:lstStyle/>
+          <a:p>
+            <a:pPr algn="ctr"/>
+            <a:endParaRPr lang="en-US"/>
+          </a:p>
+        </p:txBody>
+      </p:sp>
+      <p:sp>
+        <p:nvSpPr>
+          <p:cNvPr id="1222" name="TextBox 1221">
+            <a:extLst>
+              <a:ext uri="{FF2B5EF4-FFF2-40B4-BE49-F238E27FC236}">
+                <a16:creationId xmlns:a16="http://schemas.microsoft.com/office/drawing/2014/main" id="{C25EC4A5-D032-2108-EF0D-E30088BA0E5E}"/>
+              </a:ext>
+            </a:extLst>
+          </p:cNvPr>
+          <p:cNvSpPr txBox="1"/>
+          <p:nvPr/>
+        </p:nvSpPr>
+        <p:spPr>
+          <a:xfrm>
+            <a:off x="1887704" y="4800986"/>
+            <a:ext cx="348172" cy="200055"/>
+          </a:xfrm>
+          <a:prstGeom prst="rect">
+            <a:avLst/>
+          </a:prstGeom>
+          <a:noFill/>
+        </p:spPr>
+        <p:txBody>
+          <a:bodyPr wrap="none" rtlCol="0">
+            <a:spAutoFit/>
+          </a:bodyPr>
+          <a:lstStyle/>
+          <a:p>
+            <a:r>
+              <a:rPr lang="en-US" sz="700" dirty="0">
+                <a:latin typeface="Courier New" panose="02070309020205020404" pitchFamily="49" charset="0"/>
+                <a:cs typeface="Courier New" panose="02070309020205020404" pitchFamily="49" charset="0"/>
+              </a:rPr>
+              <a:t>D18</a:t>
+            </a:r>
+          </a:p>
+        </p:txBody>
+      </p:sp>
+      <p:sp>
+        <p:nvSpPr>
+          <p:cNvPr id="1223" name="Freeform: Shape 1222">
+            <a:extLst>
+              <a:ext uri="{FF2B5EF4-FFF2-40B4-BE49-F238E27FC236}">
+                <a16:creationId xmlns:a16="http://schemas.microsoft.com/office/drawing/2014/main" id="{D0A9ADAF-86DE-DC2A-EF33-DFC0070D2BEA}"/>
+              </a:ext>
+            </a:extLst>
+          </p:cNvPr>
+          <p:cNvSpPr/>
+          <p:nvPr/>
+        </p:nvSpPr>
+        <p:spPr>
+          <a:xfrm>
+            <a:off x="2857735" y="1546225"/>
+            <a:ext cx="697267" cy="1104900"/>
+          </a:xfrm>
+          <a:custGeom>
+            <a:avLst/>
+            <a:gdLst>
+              <a:gd name="connsiteX0" fmla="*/ 695090 w 697267"/>
+              <a:gd name="connsiteY0" fmla="*/ 1104900 h 1104900"/>
+              <a:gd name="connsiteX1" fmla="*/ 663340 w 697267"/>
+              <a:gd name="connsiteY1" fmla="*/ 638175 h 1104900"/>
+              <a:gd name="connsiteX2" fmla="*/ 460140 w 697267"/>
+              <a:gd name="connsiteY2" fmla="*/ 428625 h 1104900"/>
+              <a:gd name="connsiteX3" fmla="*/ 63265 w 697267"/>
+              <a:gd name="connsiteY3" fmla="*/ 209550 h 1104900"/>
+              <a:gd name="connsiteX4" fmla="*/ 6115 w 697267"/>
+              <a:gd name="connsiteY4" fmla="*/ 0 h 1104900"/>
+            </a:gdLst>
+            <a:ahLst/>
+            <a:cxnLst>
+              <a:cxn ang="0">
+                <a:pos x="connsiteX0" y="connsiteY0"/>
+              </a:cxn>
+              <a:cxn ang="0">
+                <a:pos x="connsiteX1" y="connsiteY1"/>
+              </a:cxn>
+              <a:cxn ang="0">
+                <a:pos x="connsiteX2" y="connsiteY2"/>
+              </a:cxn>
+              <a:cxn ang="0">
+                <a:pos x="connsiteX3" y="connsiteY3"/>
+              </a:cxn>
+              <a:cxn ang="0">
+                <a:pos x="connsiteX4" y="connsiteY4"/>
+              </a:cxn>
+            </a:cxnLst>
+            <a:rect l="l" t="t" r="r" b="b"/>
+            <a:pathLst>
+              <a:path w="697267" h="1104900">
+                <a:moveTo>
+                  <a:pt x="695090" y="1104900"/>
+                </a:moveTo>
+                <a:cubicBezTo>
+                  <a:pt x="698794" y="927893"/>
+                  <a:pt x="702498" y="750887"/>
+                  <a:pt x="663340" y="638175"/>
+                </a:cubicBezTo>
+                <a:cubicBezTo>
+                  <a:pt x="624182" y="525463"/>
+                  <a:pt x="560152" y="500062"/>
+                  <a:pt x="460140" y="428625"/>
+                </a:cubicBezTo>
+                <a:cubicBezTo>
+                  <a:pt x="360128" y="357188"/>
+                  <a:pt x="138936" y="280987"/>
+                  <a:pt x="63265" y="209550"/>
+                </a:cubicBezTo>
+                <a:cubicBezTo>
+                  <a:pt x="-12406" y="138112"/>
+                  <a:pt x="-3146" y="69056"/>
+                  <a:pt x="6115" y="0"/>
+                </a:cubicBezTo>
+              </a:path>
+            </a:pathLst>
+          </a:custGeom>
+          <a:noFill/>
+          <a:ln>
+            <a:solidFill>
+              <a:srgbClr val="FFFF00"/>
+            </a:solidFill>
+          </a:ln>
+        </p:spPr>
+        <p:style>
+          <a:lnRef idx="2">
+            <a:schemeClr val="accent1">
+              <a:shade val="50000"/>
+            </a:schemeClr>
+          </a:lnRef>
+          <a:fillRef idx="1">
+            <a:schemeClr val="accent1"/>
+          </a:fillRef>
+          <a:effectRef idx="0">
+            <a:schemeClr val="accent1"/>
+          </a:effectRef>
+          <a:fontRef idx="minor">
+            <a:schemeClr val="lt1"/>
+          </a:fontRef>
+        </p:style>
+        <p:txBody>
+          <a:bodyPr rtlCol="0" anchor="ctr"/>
+          <a:lstStyle/>
+          <a:p>
+            <a:pPr algn="ctr"/>
+            <a:endParaRPr lang="en-US"/>
+          </a:p>
+        </p:txBody>
+      </p:sp>
+      <p:cxnSp>
+        <p:nvCxnSpPr>
+          <p:cNvPr id="1226" name="Straight Connector 1225">
+            <a:extLst>
+              <a:ext uri="{FF2B5EF4-FFF2-40B4-BE49-F238E27FC236}">
+                <a16:creationId xmlns:a16="http://schemas.microsoft.com/office/drawing/2014/main" id="{D8249075-654F-4D00-B766-FF5828ABAB56}"/>
+              </a:ext>
+            </a:extLst>
+          </p:cNvPr>
+          <p:cNvCxnSpPr>
+            <a:endCxn id="1134" idx="7"/>
+          </p:cNvCxnSpPr>
+          <p:nvPr/>
+        </p:nvCxnSpPr>
+        <p:spPr>
+          <a:xfrm>
+            <a:off x="3454106" y="3773597"/>
+            <a:ext cx="3108" cy="118084"/>
+          </a:xfrm>
+          <a:prstGeom prst="line">
+            <a:avLst/>
+          </a:prstGeom>
+          <a:ln w="12700">
+            <a:solidFill>
+              <a:srgbClr val="FFFF00"/>
+            </a:solidFill>
+          </a:ln>
+        </p:spPr>
+        <p:style>
+          <a:lnRef idx="1">
+            <a:schemeClr val="accent1"/>
+          </a:lnRef>
+          <a:fillRef idx="0">
+            <a:schemeClr val="accent1"/>
+          </a:fillRef>
+          <a:effectRef idx="0">
+            <a:schemeClr val="accent1"/>
+          </a:effectRef>
+          <a:fontRef idx="minor">
+            <a:schemeClr val="tx1"/>
+          </a:fontRef>
+        </p:style>
+      </p:cxnSp>
+      <p:cxnSp>
+        <p:nvCxnSpPr>
+          <p:cNvPr id="1228" name="Straight Connector 1227">
+            <a:extLst>
+              <a:ext uri="{FF2B5EF4-FFF2-40B4-BE49-F238E27FC236}">
+                <a16:creationId xmlns:a16="http://schemas.microsoft.com/office/drawing/2014/main" id="{72507A51-F4B4-4C48-F81A-5BB149EEF802}"/>
+              </a:ext>
+            </a:extLst>
+          </p:cNvPr>
+          <p:cNvCxnSpPr/>
+          <p:nvPr/>
+        </p:nvCxnSpPr>
+        <p:spPr>
+          <a:xfrm>
+            <a:off x="3250465" y="3771295"/>
+            <a:ext cx="3108" cy="118084"/>
+          </a:xfrm>
+          <a:prstGeom prst="line">
+            <a:avLst/>
+          </a:prstGeom>
+          <a:ln w="12700">
+            <a:solidFill>
+              <a:srgbClr val="FFFF00"/>
+            </a:solidFill>
+          </a:ln>
+        </p:spPr>
+        <p:style>
+          <a:lnRef idx="1">
+            <a:schemeClr val="accent1"/>
+          </a:lnRef>
+          <a:fillRef idx="0">
+            <a:schemeClr val="accent1"/>
+          </a:fillRef>
+          <a:effectRef idx="0">
+            <a:schemeClr val="accent1"/>
+          </a:effectRef>
+          <a:fontRef idx="minor">
+            <a:schemeClr val="tx1"/>
+          </a:fontRef>
+        </p:style>
+      </p:cxnSp>
+      <p:sp>
+        <p:nvSpPr>
+          <p:cNvPr id="1240" name="Freeform: Shape 1239">
+            <a:extLst>
+              <a:ext uri="{FF2B5EF4-FFF2-40B4-BE49-F238E27FC236}">
+                <a16:creationId xmlns:a16="http://schemas.microsoft.com/office/drawing/2014/main" id="{7D2A9A6B-1528-DDCC-1719-8EAF042DCF54}"/>
+              </a:ext>
+            </a:extLst>
+          </p:cNvPr>
+          <p:cNvSpPr/>
+          <p:nvPr/>
+        </p:nvSpPr>
+        <p:spPr>
+          <a:xfrm>
+            <a:off x="3279738" y="3956049"/>
+            <a:ext cx="561762" cy="105361"/>
+          </a:xfrm>
+          <a:custGeom>
+            <a:avLst/>
+            <a:gdLst>
+              <a:gd name="connsiteX0" fmla="*/ 21578 w 601489"/>
+              <a:gd name="connsiteY0" fmla="*/ 0 h 146050"/>
+              <a:gd name="connsiteX1" fmla="*/ 31103 w 601489"/>
+              <a:gd name="connsiteY1" fmla="*/ 92075 h 146050"/>
+              <a:gd name="connsiteX2" fmla="*/ 320028 w 601489"/>
+              <a:gd name="connsiteY2" fmla="*/ 98425 h 146050"/>
+              <a:gd name="connsiteX3" fmla="*/ 564503 w 601489"/>
+              <a:gd name="connsiteY3" fmla="*/ 98425 h 146050"/>
+              <a:gd name="connsiteX4" fmla="*/ 596253 w 601489"/>
+              <a:gd name="connsiteY4" fmla="*/ 146050 h 146050"/>
+              <a:gd name="connsiteX0" fmla="*/ 7062 w 586973"/>
+              <a:gd name="connsiteY0" fmla="*/ 0 h 146050"/>
+              <a:gd name="connsiteX1" fmla="*/ 61037 w 586973"/>
+              <a:gd name="connsiteY1" fmla="*/ 95250 h 146050"/>
+              <a:gd name="connsiteX2" fmla="*/ 305512 w 586973"/>
+              <a:gd name="connsiteY2" fmla="*/ 98425 h 146050"/>
+              <a:gd name="connsiteX3" fmla="*/ 549987 w 586973"/>
+              <a:gd name="connsiteY3" fmla="*/ 98425 h 146050"/>
+              <a:gd name="connsiteX4" fmla="*/ 581737 w 586973"/>
+              <a:gd name="connsiteY4" fmla="*/ 146050 h 146050"/>
+              <a:gd name="connsiteX0" fmla="*/ 5973 w 585884"/>
+              <a:gd name="connsiteY0" fmla="*/ 0 h 146050"/>
+              <a:gd name="connsiteX1" fmla="*/ 59948 w 585884"/>
+              <a:gd name="connsiteY1" fmla="*/ 95250 h 146050"/>
+              <a:gd name="connsiteX2" fmla="*/ 304423 w 585884"/>
+              <a:gd name="connsiteY2" fmla="*/ 98425 h 146050"/>
+              <a:gd name="connsiteX3" fmla="*/ 548898 w 585884"/>
+              <a:gd name="connsiteY3" fmla="*/ 98425 h 146050"/>
+              <a:gd name="connsiteX4" fmla="*/ 580648 w 585884"/>
+              <a:gd name="connsiteY4" fmla="*/ 146050 h 146050"/>
+              <a:gd name="connsiteX0" fmla="*/ 5389 w 585300"/>
+              <a:gd name="connsiteY0" fmla="*/ 0 h 146050"/>
+              <a:gd name="connsiteX1" fmla="*/ 59364 w 585300"/>
+              <a:gd name="connsiteY1" fmla="*/ 95250 h 146050"/>
+              <a:gd name="connsiteX2" fmla="*/ 303839 w 585300"/>
+              <a:gd name="connsiteY2" fmla="*/ 98425 h 146050"/>
+              <a:gd name="connsiteX3" fmla="*/ 548314 w 585300"/>
+              <a:gd name="connsiteY3" fmla="*/ 98425 h 146050"/>
+              <a:gd name="connsiteX4" fmla="*/ 580064 w 585300"/>
+              <a:gd name="connsiteY4" fmla="*/ 146050 h 146050"/>
+              <a:gd name="connsiteX0" fmla="*/ 38 w 579949"/>
+              <a:gd name="connsiteY0" fmla="*/ 0 h 146050"/>
+              <a:gd name="connsiteX1" fmla="*/ 54013 w 579949"/>
+              <a:gd name="connsiteY1" fmla="*/ 95250 h 146050"/>
+              <a:gd name="connsiteX2" fmla="*/ 298488 w 579949"/>
+              <a:gd name="connsiteY2" fmla="*/ 98425 h 146050"/>
+              <a:gd name="connsiteX3" fmla="*/ 542963 w 579949"/>
+              <a:gd name="connsiteY3" fmla="*/ 98425 h 146050"/>
+              <a:gd name="connsiteX4" fmla="*/ 574713 w 579949"/>
+              <a:gd name="connsiteY4" fmla="*/ 146050 h 146050"/>
+              <a:gd name="connsiteX0" fmla="*/ 38 w 571663"/>
+              <a:gd name="connsiteY0" fmla="*/ 0 h 104721"/>
+              <a:gd name="connsiteX1" fmla="*/ 54013 w 571663"/>
+              <a:gd name="connsiteY1" fmla="*/ 95250 h 104721"/>
+              <a:gd name="connsiteX2" fmla="*/ 298488 w 571663"/>
+              <a:gd name="connsiteY2" fmla="*/ 98425 h 104721"/>
+              <a:gd name="connsiteX3" fmla="*/ 542963 w 571663"/>
+              <a:gd name="connsiteY3" fmla="*/ 98425 h 104721"/>
+              <a:gd name="connsiteX4" fmla="*/ 560425 w 571663"/>
+              <a:gd name="connsiteY4" fmla="*/ 46037 h 104721"/>
+              <a:gd name="connsiteX0" fmla="*/ 38 w 561590"/>
+              <a:gd name="connsiteY0" fmla="*/ 0 h 105361"/>
+              <a:gd name="connsiteX1" fmla="*/ 54013 w 561590"/>
+              <a:gd name="connsiteY1" fmla="*/ 95250 h 105361"/>
+              <a:gd name="connsiteX2" fmla="*/ 298488 w 561590"/>
+              <a:gd name="connsiteY2" fmla="*/ 98425 h 105361"/>
+              <a:gd name="connsiteX3" fmla="*/ 495338 w 561590"/>
+              <a:gd name="connsiteY3" fmla="*/ 84138 h 105361"/>
+              <a:gd name="connsiteX4" fmla="*/ 560425 w 561590"/>
+              <a:gd name="connsiteY4" fmla="*/ 46037 h 105361"/>
+              <a:gd name="connsiteX0" fmla="*/ 38 w 561762"/>
+              <a:gd name="connsiteY0" fmla="*/ 0 h 105361"/>
+              <a:gd name="connsiteX1" fmla="*/ 54013 w 561762"/>
+              <a:gd name="connsiteY1" fmla="*/ 95250 h 105361"/>
+              <a:gd name="connsiteX2" fmla="*/ 298488 w 561762"/>
+              <a:gd name="connsiteY2" fmla="*/ 98425 h 105361"/>
+              <a:gd name="connsiteX3" fmla="*/ 495338 w 561762"/>
+              <a:gd name="connsiteY3" fmla="*/ 84138 h 105361"/>
+              <a:gd name="connsiteX4" fmla="*/ 560425 w 561762"/>
+              <a:gd name="connsiteY4" fmla="*/ 46037 h 105361"/>
+              <a:gd name="connsiteX0" fmla="*/ 38 w 561762"/>
+              <a:gd name="connsiteY0" fmla="*/ 0 h 105361"/>
+              <a:gd name="connsiteX1" fmla="*/ 54013 w 561762"/>
+              <a:gd name="connsiteY1" fmla="*/ 95250 h 105361"/>
+              <a:gd name="connsiteX2" fmla="*/ 298488 w 561762"/>
+              <a:gd name="connsiteY2" fmla="*/ 98425 h 105361"/>
+              <a:gd name="connsiteX3" fmla="*/ 495338 w 561762"/>
+              <a:gd name="connsiteY3" fmla="*/ 84138 h 105361"/>
+              <a:gd name="connsiteX4" fmla="*/ 560425 w 561762"/>
+              <a:gd name="connsiteY4" fmla="*/ 46037 h 105361"/>
+            </a:gdLst>
+            <a:ahLst/>
+            <a:cxnLst>
+              <a:cxn ang="0">
+                <a:pos x="connsiteX0" y="connsiteY0"/>
+              </a:cxn>
+              <a:cxn ang="0">
+                <a:pos x="connsiteX1" y="connsiteY1"/>
+              </a:cxn>
+              <a:cxn ang="0">
+                <a:pos x="connsiteX2" y="connsiteY2"/>
+              </a:cxn>
+              <a:cxn ang="0">
+                <a:pos x="connsiteX3" y="connsiteY3"/>
+              </a:cxn>
+              <a:cxn ang="0">
+                <a:pos x="connsiteX4" y="connsiteY4"/>
+              </a:cxn>
+            </a:cxnLst>
+            <a:rect l="l" t="t" r="r" b="b"/>
+            <a:pathLst>
+              <a:path w="561762" h="105361">
+                <a:moveTo>
+                  <a:pt x="38" y="0"/>
+                </a:moveTo>
+                <a:cubicBezTo>
+                  <a:pt x="-1021" y="53710"/>
+                  <a:pt x="20146" y="75671"/>
+                  <a:pt x="54013" y="95250"/>
+                </a:cubicBezTo>
+                <a:cubicBezTo>
+                  <a:pt x="87880" y="114829"/>
+                  <a:pt x="224934" y="100277"/>
+                  <a:pt x="298488" y="98425"/>
+                </a:cubicBezTo>
+                <a:cubicBezTo>
+                  <a:pt x="372042" y="96573"/>
+                  <a:pt x="439776" y="100014"/>
+                  <a:pt x="495338" y="84138"/>
+                </a:cubicBezTo>
+                <a:cubicBezTo>
+                  <a:pt x="546138" y="53975"/>
+                  <a:pt x="567568" y="26193"/>
+                  <a:pt x="560425" y="46037"/>
+                </a:cubicBezTo>
+              </a:path>
+            </a:pathLst>
+          </a:custGeom>
+          <a:noFill/>
+          <a:ln>
+            <a:solidFill>
+              <a:srgbClr val="FFFF00"/>
+            </a:solidFill>
+          </a:ln>
+        </p:spPr>
+        <p:style>
+          <a:lnRef idx="2">
+            <a:schemeClr val="accent1">
+              <a:shade val="50000"/>
+            </a:schemeClr>
+          </a:lnRef>
+          <a:fillRef idx="1">
+            <a:schemeClr val="accent1"/>
+          </a:fillRef>
+          <a:effectRef idx="0">
+            <a:schemeClr val="accent1"/>
+          </a:effectRef>
+          <a:fontRef idx="minor">
+            <a:schemeClr val="lt1"/>
+          </a:fontRef>
+        </p:style>
+        <p:txBody>
+          <a:bodyPr rtlCol="0" anchor="ctr"/>
+          <a:lstStyle/>
+          <a:p>
+            <a:pPr algn="ctr"/>
+            <a:endParaRPr lang="en-US"/>
           </a:p>
         </p:txBody>
       </p:sp>

</xml_diff>

<commit_message>
Add sending on/off 433Mhz code
</commit_message>
<xml_diff>
--- a/design/PCB Design.pptx
+++ b/design/PCB Design.pptx
@@ -4,13 +4,19 @@
   <p:sldMasterIdLst>
     <p:sldMasterId id="2147483660" r:id="rId1"/>
   </p:sldMasterIdLst>
+  <p:notesMasterIdLst>
+    <p:notesMasterId r:id="rId5"/>
+  </p:notesMasterIdLst>
+  <p:handoutMasterIdLst>
+    <p:handoutMasterId r:id="rId6"/>
+  </p:handoutMasterIdLst>
   <p:sldIdLst>
     <p:sldId id="256" r:id="rId2"/>
     <p:sldId id="257" r:id="rId3"/>
     <p:sldId id="258" r:id="rId4"/>
   </p:sldIdLst>
   <p:sldSz cx="9144000" cy="6858000" type="screen4x3"/>
-  <p:notesSz cx="6858000" cy="9144000"/>
+  <p:notesSz cx="6888163" cy="10020300"/>
   <p:defaultTextStyle>
     <a:defPPr>
       <a:defRPr lang="en-US"/>
@@ -117,7 +123,7 @@
 <file path=ppt/revisionInfo.xml><?xml version="1.0" encoding="utf-8"?>
 <p1510:revInfo xmlns:a="http://schemas.openxmlformats.org/drawingml/2006/main" xmlns:r="http://schemas.openxmlformats.org/officeDocument/2006/relationships" xmlns:p1510="http://schemas.microsoft.com/office/powerpoint/2015/10/main">
   <p1510:revLst>
-    <p1510:client id="{C3A6CD6C-1DA5-47FB-A775-C4A3C3FB9D49}" v="164" dt="2023-05-27T08:52:41.631"/>
+    <p1510:client id="{C3A6CD6C-1DA5-47FB-A775-C4A3C3FB9D49}" v="166" dt="2023-05-28T01:39:37.733"/>
   </p1510:revLst>
 </p1510:revInfo>
 </file>
@@ -127,18 +133,18 @@
   <pc:docChgLst>
     <pc:chgData name="Olivier Grenadou" userId="02d4787ce9b02c5a" providerId="LiveId" clId="{C3A6CD6C-1DA5-47FB-A775-C4A3C3FB9D49}"/>
     <pc:docChg chg="undo custSel addSld modSld modMainMaster">
-      <pc:chgData name="Olivier Grenadou" userId="02d4787ce9b02c5a" providerId="LiveId" clId="{C3A6CD6C-1DA5-47FB-A775-C4A3C3FB9D49}" dt="2023-05-27T08:52:41.630" v="1755" actId="206"/>
+      <pc:chgData name="Olivier Grenadou" userId="02d4787ce9b02c5a" providerId="LiveId" clId="{C3A6CD6C-1DA5-47FB-A775-C4A3C3FB9D49}" dt="2023-05-28T01:53:32.990" v="1767" actId="14100"/>
       <pc:docMkLst>
         <pc:docMk/>
       </pc:docMkLst>
       <pc:sldChg chg="addSp delSp modSp mod">
-        <pc:chgData name="Olivier Grenadou" userId="02d4787ce9b02c5a" providerId="LiveId" clId="{C3A6CD6C-1DA5-47FB-A775-C4A3C3FB9D49}" dt="2023-05-27T08:52:41.630" v="1755" actId="206"/>
+        <pc:chgData name="Olivier Grenadou" userId="02d4787ce9b02c5a" providerId="LiveId" clId="{C3A6CD6C-1DA5-47FB-A775-C4A3C3FB9D49}" dt="2023-05-28T01:53:32.990" v="1767" actId="14100"/>
         <pc:sldMkLst>
           <pc:docMk/>
           <pc:sldMk cId="3274058770" sldId="256"/>
         </pc:sldMkLst>
         <pc:spChg chg="add mod">
-          <ac:chgData name="Olivier Grenadou" userId="02d4787ce9b02c5a" providerId="LiveId" clId="{C3A6CD6C-1DA5-47FB-A775-C4A3C3FB9D49}" dt="2023-05-27T08:12:37.659" v="1618" actId="108"/>
+          <ac:chgData name="Olivier Grenadou" userId="02d4787ce9b02c5a" providerId="LiveId" clId="{C3A6CD6C-1DA5-47FB-A775-C4A3C3FB9D49}" dt="2023-05-28T01:42:08.034" v="1756" actId="1582"/>
           <ac:spMkLst>
             <pc:docMk/>
             <pc:sldMk cId="3274058770" sldId="256"/>
@@ -154,7 +160,7 @@
           </ac:spMkLst>
         </pc:spChg>
         <pc:spChg chg="add mod">
-          <ac:chgData name="Olivier Grenadou" userId="02d4787ce9b02c5a" providerId="LiveId" clId="{C3A6CD6C-1DA5-47FB-A775-C4A3C3FB9D49}" dt="2023-05-27T08:07:56.423" v="1578" actId="206"/>
+          <ac:chgData name="Olivier Grenadou" userId="02d4787ce9b02c5a" providerId="LiveId" clId="{C3A6CD6C-1DA5-47FB-A775-C4A3C3FB9D49}" dt="2023-05-28T01:42:30.784" v="1757" actId="1582"/>
           <ac:spMkLst>
             <pc:docMk/>
             <pc:sldMk cId="3274058770" sldId="256"/>
@@ -258,7 +264,7 @@
           </ac:spMkLst>
         </pc:spChg>
         <pc:spChg chg="add mod">
-          <ac:chgData name="Olivier Grenadou" userId="02d4787ce9b02c5a" providerId="LiveId" clId="{C3A6CD6C-1DA5-47FB-A775-C4A3C3FB9D49}" dt="2023-05-27T08:12:18.148" v="1616" actId="208"/>
+          <ac:chgData name="Olivier Grenadou" userId="02d4787ce9b02c5a" providerId="LiveId" clId="{C3A6CD6C-1DA5-47FB-A775-C4A3C3FB9D49}" dt="2023-05-28T01:42:08.034" v="1756" actId="1582"/>
           <ac:spMkLst>
             <pc:docMk/>
             <pc:sldMk cId="3274058770" sldId="256"/>
@@ -266,7 +272,7 @@
           </ac:spMkLst>
         </pc:spChg>
         <pc:spChg chg="add mod">
-          <ac:chgData name="Olivier Grenadou" userId="02d4787ce9b02c5a" providerId="LiveId" clId="{C3A6CD6C-1DA5-47FB-A775-C4A3C3FB9D49}" dt="2023-05-27T08:30:14.371" v="1679" actId="206"/>
+          <ac:chgData name="Olivier Grenadou" userId="02d4787ce9b02c5a" providerId="LiveId" clId="{C3A6CD6C-1DA5-47FB-A775-C4A3C3FB9D49}" dt="2023-05-28T01:42:08.034" v="1756" actId="1582"/>
           <ac:spMkLst>
             <pc:docMk/>
             <pc:sldMk cId="3274058770" sldId="256"/>
@@ -394,7 +400,7 @@
           </ac:spMkLst>
         </pc:spChg>
         <pc:spChg chg="add mod topLvl">
-          <ac:chgData name="Olivier Grenadou" userId="02d4787ce9b02c5a" providerId="LiveId" clId="{C3A6CD6C-1DA5-47FB-A775-C4A3C3FB9D49}" dt="2023-05-27T08:43:20.603" v="1736" actId="14100"/>
+          <ac:chgData name="Olivier Grenadou" userId="02d4787ce9b02c5a" providerId="LiveId" clId="{C3A6CD6C-1DA5-47FB-A775-C4A3C3FB9D49}" dt="2023-05-28T01:53:08.175" v="1765" actId="3064"/>
           <ac:spMkLst>
             <pc:docMk/>
             <pc:sldMk cId="3274058770" sldId="256"/>
@@ -722,7 +728,7 @@
           </ac:spMkLst>
         </pc:spChg>
         <pc:spChg chg="add mod topLvl">
-          <ac:chgData name="Olivier Grenadou" userId="02d4787ce9b02c5a" providerId="LiveId" clId="{C3A6CD6C-1DA5-47FB-A775-C4A3C3FB9D49}" dt="2023-05-27T08:43:17.708" v="1735" actId="14100"/>
+          <ac:chgData name="Olivier Grenadou" userId="02d4787ce9b02c5a" providerId="LiveId" clId="{C3A6CD6C-1DA5-47FB-A775-C4A3C3FB9D49}" dt="2023-05-28T01:53:08.175" v="1765" actId="3064"/>
           <ac:spMkLst>
             <pc:docMk/>
             <pc:sldMk cId="3274058770" sldId="256"/>
@@ -778,7 +784,7 @@
           </ac:spMkLst>
         </pc:spChg>
         <pc:spChg chg="add mod topLvl">
-          <ac:chgData name="Olivier Grenadou" userId="02d4787ce9b02c5a" providerId="LiveId" clId="{C3A6CD6C-1DA5-47FB-A775-C4A3C3FB9D49}" dt="2023-05-27T08:43:14.905" v="1734" actId="14100"/>
+          <ac:chgData name="Olivier Grenadou" userId="02d4787ce9b02c5a" providerId="LiveId" clId="{C3A6CD6C-1DA5-47FB-A775-C4A3C3FB9D49}" dt="2023-05-28T01:53:08.175" v="1765" actId="3064"/>
           <ac:spMkLst>
             <pc:docMk/>
             <pc:sldMk cId="3274058770" sldId="256"/>
@@ -882,7 +888,7 @@
           </ac:spMkLst>
         </pc:spChg>
         <pc:spChg chg="add mod">
-          <ac:chgData name="Olivier Grenadou" userId="02d4787ce9b02c5a" providerId="LiveId" clId="{C3A6CD6C-1DA5-47FB-A775-C4A3C3FB9D49}" dt="2023-05-27T08:36:20.071" v="1706" actId="206"/>
+          <ac:chgData name="Olivier Grenadou" userId="02d4787ce9b02c5a" providerId="LiveId" clId="{C3A6CD6C-1DA5-47FB-A775-C4A3C3FB9D49}" dt="2023-05-28T01:42:08.034" v="1756" actId="1582"/>
           <ac:spMkLst>
             <pc:docMk/>
             <pc:sldMk cId="3274058770" sldId="256"/>
@@ -954,7 +960,7 @@
           </ac:spMkLst>
         </pc:spChg>
         <pc:spChg chg="add mod topLvl">
-          <ac:chgData name="Olivier Grenadou" userId="02d4787ce9b02c5a" providerId="LiveId" clId="{C3A6CD6C-1DA5-47FB-A775-C4A3C3FB9D49}" dt="2023-05-24T08:39:27.866" v="1396" actId="165"/>
+          <ac:chgData name="Olivier Grenadou" userId="02d4787ce9b02c5a" providerId="LiveId" clId="{C3A6CD6C-1DA5-47FB-A775-C4A3C3FB9D49}" dt="2023-05-28T01:53:08.175" v="1765" actId="3064"/>
           <ac:spMkLst>
             <pc:docMk/>
             <pc:sldMk cId="3274058770" sldId="256"/>
@@ -986,7 +992,7 @@
           </ac:spMkLst>
         </pc:spChg>
         <pc:spChg chg="add mod">
-          <ac:chgData name="Olivier Grenadou" userId="02d4787ce9b02c5a" providerId="LiveId" clId="{C3A6CD6C-1DA5-47FB-A775-C4A3C3FB9D49}" dt="2023-05-27T08:19:56.392" v="1654" actId="14100"/>
+          <ac:chgData name="Olivier Grenadou" userId="02d4787ce9b02c5a" providerId="LiveId" clId="{C3A6CD6C-1DA5-47FB-A775-C4A3C3FB9D49}" dt="2023-05-28T01:42:08.034" v="1756" actId="1582"/>
           <ac:spMkLst>
             <pc:docMk/>
             <pc:sldMk cId="3274058770" sldId="256"/>
@@ -1058,7 +1064,7 @@
           </ac:spMkLst>
         </pc:spChg>
         <pc:spChg chg="add mod topLvl">
-          <ac:chgData name="Olivier Grenadou" userId="02d4787ce9b02c5a" providerId="LiveId" clId="{C3A6CD6C-1DA5-47FB-A775-C4A3C3FB9D49}" dt="2023-05-24T08:39:53.346" v="1398" actId="20577"/>
+          <ac:chgData name="Olivier Grenadou" userId="02d4787ce9b02c5a" providerId="LiveId" clId="{C3A6CD6C-1DA5-47FB-A775-C4A3C3FB9D49}" dt="2023-05-28T01:53:26.136" v="1766" actId="14100"/>
           <ac:spMkLst>
             <pc:docMk/>
             <pc:sldMk cId="3274058770" sldId="256"/>
@@ -1130,7 +1136,7 @@
           </ac:spMkLst>
         </pc:spChg>
         <pc:spChg chg="add mod topLvl">
-          <ac:chgData name="Olivier Grenadou" userId="02d4787ce9b02c5a" providerId="LiveId" clId="{C3A6CD6C-1DA5-47FB-A775-C4A3C3FB9D49}" dt="2023-05-24T08:39:59.287" v="1400" actId="20577"/>
+          <ac:chgData name="Olivier Grenadou" userId="02d4787ce9b02c5a" providerId="LiveId" clId="{C3A6CD6C-1DA5-47FB-A775-C4A3C3FB9D49}" dt="2023-05-28T01:53:32.990" v="1767" actId="14100"/>
           <ac:spMkLst>
             <pc:docMk/>
             <pc:sldMk cId="3274058770" sldId="256"/>
@@ -1138,7 +1144,7 @@
           </ac:spMkLst>
         </pc:spChg>
         <pc:spChg chg="add mod">
-          <ac:chgData name="Olivier Grenadou" userId="02d4787ce9b02c5a" providerId="LiveId" clId="{C3A6CD6C-1DA5-47FB-A775-C4A3C3FB9D49}" dt="2023-05-27T08:21:57.556" v="1656" actId="208"/>
+          <ac:chgData name="Olivier Grenadou" userId="02d4787ce9b02c5a" providerId="LiveId" clId="{C3A6CD6C-1DA5-47FB-A775-C4A3C3FB9D49}" dt="2023-05-28T01:42:08.034" v="1756" actId="1582"/>
           <ac:spMkLst>
             <pc:docMk/>
             <pc:sldMk cId="3274058770" sldId="256"/>
@@ -1282,7 +1288,7 @@
           </ac:spMkLst>
         </pc:spChg>
         <pc:spChg chg="add mod topLvl">
-          <ac:chgData name="Olivier Grenadou" userId="02d4787ce9b02c5a" providerId="LiveId" clId="{C3A6CD6C-1DA5-47FB-A775-C4A3C3FB9D49}" dt="2023-05-27T08:43:24.485" v="1737" actId="14100"/>
+          <ac:chgData name="Olivier Grenadou" userId="02d4787ce9b02c5a" providerId="LiveId" clId="{C3A6CD6C-1DA5-47FB-A775-C4A3C3FB9D49}" dt="2023-05-28T01:53:08.175" v="1765" actId="3064"/>
           <ac:spMkLst>
             <pc:docMk/>
             <pc:sldMk cId="3274058770" sldId="256"/>
@@ -1290,7 +1296,7 @@
           </ac:spMkLst>
         </pc:spChg>
         <pc:spChg chg="add mod">
-          <ac:chgData name="Olivier Grenadou" userId="02d4787ce9b02c5a" providerId="LiveId" clId="{C3A6CD6C-1DA5-47FB-A775-C4A3C3FB9D49}" dt="2023-05-27T08:23:25.048" v="1658" actId="208"/>
+          <ac:chgData name="Olivier Grenadou" userId="02d4787ce9b02c5a" providerId="LiveId" clId="{C3A6CD6C-1DA5-47FB-A775-C4A3C3FB9D49}" dt="2023-05-28T01:42:08.034" v="1756" actId="1582"/>
           <ac:spMkLst>
             <pc:docMk/>
             <pc:sldMk cId="3274058770" sldId="256"/>
@@ -1298,7 +1304,7 @@
           </ac:spMkLst>
         </pc:spChg>
         <pc:spChg chg="add mod">
-          <ac:chgData name="Olivier Grenadou" userId="02d4787ce9b02c5a" providerId="LiveId" clId="{C3A6CD6C-1DA5-47FB-A775-C4A3C3FB9D49}" dt="2023-05-27T08:28:57.111" v="1660" actId="208"/>
+          <ac:chgData name="Olivier Grenadou" userId="02d4787ce9b02c5a" providerId="LiveId" clId="{C3A6CD6C-1DA5-47FB-A775-C4A3C3FB9D49}" dt="2023-05-28T01:46:11.191" v="1758" actId="1582"/>
           <ac:spMkLst>
             <pc:docMk/>
             <pc:sldMk cId="3274058770" sldId="256"/>
@@ -1306,7 +1312,7 @@
           </ac:spMkLst>
         </pc:spChg>
         <pc:spChg chg="add mod">
-          <ac:chgData name="Olivier Grenadou" userId="02d4787ce9b02c5a" providerId="LiveId" clId="{C3A6CD6C-1DA5-47FB-A775-C4A3C3FB9D49}" dt="2023-05-27T08:29:19.223" v="1666" actId="206"/>
+          <ac:chgData name="Olivier Grenadou" userId="02d4787ce9b02c5a" providerId="LiveId" clId="{C3A6CD6C-1DA5-47FB-A775-C4A3C3FB9D49}" dt="2023-05-28T01:46:11.191" v="1758" actId="1582"/>
           <ac:spMkLst>
             <pc:docMk/>
             <pc:sldMk cId="3274058770" sldId="256"/>
@@ -1314,7 +1320,7 @@
           </ac:spMkLst>
         </pc:spChg>
         <pc:spChg chg="add mod">
-          <ac:chgData name="Olivier Grenadou" userId="02d4787ce9b02c5a" providerId="LiveId" clId="{C3A6CD6C-1DA5-47FB-A775-C4A3C3FB9D49}" dt="2023-05-27T08:31:34.963" v="1684" actId="206"/>
+          <ac:chgData name="Olivier Grenadou" userId="02d4787ce9b02c5a" providerId="LiveId" clId="{C3A6CD6C-1DA5-47FB-A775-C4A3C3FB9D49}" dt="2023-05-28T01:46:11.191" v="1758" actId="1582"/>
           <ac:spMkLst>
             <pc:docMk/>
             <pc:sldMk cId="3274058770" sldId="256"/>
@@ -1322,7 +1328,7 @@
           </ac:spMkLst>
         </pc:spChg>
         <pc:spChg chg="add mod">
-          <ac:chgData name="Olivier Grenadou" userId="02d4787ce9b02c5a" providerId="LiveId" clId="{C3A6CD6C-1DA5-47FB-A775-C4A3C3FB9D49}" dt="2023-05-27T08:32:19.779" v="1690" actId="206"/>
+          <ac:chgData name="Olivier Grenadou" userId="02d4787ce9b02c5a" providerId="LiveId" clId="{C3A6CD6C-1DA5-47FB-A775-C4A3C3FB9D49}" dt="2023-05-28T01:46:11.191" v="1758" actId="1582"/>
           <ac:spMkLst>
             <pc:docMk/>
             <pc:sldMk cId="3274058770" sldId="256"/>
@@ -1330,7 +1336,7 @@
           </ac:spMkLst>
         </pc:spChg>
         <pc:spChg chg="add mod">
-          <ac:chgData name="Olivier Grenadou" userId="02d4787ce9b02c5a" providerId="LiveId" clId="{C3A6CD6C-1DA5-47FB-A775-C4A3C3FB9D49}" dt="2023-05-27T08:37:40.023" v="1715" actId="206"/>
+          <ac:chgData name="Olivier Grenadou" userId="02d4787ce9b02c5a" providerId="LiveId" clId="{C3A6CD6C-1DA5-47FB-A775-C4A3C3FB9D49}" dt="2023-05-28T01:42:08.034" v="1756" actId="1582"/>
           <ac:spMkLst>
             <pc:docMk/>
             <pc:sldMk cId="3274058770" sldId="256"/>
@@ -1346,7 +1352,7 @@
           </ac:spMkLst>
         </pc:spChg>
         <pc:spChg chg="add mod">
-          <ac:chgData name="Olivier Grenadou" userId="02d4787ce9b02c5a" providerId="LiveId" clId="{C3A6CD6C-1DA5-47FB-A775-C4A3C3FB9D49}" dt="2023-05-27T08:38:35.188" v="1717" actId="208"/>
+          <ac:chgData name="Olivier Grenadou" userId="02d4787ce9b02c5a" providerId="LiveId" clId="{C3A6CD6C-1DA5-47FB-A775-C4A3C3FB9D49}" dt="2023-05-28T01:42:08.034" v="1756" actId="1582"/>
           <ac:spMkLst>
             <pc:docMk/>
             <pc:sldMk cId="3274058770" sldId="256"/>
@@ -1394,7 +1400,7 @@
           </ac:spMkLst>
         </pc:spChg>
         <pc:spChg chg="add mod">
-          <ac:chgData name="Olivier Grenadou" userId="02d4787ce9b02c5a" providerId="LiveId" clId="{C3A6CD6C-1DA5-47FB-A775-C4A3C3FB9D49}" dt="2023-05-27T08:52:41.630" v="1755" actId="206"/>
+          <ac:chgData name="Olivier Grenadou" userId="02d4787ce9b02c5a" providerId="LiveId" clId="{C3A6CD6C-1DA5-47FB-A775-C4A3C3FB9D49}" dt="2023-05-28T01:42:08.034" v="1756" actId="1582"/>
           <ac:spMkLst>
             <pc:docMk/>
             <pc:sldMk cId="3274058770" sldId="256"/>
@@ -2106,7 +2112,7 @@
           </ac:cxnSpMkLst>
         </pc:cxnChg>
         <pc:cxnChg chg="add mod">
-          <ac:chgData name="Olivier Grenadou" userId="02d4787ce9b02c5a" providerId="LiveId" clId="{C3A6CD6C-1DA5-47FB-A775-C4A3C3FB9D49}" dt="2023-05-27T08:40:54.721" v="1720" actId="1582"/>
+          <ac:chgData name="Olivier Grenadou" userId="02d4787ce9b02c5a" providerId="LiveId" clId="{C3A6CD6C-1DA5-47FB-A775-C4A3C3FB9D49}" dt="2023-05-28T01:42:08.034" v="1756" actId="1582"/>
           <ac:cxnSpMkLst>
             <pc:docMk/>
             <pc:sldMk cId="3274058770" sldId="256"/>
@@ -2122,7 +2128,7 @@
           </ac:cxnSpMkLst>
         </pc:cxnChg>
         <pc:cxnChg chg="add mod">
-          <ac:chgData name="Olivier Grenadou" userId="02d4787ce9b02c5a" providerId="LiveId" clId="{C3A6CD6C-1DA5-47FB-A775-C4A3C3FB9D49}" dt="2023-05-27T08:41:01.216" v="1722" actId="1076"/>
+          <ac:chgData name="Olivier Grenadou" userId="02d4787ce9b02c5a" providerId="LiveId" clId="{C3A6CD6C-1DA5-47FB-A775-C4A3C3FB9D49}" dt="2023-05-28T01:42:08.034" v="1756" actId="1582"/>
           <ac:cxnSpMkLst>
             <pc:docMk/>
             <pc:sldMk cId="3274058770" sldId="256"/>
@@ -2493,6 +2499,546 @@
     </pc:docChg>
   </pc:docChgLst>
 </pc:chgInfo>
+</file>
+
+<file path=ppt/handoutMasters/handoutMaster1.xml><?xml version="1.0" encoding="utf-8"?>
+<p:handoutMaster xmlns:a="http://schemas.openxmlformats.org/drawingml/2006/main" xmlns:r="http://schemas.openxmlformats.org/officeDocument/2006/relationships" xmlns:p="http://schemas.openxmlformats.org/presentationml/2006/main">
+  <p:cSld>
+    <p:bg>
+      <p:bgRef idx="1001">
+        <a:schemeClr val="bg1"/>
+      </p:bgRef>
+    </p:bg>
+    <p:spTree>
+      <p:nvGrpSpPr>
+        <p:cNvPr id="1" name=""/>
+        <p:cNvGrpSpPr/>
+        <p:nvPr/>
+      </p:nvGrpSpPr>
+      <p:grpSpPr>
+        <a:xfrm>
+          <a:off x="0" y="0"/>
+          <a:ext cx="0" cy="0"/>
+          <a:chOff x="0" y="0"/>
+          <a:chExt cx="0" cy="0"/>
+        </a:xfrm>
+      </p:grpSpPr>
+      <p:sp>
+        <p:nvSpPr>
+          <p:cNvPr id="2" name="Header Placeholder 1">
+            <a:extLst>
+              <a:ext uri="{FF2B5EF4-FFF2-40B4-BE49-F238E27FC236}">
+                <a16:creationId xmlns:a16="http://schemas.microsoft.com/office/drawing/2014/main" id="{A481DB32-84D3-95D6-3775-22A2363DB534}"/>
+              </a:ext>
+            </a:extLst>
+          </p:cNvPr>
+          <p:cNvSpPr>
+            <a:spLocks noGrp="1"/>
+          </p:cNvSpPr>
+          <p:nvPr>
+            <p:ph type="hdr" sz="quarter"/>
+          </p:nvPr>
+        </p:nvSpPr>
+        <p:spPr>
+          <a:xfrm>
+            <a:off x="0" y="0"/>
+            <a:ext cx="2984500" cy="501650"/>
+          </a:xfrm>
+          <a:prstGeom prst="rect">
+            <a:avLst/>
+          </a:prstGeom>
+        </p:spPr>
+        <p:txBody>
+          <a:bodyPr vert="horz" lIns="91440" tIns="45720" rIns="91440" bIns="45720" rtlCol="0"/>
+          <a:lstStyle>
+            <a:lvl1pPr algn="l">
+              <a:defRPr sz="1200"/>
+            </a:lvl1pPr>
+          </a:lstStyle>
+          <a:p>
+            <a:endParaRPr lang="en-US"/>
+          </a:p>
+        </p:txBody>
+      </p:sp>
+      <p:sp>
+        <p:nvSpPr>
+          <p:cNvPr id="3" name="Date Placeholder 2">
+            <a:extLst>
+              <a:ext uri="{FF2B5EF4-FFF2-40B4-BE49-F238E27FC236}">
+                <a16:creationId xmlns:a16="http://schemas.microsoft.com/office/drawing/2014/main" id="{FBEAB3DF-B77D-4D36-2CBD-8043D6455282}"/>
+              </a:ext>
+            </a:extLst>
+          </p:cNvPr>
+          <p:cNvSpPr>
+            <a:spLocks noGrp="1"/>
+          </p:cNvSpPr>
+          <p:nvPr>
+            <p:ph type="dt" sz="quarter" idx="1"/>
+          </p:nvPr>
+        </p:nvSpPr>
+        <p:spPr>
+          <a:xfrm>
+            <a:off x="3902075" y="0"/>
+            <a:ext cx="2984500" cy="501650"/>
+          </a:xfrm>
+          <a:prstGeom prst="rect">
+            <a:avLst/>
+          </a:prstGeom>
+        </p:spPr>
+        <p:txBody>
+          <a:bodyPr vert="horz" lIns="91440" tIns="45720" rIns="91440" bIns="45720" rtlCol="0"/>
+          <a:lstStyle>
+            <a:lvl1pPr algn="r">
+              <a:defRPr sz="1200"/>
+            </a:lvl1pPr>
+          </a:lstStyle>
+          <a:p>
+            <a:fld id="{277B8CFC-F3EE-4732-AB96-F8E7CFAED285}" type="datetimeFigureOut">
+              <a:rPr lang="en-US" smtClean="0"/>
+              <a:t>5/28/2023</a:t>
+            </a:fld>
+            <a:endParaRPr lang="en-US"/>
+          </a:p>
+        </p:txBody>
+      </p:sp>
+      <p:sp>
+        <p:nvSpPr>
+          <p:cNvPr id="4" name="Footer Placeholder 3">
+            <a:extLst>
+              <a:ext uri="{FF2B5EF4-FFF2-40B4-BE49-F238E27FC236}">
+                <a16:creationId xmlns:a16="http://schemas.microsoft.com/office/drawing/2014/main" id="{EFB34AA4-CCDF-85AC-C8BA-3FEC5A078A02}"/>
+              </a:ext>
+            </a:extLst>
+          </p:cNvPr>
+          <p:cNvSpPr>
+            <a:spLocks noGrp="1"/>
+          </p:cNvSpPr>
+          <p:nvPr>
+            <p:ph type="ftr" sz="quarter" idx="2"/>
+          </p:nvPr>
+        </p:nvSpPr>
+        <p:spPr>
+          <a:xfrm>
+            <a:off x="0" y="9518650"/>
+            <a:ext cx="2984500" cy="501650"/>
+          </a:xfrm>
+          <a:prstGeom prst="rect">
+            <a:avLst/>
+          </a:prstGeom>
+        </p:spPr>
+        <p:txBody>
+          <a:bodyPr vert="horz" lIns="91440" tIns="45720" rIns="91440" bIns="45720" rtlCol="0" anchor="b"/>
+          <a:lstStyle>
+            <a:lvl1pPr algn="l">
+              <a:defRPr sz="1200"/>
+            </a:lvl1pPr>
+          </a:lstStyle>
+          <a:p>
+            <a:endParaRPr lang="en-US"/>
+          </a:p>
+        </p:txBody>
+      </p:sp>
+      <p:sp>
+        <p:nvSpPr>
+          <p:cNvPr id="5" name="Slide Number Placeholder 4">
+            <a:extLst>
+              <a:ext uri="{FF2B5EF4-FFF2-40B4-BE49-F238E27FC236}">
+                <a16:creationId xmlns:a16="http://schemas.microsoft.com/office/drawing/2014/main" id="{8B7A7F07-2595-35FD-C24A-868874AA501A}"/>
+              </a:ext>
+            </a:extLst>
+          </p:cNvPr>
+          <p:cNvSpPr>
+            <a:spLocks noGrp="1"/>
+          </p:cNvSpPr>
+          <p:nvPr>
+            <p:ph type="sldNum" sz="quarter" idx="3"/>
+          </p:nvPr>
+        </p:nvSpPr>
+        <p:spPr>
+          <a:xfrm>
+            <a:off x="3902075" y="9518650"/>
+            <a:ext cx="2984500" cy="501650"/>
+          </a:xfrm>
+          <a:prstGeom prst="rect">
+            <a:avLst/>
+          </a:prstGeom>
+        </p:spPr>
+        <p:txBody>
+          <a:bodyPr vert="horz" lIns="91440" tIns="45720" rIns="91440" bIns="45720" rtlCol="0" anchor="b"/>
+          <a:lstStyle>
+            <a:lvl1pPr algn="r">
+              <a:defRPr sz="1200"/>
+            </a:lvl1pPr>
+          </a:lstStyle>
+          <a:p>
+            <a:fld id="{83800580-37FC-4548-84A5-AF259285E0BD}" type="slidenum">
+              <a:rPr lang="en-US" smtClean="0"/>
+              <a:t>‹#›</a:t>
+            </a:fld>
+            <a:endParaRPr lang="en-US"/>
+          </a:p>
+        </p:txBody>
+      </p:sp>
+    </p:spTree>
+    <p:extLst>
+      <p:ext uri="{BB962C8B-B14F-4D97-AF65-F5344CB8AC3E}">
+        <p14:creationId xmlns:p14="http://schemas.microsoft.com/office/powerpoint/2010/main" val="3329491907"/>
+      </p:ext>
+    </p:extLst>
+  </p:cSld>
+  <p:clrMap bg1="lt1" tx1="dk1" bg2="lt2" tx2="dk2" accent1="accent1" accent2="accent2" accent3="accent3" accent4="accent4" accent5="accent5" accent6="accent6" hlink="hlink" folHlink="folHlink"/>
+  <p:hf sldNum="0" hdr="0" ftr="0" dt="0"/>
+</p:handoutMaster>
+</file>
+
+<file path=ppt/notesMasters/notesMaster1.xml><?xml version="1.0" encoding="utf-8"?>
+<p:notesMaster xmlns:a="http://schemas.openxmlformats.org/drawingml/2006/main" xmlns:r="http://schemas.openxmlformats.org/officeDocument/2006/relationships" xmlns:p="http://schemas.openxmlformats.org/presentationml/2006/main">
+  <p:cSld>
+    <p:bg>
+      <p:bgRef idx="1001">
+        <a:schemeClr val="bg1"/>
+      </p:bgRef>
+    </p:bg>
+    <p:spTree>
+      <p:nvGrpSpPr>
+        <p:cNvPr id="1" name=""/>
+        <p:cNvGrpSpPr/>
+        <p:nvPr/>
+      </p:nvGrpSpPr>
+      <p:grpSpPr>
+        <a:xfrm>
+          <a:off x="0" y="0"/>
+          <a:ext cx="0" cy="0"/>
+          <a:chOff x="0" y="0"/>
+          <a:chExt cx="0" cy="0"/>
+        </a:xfrm>
+      </p:grpSpPr>
+      <p:sp>
+        <p:nvSpPr>
+          <p:cNvPr id="2" name="Header Placeholder 1"/>
+          <p:cNvSpPr>
+            <a:spLocks noGrp="1"/>
+          </p:cNvSpPr>
+          <p:nvPr>
+            <p:ph type="hdr" sz="quarter"/>
+          </p:nvPr>
+        </p:nvSpPr>
+        <p:spPr>
+          <a:xfrm>
+            <a:off x="0" y="0"/>
+            <a:ext cx="2984500" cy="501650"/>
+          </a:xfrm>
+          <a:prstGeom prst="rect">
+            <a:avLst/>
+          </a:prstGeom>
+        </p:spPr>
+        <p:txBody>
+          <a:bodyPr vert="horz" lIns="91440" tIns="45720" rIns="91440" bIns="45720" rtlCol="0"/>
+          <a:lstStyle>
+            <a:lvl1pPr algn="l">
+              <a:defRPr sz="1200"/>
+            </a:lvl1pPr>
+          </a:lstStyle>
+          <a:p>
+            <a:endParaRPr lang="en-US"/>
+          </a:p>
+        </p:txBody>
+      </p:sp>
+      <p:sp>
+        <p:nvSpPr>
+          <p:cNvPr id="3" name="Date Placeholder 2"/>
+          <p:cNvSpPr>
+            <a:spLocks noGrp="1"/>
+          </p:cNvSpPr>
+          <p:nvPr>
+            <p:ph type="dt" idx="1"/>
+          </p:nvPr>
+        </p:nvSpPr>
+        <p:spPr>
+          <a:xfrm>
+            <a:off x="3902075" y="0"/>
+            <a:ext cx="2984500" cy="501650"/>
+          </a:xfrm>
+          <a:prstGeom prst="rect">
+            <a:avLst/>
+          </a:prstGeom>
+        </p:spPr>
+        <p:txBody>
+          <a:bodyPr vert="horz" lIns="91440" tIns="45720" rIns="91440" bIns="45720" rtlCol="0"/>
+          <a:lstStyle>
+            <a:lvl1pPr algn="r">
+              <a:defRPr sz="1200"/>
+            </a:lvl1pPr>
+          </a:lstStyle>
+          <a:p>
+            <a:fld id="{B0737B90-9943-4916-944E-9C37AE4F7AB7}" type="datetimeFigureOut">
+              <a:rPr lang="en-US" smtClean="0"/>
+              <a:t>5/28/2023</a:t>
+            </a:fld>
+            <a:endParaRPr lang="en-US"/>
+          </a:p>
+        </p:txBody>
+      </p:sp>
+      <p:sp>
+        <p:nvSpPr>
+          <p:cNvPr id="4" name="Slide Image Placeholder 3"/>
+          <p:cNvSpPr>
+            <a:spLocks noGrp="1" noRot="1" noChangeAspect="1"/>
+          </p:cNvSpPr>
+          <p:nvPr>
+            <p:ph type="sldImg" idx="2"/>
+          </p:nvPr>
+        </p:nvSpPr>
+        <p:spPr>
+          <a:xfrm>
+            <a:off x="1189038" y="1252538"/>
+            <a:ext cx="4510087" cy="3381375"/>
+          </a:xfrm>
+          <a:prstGeom prst="rect">
+            <a:avLst/>
+          </a:prstGeom>
+          <a:noFill/>
+          <a:ln w="12700">
+            <a:solidFill>
+              <a:prstClr val="black"/>
+            </a:solidFill>
+          </a:ln>
+        </p:spPr>
+        <p:txBody>
+          <a:bodyPr vert="horz" lIns="91440" tIns="45720" rIns="91440" bIns="45720" rtlCol="0" anchor="ctr"/>
+          <a:lstStyle/>
+          <a:p>
+            <a:endParaRPr lang="en-US"/>
+          </a:p>
+        </p:txBody>
+      </p:sp>
+      <p:sp>
+        <p:nvSpPr>
+          <p:cNvPr id="5" name="Notes Placeholder 4"/>
+          <p:cNvSpPr>
+            <a:spLocks noGrp="1"/>
+          </p:cNvSpPr>
+          <p:nvPr>
+            <p:ph type="body" sz="quarter" idx="3"/>
+          </p:nvPr>
+        </p:nvSpPr>
+        <p:spPr>
+          <a:xfrm>
+            <a:off x="688975" y="4822825"/>
+            <a:ext cx="5510213" cy="3944938"/>
+          </a:xfrm>
+          <a:prstGeom prst="rect">
+            <a:avLst/>
+          </a:prstGeom>
+        </p:spPr>
+        <p:txBody>
+          <a:bodyPr vert="horz" lIns="91440" tIns="45720" rIns="91440" bIns="45720" rtlCol="0"/>
+          <a:lstStyle/>
+          <a:p>
+            <a:pPr lvl="0"/>
+            <a:r>
+              <a:rPr lang="en-US"/>
+              <a:t>Click to edit Master text styles</a:t>
+            </a:r>
+          </a:p>
+          <a:p>
+            <a:pPr lvl="1"/>
+            <a:r>
+              <a:rPr lang="en-US"/>
+              <a:t>Second level</a:t>
+            </a:r>
+          </a:p>
+          <a:p>
+            <a:pPr lvl="2"/>
+            <a:r>
+              <a:rPr lang="en-US"/>
+              <a:t>Third level</a:t>
+            </a:r>
+          </a:p>
+          <a:p>
+            <a:pPr lvl="3"/>
+            <a:r>
+              <a:rPr lang="en-US"/>
+              <a:t>Fourth level</a:t>
+            </a:r>
+          </a:p>
+          <a:p>
+            <a:pPr lvl="4"/>
+            <a:r>
+              <a:rPr lang="en-US"/>
+              <a:t>Fifth level</a:t>
+            </a:r>
+          </a:p>
+        </p:txBody>
+      </p:sp>
+      <p:sp>
+        <p:nvSpPr>
+          <p:cNvPr id="6" name="Footer Placeholder 5"/>
+          <p:cNvSpPr>
+            <a:spLocks noGrp="1"/>
+          </p:cNvSpPr>
+          <p:nvPr>
+            <p:ph type="ftr" sz="quarter" idx="4"/>
+          </p:nvPr>
+        </p:nvSpPr>
+        <p:spPr>
+          <a:xfrm>
+            <a:off x="0" y="9518650"/>
+            <a:ext cx="2984500" cy="501650"/>
+          </a:xfrm>
+          <a:prstGeom prst="rect">
+            <a:avLst/>
+          </a:prstGeom>
+        </p:spPr>
+        <p:txBody>
+          <a:bodyPr vert="horz" lIns="91440" tIns="45720" rIns="91440" bIns="45720" rtlCol="0" anchor="b"/>
+          <a:lstStyle>
+            <a:lvl1pPr algn="l">
+              <a:defRPr sz="1200"/>
+            </a:lvl1pPr>
+          </a:lstStyle>
+          <a:p>
+            <a:endParaRPr lang="en-US"/>
+          </a:p>
+        </p:txBody>
+      </p:sp>
+      <p:sp>
+        <p:nvSpPr>
+          <p:cNvPr id="7" name="Slide Number Placeholder 6"/>
+          <p:cNvSpPr>
+            <a:spLocks noGrp="1"/>
+          </p:cNvSpPr>
+          <p:nvPr>
+            <p:ph type="sldNum" sz="quarter" idx="5"/>
+          </p:nvPr>
+        </p:nvSpPr>
+        <p:spPr>
+          <a:xfrm>
+            <a:off x="3902075" y="9518650"/>
+            <a:ext cx="2984500" cy="501650"/>
+          </a:xfrm>
+          <a:prstGeom prst="rect">
+            <a:avLst/>
+          </a:prstGeom>
+        </p:spPr>
+        <p:txBody>
+          <a:bodyPr vert="horz" lIns="91440" tIns="45720" rIns="91440" bIns="45720" rtlCol="0" anchor="b"/>
+          <a:lstStyle>
+            <a:lvl1pPr algn="r">
+              <a:defRPr sz="1200"/>
+            </a:lvl1pPr>
+          </a:lstStyle>
+          <a:p>
+            <a:fld id="{F29C3CAE-C89D-47D5-AC96-05F9252263F8}" type="slidenum">
+              <a:rPr lang="en-US" smtClean="0"/>
+              <a:t>‹#›</a:t>
+            </a:fld>
+            <a:endParaRPr lang="en-US"/>
+          </a:p>
+        </p:txBody>
+      </p:sp>
+    </p:spTree>
+    <p:extLst>
+      <p:ext uri="{BB962C8B-B14F-4D97-AF65-F5344CB8AC3E}">
+        <p14:creationId xmlns:p14="http://schemas.microsoft.com/office/powerpoint/2010/main" val="3283724816"/>
+      </p:ext>
+    </p:extLst>
+  </p:cSld>
+  <p:clrMap bg1="lt1" tx1="dk1" bg2="lt2" tx2="dk2" accent1="accent1" accent2="accent2" accent3="accent3" accent4="accent4" accent5="accent5" accent6="accent6" hlink="hlink" folHlink="folHlink"/>
+  <p:hf sldNum="0" hdr="0" ftr="0" dt="0"/>
+  <p:notesStyle>
+    <a:lvl1pPr marL="0" algn="l" defTabSz="914400" rtl="0" eaLnBrk="1" latinLnBrk="0" hangingPunct="1">
+      <a:defRPr sz="1200" kern="1200">
+        <a:solidFill>
+          <a:schemeClr val="tx1"/>
+        </a:solidFill>
+        <a:latin typeface="+mn-lt"/>
+        <a:ea typeface="+mn-ea"/>
+        <a:cs typeface="+mn-cs"/>
+      </a:defRPr>
+    </a:lvl1pPr>
+    <a:lvl2pPr marL="457200" algn="l" defTabSz="914400" rtl="0" eaLnBrk="1" latinLnBrk="0" hangingPunct="1">
+      <a:defRPr sz="1200" kern="1200">
+        <a:solidFill>
+          <a:schemeClr val="tx1"/>
+        </a:solidFill>
+        <a:latin typeface="+mn-lt"/>
+        <a:ea typeface="+mn-ea"/>
+        <a:cs typeface="+mn-cs"/>
+      </a:defRPr>
+    </a:lvl2pPr>
+    <a:lvl3pPr marL="914400" algn="l" defTabSz="914400" rtl="0" eaLnBrk="1" latinLnBrk="0" hangingPunct="1">
+      <a:defRPr sz="1200" kern="1200">
+        <a:solidFill>
+          <a:schemeClr val="tx1"/>
+        </a:solidFill>
+        <a:latin typeface="+mn-lt"/>
+        <a:ea typeface="+mn-ea"/>
+        <a:cs typeface="+mn-cs"/>
+      </a:defRPr>
+    </a:lvl3pPr>
+    <a:lvl4pPr marL="1371600" algn="l" defTabSz="914400" rtl="0" eaLnBrk="1" latinLnBrk="0" hangingPunct="1">
+      <a:defRPr sz="1200" kern="1200">
+        <a:solidFill>
+          <a:schemeClr val="tx1"/>
+        </a:solidFill>
+        <a:latin typeface="+mn-lt"/>
+        <a:ea typeface="+mn-ea"/>
+        <a:cs typeface="+mn-cs"/>
+      </a:defRPr>
+    </a:lvl4pPr>
+    <a:lvl5pPr marL="1828800" algn="l" defTabSz="914400" rtl="0" eaLnBrk="1" latinLnBrk="0" hangingPunct="1">
+      <a:defRPr sz="1200" kern="1200">
+        <a:solidFill>
+          <a:schemeClr val="tx1"/>
+        </a:solidFill>
+        <a:latin typeface="+mn-lt"/>
+        <a:ea typeface="+mn-ea"/>
+        <a:cs typeface="+mn-cs"/>
+      </a:defRPr>
+    </a:lvl5pPr>
+    <a:lvl6pPr marL="2286000" algn="l" defTabSz="914400" rtl="0" eaLnBrk="1" latinLnBrk="0" hangingPunct="1">
+      <a:defRPr sz="1200" kern="1200">
+        <a:solidFill>
+          <a:schemeClr val="tx1"/>
+        </a:solidFill>
+        <a:latin typeface="+mn-lt"/>
+        <a:ea typeface="+mn-ea"/>
+        <a:cs typeface="+mn-cs"/>
+      </a:defRPr>
+    </a:lvl6pPr>
+    <a:lvl7pPr marL="2743200" algn="l" defTabSz="914400" rtl="0" eaLnBrk="1" latinLnBrk="0" hangingPunct="1">
+      <a:defRPr sz="1200" kern="1200">
+        <a:solidFill>
+          <a:schemeClr val="tx1"/>
+        </a:solidFill>
+        <a:latin typeface="+mn-lt"/>
+        <a:ea typeface="+mn-ea"/>
+        <a:cs typeface="+mn-cs"/>
+      </a:defRPr>
+    </a:lvl7pPr>
+    <a:lvl8pPr marL="3200400" algn="l" defTabSz="914400" rtl="0" eaLnBrk="1" latinLnBrk="0" hangingPunct="1">
+      <a:defRPr sz="1200" kern="1200">
+        <a:solidFill>
+          <a:schemeClr val="tx1"/>
+        </a:solidFill>
+        <a:latin typeface="+mn-lt"/>
+        <a:ea typeface="+mn-ea"/>
+        <a:cs typeface="+mn-cs"/>
+      </a:defRPr>
+    </a:lvl8pPr>
+    <a:lvl9pPr marL="3657600" algn="l" defTabSz="914400" rtl="0" eaLnBrk="1" latinLnBrk="0" hangingPunct="1">
+      <a:defRPr sz="1200" kern="1200">
+        <a:solidFill>
+          <a:schemeClr val="tx1"/>
+        </a:solidFill>
+        <a:latin typeface="+mn-lt"/>
+        <a:ea typeface="+mn-ea"/>
+        <a:cs typeface="+mn-cs"/>
+      </a:defRPr>
+    </a:lvl9pPr>
+  </p:notesStyle>
+</p:notesMaster>
 </file>
 
 <file path=ppt/slideLayouts/slideLayout1.xml><?xml version="1.0" encoding="utf-8"?>
@@ -2624,9 +3170,9 @@
           <a:bodyPr/>
           <a:lstStyle/>
           <a:p>
-            <a:fld id="{57835532-65B2-471C-926A-3AB1E0464B52}" type="datetimeFigureOut">
+            <a:fld id="{2B1F1804-B436-4A2D-822D-118D5578DF06}" type="datetime1">
               <a:rPr lang="en-US" smtClean="0"/>
-              <a:t>5/27/2023</a:t>
+              <a:t>5/28/2023</a:t>
             </a:fld>
             <a:endParaRPr lang="en-US"/>
           </a:p>
@@ -2794,9 +3340,9 @@
           <a:bodyPr/>
           <a:lstStyle/>
           <a:p>
-            <a:fld id="{57835532-65B2-471C-926A-3AB1E0464B52}" type="datetimeFigureOut">
+            <a:fld id="{0615578F-07B7-4756-B430-9A1FF6B67213}" type="datetime1">
               <a:rPr lang="en-US" smtClean="0"/>
-              <a:t>5/27/2023</a:t>
+              <a:t>5/28/2023</a:t>
             </a:fld>
             <a:endParaRPr lang="en-US"/>
           </a:p>
@@ -2974,9 +3520,9 @@
           <a:bodyPr/>
           <a:lstStyle/>
           <a:p>
-            <a:fld id="{57835532-65B2-471C-926A-3AB1E0464B52}" type="datetimeFigureOut">
+            <a:fld id="{E0FD3AFC-6DCD-4847-85EB-A04866E0F2AC}" type="datetime1">
               <a:rPr lang="en-US" smtClean="0"/>
-              <a:t>5/27/2023</a:t>
+              <a:t>5/28/2023</a:t>
             </a:fld>
             <a:endParaRPr lang="en-US"/>
           </a:p>
@@ -3144,9 +3690,9 @@
           <a:bodyPr/>
           <a:lstStyle/>
           <a:p>
-            <a:fld id="{57835532-65B2-471C-926A-3AB1E0464B52}" type="datetimeFigureOut">
+            <a:fld id="{FF3E18B2-C045-415A-A91C-B4D5AC1DF18C}" type="datetime1">
               <a:rPr lang="en-US" smtClean="0"/>
-              <a:t>5/27/2023</a:t>
+              <a:t>5/28/2023</a:t>
             </a:fld>
             <a:endParaRPr lang="en-US"/>
           </a:p>
@@ -3388,9 +3934,9 @@
           <a:bodyPr/>
           <a:lstStyle/>
           <a:p>
-            <a:fld id="{57835532-65B2-471C-926A-3AB1E0464B52}" type="datetimeFigureOut">
+            <a:fld id="{DF3A76A6-507F-4A1C-A842-8C95BB9571BC}" type="datetime1">
               <a:rPr lang="en-US" smtClean="0"/>
-              <a:t>5/27/2023</a:t>
+              <a:t>5/28/2023</a:t>
             </a:fld>
             <a:endParaRPr lang="en-US"/>
           </a:p>
@@ -3620,9 +4166,9 @@
           <a:bodyPr/>
           <a:lstStyle/>
           <a:p>
-            <a:fld id="{57835532-65B2-471C-926A-3AB1E0464B52}" type="datetimeFigureOut">
+            <a:fld id="{0C30588C-6521-4B47-BF8D-DCAAE9ADF805}" type="datetime1">
               <a:rPr lang="en-US" smtClean="0"/>
-              <a:t>5/27/2023</a:t>
+              <a:t>5/28/2023</a:t>
             </a:fld>
             <a:endParaRPr lang="en-US"/>
           </a:p>
@@ -3987,9 +4533,9 @@
           <a:bodyPr/>
           <a:lstStyle/>
           <a:p>
-            <a:fld id="{57835532-65B2-471C-926A-3AB1E0464B52}" type="datetimeFigureOut">
+            <a:fld id="{0EB01D5B-4847-4CEF-8103-7D0C36E4817B}" type="datetime1">
               <a:rPr lang="en-US" smtClean="0"/>
-              <a:t>5/27/2023</a:t>
+              <a:t>5/28/2023</a:t>
             </a:fld>
             <a:endParaRPr lang="en-US"/>
           </a:p>
@@ -4105,9 +4651,9 @@
           <a:bodyPr/>
           <a:lstStyle/>
           <a:p>
-            <a:fld id="{57835532-65B2-471C-926A-3AB1E0464B52}" type="datetimeFigureOut">
+            <a:fld id="{39B86BF2-4927-4146-8257-A2751FCEE87D}" type="datetime1">
               <a:rPr lang="en-US" smtClean="0"/>
-              <a:t>5/27/2023</a:t>
+              <a:t>5/28/2023</a:t>
             </a:fld>
             <a:endParaRPr lang="en-US"/>
           </a:p>
@@ -4200,9 +4746,9 @@
           <a:bodyPr/>
           <a:lstStyle/>
           <a:p>
-            <a:fld id="{57835532-65B2-471C-926A-3AB1E0464B52}" type="datetimeFigureOut">
+            <a:fld id="{D0C6DEB9-9F32-4450-BF5A-AC4F8D0E6898}" type="datetime1">
               <a:rPr lang="en-US" smtClean="0"/>
-              <a:t>5/27/2023</a:t>
+              <a:t>5/28/2023</a:t>
             </a:fld>
             <a:endParaRPr lang="en-US"/>
           </a:p>
@@ -4477,9 +5023,9 @@
           <a:bodyPr/>
           <a:lstStyle/>
           <a:p>
-            <a:fld id="{57835532-65B2-471C-926A-3AB1E0464B52}" type="datetimeFigureOut">
+            <a:fld id="{9105E500-D918-411E-888C-3AFFE5BE457C}" type="datetime1">
               <a:rPr lang="en-US" smtClean="0"/>
-              <a:t>5/27/2023</a:t>
+              <a:t>5/28/2023</a:t>
             </a:fld>
             <a:endParaRPr lang="en-US"/>
           </a:p>
@@ -4734,9 +5280,9 @@
           <a:bodyPr/>
           <a:lstStyle/>
           <a:p>
-            <a:fld id="{57835532-65B2-471C-926A-3AB1E0464B52}" type="datetimeFigureOut">
+            <a:fld id="{F5364EA7-28AC-4BD3-8C1C-0EE626E1824A}" type="datetime1">
               <a:rPr lang="en-US" smtClean="0"/>
-              <a:t>5/27/2023</a:t>
+              <a:t>5/28/2023</a:t>
             </a:fld>
             <a:endParaRPr lang="en-US"/>
           </a:p>
@@ -4947,9 +5493,9 @@
             </a:lvl1pPr>
           </a:lstStyle>
           <a:p>
-            <a:fld id="{57835532-65B2-471C-926A-3AB1E0464B52}" type="datetimeFigureOut">
+            <a:fld id="{423E8357-C248-4E4D-893B-B2D5385FA443}" type="datetime1">
               <a:rPr lang="en-US" smtClean="0"/>
-              <a:t>5/27/2023</a:t>
+              <a:t>5/28/2023</a:t>
             </a:fld>
             <a:endParaRPr lang="en-US"/>
           </a:p>
@@ -5054,6 +5600,7 @@
     <p:sldLayoutId id="2147483670" r:id="rId10"/>
     <p:sldLayoutId id="2147483671" r:id="rId11"/>
   </p:sldLayoutIdLst>
+  <p:hf sldNum="0" hdr="0" ftr="0" dt="0"/>
   <p:txStyles>
     <p:titleStyle>
       <a:lvl1pPr algn="l" defTabSz="914400" rtl="0" eaLnBrk="1" latinLnBrk="0" hangingPunct="1">
@@ -6981,22 +7528,20 @@
         </p:spPr>
         <p:style>
           <a:lnRef idx="2">
-            <a:schemeClr val="dk1">
-              <a:shade val="50000"/>
-            </a:schemeClr>
+            <a:schemeClr val="dk1"/>
           </a:lnRef>
           <a:fillRef idx="1">
-            <a:schemeClr val="dk1"/>
+            <a:schemeClr val="lt1"/>
           </a:fillRef>
           <a:effectRef idx="0">
             <a:schemeClr val="dk1"/>
           </a:effectRef>
           <a:fontRef idx="minor">
-            <a:schemeClr val="lt1"/>
+            <a:schemeClr val="dk1"/>
           </a:fontRef>
         </p:style>
         <p:txBody>
-          <a:bodyPr lIns="34290" tIns="6858" rIns="0" bIns="0" rtlCol="0" anchor="t" anchorCtr="0"/>
+          <a:bodyPr lIns="34290" tIns="18288" rIns="0" bIns="0" rtlCol="0" anchor="t" anchorCtr="0"/>
           <a:lstStyle/>
           <a:p>
             <a:pPr>
@@ -7005,7 +7550,10 @@
               </a:lnSpc>
             </a:pPr>
             <a:r>
-              <a:rPr lang="en-US" sz="450" dirty="0">
+              <a:rPr lang="en-US" sz="450" b="1" dirty="0">
+                <a:solidFill>
+                  <a:schemeClr val="tx1"/>
+                </a:solidFill>
                 <a:latin typeface="Courier New" panose="02070309020205020404" pitchFamily="49" charset="0"/>
                 <a:cs typeface="Courier New" panose="02070309020205020404" pitchFamily="49" charset="0"/>
               </a:rPr>
@@ -7019,7 +7567,10 @@
               </a:lnSpc>
             </a:pPr>
             <a:r>
-              <a:rPr lang="en-US" sz="450" dirty="0">
+              <a:rPr lang="en-US" sz="450" b="1" dirty="0">
+                <a:solidFill>
+                  <a:schemeClr val="tx1"/>
+                </a:solidFill>
                 <a:latin typeface="Courier New" panose="02070309020205020404" pitchFamily="49" charset="0"/>
                 <a:cs typeface="Courier New" panose="02070309020205020404" pitchFamily="49" charset="0"/>
               </a:rPr>
@@ -9001,22 +9552,20 @@
         </p:spPr>
         <p:style>
           <a:lnRef idx="2">
-            <a:schemeClr val="dk1">
-              <a:shade val="50000"/>
-            </a:schemeClr>
+            <a:schemeClr val="dk1"/>
           </a:lnRef>
           <a:fillRef idx="1">
-            <a:schemeClr val="dk1"/>
+            <a:schemeClr val="lt1"/>
           </a:fillRef>
           <a:effectRef idx="0">
             <a:schemeClr val="dk1"/>
           </a:effectRef>
           <a:fontRef idx="minor">
-            <a:schemeClr val="lt1"/>
+            <a:schemeClr val="dk1"/>
           </a:fontRef>
         </p:style>
         <p:txBody>
-          <a:bodyPr lIns="34290" tIns="6858" rIns="0" bIns="0" rtlCol="0" anchor="t" anchorCtr="0"/>
+          <a:bodyPr lIns="34290" tIns="18288" rIns="0" bIns="0" rtlCol="0" anchor="t" anchorCtr="0"/>
           <a:lstStyle/>
           <a:p>
             <a:pPr>
@@ -9025,7 +9574,10 @@
               </a:lnSpc>
             </a:pPr>
             <a:r>
-              <a:rPr lang="en-US" sz="450" dirty="0">
+              <a:rPr lang="en-US" sz="450" b="1" dirty="0">
+                <a:solidFill>
+                  <a:schemeClr val="tx1"/>
+                </a:solidFill>
                 <a:latin typeface="Courier New" panose="02070309020205020404" pitchFamily="49" charset="0"/>
                 <a:cs typeface="Courier New" panose="02070309020205020404" pitchFamily="49" charset="0"/>
               </a:rPr>
@@ -9039,7 +9591,10 @@
               </a:lnSpc>
             </a:pPr>
             <a:r>
-              <a:rPr lang="en-US" sz="450" dirty="0">
+              <a:rPr lang="en-US" sz="450" b="1" dirty="0">
+                <a:solidFill>
+                  <a:schemeClr val="tx1"/>
+                </a:solidFill>
                 <a:latin typeface="Courier New" panose="02070309020205020404" pitchFamily="49" charset="0"/>
                 <a:cs typeface="Courier New" panose="02070309020205020404" pitchFamily="49" charset="0"/>
               </a:rPr>
@@ -9461,22 +10016,20 @@
         </p:spPr>
         <p:style>
           <a:lnRef idx="2">
-            <a:schemeClr val="dk1">
-              <a:shade val="50000"/>
-            </a:schemeClr>
+            <a:schemeClr val="dk1"/>
           </a:lnRef>
           <a:fillRef idx="1">
-            <a:schemeClr val="dk1"/>
+            <a:schemeClr val="lt1"/>
           </a:fillRef>
           <a:effectRef idx="0">
             <a:schemeClr val="dk1"/>
           </a:effectRef>
           <a:fontRef idx="minor">
-            <a:schemeClr val="lt1"/>
+            <a:schemeClr val="dk1"/>
           </a:fontRef>
         </p:style>
         <p:txBody>
-          <a:bodyPr lIns="34290" tIns="6858" rIns="0" bIns="0" rtlCol="0" anchor="t" anchorCtr="0"/>
+          <a:bodyPr lIns="34290" tIns="18288" rIns="0" bIns="0" rtlCol="0" anchor="t" anchorCtr="0"/>
           <a:lstStyle/>
           <a:p>
             <a:pPr>
@@ -9485,7 +10038,10 @@
               </a:lnSpc>
             </a:pPr>
             <a:r>
-              <a:rPr lang="en-US" sz="450" dirty="0">
+              <a:rPr lang="en-US" sz="450" b="1" dirty="0">
+                <a:solidFill>
+                  <a:schemeClr val="tx1"/>
+                </a:solidFill>
                 <a:latin typeface="Courier New" panose="02070309020205020404" pitchFamily="49" charset="0"/>
                 <a:cs typeface="Courier New" panose="02070309020205020404" pitchFamily="49" charset="0"/>
               </a:rPr>
@@ -9499,7 +10055,10 @@
               </a:lnSpc>
             </a:pPr>
             <a:r>
-              <a:rPr lang="en-US" sz="450" dirty="0">
+              <a:rPr lang="en-US" sz="450" b="1" dirty="0">
+                <a:solidFill>
+                  <a:schemeClr val="tx1"/>
+                </a:solidFill>
                 <a:latin typeface="Courier New" panose="02070309020205020404" pitchFamily="49" charset="0"/>
                 <a:cs typeface="Courier New" panose="02070309020205020404" pitchFamily="49" charset="0"/>
               </a:rPr>
@@ -9513,7 +10072,10 @@
               </a:lnSpc>
             </a:pPr>
             <a:r>
-              <a:rPr lang="en-US" sz="450" dirty="0">
+              <a:rPr lang="en-US" sz="450" b="1" dirty="0">
+                <a:solidFill>
+                  <a:schemeClr val="tx1"/>
+                </a:solidFill>
                 <a:latin typeface="Courier New" panose="02070309020205020404" pitchFamily="49" charset="0"/>
                 <a:cs typeface="Courier New" panose="02070309020205020404" pitchFamily="49" charset="0"/>
               </a:rPr>
@@ -9526,7 +10088,10 @@
                 <a:spcPts val="413"/>
               </a:lnSpc>
             </a:pPr>
-            <a:endParaRPr lang="en-US" sz="450" dirty="0">
+            <a:endParaRPr lang="en-US" sz="450" b="1" dirty="0">
+              <a:solidFill>
+                <a:schemeClr val="tx1"/>
+              </a:solidFill>
               <a:latin typeface="Courier New" panose="02070309020205020404" pitchFamily="49" charset="0"/>
               <a:cs typeface="Courier New" panose="02070309020205020404" pitchFamily="49" charset="0"/>
             </a:endParaRPr>
@@ -10860,22 +11425,20 @@
         </p:spPr>
         <p:style>
           <a:lnRef idx="2">
-            <a:schemeClr val="dk1">
-              <a:shade val="50000"/>
-            </a:schemeClr>
+            <a:schemeClr val="dk1"/>
           </a:lnRef>
           <a:fillRef idx="1">
-            <a:schemeClr val="dk1"/>
+            <a:schemeClr val="lt1"/>
           </a:fillRef>
           <a:effectRef idx="0">
             <a:schemeClr val="dk1"/>
           </a:effectRef>
           <a:fontRef idx="minor">
-            <a:schemeClr val="lt1"/>
+            <a:schemeClr val="dk1"/>
           </a:fontRef>
         </p:style>
         <p:txBody>
-          <a:bodyPr lIns="34290" tIns="6858" rIns="0" bIns="0" rtlCol="0" anchor="t" anchorCtr="0"/>
+          <a:bodyPr lIns="34290" tIns="18288" rIns="0" bIns="0" rtlCol="0" anchor="t" anchorCtr="0"/>
           <a:lstStyle/>
           <a:p>
             <a:pPr>
@@ -10884,7 +11447,10 @@
               </a:lnSpc>
             </a:pPr>
             <a:r>
-              <a:rPr lang="en-US" sz="450" dirty="0">
+              <a:rPr lang="en-US" sz="450" b="1" dirty="0">
+                <a:solidFill>
+                  <a:schemeClr val="tx1"/>
+                </a:solidFill>
                 <a:latin typeface="Courier New" panose="02070309020205020404" pitchFamily="49" charset="0"/>
                 <a:cs typeface="Courier New" panose="02070309020205020404" pitchFamily="49" charset="0"/>
               </a:rPr>
@@ -10898,7 +11464,10 @@
               </a:lnSpc>
             </a:pPr>
             <a:r>
-              <a:rPr lang="en-US" sz="450" dirty="0">
+              <a:rPr lang="en-US" sz="450" b="1" dirty="0">
+                <a:solidFill>
+                  <a:schemeClr val="tx1"/>
+                </a:solidFill>
                 <a:latin typeface="Courier New" panose="02070309020205020404" pitchFamily="49" charset="0"/>
                 <a:cs typeface="Courier New" panose="02070309020205020404" pitchFamily="49" charset="0"/>
               </a:rPr>
@@ -10912,7 +11481,10 @@
               </a:lnSpc>
             </a:pPr>
             <a:r>
-              <a:rPr lang="en-US" sz="450" dirty="0">
+              <a:rPr lang="en-US" sz="450" b="1" dirty="0">
+                <a:solidFill>
+                  <a:schemeClr val="tx1"/>
+                </a:solidFill>
                 <a:latin typeface="Courier New" panose="02070309020205020404" pitchFamily="49" charset="0"/>
                 <a:cs typeface="Courier New" panose="02070309020205020404" pitchFamily="49" charset="0"/>
               </a:rPr>
@@ -10926,7 +11498,10 @@
               </a:lnSpc>
             </a:pPr>
             <a:r>
-              <a:rPr lang="en-US" sz="450" dirty="0">
+              <a:rPr lang="en-US" sz="450" b="1" dirty="0">
+                <a:solidFill>
+                  <a:schemeClr val="tx1"/>
+                </a:solidFill>
                 <a:latin typeface="Courier New" panose="02070309020205020404" pitchFamily="49" charset="0"/>
                 <a:cs typeface="Courier New" panose="02070309020205020404" pitchFamily="49" charset="0"/>
               </a:rPr>
@@ -10940,7 +11515,10 @@
               </a:lnSpc>
             </a:pPr>
             <a:r>
-              <a:rPr lang="en-US" sz="450" dirty="0">
+              <a:rPr lang="en-US" sz="450" b="1" dirty="0">
+                <a:solidFill>
+                  <a:schemeClr val="tx1"/>
+                </a:solidFill>
                 <a:latin typeface="Courier New" panose="02070309020205020404" pitchFamily="49" charset="0"/>
                 <a:cs typeface="Courier New" panose="02070309020205020404" pitchFamily="49" charset="0"/>
               </a:rPr>
@@ -10954,7 +11532,10 @@
               </a:lnSpc>
             </a:pPr>
             <a:r>
-              <a:rPr lang="en-US" sz="450" dirty="0">
+              <a:rPr lang="en-US" sz="450" b="1" dirty="0">
+                <a:solidFill>
+                  <a:schemeClr val="tx1"/>
+                </a:solidFill>
                 <a:latin typeface="Courier New" panose="02070309020205020404" pitchFamily="49" charset="0"/>
                 <a:cs typeface="Courier New" panose="02070309020205020404" pitchFamily="49" charset="0"/>
               </a:rPr>
@@ -11736,8 +12317,8 @@
         </p:nvSpPr>
         <p:spPr>
           <a:xfrm>
-            <a:off x="456746" y="2730452"/>
-            <a:ext cx="975528" cy="140615"/>
+            <a:off x="456746" y="2730453"/>
+            <a:ext cx="975528" cy="122286"/>
           </a:xfrm>
           <a:prstGeom prst="rect">
             <a:avLst/>
@@ -11745,22 +12326,20 @@
         </p:spPr>
         <p:style>
           <a:lnRef idx="2">
-            <a:schemeClr val="dk1">
-              <a:shade val="50000"/>
-            </a:schemeClr>
+            <a:schemeClr val="dk1"/>
           </a:lnRef>
           <a:fillRef idx="1">
-            <a:schemeClr val="dk1"/>
+            <a:schemeClr val="lt1"/>
           </a:fillRef>
           <a:effectRef idx="0">
             <a:schemeClr val="dk1"/>
           </a:effectRef>
           <a:fontRef idx="minor">
-            <a:schemeClr val="lt1"/>
+            <a:schemeClr val="dk1"/>
           </a:fontRef>
         </p:style>
         <p:txBody>
-          <a:bodyPr lIns="34290" tIns="6858" rIns="0" bIns="0" rtlCol="0" anchor="t" anchorCtr="0"/>
+          <a:bodyPr lIns="34290" tIns="18288" rIns="0" bIns="0" rtlCol="0" anchor="t" anchorCtr="0"/>
           <a:lstStyle/>
           <a:p>
             <a:pPr>
@@ -11769,7 +12348,10 @@
               </a:lnSpc>
             </a:pPr>
             <a:r>
-              <a:rPr lang="en-US" sz="450" dirty="0">
+              <a:rPr lang="en-US" sz="450" b="1" dirty="0">
+                <a:solidFill>
+                  <a:schemeClr val="tx1"/>
+                </a:solidFill>
                 <a:latin typeface="Courier New" panose="02070309020205020404" pitchFamily="49" charset="0"/>
                 <a:cs typeface="Courier New" panose="02070309020205020404" pitchFamily="49" charset="0"/>
               </a:rPr>
@@ -11783,7 +12365,10 @@
               </a:lnSpc>
             </a:pPr>
             <a:r>
-              <a:rPr lang="en-US" sz="450" dirty="0">
+              <a:rPr lang="en-US" sz="450" b="1" dirty="0">
+                <a:solidFill>
+                  <a:schemeClr val="tx1"/>
+                </a:solidFill>
                 <a:latin typeface="Courier New" panose="02070309020205020404" pitchFamily="49" charset="0"/>
                 <a:cs typeface="Courier New" panose="02070309020205020404" pitchFamily="49" charset="0"/>
               </a:rPr>
@@ -11796,7 +12381,10 @@
                 <a:spcPts val="413"/>
               </a:lnSpc>
             </a:pPr>
-            <a:endParaRPr lang="en-US" sz="450" dirty="0">
+            <a:endParaRPr lang="en-US" sz="450" b="1" dirty="0">
+              <a:solidFill>
+                <a:schemeClr val="tx1"/>
+              </a:solidFill>
               <a:latin typeface="Courier New" panose="02070309020205020404" pitchFamily="49" charset="0"/>
               <a:cs typeface="Courier New" panose="02070309020205020404" pitchFamily="49" charset="0"/>
             </a:endParaRPr>
@@ -12473,7 +13061,7 @@
         <p:spPr>
           <a:xfrm>
             <a:off x="456746" y="3185435"/>
-            <a:ext cx="975528" cy="140615"/>
+            <a:ext cx="975528" cy="129265"/>
           </a:xfrm>
           <a:prstGeom prst="rect">
             <a:avLst/>
@@ -12481,22 +13069,20 @@
         </p:spPr>
         <p:style>
           <a:lnRef idx="2">
-            <a:schemeClr val="dk1">
-              <a:shade val="50000"/>
-            </a:schemeClr>
+            <a:schemeClr val="dk1"/>
           </a:lnRef>
           <a:fillRef idx="1">
-            <a:schemeClr val="dk1"/>
+            <a:schemeClr val="lt1"/>
           </a:fillRef>
           <a:effectRef idx="0">
             <a:schemeClr val="dk1"/>
           </a:effectRef>
           <a:fontRef idx="minor">
-            <a:schemeClr val="lt1"/>
+            <a:schemeClr val="dk1"/>
           </a:fontRef>
         </p:style>
         <p:txBody>
-          <a:bodyPr lIns="34290" tIns="6858" rIns="0" bIns="0" rtlCol="0" anchor="t" anchorCtr="0"/>
+          <a:bodyPr lIns="34290" tIns="18288" rIns="0" bIns="0" rtlCol="0" anchor="t" anchorCtr="0"/>
           <a:lstStyle/>
           <a:p>
             <a:pPr>
@@ -12505,7 +13091,10 @@
               </a:lnSpc>
             </a:pPr>
             <a:r>
-              <a:rPr lang="en-US" sz="450" dirty="0">
+              <a:rPr lang="en-US" sz="450" b="1" dirty="0">
+                <a:solidFill>
+                  <a:schemeClr val="tx1"/>
+                </a:solidFill>
                 <a:latin typeface="Courier New" panose="02070309020205020404" pitchFamily="49" charset="0"/>
                 <a:cs typeface="Courier New" panose="02070309020205020404" pitchFamily="49" charset="0"/>
               </a:rPr>
@@ -12519,7 +13108,10 @@
               </a:lnSpc>
             </a:pPr>
             <a:r>
-              <a:rPr lang="en-US" sz="450" dirty="0">
+              <a:rPr lang="en-US" sz="450" b="1" dirty="0">
+                <a:solidFill>
+                  <a:schemeClr val="tx1"/>
+                </a:solidFill>
                 <a:latin typeface="Courier New" panose="02070309020205020404" pitchFamily="49" charset="0"/>
                 <a:cs typeface="Courier New" panose="02070309020205020404" pitchFamily="49" charset="0"/>
               </a:rPr>
@@ -13636,22 +14228,20 @@
         </p:spPr>
         <p:style>
           <a:lnRef idx="2">
-            <a:schemeClr val="dk1">
-              <a:shade val="50000"/>
-            </a:schemeClr>
+            <a:schemeClr val="dk1"/>
           </a:lnRef>
           <a:fillRef idx="1">
-            <a:schemeClr val="dk1"/>
+            <a:schemeClr val="lt1"/>
           </a:fillRef>
           <a:effectRef idx="0">
             <a:schemeClr val="dk1"/>
           </a:effectRef>
           <a:fontRef idx="minor">
-            <a:schemeClr val="lt1"/>
+            <a:schemeClr val="dk1"/>
           </a:fontRef>
         </p:style>
         <p:txBody>
-          <a:bodyPr lIns="34290" tIns="6858" rIns="0" bIns="0" rtlCol="0" anchor="t" anchorCtr="0"/>
+          <a:bodyPr lIns="34290" tIns="18288" rIns="0" bIns="0" rtlCol="0" anchor="t" anchorCtr="0"/>
           <a:lstStyle/>
           <a:p>
             <a:pPr>
@@ -13660,7 +14250,10 @@
               </a:lnSpc>
             </a:pPr>
             <a:r>
-              <a:rPr lang="en-US" sz="450" dirty="0">
+              <a:rPr lang="en-US" sz="450" b="1" dirty="0">
+                <a:solidFill>
+                  <a:schemeClr val="tx1"/>
+                </a:solidFill>
                 <a:latin typeface="Courier New" panose="02070309020205020404" pitchFamily="49" charset="0"/>
                 <a:cs typeface="Courier New" panose="02070309020205020404" pitchFamily="49" charset="0"/>
               </a:rPr>
@@ -13674,16 +14267,15 @@
               </a:lnSpc>
             </a:pPr>
             <a:r>
-              <a:rPr lang="en-US" sz="450">
+              <a:rPr lang="en-US" sz="450" b="1" dirty="0">
+                <a:solidFill>
+                  <a:schemeClr val="tx1"/>
+                </a:solidFill>
                 <a:latin typeface="Courier New" panose="02070309020205020404" pitchFamily="49" charset="0"/>
                 <a:cs typeface="Courier New" panose="02070309020205020404" pitchFamily="49" charset="0"/>
               </a:rPr>
               <a:t>VCC50-TRIG-ECHO-GND</a:t>
             </a:r>
-            <a:endParaRPr lang="en-US" sz="450" dirty="0">
-              <a:latin typeface="Courier New" panose="02070309020205020404" pitchFamily="49" charset="0"/>
-              <a:cs typeface="Courier New" panose="02070309020205020404" pitchFamily="49" charset="0"/>
-            </a:endParaRPr>
           </a:p>
         </p:txBody>
       </p:sp>
@@ -14223,6 +14815,7 @@
               </a:path>
             </a:pathLst>
           </a:custGeom>
+          <a:ln w="28575"/>
         </p:spPr>
         <p:style>
           <a:lnRef idx="3">
@@ -14715,7 +15308,7 @@
             </a:pathLst>
           </a:custGeom>
           <a:noFill/>
-          <a:ln>
+          <a:ln w="28575">
             <a:solidFill>
               <a:srgbClr val="FFFF00"/>
             </a:solidFill>
@@ -14923,7 +15516,7 @@
             </a:pathLst>
           </a:custGeom>
           <a:noFill/>
-          <a:ln>
+          <a:ln w="28575">
             <a:solidFill>
               <a:srgbClr val="FFFF00"/>
             </a:solidFill>
@@ -15145,7 +15738,7 @@
             </a:pathLst>
           </a:custGeom>
           <a:noFill/>
-          <a:ln>
+          <a:ln w="28575">
             <a:solidFill>
               <a:srgbClr val="FFFF00"/>
             </a:solidFill>
@@ -15410,7 +16003,7 @@
             </a:pathLst>
           </a:custGeom>
           <a:noFill/>
-          <a:ln>
+          <a:ln w="28575">
             <a:solidFill>
               <a:srgbClr val="FFFF00"/>
             </a:solidFill>
@@ -15640,7 +16233,7 @@
             </a:pathLst>
           </a:custGeom>
           <a:noFill/>
-          <a:ln>
+          <a:ln w="28575">
             <a:solidFill>
               <a:srgbClr val="FFFF00"/>
             </a:solidFill>
@@ -15770,7 +16363,7 @@
             </a:pathLst>
           </a:custGeom>
           <a:noFill/>
-          <a:ln>
+          <a:ln w="28575">
             <a:solidFill>
               <a:srgbClr val="FFFF00"/>
             </a:solidFill>
@@ -15900,7 +16493,7 @@
             </a:pathLst>
           </a:custGeom>
           <a:noFill/>
-          <a:ln>
+          <a:ln w="28575">
             <a:solidFill>
               <a:srgbClr val="FFFF00"/>
             </a:solidFill>
@@ -16030,7 +16623,7 @@
             </a:pathLst>
           </a:custGeom>
           <a:noFill/>
-          <a:ln>
+          <a:ln w="19050">
             <a:solidFill>
               <a:srgbClr val="90F828"/>
             </a:solidFill>
@@ -16216,7 +16809,7 @@
             </a:pathLst>
           </a:custGeom>
           <a:noFill/>
-          <a:ln>
+          <a:ln w="19050">
             <a:solidFill>
               <a:srgbClr val="90F828"/>
             </a:solidFill>
@@ -16356,7 +16949,7 @@
             </a:pathLst>
           </a:custGeom>
           <a:noFill/>
-          <a:ln>
+          <a:ln w="19050">
             <a:solidFill>
               <a:srgbClr val="FFFF00"/>
             </a:solidFill>
@@ -16464,7 +17057,7 @@
             </a:pathLst>
           </a:custGeom>
           <a:noFill/>
-          <a:ln>
+          <a:ln w="19050">
             <a:solidFill>
               <a:srgbClr val="90F828"/>
             </a:solidFill>
@@ -16614,7 +17207,7 @@
             </a:pathLst>
           </a:custGeom>
           <a:noFill/>
-          <a:ln>
+          <a:ln w="28575">
             <a:solidFill>
               <a:srgbClr val="FFFF00"/>
             </a:solidFill>
@@ -16762,7 +17355,7 @@
             </a:pathLst>
           </a:custGeom>
           <a:noFill/>
-          <a:ln>
+          <a:ln w="28575">
             <a:solidFill>
               <a:srgbClr val="FFFF00"/>
             </a:solidFill>
@@ -16815,7 +17408,7 @@
           <a:prstGeom prst="line">
             <a:avLst/>
           </a:prstGeom>
-          <a:ln w="12700">
+          <a:ln w="28575">
             <a:solidFill>
               <a:srgbClr val="FFFF00"/>
             </a:solidFill>
@@ -16856,7 +17449,7 @@
           <a:prstGeom prst="line">
             <a:avLst/>
           </a:prstGeom>
-          <a:ln w="12700">
+          <a:ln w="28575">
             <a:solidFill>
               <a:srgbClr val="FFFF00"/>
             </a:solidFill>
@@ -17036,7 +17629,7 @@
             </a:pathLst>
           </a:custGeom>
           <a:noFill/>
-          <a:ln>
+          <a:ln w="28575">
             <a:solidFill>
               <a:srgbClr val="FFFF00"/>
             </a:solidFill>
@@ -17521,4 +18114,594 @@
     </a:ext>
   </a:extLst>
 </a:theme>
+</file>
+
+<file path=ppt/theme/theme2.xml><?xml version="1.0" encoding="utf-8"?>
+<a:theme xmlns:a="http://schemas.openxmlformats.org/drawingml/2006/main" name="Office Theme">
+  <a:themeElements>
+    <a:clrScheme name="Office">
+      <a:dk1>
+        <a:sysClr val="windowText" lastClr="000000"/>
+      </a:dk1>
+      <a:lt1>
+        <a:sysClr val="window" lastClr="FFFFFF"/>
+      </a:lt1>
+      <a:dk2>
+        <a:srgbClr val="44546A"/>
+      </a:dk2>
+      <a:lt2>
+        <a:srgbClr val="E7E6E6"/>
+      </a:lt2>
+      <a:accent1>
+        <a:srgbClr val="4472C4"/>
+      </a:accent1>
+      <a:accent2>
+        <a:srgbClr val="ED7D31"/>
+      </a:accent2>
+      <a:accent3>
+        <a:srgbClr val="A5A5A5"/>
+      </a:accent3>
+      <a:accent4>
+        <a:srgbClr val="FFC000"/>
+      </a:accent4>
+      <a:accent5>
+        <a:srgbClr val="5B9BD5"/>
+      </a:accent5>
+      <a:accent6>
+        <a:srgbClr val="70AD47"/>
+      </a:accent6>
+      <a:hlink>
+        <a:srgbClr val="0563C1"/>
+      </a:hlink>
+      <a:folHlink>
+        <a:srgbClr val="954F72"/>
+      </a:folHlink>
+    </a:clrScheme>
+    <a:fontScheme name="Office">
+      <a:majorFont>
+        <a:latin typeface="Calibri Light" panose="020F0302020204030204"/>
+        <a:ea typeface=""/>
+        <a:cs typeface=""/>
+        <a:font script="Jpan" typeface="游ゴシック Light"/>
+        <a:font script="Hang" typeface="맑은 고딕"/>
+        <a:font script="Hans" typeface="等线 Light"/>
+        <a:font script="Hant" typeface="新細明體"/>
+        <a:font script="Arab" typeface="Times New Roman"/>
+        <a:font script="Hebr" typeface="Times New Roman"/>
+        <a:font script="Thai" typeface="Angsana New"/>
+        <a:font script="Ethi" typeface="Nyala"/>
+        <a:font script="Beng" typeface="Vrinda"/>
+        <a:font script="Gujr" typeface="Shruti"/>
+        <a:font script="Khmr" typeface="MoolBoran"/>
+        <a:font script="Knda" typeface="Tunga"/>
+        <a:font script="Guru" typeface="Raavi"/>
+        <a:font script="Cans" typeface="Euphemia"/>
+        <a:font script="Cher" typeface="Plantagenet Cherokee"/>
+        <a:font script="Yiii" typeface="Microsoft Yi Baiti"/>
+        <a:font script="Tibt" typeface="Microsoft Himalaya"/>
+        <a:font script="Thaa" typeface="MV Boli"/>
+        <a:font script="Deva" typeface="Mangal"/>
+        <a:font script="Telu" typeface="Gautami"/>
+        <a:font script="Taml" typeface="Latha"/>
+        <a:font script="Syrc" typeface="Estrangelo Edessa"/>
+        <a:font script="Orya" typeface="Kalinga"/>
+        <a:font script="Mlym" typeface="Kartika"/>
+        <a:font script="Laoo" typeface="DokChampa"/>
+        <a:font script="Sinh" typeface="Iskoola Pota"/>
+        <a:font script="Mong" typeface="Mongolian Baiti"/>
+        <a:font script="Viet" typeface="Times New Roman"/>
+        <a:font script="Uigh" typeface="Microsoft Uighur"/>
+        <a:font script="Geor" typeface="Sylfaen"/>
+        <a:font script="Armn" typeface="Arial"/>
+        <a:font script="Bugi" typeface="Leelawadee UI"/>
+        <a:font script="Bopo" typeface="Microsoft JhengHei"/>
+        <a:font script="Java" typeface="Javanese Text"/>
+        <a:font script="Lisu" typeface="Segoe UI"/>
+        <a:font script="Mymr" typeface="Myanmar Text"/>
+        <a:font script="Nkoo" typeface="Ebrima"/>
+        <a:font script="Olck" typeface="Nirmala UI"/>
+        <a:font script="Osma" typeface="Ebrima"/>
+        <a:font script="Phag" typeface="Phagspa"/>
+        <a:font script="Syrn" typeface="Estrangelo Edessa"/>
+        <a:font script="Syrj" typeface="Estrangelo Edessa"/>
+        <a:font script="Syre" typeface="Estrangelo Edessa"/>
+        <a:font script="Sora" typeface="Nirmala UI"/>
+        <a:font script="Tale" typeface="Microsoft Tai Le"/>
+        <a:font script="Talu" typeface="Microsoft New Tai Lue"/>
+        <a:font script="Tfng" typeface="Ebrima"/>
+      </a:majorFont>
+      <a:minorFont>
+        <a:latin typeface="Calibri" panose="020F0502020204030204"/>
+        <a:ea typeface=""/>
+        <a:cs typeface=""/>
+        <a:font script="Jpan" typeface="游ゴシック"/>
+        <a:font script="Hang" typeface="맑은 고딕"/>
+        <a:font script="Hans" typeface="等线"/>
+        <a:font script="Hant" typeface="新細明體"/>
+        <a:font script="Arab" typeface="Arial"/>
+        <a:font script="Hebr" typeface="Arial"/>
+        <a:font script="Thai" typeface="Cordia New"/>
+        <a:font script="Ethi" typeface="Nyala"/>
+        <a:font script="Beng" typeface="Vrinda"/>
+        <a:font script="Gujr" typeface="Shruti"/>
+        <a:font script="Khmr" typeface="DaunPenh"/>
+        <a:font script="Knda" typeface="Tunga"/>
+        <a:font script="Guru" typeface="Raavi"/>
+        <a:font script="Cans" typeface="Euphemia"/>
+        <a:font script="Cher" typeface="Plantagenet Cherokee"/>
+        <a:font script="Yiii" typeface="Microsoft Yi Baiti"/>
+        <a:font script="Tibt" typeface="Microsoft Himalaya"/>
+        <a:font script="Thaa" typeface="MV Boli"/>
+        <a:font script="Deva" typeface="Mangal"/>
+        <a:font script="Telu" typeface="Gautami"/>
+        <a:font script="Taml" typeface="Latha"/>
+        <a:font script="Syrc" typeface="Estrangelo Edessa"/>
+        <a:font script="Orya" typeface="Kalinga"/>
+        <a:font script="Mlym" typeface="Kartika"/>
+        <a:font script="Laoo" typeface="DokChampa"/>
+        <a:font script="Sinh" typeface="Iskoola Pota"/>
+        <a:font script="Mong" typeface="Mongolian Baiti"/>
+        <a:font script="Viet" typeface="Arial"/>
+        <a:font script="Uigh" typeface="Microsoft Uighur"/>
+        <a:font script="Geor" typeface="Sylfaen"/>
+        <a:font script="Armn" typeface="Arial"/>
+        <a:font script="Bugi" typeface="Leelawadee UI"/>
+        <a:font script="Bopo" typeface="Microsoft JhengHei"/>
+        <a:font script="Java" typeface="Javanese Text"/>
+        <a:font script="Lisu" typeface="Segoe UI"/>
+        <a:font script="Mymr" typeface="Myanmar Text"/>
+        <a:font script="Nkoo" typeface="Ebrima"/>
+        <a:font script="Olck" typeface="Nirmala UI"/>
+        <a:font script="Osma" typeface="Ebrima"/>
+        <a:font script="Phag" typeface="Phagspa"/>
+        <a:font script="Syrn" typeface="Estrangelo Edessa"/>
+        <a:font script="Syrj" typeface="Estrangelo Edessa"/>
+        <a:font script="Syre" typeface="Estrangelo Edessa"/>
+        <a:font script="Sora" typeface="Nirmala UI"/>
+        <a:font script="Tale" typeface="Microsoft Tai Le"/>
+        <a:font script="Talu" typeface="Microsoft New Tai Lue"/>
+        <a:font script="Tfng" typeface="Ebrima"/>
+      </a:minorFont>
+    </a:fontScheme>
+    <a:fmtScheme name="Office">
+      <a:fillStyleLst>
+        <a:solidFill>
+          <a:schemeClr val="phClr"/>
+        </a:solidFill>
+        <a:gradFill rotWithShape="1">
+          <a:gsLst>
+            <a:gs pos="0">
+              <a:schemeClr val="phClr">
+                <a:lumMod val="110000"/>
+                <a:satMod val="105000"/>
+                <a:tint val="67000"/>
+              </a:schemeClr>
+            </a:gs>
+            <a:gs pos="50000">
+              <a:schemeClr val="phClr">
+                <a:lumMod val="105000"/>
+                <a:satMod val="103000"/>
+                <a:tint val="73000"/>
+              </a:schemeClr>
+            </a:gs>
+            <a:gs pos="100000">
+              <a:schemeClr val="phClr">
+                <a:lumMod val="105000"/>
+                <a:satMod val="109000"/>
+                <a:tint val="81000"/>
+              </a:schemeClr>
+            </a:gs>
+          </a:gsLst>
+          <a:lin ang="5400000" scaled="0"/>
+        </a:gradFill>
+        <a:gradFill rotWithShape="1">
+          <a:gsLst>
+            <a:gs pos="0">
+              <a:schemeClr val="phClr">
+                <a:satMod val="103000"/>
+                <a:lumMod val="102000"/>
+                <a:tint val="94000"/>
+              </a:schemeClr>
+            </a:gs>
+            <a:gs pos="50000">
+              <a:schemeClr val="phClr">
+                <a:satMod val="110000"/>
+                <a:lumMod val="100000"/>
+                <a:shade val="100000"/>
+              </a:schemeClr>
+            </a:gs>
+            <a:gs pos="100000">
+              <a:schemeClr val="phClr">
+                <a:lumMod val="99000"/>
+                <a:satMod val="120000"/>
+                <a:shade val="78000"/>
+              </a:schemeClr>
+            </a:gs>
+          </a:gsLst>
+          <a:lin ang="5400000" scaled="0"/>
+        </a:gradFill>
+      </a:fillStyleLst>
+      <a:lnStyleLst>
+        <a:ln w="6350" cap="flat" cmpd="sng" algn="ctr">
+          <a:solidFill>
+            <a:schemeClr val="phClr"/>
+          </a:solidFill>
+          <a:prstDash val="solid"/>
+          <a:miter lim="800000"/>
+        </a:ln>
+        <a:ln w="12700" cap="flat" cmpd="sng" algn="ctr">
+          <a:solidFill>
+            <a:schemeClr val="phClr"/>
+          </a:solidFill>
+          <a:prstDash val="solid"/>
+          <a:miter lim="800000"/>
+        </a:ln>
+        <a:ln w="19050" cap="flat" cmpd="sng" algn="ctr">
+          <a:solidFill>
+            <a:schemeClr val="phClr"/>
+          </a:solidFill>
+          <a:prstDash val="solid"/>
+          <a:miter lim="800000"/>
+        </a:ln>
+      </a:lnStyleLst>
+      <a:effectStyleLst>
+        <a:effectStyle>
+          <a:effectLst/>
+        </a:effectStyle>
+        <a:effectStyle>
+          <a:effectLst/>
+        </a:effectStyle>
+        <a:effectStyle>
+          <a:effectLst>
+            <a:outerShdw blurRad="57150" dist="19050" dir="5400000" algn="ctr" rotWithShape="0">
+              <a:srgbClr val="000000">
+                <a:alpha val="63000"/>
+              </a:srgbClr>
+            </a:outerShdw>
+          </a:effectLst>
+        </a:effectStyle>
+      </a:effectStyleLst>
+      <a:bgFillStyleLst>
+        <a:solidFill>
+          <a:schemeClr val="phClr"/>
+        </a:solidFill>
+        <a:solidFill>
+          <a:schemeClr val="phClr">
+            <a:tint val="95000"/>
+            <a:satMod val="170000"/>
+          </a:schemeClr>
+        </a:solidFill>
+        <a:gradFill rotWithShape="1">
+          <a:gsLst>
+            <a:gs pos="0">
+              <a:schemeClr val="phClr">
+                <a:tint val="93000"/>
+                <a:satMod val="150000"/>
+                <a:shade val="98000"/>
+                <a:lumMod val="102000"/>
+              </a:schemeClr>
+            </a:gs>
+            <a:gs pos="50000">
+              <a:schemeClr val="phClr">
+                <a:tint val="98000"/>
+                <a:satMod val="130000"/>
+                <a:shade val="90000"/>
+                <a:lumMod val="103000"/>
+              </a:schemeClr>
+            </a:gs>
+            <a:gs pos="100000">
+              <a:schemeClr val="phClr">
+                <a:shade val="63000"/>
+                <a:satMod val="120000"/>
+              </a:schemeClr>
+            </a:gs>
+          </a:gsLst>
+          <a:lin ang="5400000" scaled="0"/>
+        </a:gradFill>
+      </a:bgFillStyleLst>
+    </a:fmtScheme>
+  </a:themeElements>
+  <a:objectDefaults/>
+  <a:extraClrSchemeLst/>
+  <a:extLst>
+    <a:ext uri="{05A4C25C-085E-4340-85A3-A5531E510DB2}">
+      <thm15:themeFamily xmlns:thm15="http://schemas.microsoft.com/office/thememl/2012/main" name="Office Theme" id="{62F939B6-93AF-4DB8-9C6B-D6C7DFDC589F}" vid="{4A3C46E8-61CC-4603-A589-7422A47A8E4A}"/>
+    </a:ext>
+  </a:extLst>
+</a:theme>
+</file>
+
+<file path=ppt/theme/theme3.xml><?xml version="1.0" encoding="utf-8"?>
+<a:theme xmlns:a="http://schemas.openxmlformats.org/drawingml/2006/main" name="Office Theme">
+  <a:themeElements>
+    <a:clrScheme name="Office">
+      <a:dk1>
+        <a:sysClr val="windowText" lastClr="000000"/>
+      </a:dk1>
+      <a:lt1>
+        <a:sysClr val="window" lastClr="FFFFFF"/>
+      </a:lt1>
+      <a:dk2>
+        <a:srgbClr val="44546A"/>
+      </a:dk2>
+      <a:lt2>
+        <a:srgbClr val="E7E6E6"/>
+      </a:lt2>
+      <a:accent1>
+        <a:srgbClr val="4472C4"/>
+      </a:accent1>
+      <a:accent2>
+        <a:srgbClr val="ED7D31"/>
+      </a:accent2>
+      <a:accent3>
+        <a:srgbClr val="A5A5A5"/>
+      </a:accent3>
+      <a:accent4>
+        <a:srgbClr val="FFC000"/>
+      </a:accent4>
+      <a:accent5>
+        <a:srgbClr val="5B9BD5"/>
+      </a:accent5>
+      <a:accent6>
+        <a:srgbClr val="70AD47"/>
+      </a:accent6>
+      <a:hlink>
+        <a:srgbClr val="0563C1"/>
+      </a:hlink>
+      <a:folHlink>
+        <a:srgbClr val="954F72"/>
+      </a:folHlink>
+    </a:clrScheme>
+    <a:fontScheme name="Office">
+      <a:majorFont>
+        <a:latin typeface="Calibri Light" panose="020F0302020204030204"/>
+        <a:ea typeface=""/>
+        <a:cs typeface=""/>
+        <a:font script="Jpan" typeface="游ゴシック Light"/>
+        <a:font script="Hang" typeface="맑은 고딕"/>
+        <a:font script="Hans" typeface="等线 Light"/>
+        <a:font script="Hant" typeface="新細明體"/>
+        <a:font script="Arab" typeface="Times New Roman"/>
+        <a:font script="Hebr" typeface="Times New Roman"/>
+        <a:font script="Thai" typeface="Angsana New"/>
+        <a:font script="Ethi" typeface="Nyala"/>
+        <a:font script="Beng" typeface="Vrinda"/>
+        <a:font script="Gujr" typeface="Shruti"/>
+        <a:font script="Khmr" typeface="MoolBoran"/>
+        <a:font script="Knda" typeface="Tunga"/>
+        <a:font script="Guru" typeface="Raavi"/>
+        <a:font script="Cans" typeface="Euphemia"/>
+        <a:font script="Cher" typeface="Plantagenet Cherokee"/>
+        <a:font script="Yiii" typeface="Microsoft Yi Baiti"/>
+        <a:font script="Tibt" typeface="Microsoft Himalaya"/>
+        <a:font script="Thaa" typeface="MV Boli"/>
+        <a:font script="Deva" typeface="Mangal"/>
+        <a:font script="Telu" typeface="Gautami"/>
+        <a:font script="Taml" typeface="Latha"/>
+        <a:font script="Syrc" typeface="Estrangelo Edessa"/>
+        <a:font script="Orya" typeface="Kalinga"/>
+        <a:font script="Mlym" typeface="Kartika"/>
+        <a:font script="Laoo" typeface="DokChampa"/>
+        <a:font script="Sinh" typeface="Iskoola Pota"/>
+        <a:font script="Mong" typeface="Mongolian Baiti"/>
+        <a:font script="Viet" typeface="Times New Roman"/>
+        <a:font script="Uigh" typeface="Microsoft Uighur"/>
+        <a:font script="Geor" typeface="Sylfaen"/>
+        <a:font script="Armn" typeface="Arial"/>
+        <a:font script="Bugi" typeface="Leelawadee UI"/>
+        <a:font script="Bopo" typeface="Microsoft JhengHei"/>
+        <a:font script="Java" typeface="Javanese Text"/>
+        <a:font script="Lisu" typeface="Segoe UI"/>
+        <a:font script="Mymr" typeface="Myanmar Text"/>
+        <a:font script="Nkoo" typeface="Ebrima"/>
+        <a:font script="Olck" typeface="Nirmala UI"/>
+        <a:font script="Osma" typeface="Ebrima"/>
+        <a:font script="Phag" typeface="Phagspa"/>
+        <a:font script="Syrn" typeface="Estrangelo Edessa"/>
+        <a:font script="Syrj" typeface="Estrangelo Edessa"/>
+        <a:font script="Syre" typeface="Estrangelo Edessa"/>
+        <a:font script="Sora" typeface="Nirmala UI"/>
+        <a:font script="Tale" typeface="Microsoft Tai Le"/>
+        <a:font script="Talu" typeface="Microsoft New Tai Lue"/>
+        <a:font script="Tfng" typeface="Ebrima"/>
+      </a:majorFont>
+      <a:minorFont>
+        <a:latin typeface="Calibri" panose="020F0502020204030204"/>
+        <a:ea typeface=""/>
+        <a:cs typeface=""/>
+        <a:font script="Jpan" typeface="游ゴシック"/>
+        <a:font script="Hang" typeface="맑은 고딕"/>
+        <a:font script="Hans" typeface="等线"/>
+        <a:font script="Hant" typeface="新細明體"/>
+        <a:font script="Arab" typeface="Arial"/>
+        <a:font script="Hebr" typeface="Arial"/>
+        <a:font script="Thai" typeface="Cordia New"/>
+        <a:font script="Ethi" typeface="Nyala"/>
+        <a:font script="Beng" typeface="Vrinda"/>
+        <a:font script="Gujr" typeface="Shruti"/>
+        <a:font script="Khmr" typeface="DaunPenh"/>
+        <a:font script="Knda" typeface="Tunga"/>
+        <a:font script="Guru" typeface="Raavi"/>
+        <a:font script="Cans" typeface="Euphemia"/>
+        <a:font script="Cher" typeface="Plantagenet Cherokee"/>
+        <a:font script="Yiii" typeface="Microsoft Yi Baiti"/>
+        <a:font script="Tibt" typeface="Microsoft Himalaya"/>
+        <a:font script="Thaa" typeface="MV Boli"/>
+        <a:font script="Deva" typeface="Mangal"/>
+        <a:font script="Telu" typeface="Gautami"/>
+        <a:font script="Taml" typeface="Latha"/>
+        <a:font script="Syrc" typeface="Estrangelo Edessa"/>
+        <a:font script="Orya" typeface="Kalinga"/>
+        <a:font script="Mlym" typeface="Kartika"/>
+        <a:font script="Laoo" typeface="DokChampa"/>
+        <a:font script="Sinh" typeface="Iskoola Pota"/>
+        <a:font script="Mong" typeface="Mongolian Baiti"/>
+        <a:font script="Viet" typeface="Arial"/>
+        <a:font script="Uigh" typeface="Microsoft Uighur"/>
+        <a:font script="Geor" typeface="Sylfaen"/>
+        <a:font script="Armn" typeface="Arial"/>
+        <a:font script="Bugi" typeface="Leelawadee UI"/>
+        <a:font script="Bopo" typeface="Microsoft JhengHei"/>
+        <a:font script="Java" typeface="Javanese Text"/>
+        <a:font script="Lisu" typeface="Segoe UI"/>
+        <a:font script="Mymr" typeface="Myanmar Text"/>
+        <a:font script="Nkoo" typeface="Ebrima"/>
+        <a:font script="Olck" typeface="Nirmala UI"/>
+        <a:font script="Osma" typeface="Ebrima"/>
+        <a:font script="Phag" typeface="Phagspa"/>
+        <a:font script="Syrn" typeface="Estrangelo Edessa"/>
+        <a:font script="Syrj" typeface="Estrangelo Edessa"/>
+        <a:font script="Syre" typeface="Estrangelo Edessa"/>
+        <a:font script="Sora" typeface="Nirmala UI"/>
+        <a:font script="Tale" typeface="Microsoft Tai Le"/>
+        <a:font script="Talu" typeface="Microsoft New Tai Lue"/>
+        <a:font script="Tfng" typeface="Ebrima"/>
+      </a:minorFont>
+    </a:fontScheme>
+    <a:fmtScheme name="Office">
+      <a:fillStyleLst>
+        <a:solidFill>
+          <a:schemeClr val="phClr"/>
+        </a:solidFill>
+        <a:gradFill rotWithShape="1">
+          <a:gsLst>
+            <a:gs pos="0">
+              <a:schemeClr val="phClr">
+                <a:lumMod val="110000"/>
+                <a:satMod val="105000"/>
+                <a:tint val="67000"/>
+              </a:schemeClr>
+            </a:gs>
+            <a:gs pos="50000">
+              <a:schemeClr val="phClr">
+                <a:lumMod val="105000"/>
+                <a:satMod val="103000"/>
+                <a:tint val="73000"/>
+              </a:schemeClr>
+            </a:gs>
+            <a:gs pos="100000">
+              <a:schemeClr val="phClr">
+                <a:lumMod val="105000"/>
+                <a:satMod val="109000"/>
+                <a:tint val="81000"/>
+              </a:schemeClr>
+            </a:gs>
+          </a:gsLst>
+          <a:lin ang="5400000" scaled="0"/>
+        </a:gradFill>
+        <a:gradFill rotWithShape="1">
+          <a:gsLst>
+            <a:gs pos="0">
+              <a:schemeClr val="phClr">
+                <a:satMod val="103000"/>
+                <a:lumMod val="102000"/>
+                <a:tint val="94000"/>
+              </a:schemeClr>
+            </a:gs>
+            <a:gs pos="50000">
+              <a:schemeClr val="phClr">
+                <a:satMod val="110000"/>
+                <a:lumMod val="100000"/>
+                <a:shade val="100000"/>
+              </a:schemeClr>
+            </a:gs>
+            <a:gs pos="100000">
+              <a:schemeClr val="phClr">
+                <a:lumMod val="99000"/>
+                <a:satMod val="120000"/>
+                <a:shade val="78000"/>
+              </a:schemeClr>
+            </a:gs>
+          </a:gsLst>
+          <a:lin ang="5400000" scaled="0"/>
+        </a:gradFill>
+      </a:fillStyleLst>
+      <a:lnStyleLst>
+        <a:ln w="6350" cap="flat" cmpd="sng" algn="ctr">
+          <a:solidFill>
+            <a:schemeClr val="phClr"/>
+          </a:solidFill>
+          <a:prstDash val="solid"/>
+          <a:miter lim="800000"/>
+        </a:ln>
+        <a:ln w="12700" cap="flat" cmpd="sng" algn="ctr">
+          <a:solidFill>
+            <a:schemeClr val="phClr"/>
+          </a:solidFill>
+          <a:prstDash val="solid"/>
+          <a:miter lim="800000"/>
+        </a:ln>
+        <a:ln w="19050" cap="flat" cmpd="sng" algn="ctr">
+          <a:solidFill>
+            <a:schemeClr val="phClr"/>
+          </a:solidFill>
+          <a:prstDash val="solid"/>
+          <a:miter lim="800000"/>
+        </a:ln>
+      </a:lnStyleLst>
+      <a:effectStyleLst>
+        <a:effectStyle>
+          <a:effectLst/>
+        </a:effectStyle>
+        <a:effectStyle>
+          <a:effectLst/>
+        </a:effectStyle>
+        <a:effectStyle>
+          <a:effectLst>
+            <a:outerShdw blurRad="57150" dist="19050" dir="5400000" algn="ctr" rotWithShape="0">
+              <a:srgbClr val="000000">
+                <a:alpha val="63000"/>
+              </a:srgbClr>
+            </a:outerShdw>
+          </a:effectLst>
+        </a:effectStyle>
+      </a:effectStyleLst>
+      <a:bgFillStyleLst>
+        <a:solidFill>
+          <a:schemeClr val="phClr"/>
+        </a:solidFill>
+        <a:solidFill>
+          <a:schemeClr val="phClr">
+            <a:tint val="95000"/>
+            <a:satMod val="170000"/>
+          </a:schemeClr>
+        </a:solidFill>
+        <a:gradFill rotWithShape="1">
+          <a:gsLst>
+            <a:gs pos="0">
+              <a:schemeClr val="phClr">
+                <a:tint val="93000"/>
+                <a:satMod val="150000"/>
+                <a:shade val="98000"/>
+                <a:lumMod val="102000"/>
+              </a:schemeClr>
+            </a:gs>
+            <a:gs pos="50000">
+              <a:schemeClr val="phClr">
+                <a:tint val="98000"/>
+                <a:satMod val="130000"/>
+                <a:shade val="90000"/>
+                <a:lumMod val="103000"/>
+              </a:schemeClr>
+            </a:gs>
+            <a:gs pos="100000">
+              <a:schemeClr val="phClr">
+                <a:shade val="63000"/>
+                <a:satMod val="120000"/>
+              </a:schemeClr>
+            </a:gs>
+          </a:gsLst>
+          <a:lin ang="5400000" scaled="0"/>
+        </a:gradFill>
+      </a:bgFillStyleLst>
+    </a:fmtScheme>
+  </a:themeElements>
+  <a:objectDefaults/>
+  <a:extraClrSchemeLst/>
+  <a:extLst>
+    <a:ext uri="{05A4C25C-085E-4340-85A3-A5531E510DB2}">
+      <thm15:themeFamily xmlns:thm15="http://schemas.microsoft.com/office/thememl/2012/main" name="Office Theme" id="{62F939B6-93AF-4DB8-9C6B-D6C7DFDC589F}" vid="{4A3C46E8-61CC-4603-A589-7422A47A8E4A}"/>
+    </a:ext>
+  </a:extLst>
+</a:theme>
 </file>
</xml_diff>

<commit_message>
Added WebSocket + new APIs
</commit_message>
<xml_diff>
--- a/design/PCB Design.pptx
+++ b/design/PCB Design.pptx
@@ -123,7 +123,7 @@
 <file path=ppt/revisionInfo.xml><?xml version="1.0" encoding="utf-8"?>
 <p1510:revInfo xmlns:a="http://schemas.openxmlformats.org/drawingml/2006/main" xmlns:r="http://schemas.openxmlformats.org/officeDocument/2006/relationships" xmlns:p1510="http://schemas.microsoft.com/office/powerpoint/2015/10/main">
   <p1510:revLst>
-    <p1510:client id="{C3A6CD6C-1DA5-47FB-A775-C4A3C3FB9D49}" v="166" dt="2023-05-28T01:39:37.733"/>
+    <p1510:client id="{C3A6CD6C-1DA5-47FB-A775-C4A3C3FB9D49}" v="179" dt="2023-06-07T09:19:34.757"/>
   </p1510:revLst>
 </p1510:revInfo>
 </file>
@@ -133,12 +133,12 @@
   <pc:docChgLst>
     <pc:chgData name="Olivier Grenadou" userId="02d4787ce9b02c5a" providerId="LiveId" clId="{C3A6CD6C-1DA5-47FB-A775-C4A3C3FB9D49}"/>
     <pc:docChg chg="undo custSel addSld modSld modMainMaster">
-      <pc:chgData name="Olivier Grenadou" userId="02d4787ce9b02c5a" providerId="LiveId" clId="{C3A6CD6C-1DA5-47FB-A775-C4A3C3FB9D49}" dt="2023-05-28T07:08:43.986" v="1773" actId="3064"/>
+      <pc:chgData name="Olivier Grenadou" userId="02d4787ce9b02c5a" providerId="LiveId" clId="{C3A6CD6C-1DA5-47FB-A775-C4A3C3FB9D49}" dt="2023-06-07T09:19:34.757" v="1802" actId="206"/>
       <pc:docMkLst>
         <pc:docMk/>
       </pc:docMkLst>
       <pc:sldChg chg="addSp delSp modSp mod">
-        <pc:chgData name="Olivier Grenadou" userId="02d4787ce9b02c5a" providerId="LiveId" clId="{C3A6CD6C-1DA5-47FB-A775-C4A3C3FB9D49}" dt="2023-05-28T07:08:43.986" v="1773" actId="3064"/>
+        <pc:chgData name="Olivier Grenadou" userId="02d4787ce9b02c5a" providerId="LiveId" clId="{C3A6CD6C-1DA5-47FB-A775-C4A3C3FB9D49}" dt="2023-06-07T09:19:34.757" v="1802" actId="206"/>
         <pc:sldMkLst>
           <pc:docMk/>
           <pc:sldMk cId="3274058770" sldId="256"/>
@@ -1288,7 +1288,7 @@
           </ac:spMkLst>
         </pc:spChg>
         <pc:spChg chg="add mod topLvl">
-          <ac:chgData name="Olivier Grenadou" userId="02d4787ce9b02c5a" providerId="LiveId" clId="{C3A6CD6C-1DA5-47FB-A775-C4A3C3FB9D49}" dt="2023-05-28T01:53:08.175" v="1765" actId="3064"/>
+          <ac:chgData name="Olivier Grenadou" userId="02d4787ce9b02c5a" providerId="LiveId" clId="{C3A6CD6C-1DA5-47FB-A775-C4A3C3FB9D49}" dt="2023-06-07T08:00:59.072" v="1779" actId="20577"/>
           <ac:spMkLst>
             <pc:docMk/>
             <pc:sldMk cId="3274058770" sldId="256"/>
@@ -1400,7 +1400,7 @@
           </ac:spMkLst>
         </pc:spChg>
         <pc:spChg chg="add mod">
-          <ac:chgData name="Olivier Grenadou" userId="02d4787ce9b02c5a" providerId="LiveId" clId="{C3A6CD6C-1DA5-47FB-A775-C4A3C3FB9D49}" dt="2023-05-28T01:42:08.034" v="1756" actId="1582"/>
+          <ac:chgData name="Olivier Grenadou" userId="02d4787ce9b02c5a" providerId="LiveId" clId="{C3A6CD6C-1DA5-47FB-A775-C4A3C3FB9D49}" dt="2023-06-07T09:19:34.757" v="1802" actId="206"/>
           <ac:spMkLst>
             <pc:docMk/>
             <pc:sldMk cId="3274058770" sldId="256"/>
@@ -1640,7 +1640,7 @@
           </ac:grpSpMkLst>
         </pc:grpChg>
         <pc:grpChg chg="add mod topLvl">
-          <ac:chgData name="Olivier Grenadou" userId="02d4787ce9b02c5a" providerId="LiveId" clId="{C3A6CD6C-1DA5-47FB-A775-C4A3C3FB9D49}" dt="2023-05-24T08:39:27.866" v="1396" actId="165"/>
+          <ac:chgData name="Olivier Grenadou" userId="02d4787ce9b02c5a" providerId="LiveId" clId="{C3A6CD6C-1DA5-47FB-A775-C4A3C3FB9D49}" dt="2023-06-07T08:36:02.506" v="1788" actId="1076"/>
           <ac:grpSpMkLst>
             <pc:docMk/>
             <pc:sldMk cId="3274058770" sldId="256"/>
@@ -1663,8 +1663,8 @@
             <ac:grpSpMk id="1113" creationId="{C0951862-BAA0-C728-64FB-75AE431A5512}"/>
           </ac:grpSpMkLst>
         </pc:grpChg>
-        <pc:grpChg chg="add mod topLvl">
-          <ac:chgData name="Olivier Grenadou" userId="02d4787ce9b02c5a" providerId="LiveId" clId="{C3A6CD6C-1DA5-47FB-A775-C4A3C3FB9D49}" dt="2023-05-27T08:42:39.433" v="1725" actId="1036"/>
+        <pc:grpChg chg="add del mod topLvl">
+          <ac:chgData name="Olivier Grenadou" userId="02d4787ce9b02c5a" providerId="LiveId" clId="{C3A6CD6C-1DA5-47FB-A775-C4A3C3FB9D49}" dt="2023-06-07T08:35:57.986" v="1787" actId="478"/>
           <ac:grpSpMkLst>
             <pc:docMk/>
             <pc:sldMk cId="3274058770" sldId="256"/>
@@ -1672,7 +1672,7 @@
           </ac:grpSpMkLst>
         </pc:grpChg>
         <pc:grpChg chg="add mod topLvl">
-          <ac:chgData name="Olivier Grenadou" userId="02d4787ce9b02c5a" providerId="LiveId" clId="{C3A6CD6C-1DA5-47FB-A775-C4A3C3FB9D49}" dt="2023-05-24T08:39:27.866" v="1396" actId="165"/>
+          <ac:chgData name="Olivier Grenadou" userId="02d4787ce9b02c5a" providerId="LiveId" clId="{C3A6CD6C-1DA5-47FB-A775-C4A3C3FB9D49}" dt="2023-06-07T08:35:53.100" v="1786" actId="1036"/>
           <ac:grpSpMkLst>
             <pc:docMk/>
             <pc:sldMk cId="3274058770" sldId="256"/>
@@ -1695,8 +1695,8 @@
             <ac:grpSpMk id="1126" creationId="{F9E064E6-142D-CBF1-9769-85BBED034B17}"/>
           </ac:grpSpMkLst>
         </pc:grpChg>
-        <pc:grpChg chg="add mod topLvl">
-          <ac:chgData name="Olivier Grenadou" userId="02d4787ce9b02c5a" providerId="LiveId" clId="{C3A6CD6C-1DA5-47FB-A775-C4A3C3FB9D49}" dt="2023-05-24T08:39:27.866" v="1396" actId="165"/>
+        <pc:grpChg chg="add del mod topLvl">
+          <ac:chgData name="Olivier Grenadou" userId="02d4787ce9b02c5a" providerId="LiveId" clId="{C3A6CD6C-1DA5-47FB-A775-C4A3C3FB9D49}" dt="2023-06-07T08:35:43.752" v="1780" actId="478"/>
           <ac:grpSpMkLst>
             <pc:docMk/>
             <pc:sldMk cId="3274058770" sldId="256"/>
@@ -1912,7 +1912,7 @@
           </ac:picMkLst>
         </pc:picChg>
         <pc:picChg chg="mod topLvl">
-          <ac:chgData name="Olivier Grenadou" userId="02d4787ce9b02c5a" providerId="LiveId" clId="{C3A6CD6C-1DA5-47FB-A775-C4A3C3FB9D49}" dt="2023-05-24T08:39:27.866" v="1396" actId="165"/>
+          <ac:chgData name="Olivier Grenadou" userId="02d4787ce9b02c5a" providerId="LiveId" clId="{C3A6CD6C-1DA5-47FB-A775-C4A3C3FB9D49}" dt="2023-06-07T09:18:39.441" v="1790" actId="1076"/>
           <ac:picMkLst>
             <pc:docMk/>
             <pc:sldMk cId="3274058770" sldId="256"/>
@@ -2595,7 +2595,7 @@
           <a:p>
             <a:fld id="{277B8CFC-F3EE-4732-AB96-F8E7CFAED285}" type="datetimeFigureOut">
               <a:rPr lang="en-US" smtClean="0"/>
-              <a:t>5/28/2023</a:t>
+              <a:t>6/7/2023</a:t>
             </a:fld>
             <a:endParaRPr lang="en-US"/>
           </a:p>
@@ -2773,7 +2773,7 @@
           <a:p>
             <a:fld id="{B0737B90-9943-4916-944E-9C37AE4F7AB7}" type="datetimeFigureOut">
               <a:rPr lang="en-US" smtClean="0"/>
-              <a:t>5/28/2023</a:t>
+              <a:t>6/7/2023</a:t>
             </a:fld>
             <a:endParaRPr lang="en-US"/>
           </a:p>
@@ -3172,7 +3172,7 @@
           <a:p>
             <a:fld id="{2B1F1804-B436-4A2D-822D-118D5578DF06}" type="datetime1">
               <a:rPr lang="en-US" smtClean="0"/>
-              <a:t>5/28/2023</a:t>
+              <a:t>6/7/2023</a:t>
             </a:fld>
             <a:endParaRPr lang="en-US"/>
           </a:p>
@@ -3342,7 +3342,7 @@
           <a:p>
             <a:fld id="{0615578F-07B7-4756-B430-9A1FF6B67213}" type="datetime1">
               <a:rPr lang="en-US" smtClean="0"/>
-              <a:t>5/28/2023</a:t>
+              <a:t>6/7/2023</a:t>
             </a:fld>
             <a:endParaRPr lang="en-US"/>
           </a:p>
@@ -3522,7 +3522,7 @@
           <a:p>
             <a:fld id="{E0FD3AFC-6DCD-4847-85EB-A04866E0F2AC}" type="datetime1">
               <a:rPr lang="en-US" smtClean="0"/>
-              <a:t>5/28/2023</a:t>
+              <a:t>6/7/2023</a:t>
             </a:fld>
             <a:endParaRPr lang="en-US"/>
           </a:p>
@@ -3692,7 +3692,7 @@
           <a:p>
             <a:fld id="{FF3E18B2-C045-415A-A91C-B4D5AC1DF18C}" type="datetime1">
               <a:rPr lang="en-US" smtClean="0"/>
-              <a:t>5/28/2023</a:t>
+              <a:t>6/7/2023</a:t>
             </a:fld>
             <a:endParaRPr lang="en-US"/>
           </a:p>
@@ -3936,7 +3936,7 @@
           <a:p>
             <a:fld id="{DF3A76A6-507F-4A1C-A842-8C95BB9571BC}" type="datetime1">
               <a:rPr lang="en-US" smtClean="0"/>
-              <a:t>5/28/2023</a:t>
+              <a:t>6/7/2023</a:t>
             </a:fld>
             <a:endParaRPr lang="en-US"/>
           </a:p>
@@ -4168,7 +4168,7 @@
           <a:p>
             <a:fld id="{0C30588C-6521-4B47-BF8D-DCAAE9ADF805}" type="datetime1">
               <a:rPr lang="en-US" smtClean="0"/>
-              <a:t>5/28/2023</a:t>
+              <a:t>6/7/2023</a:t>
             </a:fld>
             <a:endParaRPr lang="en-US"/>
           </a:p>
@@ -4535,7 +4535,7 @@
           <a:p>
             <a:fld id="{0EB01D5B-4847-4CEF-8103-7D0C36E4817B}" type="datetime1">
               <a:rPr lang="en-US" smtClean="0"/>
-              <a:t>5/28/2023</a:t>
+              <a:t>6/7/2023</a:t>
             </a:fld>
             <a:endParaRPr lang="en-US"/>
           </a:p>
@@ -4653,7 +4653,7 @@
           <a:p>
             <a:fld id="{39B86BF2-4927-4146-8257-A2751FCEE87D}" type="datetime1">
               <a:rPr lang="en-US" smtClean="0"/>
-              <a:t>5/28/2023</a:t>
+              <a:t>6/7/2023</a:t>
             </a:fld>
             <a:endParaRPr lang="en-US"/>
           </a:p>
@@ -4748,7 +4748,7 @@
           <a:p>
             <a:fld id="{D0C6DEB9-9F32-4450-BF5A-AC4F8D0E6898}" type="datetime1">
               <a:rPr lang="en-US" smtClean="0"/>
-              <a:t>5/28/2023</a:t>
+              <a:t>6/7/2023</a:t>
             </a:fld>
             <a:endParaRPr lang="en-US"/>
           </a:p>
@@ -5025,7 +5025,7 @@
           <a:p>
             <a:fld id="{9105E500-D918-411E-888C-3AFFE5BE457C}" type="datetime1">
               <a:rPr lang="en-US" smtClean="0"/>
-              <a:t>5/28/2023</a:t>
+              <a:t>6/7/2023</a:t>
             </a:fld>
             <a:endParaRPr lang="en-US"/>
           </a:p>
@@ -5282,7 +5282,7 @@
           <a:p>
             <a:fld id="{F5364EA7-28AC-4BD3-8C1C-0EE626E1824A}" type="datetime1">
               <a:rPr lang="en-US" smtClean="0"/>
-              <a:t>5/28/2023</a:t>
+              <a:t>6/7/2023</a:t>
             </a:fld>
             <a:endParaRPr lang="en-US"/>
           </a:p>
@@ -5495,7 +5495,7 @@
           <a:p>
             <a:fld id="{423E8357-C248-4E4D-893B-B2D5385FA443}" type="datetime1">
               <a:rPr lang="en-US" smtClean="0"/>
-              <a:t>5/28/2023</a:t>
+              <a:t>6/7/2023</a:t>
             </a:fld>
             <a:endParaRPr lang="en-US"/>
           </a:p>
@@ -9617,7 +9617,7 @@
         </p:nvGrpSpPr>
         <p:grpSpPr>
           <a:xfrm>
-            <a:off x="3606276" y="4099873"/>
+            <a:off x="3705908" y="4099979"/>
             <a:ext cx="96139" cy="86801"/>
             <a:chOff x="5638800" y="2824162"/>
             <a:chExt cx="111919" cy="97631"/>
@@ -10100,136 +10100,6 @@
       </p:sp>
       <p:grpSp>
         <p:nvGrpSpPr>
-          <p:cNvPr id="1117" name="Group 1116">
-            <a:extLst>
-              <a:ext uri="{FF2B5EF4-FFF2-40B4-BE49-F238E27FC236}">
-                <a16:creationId xmlns:a16="http://schemas.microsoft.com/office/drawing/2014/main" id="{BCAB0468-9903-4F3D-0ED5-8801673DF900}"/>
-              </a:ext>
-            </a:extLst>
-          </p:cNvPr>
-          <p:cNvGrpSpPr/>
-          <p:nvPr/>
-        </p:nvGrpSpPr>
-        <p:grpSpPr>
-          <a:xfrm>
-            <a:off x="3705486" y="4102262"/>
-            <a:ext cx="96139" cy="86801"/>
-            <a:chOff x="5638800" y="2824162"/>
-            <a:chExt cx="111919" cy="97631"/>
-          </a:xfrm>
-        </p:grpSpPr>
-        <p:sp>
-          <p:nvSpPr>
-            <p:cNvPr id="1118" name="Rectangle 1117">
-              <a:extLst>
-                <a:ext uri="{FF2B5EF4-FFF2-40B4-BE49-F238E27FC236}">
-                  <a16:creationId xmlns:a16="http://schemas.microsoft.com/office/drawing/2014/main" id="{CB51028F-EE7F-CE15-CAC5-F3983121F2A3}"/>
-                </a:ext>
-              </a:extLst>
-            </p:cNvPr>
-            <p:cNvSpPr/>
-            <p:nvPr/>
-          </p:nvSpPr>
-          <p:spPr>
-            <a:xfrm>
-              <a:off x="5638800" y="2824162"/>
-              <a:ext cx="111919" cy="97631"/>
-            </a:xfrm>
-            <a:prstGeom prst="rect">
-              <a:avLst/>
-            </a:prstGeom>
-            <a:solidFill>
-              <a:schemeClr val="accent6">
-                <a:lumMod val="60000"/>
-                <a:lumOff val="40000"/>
-              </a:schemeClr>
-            </a:solidFill>
-            <a:ln>
-              <a:noFill/>
-            </a:ln>
-          </p:spPr>
-          <p:style>
-            <a:lnRef idx="2">
-              <a:schemeClr val="dk1">
-                <a:shade val="50000"/>
-              </a:schemeClr>
-            </a:lnRef>
-            <a:fillRef idx="1">
-              <a:schemeClr val="dk1"/>
-            </a:fillRef>
-            <a:effectRef idx="0">
-              <a:schemeClr val="dk1"/>
-            </a:effectRef>
-            <a:fontRef idx="minor">
-              <a:schemeClr val="lt1"/>
-            </a:fontRef>
-          </p:style>
-          <p:txBody>
-            <a:bodyPr lIns="0" tIns="0" rIns="0" bIns="0" rtlCol="0" anchor="ctr"/>
-            <a:lstStyle/>
-            <a:p>
-              <a:pPr algn="ctr"/>
-              <a:endParaRPr lang="en-US" sz="600" dirty="0"/>
-            </a:p>
-          </p:txBody>
-        </p:sp>
-        <p:sp>
-          <p:nvSpPr>
-            <p:cNvPr id="1119" name="Oval 1118">
-              <a:extLst>
-                <a:ext uri="{FF2B5EF4-FFF2-40B4-BE49-F238E27FC236}">
-                  <a16:creationId xmlns:a16="http://schemas.microsoft.com/office/drawing/2014/main" id="{06ED75B4-C9EE-5DEF-7EA0-94F93847C7C0}"/>
-                </a:ext>
-              </a:extLst>
-            </p:cNvPr>
-            <p:cNvSpPr/>
-            <p:nvPr/>
-          </p:nvSpPr>
-          <p:spPr>
-            <a:xfrm>
-              <a:off x="5667375" y="2844800"/>
-              <a:ext cx="50800" cy="53975"/>
-            </a:xfrm>
-            <a:prstGeom prst="ellipse">
-              <a:avLst/>
-            </a:prstGeom>
-            <a:solidFill>
-              <a:srgbClr val="FF0000"/>
-            </a:solidFill>
-            <a:ln>
-              <a:solidFill>
-                <a:srgbClr val="FFC000"/>
-              </a:solidFill>
-            </a:ln>
-          </p:spPr>
-          <p:style>
-            <a:lnRef idx="2">
-              <a:schemeClr val="accent1">
-                <a:shade val="50000"/>
-              </a:schemeClr>
-            </a:lnRef>
-            <a:fillRef idx="1">
-              <a:schemeClr val="accent1"/>
-            </a:fillRef>
-            <a:effectRef idx="0">
-              <a:schemeClr val="accent1"/>
-            </a:effectRef>
-            <a:fontRef idx="minor">
-              <a:schemeClr val="lt1"/>
-            </a:fontRef>
-          </p:style>
-          <p:txBody>
-            <a:bodyPr rtlCol="0" anchor="ctr"/>
-            <a:lstStyle/>
-            <a:p>
-              <a:pPr algn="ctr"/>
-              <a:endParaRPr lang="en-US" sz="1350"/>
-            </a:p>
-          </p:txBody>
-        </p:sp>
-      </p:grpSp>
-      <p:grpSp>
-        <p:nvGrpSpPr>
           <p:cNvPr id="1120" name="Group 1119">
             <a:extLst>
               <a:ext uri="{FF2B5EF4-FFF2-40B4-BE49-F238E27FC236}">
@@ -10242,7 +10112,7 @@
         </p:nvGrpSpPr>
         <p:grpSpPr>
           <a:xfrm>
-            <a:off x="3606276" y="3902020"/>
+            <a:off x="3704583" y="3904941"/>
             <a:ext cx="96139" cy="86801"/>
             <a:chOff x="5638800" y="2824162"/>
             <a:chExt cx="111919" cy="97631"/>
@@ -10585,136 +10455,6 @@
             </a:prstGeom>
             <a:solidFill>
               <a:srgbClr val="00B0F0"/>
-            </a:solidFill>
-            <a:ln>
-              <a:solidFill>
-                <a:srgbClr val="FFC000"/>
-              </a:solidFill>
-            </a:ln>
-          </p:spPr>
-          <p:style>
-            <a:lnRef idx="2">
-              <a:schemeClr val="accent1">
-                <a:shade val="50000"/>
-              </a:schemeClr>
-            </a:lnRef>
-            <a:fillRef idx="1">
-              <a:schemeClr val="accent1"/>
-            </a:fillRef>
-            <a:effectRef idx="0">
-              <a:schemeClr val="accent1"/>
-            </a:effectRef>
-            <a:fontRef idx="minor">
-              <a:schemeClr val="lt1"/>
-            </a:fontRef>
-          </p:style>
-          <p:txBody>
-            <a:bodyPr rtlCol="0" anchor="ctr"/>
-            <a:lstStyle/>
-            <a:p>
-              <a:pPr algn="ctr"/>
-              <a:endParaRPr lang="en-US" sz="1350"/>
-            </a:p>
-          </p:txBody>
-        </p:sp>
-      </p:grpSp>
-      <p:grpSp>
-        <p:nvGrpSpPr>
-          <p:cNvPr id="1129" name="Group 1128">
-            <a:extLst>
-              <a:ext uri="{FF2B5EF4-FFF2-40B4-BE49-F238E27FC236}">
-                <a16:creationId xmlns:a16="http://schemas.microsoft.com/office/drawing/2014/main" id="{9A7BAA31-08D2-842C-ED3A-2F657F6AD477}"/>
-              </a:ext>
-            </a:extLst>
-          </p:cNvPr>
-          <p:cNvGrpSpPr/>
-          <p:nvPr/>
-        </p:nvGrpSpPr>
-        <p:grpSpPr>
-          <a:xfrm>
-            <a:off x="3705486" y="3901234"/>
-            <a:ext cx="96139" cy="86801"/>
-            <a:chOff x="5638800" y="2824162"/>
-            <a:chExt cx="111919" cy="97631"/>
-          </a:xfrm>
-        </p:grpSpPr>
-        <p:sp>
-          <p:nvSpPr>
-            <p:cNvPr id="1130" name="Rectangle 1129">
-              <a:extLst>
-                <a:ext uri="{FF2B5EF4-FFF2-40B4-BE49-F238E27FC236}">
-                  <a16:creationId xmlns:a16="http://schemas.microsoft.com/office/drawing/2014/main" id="{51338400-D4D1-5B85-F6DA-95109A6B66A2}"/>
-                </a:ext>
-              </a:extLst>
-            </p:cNvPr>
-            <p:cNvSpPr/>
-            <p:nvPr/>
-          </p:nvSpPr>
-          <p:spPr>
-            <a:xfrm>
-              <a:off x="5638800" y="2824162"/>
-              <a:ext cx="111919" cy="97631"/>
-            </a:xfrm>
-            <a:prstGeom prst="rect">
-              <a:avLst/>
-            </a:prstGeom>
-            <a:solidFill>
-              <a:schemeClr val="accent6">
-                <a:lumMod val="60000"/>
-                <a:lumOff val="40000"/>
-              </a:schemeClr>
-            </a:solidFill>
-            <a:ln>
-              <a:noFill/>
-            </a:ln>
-          </p:spPr>
-          <p:style>
-            <a:lnRef idx="2">
-              <a:schemeClr val="dk1">
-                <a:shade val="50000"/>
-              </a:schemeClr>
-            </a:lnRef>
-            <a:fillRef idx="1">
-              <a:schemeClr val="dk1"/>
-            </a:fillRef>
-            <a:effectRef idx="0">
-              <a:schemeClr val="dk1"/>
-            </a:effectRef>
-            <a:fontRef idx="minor">
-              <a:schemeClr val="lt1"/>
-            </a:fontRef>
-          </p:style>
-          <p:txBody>
-            <a:bodyPr lIns="0" tIns="0" rIns="0" bIns="0" rtlCol="0" anchor="ctr"/>
-            <a:lstStyle/>
-            <a:p>
-              <a:pPr algn="ctr"/>
-              <a:endParaRPr lang="en-US" sz="600" dirty="0"/>
-            </a:p>
-          </p:txBody>
-        </p:sp>
-        <p:sp>
-          <p:nvSpPr>
-            <p:cNvPr id="1131" name="Oval 1130">
-              <a:extLst>
-                <a:ext uri="{FF2B5EF4-FFF2-40B4-BE49-F238E27FC236}">
-                  <a16:creationId xmlns:a16="http://schemas.microsoft.com/office/drawing/2014/main" id="{1F7D84E4-8FE0-7CA4-A597-EF23EEB87732}"/>
-                </a:ext>
-              </a:extLst>
-            </p:cNvPr>
-            <p:cNvSpPr/>
-            <p:nvPr/>
-          </p:nvSpPr>
-          <p:spPr>
-            <a:xfrm>
-              <a:off x="5667375" y="2844800"/>
-              <a:ext cx="50800" cy="53975"/>
-            </a:xfrm>
-            <a:prstGeom prst="ellipse">
-              <a:avLst/>
-            </a:prstGeom>
-            <a:solidFill>
-              <a:srgbClr val="FF0000"/>
             </a:solidFill>
             <a:ln>
               <a:solidFill>
@@ -14267,15 +14007,22 @@
               </a:lnSpc>
             </a:pPr>
             <a:r>
-              <a:rPr lang="en-US" sz="450" b="1" dirty="0">
+              <a:rPr lang="en-US" sz="450" b="1">
                 <a:solidFill>
                   <a:schemeClr val="tx1"/>
                 </a:solidFill>
                 <a:latin typeface="Courier New" panose="02070309020205020404" pitchFamily="49" charset="0"/>
                 <a:cs typeface="Courier New" panose="02070309020205020404" pitchFamily="49" charset="0"/>
               </a:rPr>
-              <a:t>VCC50-TRIG-ECHO-GND</a:t>
+              <a:t>GND-TRIG-ECHO-VCC50</a:t>
             </a:r>
+            <a:endParaRPr lang="en-US" sz="450" b="1" dirty="0">
+              <a:solidFill>
+                <a:schemeClr val="tx1"/>
+              </a:solidFill>
+              <a:latin typeface="Courier New" panose="02070309020205020404" pitchFamily="49" charset="0"/>
+              <a:cs typeface="Courier New" panose="02070309020205020404" pitchFamily="49" charset="0"/>
+            </a:endParaRPr>
           </a:p>
         </p:txBody>
       </p:sp>
@@ -17484,8 +17231,8 @@
         </p:nvSpPr>
         <p:spPr>
           <a:xfrm>
-            <a:off x="3279738" y="3956049"/>
-            <a:ext cx="561762" cy="105361"/>
+            <a:off x="3268058" y="3408179"/>
+            <a:ext cx="583669" cy="564815"/>
           </a:xfrm>
           <a:custGeom>
             <a:avLst/>
@@ -17580,6 +17327,116 @@
               <a:gd name="connsiteY3" fmla="*/ 84138 h 105361"/>
               <a:gd name="connsiteX4" fmla="*/ 560425 w 561762"/>
               <a:gd name="connsiteY4" fmla="*/ 46037 h 105361"/>
+              <a:gd name="connsiteX0" fmla="*/ 38 w 556546"/>
+              <a:gd name="connsiteY0" fmla="*/ 0 h 109305"/>
+              <a:gd name="connsiteX1" fmla="*/ 54013 w 556546"/>
+              <a:gd name="connsiteY1" fmla="*/ 95250 h 109305"/>
+              <a:gd name="connsiteX2" fmla="*/ 298488 w 556546"/>
+              <a:gd name="connsiteY2" fmla="*/ 98425 h 109305"/>
+              <a:gd name="connsiteX3" fmla="*/ 495338 w 556546"/>
+              <a:gd name="connsiteY3" fmla="*/ 84138 h 109305"/>
+              <a:gd name="connsiteX4" fmla="*/ 554930 w 556546"/>
+              <a:gd name="connsiteY4" fmla="*/ 109305 h 109305"/>
+              <a:gd name="connsiteX0" fmla="*/ 38 w 572399"/>
+              <a:gd name="connsiteY0" fmla="*/ 0 h 105361"/>
+              <a:gd name="connsiteX1" fmla="*/ 54013 w 572399"/>
+              <a:gd name="connsiteY1" fmla="*/ 95250 h 105361"/>
+              <a:gd name="connsiteX2" fmla="*/ 298488 w 572399"/>
+              <a:gd name="connsiteY2" fmla="*/ 98425 h 105361"/>
+              <a:gd name="connsiteX3" fmla="*/ 495338 w 572399"/>
+              <a:gd name="connsiteY3" fmla="*/ 84138 h 105361"/>
+              <a:gd name="connsiteX4" fmla="*/ 571416 w 572399"/>
+              <a:gd name="connsiteY4" fmla="*/ 90697 h 105361"/>
+              <a:gd name="connsiteX0" fmla="*/ 38 w 571600"/>
+              <a:gd name="connsiteY0" fmla="*/ 0 h 106773"/>
+              <a:gd name="connsiteX1" fmla="*/ 54013 w 571600"/>
+              <a:gd name="connsiteY1" fmla="*/ 95250 h 106773"/>
+              <a:gd name="connsiteX2" fmla="*/ 298488 w 571600"/>
+              <a:gd name="connsiteY2" fmla="*/ 98425 h 106773"/>
+              <a:gd name="connsiteX3" fmla="*/ 324986 w 571600"/>
+              <a:gd name="connsiteY3" fmla="*/ 56226 h 106773"/>
+              <a:gd name="connsiteX4" fmla="*/ 571416 w 571600"/>
+              <a:gd name="connsiteY4" fmla="*/ 90697 h 106773"/>
+              <a:gd name="connsiteX0" fmla="*/ 18 w 571580"/>
+              <a:gd name="connsiteY0" fmla="*/ 0 h 99672"/>
+              <a:gd name="connsiteX1" fmla="*/ 81469 w 571580"/>
+              <a:gd name="connsiteY1" fmla="*/ 6861 h 99672"/>
+              <a:gd name="connsiteX2" fmla="*/ 298468 w 571580"/>
+              <a:gd name="connsiteY2" fmla="*/ 98425 h 99672"/>
+              <a:gd name="connsiteX3" fmla="*/ 324966 w 571580"/>
+              <a:gd name="connsiteY3" fmla="*/ 56226 h 99672"/>
+              <a:gd name="connsiteX4" fmla="*/ 571396 w 571580"/>
+              <a:gd name="connsiteY4" fmla="*/ 90697 h 99672"/>
+              <a:gd name="connsiteX0" fmla="*/ 24 w 571586"/>
+              <a:gd name="connsiteY0" fmla="*/ 0 h 99672"/>
+              <a:gd name="connsiteX1" fmla="*/ 81475 w 571586"/>
+              <a:gd name="connsiteY1" fmla="*/ 6861 h 99672"/>
+              <a:gd name="connsiteX2" fmla="*/ 298474 w 571586"/>
+              <a:gd name="connsiteY2" fmla="*/ 98425 h 99672"/>
+              <a:gd name="connsiteX3" fmla="*/ 324972 w 571586"/>
+              <a:gd name="connsiteY3" fmla="*/ 56226 h 99672"/>
+              <a:gd name="connsiteX4" fmla="*/ 571402 w 571586"/>
+              <a:gd name="connsiteY4" fmla="*/ 90697 h 99672"/>
+              <a:gd name="connsiteX0" fmla="*/ 0 w 571562"/>
+              <a:gd name="connsiteY0" fmla="*/ 3176 h 102848"/>
+              <a:gd name="connsiteX1" fmla="*/ 81451 w 571562"/>
+              <a:gd name="connsiteY1" fmla="*/ 10037 h 102848"/>
+              <a:gd name="connsiteX2" fmla="*/ 298450 w 571562"/>
+              <a:gd name="connsiteY2" fmla="*/ 101601 h 102848"/>
+              <a:gd name="connsiteX3" fmla="*/ 324948 w 571562"/>
+              <a:gd name="connsiteY3" fmla="*/ 59402 h 102848"/>
+              <a:gd name="connsiteX4" fmla="*/ 571378 w 571562"/>
+              <a:gd name="connsiteY4" fmla="*/ 93873 h 102848"/>
+              <a:gd name="connsiteX0" fmla="*/ 0 w 571562"/>
+              <a:gd name="connsiteY0" fmla="*/ 5707 h 105379"/>
+              <a:gd name="connsiteX1" fmla="*/ 81451 w 571562"/>
+              <a:gd name="connsiteY1" fmla="*/ 12568 h 105379"/>
+              <a:gd name="connsiteX2" fmla="*/ 298450 w 571562"/>
+              <a:gd name="connsiteY2" fmla="*/ 104132 h 105379"/>
+              <a:gd name="connsiteX3" fmla="*/ 324948 w 571562"/>
+              <a:gd name="connsiteY3" fmla="*/ 61933 h 105379"/>
+              <a:gd name="connsiteX4" fmla="*/ 571378 w 571562"/>
+              <a:gd name="connsiteY4" fmla="*/ 96404 h 105379"/>
+              <a:gd name="connsiteX0" fmla="*/ 0 w 571562"/>
+              <a:gd name="connsiteY0" fmla="*/ 3197 h 93894"/>
+              <a:gd name="connsiteX1" fmla="*/ 81451 w 571562"/>
+              <a:gd name="connsiteY1" fmla="*/ 10058 h 93894"/>
+              <a:gd name="connsiteX2" fmla="*/ 166565 w 571562"/>
+              <a:gd name="connsiteY2" fmla="*/ 43936 h 93894"/>
+              <a:gd name="connsiteX3" fmla="*/ 324948 w 571562"/>
+              <a:gd name="connsiteY3" fmla="*/ 59423 h 93894"/>
+              <a:gd name="connsiteX4" fmla="*/ 571378 w 571562"/>
+              <a:gd name="connsiteY4" fmla="*/ 93894 h 93894"/>
+              <a:gd name="connsiteX0" fmla="*/ 0 w 571562"/>
+              <a:gd name="connsiteY0" fmla="*/ 2980 h 93677"/>
+              <a:gd name="connsiteX1" fmla="*/ 81451 w 571562"/>
+              <a:gd name="connsiteY1" fmla="*/ 9841 h 93677"/>
+              <a:gd name="connsiteX2" fmla="*/ 155575 w 571562"/>
+              <a:gd name="connsiteY2" fmla="*/ 36276 h 93677"/>
+              <a:gd name="connsiteX3" fmla="*/ 324948 w 571562"/>
+              <a:gd name="connsiteY3" fmla="*/ 59206 h 93677"/>
+              <a:gd name="connsiteX4" fmla="*/ 571378 w 571562"/>
+              <a:gd name="connsiteY4" fmla="*/ 93677 h 93677"/>
+              <a:gd name="connsiteX0" fmla="*/ 0 w 571562"/>
+              <a:gd name="connsiteY0" fmla="*/ 2980 h 93677"/>
+              <a:gd name="connsiteX1" fmla="*/ 81451 w 571562"/>
+              <a:gd name="connsiteY1" fmla="*/ 9841 h 93677"/>
+              <a:gd name="connsiteX2" fmla="*/ 155575 w 571562"/>
+              <a:gd name="connsiteY2" fmla="*/ 36276 h 93677"/>
+              <a:gd name="connsiteX3" fmla="*/ 324948 w 571562"/>
+              <a:gd name="connsiteY3" fmla="*/ 59206 h 93677"/>
+              <a:gd name="connsiteX4" fmla="*/ 571378 w 571562"/>
+              <a:gd name="connsiteY4" fmla="*/ 93677 h 93677"/>
+              <a:gd name="connsiteX0" fmla="*/ 0 w 571742"/>
+              <a:gd name="connsiteY0" fmla="*/ 2980 h 93677"/>
+              <a:gd name="connsiteX1" fmla="*/ 81451 w 571742"/>
+              <a:gd name="connsiteY1" fmla="*/ 9841 h 93677"/>
+              <a:gd name="connsiteX2" fmla="*/ 155575 w 571742"/>
+              <a:gd name="connsiteY2" fmla="*/ 36276 h 93677"/>
+              <a:gd name="connsiteX3" fmla="*/ 324948 w 571742"/>
+              <a:gd name="connsiteY3" fmla="*/ 59206 h 93677"/>
+              <a:gd name="connsiteX4" fmla="*/ 571378 w 571742"/>
+              <a:gd name="connsiteY4" fmla="*/ 93677 h 93677"/>
             </a:gdLst>
             <a:ahLst/>
             <a:cxnLst>
@@ -17601,29 +17458,29 @@
             </a:cxnLst>
             <a:rect l="l" t="t" r="r" b="b"/>
             <a:pathLst>
-              <a:path w="561762" h="105361">
+              <a:path w="571742" h="93677">
                 <a:moveTo>
-                  <a:pt x="38" y="0"/>
+                  <a:pt x="0" y="2980"/>
                 </a:moveTo>
                 <a:cubicBezTo>
-                  <a:pt x="-1021" y="53710"/>
-                  <a:pt x="20146" y="75671"/>
-                  <a:pt x="54013" y="95250"/>
+                  <a:pt x="53892" y="-4717"/>
+                  <a:pt x="55522" y="4292"/>
+                  <a:pt x="81451" y="9841"/>
                 </a:cubicBezTo>
                 <a:cubicBezTo>
-                  <a:pt x="87880" y="114829"/>
-                  <a:pt x="224934" y="100277"/>
-                  <a:pt x="298488" y="98425"/>
+                  <a:pt x="107380" y="15390"/>
+                  <a:pt x="114992" y="28049"/>
+                  <a:pt x="155575" y="36276"/>
                 </a:cubicBezTo>
                 <a:cubicBezTo>
-                  <a:pt x="372042" y="96573"/>
-                  <a:pt x="439776" y="100014"/>
-                  <a:pt x="495338" y="84138"/>
+                  <a:pt x="196158" y="44503"/>
+                  <a:pt x="181464" y="51822"/>
+                  <a:pt x="324948" y="59206"/>
                 </a:cubicBezTo>
                 <a:cubicBezTo>
-                  <a:pt x="546138" y="53975"/>
-                  <a:pt x="567568" y="26193"/>
-                  <a:pt x="560425" y="46037"/>
+                  <a:pt x="480157" y="60677"/>
+                  <a:pt x="578521" y="73833"/>
+                  <a:pt x="571378" y="93677"/>
                 </a:cubicBezTo>
               </a:path>
             </a:pathLst>

</xml_diff>

<commit_message>
Convert local sensor to remote esp-now readings
</commit_message>
<xml_diff>
--- a/design/PCB Design.pptx
+++ b/design/PCB Design.pptx
@@ -5,15 +5,16 @@
     <p:sldMasterId id="2147483660" r:id="rId1"/>
   </p:sldMasterIdLst>
   <p:notesMasterIdLst>
-    <p:notesMasterId r:id="rId5"/>
+    <p:notesMasterId r:id="rId6"/>
   </p:notesMasterIdLst>
   <p:handoutMasterIdLst>
-    <p:handoutMasterId r:id="rId6"/>
+    <p:handoutMasterId r:id="rId7"/>
   </p:handoutMasterIdLst>
   <p:sldIdLst>
     <p:sldId id="256" r:id="rId2"/>
     <p:sldId id="257" r:id="rId3"/>
-    <p:sldId id="258" r:id="rId4"/>
+    <p:sldId id="259" r:id="rId4"/>
+    <p:sldId id="258" r:id="rId5"/>
   </p:sldIdLst>
   <p:sldSz cx="9144000" cy="6858000" type="screen4x3"/>
   <p:notesSz cx="6888163" cy="10020300"/>
@@ -123,7 +124,7 @@
 <file path=ppt/revisionInfo.xml><?xml version="1.0" encoding="utf-8"?>
 <p1510:revInfo xmlns:a="http://schemas.openxmlformats.org/drawingml/2006/main" xmlns:r="http://schemas.openxmlformats.org/officeDocument/2006/relationships" xmlns:p1510="http://schemas.microsoft.com/office/powerpoint/2015/10/main">
   <p1510:revLst>
-    <p1510:client id="{C3A6CD6C-1DA5-47FB-A775-C4A3C3FB9D49}" v="179" dt="2023-06-07T09:19:34.757"/>
+    <p1510:client id="{C3A6CD6C-1DA5-47FB-A775-C4A3C3FB9D49}" v="215" dt="2023-06-13T08:38:50.450"/>
   </p1510:revLst>
 </p1510:revInfo>
 </file>
@@ -133,12 +134,12 @@
   <pc:docChgLst>
     <pc:chgData name="Olivier Grenadou" userId="02d4787ce9b02c5a" providerId="LiveId" clId="{C3A6CD6C-1DA5-47FB-A775-C4A3C3FB9D49}"/>
     <pc:docChg chg="undo custSel addSld modSld modMainMaster">
-      <pc:chgData name="Olivier Grenadou" userId="02d4787ce9b02c5a" providerId="LiveId" clId="{C3A6CD6C-1DA5-47FB-A775-C4A3C3FB9D49}" dt="2023-06-07T09:19:34.757" v="1802" actId="206"/>
+      <pc:chgData name="Olivier Grenadou" userId="02d4787ce9b02c5a" providerId="LiveId" clId="{C3A6CD6C-1DA5-47FB-A775-C4A3C3FB9D49}" dt="2023-06-13T08:38:50.449" v="2119" actId="206"/>
       <pc:docMkLst>
         <pc:docMk/>
       </pc:docMkLst>
       <pc:sldChg chg="addSp delSp modSp mod">
-        <pc:chgData name="Olivier Grenadou" userId="02d4787ce9b02c5a" providerId="LiveId" clId="{C3A6CD6C-1DA5-47FB-A775-C4A3C3FB9D49}" dt="2023-06-07T09:19:34.757" v="1802" actId="206"/>
+        <pc:chgData name="Olivier Grenadou" userId="02d4787ce9b02c5a" providerId="LiveId" clId="{C3A6CD6C-1DA5-47FB-A775-C4A3C3FB9D49}" dt="2023-06-08T11:02:50.074" v="1829" actId="20577"/>
         <pc:sldMkLst>
           <pc:docMk/>
           <pc:sldMk cId="3274058770" sldId="256"/>
@@ -784,7 +785,7 @@
           </ac:spMkLst>
         </pc:spChg>
         <pc:spChg chg="add mod topLvl">
-          <ac:chgData name="Olivier Grenadou" userId="02d4787ce9b02c5a" providerId="LiveId" clId="{C3A6CD6C-1DA5-47FB-A775-C4A3C3FB9D49}" dt="2023-05-28T07:08:43.986" v="1773" actId="3064"/>
+          <ac:chgData name="Olivier Grenadou" userId="02d4787ce9b02c5a" providerId="LiveId" clId="{C3A6CD6C-1DA5-47FB-A775-C4A3C3FB9D49}" dt="2023-06-08T11:02:41.872" v="1828" actId="6549"/>
           <ac:spMkLst>
             <pc:docMk/>
             <pc:sldMk cId="3274058770" sldId="256"/>
@@ -1288,7 +1289,7 @@
           </ac:spMkLst>
         </pc:spChg>
         <pc:spChg chg="add mod topLvl">
-          <ac:chgData name="Olivier Grenadou" userId="02d4787ce9b02c5a" providerId="LiveId" clId="{C3A6CD6C-1DA5-47FB-A775-C4A3C3FB9D49}" dt="2023-06-07T08:00:59.072" v="1779" actId="20577"/>
+          <ac:chgData name="Olivier Grenadou" userId="02d4787ce9b02c5a" providerId="LiveId" clId="{C3A6CD6C-1DA5-47FB-A775-C4A3C3FB9D49}" dt="2023-06-08T11:02:50.074" v="1829" actId="20577"/>
           <ac:spMkLst>
             <pc:docMk/>
             <pc:sldMk cId="3274058770" sldId="256"/>
@@ -2153,7 +2154,7 @@
         </pc:cxnChg>
       </pc:sldChg>
       <pc:sldChg chg="addSp delSp modSp new mod">
-        <pc:chgData name="Olivier Grenadou" userId="02d4787ce9b02c5a" providerId="LiveId" clId="{C3A6CD6C-1DA5-47FB-A775-C4A3C3FB9D49}" dt="2023-05-24T07:41:35.781" v="1380"/>
+        <pc:chgData name="Olivier Grenadou" userId="02d4787ce9b02c5a" providerId="LiveId" clId="{C3A6CD6C-1DA5-47FB-A775-C4A3C3FB9D49}" dt="2023-06-13T08:38:50.449" v="2119" actId="206"/>
         <pc:sldMkLst>
           <pc:docMk/>
           <pc:sldMk cId="3659786731" sldId="257"/>
@@ -2174,8 +2175,176 @@
             <ac:spMk id="3" creationId="{7531F6D2-6978-6FF0-1D5D-69A8A72E0EC2}"/>
           </ac:spMkLst>
         </pc:spChg>
+        <pc:spChg chg="add mod">
+          <ac:chgData name="Olivier Grenadou" userId="02d4787ce9b02c5a" providerId="LiveId" clId="{C3A6CD6C-1DA5-47FB-A775-C4A3C3FB9D49}" dt="2023-06-13T08:30:37.113" v="2065" actId="1076"/>
+          <ac:spMkLst>
+            <pc:docMk/>
+            <pc:sldMk cId="3659786731" sldId="257"/>
+            <ac:spMk id="10" creationId="{530D2840-8B6D-33B1-37C1-70D7D3891060}"/>
+          </ac:spMkLst>
+        </pc:spChg>
+        <pc:spChg chg="add mod">
+          <ac:chgData name="Olivier Grenadou" userId="02d4787ce9b02c5a" providerId="LiveId" clId="{C3A6CD6C-1DA5-47FB-A775-C4A3C3FB9D49}" dt="2023-06-13T08:30:56.586" v="2067" actId="1076"/>
+          <ac:spMkLst>
+            <pc:docMk/>
+            <pc:sldMk cId="3659786731" sldId="257"/>
+            <ac:spMk id="11" creationId="{DF3CED93-5B67-8308-EC77-1D30926321E2}"/>
+          </ac:spMkLst>
+        </pc:spChg>
+        <pc:spChg chg="add del mod">
+          <ac:chgData name="Olivier Grenadou" userId="02d4787ce9b02c5a" providerId="LiveId" clId="{C3A6CD6C-1DA5-47FB-A775-C4A3C3FB9D49}" dt="2023-06-13T08:32:24.378" v="2077" actId="478"/>
+          <ac:spMkLst>
+            <pc:docMk/>
+            <pc:sldMk cId="3659786731" sldId="257"/>
+            <ac:spMk id="16" creationId="{EFC24657-ADF5-BE7D-FE87-51CC70AA15B1}"/>
+          </ac:spMkLst>
+        </pc:spChg>
+        <pc:spChg chg="add del mod">
+          <ac:chgData name="Olivier Grenadou" userId="02d4787ce9b02c5a" providerId="LiveId" clId="{C3A6CD6C-1DA5-47FB-A775-C4A3C3FB9D49}" dt="2023-06-13T08:31:06.738" v="2069" actId="478"/>
+          <ac:spMkLst>
+            <pc:docMk/>
+            <pc:sldMk cId="3659786731" sldId="257"/>
+            <ac:spMk id="18" creationId="{BB73E366-980E-7281-8CA0-FE5514697C52}"/>
+          </ac:spMkLst>
+        </pc:spChg>
+        <pc:spChg chg="add del mod">
+          <ac:chgData name="Olivier Grenadou" userId="02d4787ce9b02c5a" providerId="LiveId" clId="{C3A6CD6C-1DA5-47FB-A775-C4A3C3FB9D49}" dt="2023-06-13T08:34:34.833" v="2095" actId="478"/>
+          <ac:spMkLst>
+            <pc:docMk/>
+            <pc:sldMk cId="3659786731" sldId="257"/>
+            <ac:spMk id="19" creationId="{4276842F-1AD2-DC69-828B-AABD219366CC}"/>
+          </ac:spMkLst>
+        </pc:spChg>
+        <pc:spChg chg="add del mod">
+          <ac:chgData name="Olivier Grenadou" userId="02d4787ce9b02c5a" providerId="LiveId" clId="{C3A6CD6C-1DA5-47FB-A775-C4A3C3FB9D49}" dt="2023-06-13T08:32:50.576" v="2079" actId="478"/>
+          <ac:spMkLst>
+            <pc:docMk/>
+            <pc:sldMk cId="3659786731" sldId="257"/>
+            <ac:spMk id="20" creationId="{A2A68195-EB52-76A6-1F50-24E4060DA69F}"/>
+          </ac:spMkLst>
+        </pc:spChg>
+        <pc:spChg chg="add mod">
+          <ac:chgData name="Olivier Grenadou" userId="02d4787ce9b02c5a" providerId="LiveId" clId="{C3A6CD6C-1DA5-47FB-A775-C4A3C3FB9D49}" dt="2023-06-13T08:34:14.781" v="2092" actId="14100"/>
+          <ac:spMkLst>
+            <pc:docMk/>
+            <pc:sldMk cId="3659786731" sldId="257"/>
+            <ac:spMk id="21" creationId="{BC2FDA6D-0612-1D44-BAF4-6CAA5EFD8508}"/>
+          </ac:spMkLst>
+        </pc:spChg>
+        <pc:spChg chg="add del mod">
+          <ac:chgData name="Olivier Grenadou" userId="02d4787ce9b02c5a" providerId="LiveId" clId="{C3A6CD6C-1DA5-47FB-A775-C4A3C3FB9D49}" dt="2023-06-13T08:31:27.673" v="2072" actId="478"/>
+          <ac:spMkLst>
+            <pc:docMk/>
+            <pc:sldMk cId="3659786731" sldId="257"/>
+            <ac:spMk id="22" creationId="{13DD3CE9-C6AA-2097-93BB-989334681E17}"/>
+          </ac:spMkLst>
+        </pc:spChg>
+        <pc:spChg chg="add del mod">
+          <ac:chgData name="Olivier Grenadou" userId="02d4787ce9b02c5a" providerId="LiveId" clId="{C3A6CD6C-1DA5-47FB-A775-C4A3C3FB9D49}" dt="2023-06-13T08:34:22.346" v="2094" actId="478"/>
+          <ac:spMkLst>
+            <pc:docMk/>
+            <pc:sldMk cId="3659786731" sldId="257"/>
+            <ac:spMk id="23" creationId="{88B7907B-8E51-B089-D183-2E74EEE5BA76}"/>
+          </ac:spMkLst>
+        </pc:spChg>
+        <pc:spChg chg="add del">
+          <ac:chgData name="Olivier Grenadou" userId="02d4787ce9b02c5a" providerId="LiveId" clId="{C3A6CD6C-1DA5-47FB-A775-C4A3C3FB9D49}" dt="2023-06-13T08:34:21.148" v="2093" actId="478"/>
+          <ac:spMkLst>
+            <pc:docMk/>
+            <pc:sldMk cId="3659786731" sldId="257"/>
+            <ac:spMk id="24" creationId="{04A15F77-F2E9-7A9E-31A8-DAE3823A0E1E}"/>
+          </ac:spMkLst>
+        </pc:spChg>
+        <pc:spChg chg="add mod">
+          <ac:chgData name="Olivier Grenadou" userId="02d4787ce9b02c5a" providerId="LiveId" clId="{C3A6CD6C-1DA5-47FB-A775-C4A3C3FB9D49}" dt="2023-06-13T08:31:23.224" v="2071" actId="208"/>
+          <ac:spMkLst>
+            <pc:docMk/>
+            <pc:sldMk cId="3659786731" sldId="257"/>
+            <ac:spMk id="26" creationId="{93452E54-7E78-D70A-9B4D-8ADD5F0CE876}"/>
+          </ac:spMkLst>
+        </pc:spChg>
+        <pc:spChg chg="add mod">
+          <ac:chgData name="Olivier Grenadou" userId="02d4787ce9b02c5a" providerId="LiveId" clId="{C3A6CD6C-1DA5-47FB-A775-C4A3C3FB9D49}" dt="2023-06-13T08:31:48.559" v="2074" actId="208"/>
+          <ac:spMkLst>
+            <pc:docMk/>
+            <pc:sldMk cId="3659786731" sldId="257"/>
+            <ac:spMk id="27" creationId="{2844AF93-91BA-8155-3AA0-4C866299F094}"/>
+          </ac:spMkLst>
+        </pc:spChg>
+        <pc:spChg chg="add mod">
+          <ac:chgData name="Olivier Grenadou" userId="02d4787ce9b02c5a" providerId="LiveId" clId="{C3A6CD6C-1DA5-47FB-A775-C4A3C3FB9D49}" dt="2023-06-13T08:33:40.785" v="2085" actId="208"/>
+          <ac:spMkLst>
+            <pc:docMk/>
+            <pc:sldMk cId="3659786731" sldId="257"/>
+            <ac:spMk id="28" creationId="{6D58C014-0EC3-2D27-8DE3-EC28BDBCC886}"/>
+          </ac:spMkLst>
+        </pc:spChg>
+        <pc:spChg chg="add del">
+          <ac:chgData name="Olivier Grenadou" userId="02d4787ce9b02c5a" providerId="LiveId" clId="{C3A6CD6C-1DA5-47FB-A775-C4A3C3FB9D49}" dt="2023-06-13T08:34:38.550" v="2096" actId="478"/>
+          <ac:spMkLst>
+            <pc:docMk/>
+            <pc:sldMk cId="3659786731" sldId="257"/>
+            <ac:spMk id="29" creationId="{C09D4673-B62E-C26F-A8B7-5FE32BAE96D2}"/>
+          </ac:spMkLst>
+        </pc:spChg>
+        <pc:spChg chg="add mod">
+          <ac:chgData name="Olivier Grenadou" userId="02d4787ce9b02c5a" providerId="LiveId" clId="{C3A6CD6C-1DA5-47FB-A775-C4A3C3FB9D49}" dt="2023-06-13T08:33:45.399" v="2086" actId="208"/>
+          <ac:spMkLst>
+            <pc:docMk/>
+            <pc:sldMk cId="3659786731" sldId="257"/>
+            <ac:spMk id="30" creationId="{9E7A9BC4-40BF-BF2A-E4B5-801957B1D704}"/>
+          </ac:spMkLst>
+        </pc:spChg>
+        <pc:spChg chg="add mod">
+          <ac:chgData name="Olivier Grenadou" userId="02d4787ce9b02c5a" providerId="LiveId" clId="{C3A6CD6C-1DA5-47FB-A775-C4A3C3FB9D49}" dt="2023-06-13T08:36:43.645" v="2111" actId="206"/>
+          <ac:spMkLst>
+            <pc:docMk/>
+            <pc:sldMk cId="3659786731" sldId="257"/>
+            <ac:spMk id="31" creationId="{7D557BE8-0996-169F-85DF-E3A724E13884}"/>
+          </ac:spMkLst>
+        </pc:spChg>
+        <pc:spChg chg="add">
+          <ac:chgData name="Olivier Grenadou" userId="02d4787ce9b02c5a" providerId="LiveId" clId="{C3A6CD6C-1DA5-47FB-A775-C4A3C3FB9D49}" dt="2023-06-13T08:35:34.946" v="2099" actId="11529"/>
+          <ac:spMkLst>
+            <pc:docMk/>
+            <pc:sldMk cId="3659786731" sldId="257"/>
+            <ac:spMk id="32" creationId="{8E60B8EF-403B-83D7-6BB1-46701F48E3F9}"/>
+          </ac:spMkLst>
+        </pc:spChg>
+        <pc:spChg chg="add">
+          <ac:chgData name="Olivier Grenadou" userId="02d4787ce9b02c5a" providerId="LiveId" clId="{C3A6CD6C-1DA5-47FB-A775-C4A3C3FB9D49}" dt="2023-06-13T08:35:43.878" v="2100" actId="11529"/>
+          <ac:spMkLst>
+            <pc:docMk/>
+            <pc:sldMk cId="3659786731" sldId="257"/>
+            <ac:spMk id="33" creationId="{D49E5538-B2F4-0E70-298B-3806054ED250}"/>
+          </ac:spMkLst>
+        </pc:spChg>
+        <pc:spChg chg="add mod">
+          <ac:chgData name="Olivier Grenadou" userId="02d4787ce9b02c5a" providerId="LiveId" clId="{C3A6CD6C-1DA5-47FB-A775-C4A3C3FB9D49}" dt="2023-06-13T08:38:50.449" v="2119" actId="206"/>
+          <ac:spMkLst>
+            <pc:docMk/>
+            <pc:sldMk cId="3659786731" sldId="257"/>
+            <ac:spMk id="34" creationId="{9F619C5B-3C54-0016-E7D8-FC2D86658304}"/>
+          </ac:spMkLst>
+        </pc:spChg>
+        <pc:spChg chg="add mod">
+          <ac:chgData name="Olivier Grenadou" userId="02d4787ce9b02c5a" providerId="LiveId" clId="{C3A6CD6C-1DA5-47FB-A775-C4A3C3FB9D49}" dt="2023-06-13T08:38:34.553" v="2118" actId="206"/>
+          <ac:spMkLst>
+            <pc:docMk/>
+            <pc:sldMk cId="3659786731" sldId="257"/>
+            <ac:spMk id="35" creationId="{D892F7A8-FF50-9638-54A7-7CA0DD5E1EA4}"/>
+          </ac:spMkLst>
+        </pc:spChg>
         <pc:picChg chg="add mod">
-          <ac:chgData name="Olivier Grenadou" userId="02d4787ce9b02c5a" providerId="LiveId" clId="{C3A6CD6C-1DA5-47FB-A775-C4A3C3FB9D49}" dt="2023-05-24T07:41:35.781" v="1380"/>
+          <ac:chgData name="Olivier Grenadou" userId="02d4787ce9b02c5a" providerId="LiveId" clId="{C3A6CD6C-1DA5-47FB-A775-C4A3C3FB9D49}" dt="2023-06-13T08:30:24.911" v="2064" actId="1037"/>
+          <ac:picMkLst>
+            <pc:docMk/>
+            <pc:sldMk cId="3659786731" sldId="257"/>
+            <ac:picMk id="3" creationId="{93DED1A9-0E6E-E097-7200-3B32926050BB}"/>
+          </ac:picMkLst>
+        </pc:picChg>
+        <pc:picChg chg="add del mod">
+          <ac:chgData name="Olivier Grenadou" userId="02d4787ce9b02c5a" providerId="LiveId" clId="{C3A6CD6C-1DA5-47FB-A775-C4A3C3FB9D49}" dt="2023-06-13T08:11:26.955" v="1831" actId="478"/>
           <ac:picMkLst>
             <pc:docMk/>
             <pc:sldMk cId="3659786731" sldId="257"/>
@@ -2183,13 +2352,45 @@
           </ac:picMkLst>
         </pc:picChg>
         <pc:picChg chg="add mod">
-          <ac:chgData name="Olivier Grenadou" userId="02d4787ce9b02c5a" providerId="LiveId" clId="{C3A6CD6C-1DA5-47FB-A775-C4A3C3FB9D49}" dt="2023-05-24T07:41:35.781" v="1380"/>
+          <ac:chgData name="Olivier Grenadou" userId="02d4787ce9b02c5a" providerId="LiveId" clId="{C3A6CD6C-1DA5-47FB-A775-C4A3C3FB9D49}" dt="2023-06-13T08:36:11.661" v="2103" actId="1076"/>
           <ac:picMkLst>
             <pc:docMk/>
             <pc:sldMk cId="3659786731" sldId="257"/>
             <ac:picMk id="5" creationId="{B4D397FD-FD49-B827-B25F-6270CEAE635D}"/>
           </ac:picMkLst>
         </pc:picChg>
+        <pc:picChg chg="add mod">
+          <ac:chgData name="Olivier Grenadou" userId="02d4787ce9b02c5a" providerId="LiveId" clId="{C3A6CD6C-1DA5-47FB-A775-C4A3C3FB9D49}" dt="2023-06-13T08:15:40.130" v="1898" actId="1037"/>
+          <ac:picMkLst>
+            <pc:docMk/>
+            <pc:sldMk cId="3659786731" sldId="257"/>
+            <ac:picMk id="7" creationId="{FA551238-A729-6605-4DF6-830B930E3279}"/>
+          </ac:picMkLst>
+        </pc:picChg>
+        <pc:picChg chg="add mod">
+          <ac:chgData name="Olivier Grenadou" userId="02d4787ce9b02c5a" providerId="LiveId" clId="{C3A6CD6C-1DA5-47FB-A775-C4A3C3FB9D49}" dt="2023-06-13T08:18:15.117" v="1974" actId="1035"/>
+          <ac:picMkLst>
+            <pc:docMk/>
+            <pc:sldMk cId="3659786731" sldId="257"/>
+            <ac:picMk id="9" creationId="{0B8449C5-F3A3-BA7E-F7C2-C2B5DA04B0DC}"/>
+          </ac:picMkLst>
+        </pc:picChg>
+        <pc:cxnChg chg="add mod">
+          <ac:chgData name="Olivier Grenadou" userId="02d4787ce9b02c5a" providerId="LiveId" clId="{C3A6CD6C-1DA5-47FB-A775-C4A3C3FB9D49}" dt="2023-06-13T08:30:37.113" v="2065" actId="1076"/>
+          <ac:cxnSpMkLst>
+            <pc:docMk/>
+            <pc:sldMk cId="3659786731" sldId="257"/>
+            <ac:cxnSpMk id="13" creationId="{14800A1A-2B22-9191-F2C0-1BF322781724}"/>
+          </ac:cxnSpMkLst>
+        </pc:cxnChg>
+        <pc:cxnChg chg="add mod">
+          <ac:chgData name="Olivier Grenadou" userId="02d4787ce9b02c5a" providerId="LiveId" clId="{C3A6CD6C-1DA5-47FB-A775-C4A3C3FB9D49}" dt="2023-06-13T08:31:00.753" v="2068" actId="14100"/>
+          <ac:cxnSpMkLst>
+            <pc:docMk/>
+            <pc:sldMk cId="3659786731" sldId="257"/>
+            <ac:cxnSpMk id="14" creationId="{7104F72C-2D95-949D-A9E5-9F2AD9AE53B2}"/>
+          </ac:cxnSpMkLst>
+        </pc:cxnChg>
       </pc:sldChg>
       <pc:sldChg chg="addSp delSp new mod">
         <pc:chgData name="Olivier Grenadou" userId="02d4787ce9b02c5a" providerId="LiveId" clId="{C3A6CD6C-1DA5-47FB-A775-C4A3C3FB9D49}" dt="2023-05-27T04:05:07.209" v="1574"/>
@@ -2221,6 +2422,13 @@
             <ac:picMk id="1026" creationId="{CBA7387B-05C4-EE56-E464-AFBD9E30D485}"/>
           </ac:picMkLst>
         </pc:picChg>
+      </pc:sldChg>
+      <pc:sldChg chg="add">
+        <pc:chgData name="Olivier Grenadou" userId="02d4787ce9b02c5a" providerId="LiveId" clId="{C3A6CD6C-1DA5-47FB-A775-C4A3C3FB9D49}" dt="2023-06-13T08:11:23.873" v="1830" actId="2890"/>
+        <pc:sldMkLst>
+          <pc:docMk/>
+          <pc:sldMk cId="1462997189" sldId="259"/>
+        </pc:sldMkLst>
       </pc:sldChg>
       <pc:sldMasterChg chg="modSp modSldLayout">
         <pc:chgData name="Olivier Grenadou" userId="02d4787ce9b02c5a" providerId="LiveId" clId="{C3A6CD6C-1DA5-47FB-A775-C4A3C3FB9D49}" dt="2023-05-24T07:41:35.781" v="1380"/>
@@ -2595,7 +2803,7 @@
           <a:p>
             <a:fld id="{277B8CFC-F3EE-4732-AB96-F8E7CFAED285}" type="datetimeFigureOut">
               <a:rPr lang="en-US" smtClean="0"/>
-              <a:t>6/7/2023</a:t>
+              <a:t>6/13/2023</a:t>
             </a:fld>
             <a:endParaRPr lang="en-US"/>
           </a:p>
@@ -2773,7 +2981,7 @@
           <a:p>
             <a:fld id="{B0737B90-9943-4916-944E-9C37AE4F7AB7}" type="datetimeFigureOut">
               <a:rPr lang="en-US" smtClean="0"/>
-              <a:t>6/7/2023</a:t>
+              <a:t>6/13/2023</a:t>
             </a:fld>
             <a:endParaRPr lang="en-US"/>
           </a:p>
@@ -3172,7 +3380,7 @@
           <a:p>
             <a:fld id="{2B1F1804-B436-4A2D-822D-118D5578DF06}" type="datetime1">
               <a:rPr lang="en-US" smtClean="0"/>
-              <a:t>6/7/2023</a:t>
+              <a:t>6/13/2023</a:t>
             </a:fld>
             <a:endParaRPr lang="en-US"/>
           </a:p>
@@ -3342,7 +3550,7 @@
           <a:p>
             <a:fld id="{0615578F-07B7-4756-B430-9A1FF6B67213}" type="datetime1">
               <a:rPr lang="en-US" smtClean="0"/>
-              <a:t>6/7/2023</a:t>
+              <a:t>6/13/2023</a:t>
             </a:fld>
             <a:endParaRPr lang="en-US"/>
           </a:p>
@@ -3522,7 +3730,7 @@
           <a:p>
             <a:fld id="{E0FD3AFC-6DCD-4847-85EB-A04866E0F2AC}" type="datetime1">
               <a:rPr lang="en-US" smtClean="0"/>
-              <a:t>6/7/2023</a:t>
+              <a:t>6/13/2023</a:t>
             </a:fld>
             <a:endParaRPr lang="en-US"/>
           </a:p>
@@ -3692,7 +3900,7 @@
           <a:p>
             <a:fld id="{FF3E18B2-C045-415A-A91C-B4D5AC1DF18C}" type="datetime1">
               <a:rPr lang="en-US" smtClean="0"/>
-              <a:t>6/7/2023</a:t>
+              <a:t>6/13/2023</a:t>
             </a:fld>
             <a:endParaRPr lang="en-US"/>
           </a:p>
@@ -3936,7 +4144,7 @@
           <a:p>
             <a:fld id="{DF3A76A6-507F-4A1C-A842-8C95BB9571BC}" type="datetime1">
               <a:rPr lang="en-US" smtClean="0"/>
-              <a:t>6/7/2023</a:t>
+              <a:t>6/13/2023</a:t>
             </a:fld>
             <a:endParaRPr lang="en-US"/>
           </a:p>
@@ -4168,7 +4376,7 @@
           <a:p>
             <a:fld id="{0C30588C-6521-4B47-BF8D-DCAAE9ADF805}" type="datetime1">
               <a:rPr lang="en-US" smtClean="0"/>
-              <a:t>6/7/2023</a:t>
+              <a:t>6/13/2023</a:t>
             </a:fld>
             <a:endParaRPr lang="en-US"/>
           </a:p>
@@ -4535,7 +4743,7 @@
           <a:p>
             <a:fld id="{0EB01D5B-4847-4CEF-8103-7D0C36E4817B}" type="datetime1">
               <a:rPr lang="en-US" smtClean="0"/>
-              <a:t>6/7/2023</a:t>
+              <a:t>6/13/2023</a:t>
             </a:fld>
             <a:endParaRPr lang="en-US"/>
           </a:p>
@@ -4653,7 +4861,7 @@
           <a:p>
             <a:fld id="{39B86BF2-4927-4146-8257-A2751FCEE87D}" type="datetime1">
               <a:rPr lang="en-US" smtClean="0"/>
-              <a:t>6/7/2023</a:t>
+              <a:t>6/13/2023</a:t>
             </a:fld>
             <a:endParaRPr lang="en-US"/>
           </a:p>
@@ -4748,7 +4956,7 @@
           <a:p>
             <a:fld id="{D0C6DEB9-9F32-4450-BF5A-AC4F8D0E6898}" type="datetime1">
               <a:rPr lang="en-US" smtClean="0"/>
-              <a:t>6/7/2023</a:t>
+              <a:t>6/13/2023</a:t>
             </a:fld>
             <a:endParaRPr lang="en-US"/>
           </a:p>
@@ -5025,7 +5233,7 @@
           <a:p>
             <a:fld id="{9105E500-D918-411E-888C-3AFFE5BE457C}" type="datetime1">
               <a:rPr lang="en-US" smtClean="0"/>
-              <a:t>6/7/2023</a:t>
+              <a:t>6/13/2023</a:t>
             </a:fld>
             <a:endParaRPr lang="en-US"/>
           </a:p>
@@ -5282,7 +5490,7 @@
           <a:p>
             <a:fld id="{F5364EA7-28AC-4BD3-8C1C-0EE626E1824A}" type="datetime1">
               <a:rPr lang="en-US" smtClean="0"/>
-              <a:t>6/7/2023</a:t>
+              <a:t>6/13/2023</a:t>
             </a:fld>
             <a:endParaRPr lang="en-US"/>
           </a:p>
@@ -5495,7 +5703,7 @@
           <a:p>
             <a:fld id="{423E8357-C248-4E4D-893B-B2D5385FA443}" type="datetime1">
               <a:rPr lang="en-US" smtClean="0"/>
-              <a:t>6/7/2023</a:t>
+              <a:t>6/13/2023</a:t>
             </a:fld>
             <a:endParaRPr lang="en-US"/>
           </a:p>
@@ -10062,24 +10270,7 @@
                 <a:latin typeface="Courier New" panose="02070309020205020404" pitchFamily="49" charset="0"/>
                 <a:cs typeface="Courier New" panose="02070309020205020404" pitchFamily="49" charset="0"/>
               </a:rPr>
-              <a:t>GND-VCC33-TRIGGER1-VCC5V</a:t>
-            </a:r>
-          </a:p>
-          <a:p>
-            <a:pPr>
-              <a:lnSpc>
-                <a:spcPts val="413"/>
-              </a:lnSpc>
-            </a:pPr>
-            <a:r>
-              <a:rPr lang="en-US" sz="450" b="1" dirty="0">
-                <a:solidFill>
-                  <a:schemeClr val="tx1"/>
-                </a:solidFill>
-                <a:latin typeface="Courier New" panose="02070309020205020404" pitchFamily="49" charset="0"/>
-                <a:cs typeface="Courier New" panose="02070309020205020404" pitchFamily="49" charset="0"/>
-              </a:rPr>
-              <a:t>GND-VCC33-TRIGGER2-VCC5V</a:t>
+              <a:t>GND-TRIG-VCC5V</a:t>
             </a:r>
           </a:p>
           <a:p>
@@ -14007,6 +14198,16 @@
               </a:lnSpc>
             </a:pPr>
             <a:r>
+              <a:rPr lang="en-US" sz="450" b="1" dirty="0">
+                <a:solidFill>
+                  <a:schemeClr val="tx1"/>
+                </a:solidFill>
+                <a:latin typeface="Courier New" panose="02070309020205020404" pitchFamily="49" charset="0"/>
+                <a:cs typeface="Courier New" panose="02070309020205020404" pitchFamily="49" charset="0"/>
+              </a:rPr>
+              <a:t>GND-TRIG(19)-ECHO(34</a:t>
+            </a:r>
+            <a:r>
               <a:rPr lang="en-US" sz="450" b="1">
                 <a:solidFill>
                   <a:schemeClr val="tx1"/>
@@ -14014,7 +14215,7 @@
                 <a:latin typeface="Courier New" panose="02070309020205020404" pitchFamily="49" charset="0"/>
                 <a:cs typeface="Courier New" panose="02070309020205020404" pitchFamily="49" charset="0"/>
               </a:rPr>
-              <a:t>GND-TRIG-ECHO-VCC50</a:t>
+              <a:t>)-VCC5V</a:t>
             </a:r>
             <a:endParaRPr lang="en-US" sz="450" b="1" dirty="0">
               <a:solidFill>
@@ -17549,6 +17750,1540 @@
       </p:grpSpPr>
       <p:pic>
         <p:nvPicPr>
+          <p:cNvPr id="5" name="Picture 2">
+            <a:extLst>
+              <a:ext uri="{FF2B5EF4-FFF2-40B4-BE49-F238E27FC236}">
+                <a16:creationId xmlns:a16="http://schemas.microsoft.com/office/drawing/2014/main" id="{B4D397FD-FD49-B827-B25F-6270CEAE635D}"/>
+              </a:ext>
+            </a:extLst>
+          </p:cNvPr>
+          <p:cNvPicPr>
+            <a:picLocks noChangeAspect="1" noChangeArrowheads="1"/>
+          </p:cNvPicPr>
+          <p:nvPr/>
+        </p:nvPicPr>
+        <p:blipFill rotWithShape="1">
+          <a:blip r:embed="rId2">
+            <a:extLst>
+              <a:ext uri="{28A0092B-C50C-407E-A947-70E740481C1C}">
+                <a14:useLocalDpi xmlns:a14="http://schemas.microsoft.com/office/drawing/2010/main" val="0"/>
+              </a:ext>
+            </a:extLst>
+          </a:blip>
+          <a:srcRect l="17415" t="8617" r="14542" b="8977"/>
+          <a:stretch/>
+        </p:blipFill>
+        <p:spPr bwMode="auto">
+          <a:xfrm rot="16200000">
+            <a:off x="2004378" y="1663700"/>
+            <a:ext cx="2406650" cy="2914650"/>
+          </a:xfrm>
+          <a:prstGeom prst="rect">
+            <a:avLst/>
+          </a:prstGeom>
+          <a:noFill/>
+          <a:extLst>
+            <a:ext uri="{909E8E84-426E-40DD-AFC4-6F175D3DCCD1}">
+              <a14:hiddenFill xmlns:a14="http://schemas.microsoft.com/office/drawing/2010/main">
+                <a:solidFill>
+                  <a:srgbClr val="FFFFFF"/>
+                </a:solidFill>
+              </a14:hiddenFill>
+            </a:ext>
+          </a:extLst>
+        </p:spPr>
+      </p:pic>
+      <p:pic>
+        <p:nvPicPr>
+          <p:cNvPr id="3" name="Picture 2">
+            <a:extLst>
+              <a:ext uri="{FF2B5EF4-FFF2-40B4-BE49-F238E27FC236}">
+                <a16:creationId xmlns:a16="http://schemas.microsoft.com/office/drawing/2014/main" id="{93DED1A9-0E6E-E097-7200-3B32926050BB}"/>
+              </a:ext>
+            </a:extLst>
+          </p:cNvPr>
+          <p:cNvPicPr>
+            <a:picLocks noChangeAspect="1"/>
+          </p:cNvPicPr>
+          <p:nvPr/>
+        </p:nvPicPr>
+        <p:blipFill>
+          <a:blip r:embed="rId3"/>
+          <a:stretch>
+            <a:fillRect/>
+          </a:stretch>
+        </p:blipFill>
+        <p:spPr>
+          <a:xfrm rot="16200000">
+            <a:off x="2608107" y="2050966"/>
+            <a:ext cx="845604" cy="1112478"/>
+          </a:xfrm>
+          <a:prstGeom prst="rect">
+            <a:avLst/>
+          </a:prstGeom>
+        </p:spPr>
+      </p:pic>
+      <p:pic>
+        <p:nvPicPr>
+          <p:cNvPr id="7" name="Picture 6">
+            <a:extLst>
+              <a:ext uri="{FF2B5EF4-FFF2-40B4-BE49-F238E27FC236}">
+                <a16:creationId xmlns:a16="http://schemas.microsoft.com/office/drawing/2014/main" id="{FA551238-A729-6605-4DF6-830B930E3279}"/>
+              </a:ext>
+            </a:extLst>
+          </p:cNvPr>
+          <p:cNvPicPr>
+            <a:picLocks noChangeAspect="1"/>
+          </p:cNvPicPr>
+          <p:nvPr/>
+        </p:nvPicPr>
+        <p:blipFill>
+          <a:blip r:embed="rId4"/>
+          <a:stretch>
+            <a:fillRect/>
+          </a:stretch>
+        </p:blipFill>
+        <p:spPr>
+          <a:xfrm>
+            <a:off x="2498361" y="3195108"/>
+            <a:ext cx="1295764" cy="397242"/>
+          </a:xfrm>
+          <a:prstGeom prst="rect">
+            <a:avLst/>
+          </a:prstGeom>
+        </p:spPr>
+      </p:pic>
+      <p:pic>
+        <p:nvPicPr>
+          <p:cNvPr id="9" name="Picture 8">
+            <a:extLst>
+              <a:ext uri="{FF2B5EF4-FFF2-40B4-BE49-F238E27FC236}">
+                <a16:creationId xmlns:a16="http://schemas.microsoft.com/office/drawing/2014/main" id="{0B8449C5-F3A3-BA7E-F7C2-C2B5DA04B0DC}"/>
+              </a:ext>
+            </a:extLst>
+          </p:cNvPr>
+          <p:cNvPicPr>
+            <a:picLocks noChangeAspect="1"/>
+          </p:cNvPicPr>
+          <p:nvPr/>
+        </p:nvPicPr>
+        <p:blipFill>
+          <a:blip r:embed="rId5"/>
+          <a:stretch>
+            <a:fillRect/>
+          </a:stretch>
+        </p:blipFill>
+        <p:spPr>
+          <a:xfrm>
+            <a:off x="2598683" y="3921016"/>
+            <a:ext cx="1443092" cy="592761"/>
+          </a:xfrm>
+          <a:prstGeom prst="rect">
+            <a:avLst/>
+          </a:prstGeom>
+        </p:spPr>
+      </p:pic>
+      <p:sp>
+        <p:nvSpPr>
+          <p:cNvPr id="10" name="Arrow: Pentagon 9">
+            <a:extLst>
+              <a:ext uri="{FF2B5EF4-FFF2-40B4-BE49-F238E27FC236}">
+                <a16:creationId xmlns:a16="http://schemas.microsoft.com/office/drawing/2014/main" id="{530D2840-8B6D-33B1-37C1-70D7D3891060}"/>
+              </a:ext>
+            </a:extLst>
+          </p:cNvPr>
+          <p:cNvSpPr/>
+          <p:nvPr/>
+        </p:nvSpPr>
+        <p:spPr>
+          <a:xfrm>
+            <a:off x="1268847" y="2257423"/>
+            <a:ext cx="247650" cy="95250"/>
+          </a:xfrm>
+          <a:prstGeom prst="homePlate">
+            <a:avLst/>
+          </a:prstGeom>
+          <a:solidFill>
+            <a:srgbClr val="FF0000"/>
+          </a:solidFill>
+          <a:ln>
+            <a:solidFill>
+              <a:srgbClr val="C00000"/>
+            </a:solidFill>
+          </a:ln>
+        </p:spPr>
+        <p:style>
+          <a:lnRef idx="1">
+            <a:schemeClr val="accent2"/>
+          </a:lnRef>
+          <a:fillRef idx="3">
+            <a:schemeClr val="accent2"/>
+          </a:fillRef>
+          <a:effectRef idx="2">
+            <a:schemeClr val="accent2"/>
+          </a:effectRef>
+          <a:fontRef idx="minor">
+            <a:schemeClr val="lt1"/>
+          </a:fontRef>
+        </p:style>
+        <p:txBody>
+          <a:bodyPr lIns="0" tIns="0" rIns="0" bIns="0" rtlCol="0" anchor="ctr"/>
+          <a:lstStyle/>
+          <a:p>
+            <a:pPr algn="ctr"/>
+            <a:r>
+              <a:rPr lang="en-US" sz="600" dirty="0"/>
+              <a:t>5V</a:t>
+            </a:r>
+          </a:p>
+        </p:txBody>
+      </p:sp>
+      <p:sp>
+        <p:nvSpPr>
+          <p:cNvPr id="11" name="Arrow: Pentagon 10">
+            <a:extLst>
+              <a:ext uri="{FF2B5EF4-FFF2-40B4-BE49-F238E27FC236}">
+                <a16:creationId xmlns:a16="http://schemas.microsoft.com/office/drawing/2014/main" id="{DF3CED93-5B67-8308-EC77-1D30926321E2}"/>
+              </a:ext>
+            </a:extLst>
+          </p:cNvPr>
+          <p:cNvSpPr/>
+          <p:nvPr/>
+        </p:nvSpPr>
+        <p:spPr>
+          <a:xfrm>
+            <a:off x="1269446" y="2376489"/>
+            <a:ext cx="247650" cy="95250"/>
+          </a:xfrm>
+          <a:prstGeom prst="homePlate">
+            <a:avLst/>
+          </a:prstGeom>
+          <a:solidFill>
+            <a:schemeClr val="tx1"/>
+          </a:solidFill>
+        </p:spPr>
+        <p:style>
+          <a:lnRef idx="2">
+            <a:schemeClr val="accent1">
+              <a:shade val="15000"/>
+            </a:schemeClr>
+          </a:lnRef>
+          <a:fillRef idx="1">
+            <a:schemeClr val="accent1"/>
+          </a:fillRef>
+          <a:effectRef idx="0">
+            <a:schemeClr val="accent1"/>
+          </a:effectRef>
+          <a:fontRef idx="minor">
+            <a:schemeClr val="lt1"/>
+          </a:fontRef>
+        </p:style>
+        <p:txBody>
+          <a:bodyPr lIns="0" tIns="0" rIns="0" bIns="0" rtlCol="0" anchor="ctr"/>
+          <a:lstStyle/>
+          <a:p>
+            <a:pPr algn="ctr"/>
+            <a:r>
+              <a:rPr lang="en-US" sz="600" dirty="0"/>
+              <a:t>GND</a:t>
+            </a:r>
+          </a:p>
+        </p:txBody>
+      </p:sp>
+      <p:cxnSp>
+        <p:nvCxnSpPr>
+          <p:cNvPr id="13" name="Straight Connector 12">
+            <a:extLst>
+              <a:ext uri="{FF2B5EF4-FFF2-40B4-BE49-F238E27FC236}">
+                <a16:creationId xmlns:a16="http://schemas.microsoft.com/office/drawing/2014/main" id="{14800A1A-2B22-9191-F2C0-1BF322781724}"/>
+              </a:ext>
+            </a:extLst>
+          </p:cNvPr>
+          <p:cNvCxnSpPr/>
+          <p:nvPr/>
+        </p:nvCxnSpPr>
+        <p:spPr>
+          <a:xfrm>
+            <a:off x="1541141" y="2305048"/>
+            <a:ext cx="533400" cy="0"/>
+          </a:xfrm>
+          <a:prstGeom prst="line">
+            <a:avLst/>
+          </a:prstGeom>
+          <a:ln>
+            <a:solidFill>
+              <a:srgbClr val="FF0000"/>
+            </a:solidFill>
+          </a:ln>
+        </p:spPr>
+        <p:style>
+          <a:lnRef idx="3">
+            <a:schemeClr val="accent2"/>
+          </a:lnRef>
+          <a:fillRef idx="0">
+            <a:schemeClr val="accent2"/>
+          </a:fillRef>
+          <a:effectRef idx="2">
+            <a:schemeClr val="accent2"/>
+          </a:effectRef>
+          <a:fontRef idx="minor">
+            <a:schemeClr val="tx1"/>
+          </a:fontRef>
+        </p:style>
+      </p:cxnSp>
+      <p:cxnSp>
+        <p:nvCxnSpPr>
+          <p:cNvPr id="14" name="Straight Connector 13">
+            <a:extLst>
+              <a:ext uri="{FF2B5EF4-FFF2-40B4-BE49-F238E27FC236}">
+                <a16:creationId xmlns:a16="http://schemas.microsoft.com/office/drawing/2014/main" id="{7104F72C-2D95-949D-A9E5-9F2AD9AE53B2}"/>
+              </a:ext>
+            </a:extLst>
+          </p:cNvPr>
+          <p:cNvCxnSpPr>
+            <a:cxnSpLocks/>
+          </p:cNvCxnSpPr>
+          <p:nvPr/>
+        </p:nvCxnSpPr>
+        <p:spPr>
+          <a:xfrm flipV="1">
+            <a:off x="1538855" y="2387597"/>
+            <a:ext cx="531712" cy="36517"/>
+          </a:xfrm>
+          <a:prstGeom prst="line">
+            <a:avLst/>
+          </a:prstGeom>
+          <a:ln>
+            <a:solidFill>
+              <a:schemeClr val="tx1"/>
+            </a:solidFill>
+          </a:ln>
+        </p:spPr>
+        <p:style>
+          <a:lnRef idx="3">
+            <a:schemeClr val="accent2"/>
+          </a:lnRef>
+          <a:fillRef idx="0">
+            <a:schemeClr val="accent2"/>
+          </a:fillRef>
+          <a:effectRef idx="2">
+            <a:schemeClr val="accent2"/>
+          </a:effectRef>
+          <a:fontRef idx="minor">
+            <a:schemeClr val="tx1"/>
+          </a:fontRef>
+        </p:style>
+      </p:cxnSp>
+      <p:sp>
+        <p:nvSpPr>
+          <p:cNvPr id="21" name="Freeform: Shape 20">
+            <a:extLst>
+              <a:ext uri="{FF2B5EF4-FFF2-40B4-BE49-F238E27FC236}">
+                <a16:creationId xmlns:a16="http://schemas.microsoft.com/office/drawing/2014/main" id="{BC2FDA6D-0612-1D44-BAF4-6CAA5EFD8508}"/>
+              </a:ext>
+            </a:extLst>
+          </p:cNvPr>
+          <p:cNvSpPr/>
+          <p:nvPr/>
+        </p:nvSpPr>
+        <p:spPr>
+          <a:xfrm>
+            <a:off x="2540000" y="3521075"/>
+            <a:ext cx="899861" cy="400050"/>
+          </a:xfrm>
+          <a:custGeom>
+            <a:avLst/>
+            <a:gdLst>
+              <a:gd name="connsiteX0" fmla="*/ 0 w 867303"/>
+              <a:gd name="connsiteY0" fmla="*/ 0 h 400050"/>
+              <a:gd name="connsiteX1" fmla="*/ 282575 w 867303"/>
+              <a:gd name="connsiteY1" fmla="*/ 41275 h 400050"/>
+              <a:gd name="connsiteX2" fmla="*/ 425450 w 867303"/>
+              <a:gd name="connsiteY2" fmla="*/ 155575 h 400050"/>
+              <a:gd name="connsiteX3" fmla="*/ 800100 w 867303"/>
+              <a:gd name="connsiteY3" fmla="*/ 184150 h 400050"/>
+              <a:gd name="connsiteX4" fmla="*/ 863600 w 867303"/>
+              <a:gd name="connsiteY4" fmla="*/ 400050 h 400050"/>
+              <a:gd name="connsiteX0" fmla="*/ 0 w 867303"/>
+              <a:gd name="connsiteY0" fmla="*/ 0 h 400050"/>
+              <a:gd name="connsiteX1" fmla="*/ 63500 w 867303"/>
+              <a:gd name="connsiteY1" fmla="*/ 187325 h 400050"/>
+              <a:gd name="connsiteX2" fmla="*/ 425450 w 867303"/>
+              <a:gd name="connsiteY2" fmla="*/ 155575 h 400050"/>
+              <a:gd name="connsiteX3" fmla="*/ 800100 w 867303"/>
+              <a:gd name="connsiteY3" fmla="*/ 184150 h 400050"/>
+              <a:gd name="connsiteX4" fmla="*/ 863600 w 867303"/>
+              <a:gd name="connsiteY4" fmla="*/ 400050 h 400050"/>
+              <a:gd name="connsiteX0" fmla="*/ 0 w 867303"/>
+              <a:gd name="connsiteY0" fmla="*/ 0 h 400050"/>
+              <a:gd name="connsiteX1" fmla="*/ 63500 w 867303"/>
+              <a:gd name="connsiteY1" fmla="*/ 187325 h 400050"/>
+              <a:gd name="connsiteX2" fmla="*/ 425450 w 867303"/>
+              <a:gd name="connsiteY2" fmla="*/ 155575 h 400050"/>
+              <a:gd name="connsiteX3" fmla="*/ 800100 w 867303"/>
+              <a:gd name="connsiteY3" fmla="*/ 184150 h 400050"/>
+              <a:gd name="connsiteX4" fmla="*/ 863600 w 867303"/>
+              <a:gd name="connsiteY4" fmla="*/ 400050 h 400050"/>
+              <a:gd name="connsiteX0" fmla="*/ 0 w 867303"/>
+              <a:gd name="connsiteY0" fmla="*/ 0 h 400050"/>
+              <a:gd name="connsiteX1" fmla="*/ 63500 w 867303"/>
+              <a:gd name="connsiteY1" fmla="*/ 187325 h 400050"/>
+              <a:gd name="connsiteX2" fmla="*/ 425450 w 867303"/>
+              <a:gd name="connsiteY2" fmla="*/ 206375 h 400050"/>
+              <a:gd name="connsiteX3" fmla="*/ 800100 w 867303"/>
+              <a:gd name="connsiteY3" fmla="*/ 184150 h 400050"/>
+              <a:gd name="connsiteX4" fmla="*/ 863600 w 867303"/>
+              <a:gd name="connsiteY4" fmla="*/ 400050 h 400050"/>
+              <a:gd name="connsiteX0" fmla="*/ 0 w 864936"/>
+              <a:gd name="connsiteY0" fmla="*/ 0 h 400050"/>
+              <a:gd name="connsiteX1" fmla="*/ 63500 w 864936"/>
+              <a:gd name="connsiteY1" fmla="*/ 187325 h 400050"/>
+              <a:gd name="connsiteX2" fmla="*/ 425450 w 864936"/>
+              <a:gd name="connsiteY2" fmla="*/ 206375 h 400050"/>
+              <a:gd name="connsiteX3" fmla="*/ 771525 w 864936"/>
+              <a:gd name="connsiteY3" fmla="*/ 254000 h 400050"/>
+              <a:gd name="connsiteX4" fmla="*/ 863600 w 864936"/>
+              <a:gd name="connsiteY4" fmla="*/ 400050 h 400050"/>
+            </a:gdLst>
+            <a:ahLst/>
+            <a:cxnLst>
+              <a:cxn ang="0">
+                <a:pos x="connsiteX0" y="connsiteY0"/>
+              </a:cxn>
+              <a:cxn ang="0">
+                <a:pos x="connsiteX1" y="connsiteY1"/>
+              </a:cxn>
+              <a:cxn ang="0">
+                <a:pos x="connsiteX2" y="connsiteY2"/>
+              </a:cxn>
+              <a:cxn ang="0">
+                <a:pos x="connsiteX3" y="connsiteY3"/>
+              </a:cxn>
+              <a:cxn ang="0">
+                <a:pos x="connsiteX4" y="connsiteY4"/>
+              </a:cxn>
+            </a:cxnLst>
+            <a:rect l="l" t="t" r="r" b="b"/>
+            <a:pathLst>
+              <a:path w="864936" h="400050">
+                <a:moveTo>
+                  <a:pt x="0" y="0"/>
+                </a:moveTo>
+                <a:cubicBezTo>
+                  <a:pt x="7408" y="115623"/>
+                  <a:pt x="-7408" y="152929"/>
+                  <a:pt x="63500" y="187325"/>
+                </a:cubicBezTo>
+                <a:cubicBezTo>
+                  <a:pt x="134408" y="221721"/>
+                  <a:pt x="307446" y="195263"/>
+                  <a:pt x="425450" y="206375"/>
+                </a:cubicBezTo>
+                <a:cubicBezTo>
+                  <a:pt x="543454" y="217487"/>
+                  <a:pt x="698500" y="213254"/>
+                  <a:pt x="771525" y="254000"/>
+                </a:cubicBezTo>
+                <a:cubicBezTo>
+                  <a:pt x="844550" y="294746"/>
+                  <a:pt x="871537" y="363538"/>
+                  <a:pt x="863600" y="400050"/>
+                </a:cubicBezTo>
+              </a:path>
+            </a:pathLst>
+          </a:custGeom>
+          <a:noFill/>
+          <a:ln w="19050">
+            <a:solidFill>
+              <a:schemeClr val="tx1"/>
+            </a:solidFill>
+          </a:ln>
+        </p:spPr>
+        <p:style>
+          <a:lnRef idx="2">
+            <a:schemeClr val="accent1">
+              <a:shade val="15000"/>
+            </a:schemeClr>
+          </a:lnRef>
+          <a:fillRef idx="1">
+            <a:schemeClr val="accent1"/>
+          </a:fillRef>
+          <a:effectRef idx="0">
+            <a:schemeClr val="accent1"/>
+          </a:effectRef>
+          <a:fontRef idx="minor">
+            <a:schemeClr val="lt1"/>
+          </a:fontRef>
+        </p:style>
+        <p:txBody>
+          <a:bodyPr rtlCol="0" anchor="ctr"/>
+          <a:lstStyle/>
+          <a:p>
+            <a:pPr algn="ctr"/>
+            <a:endParaRPr lang="en-US"/>
+          </a:p>
+        </p:txBody>
+      </p:sp>
+      <p:sp>
+        <p:nvSpPr>
+          <p:cNvPr id="26" name="Freeform: Shape 25">
+            <a:extLst>
+              <a:ext uri="{FF2B5EF4-FFF2-40B4-BE49-F238E27FC236}">
+                <a16:creationId xmlns:a16="http://schemas.microsoft.com/office/drawing/2014/main" id="{93452E54-7E78-D70A-9B4D-8ADD5F0CE876}"/>
+              </a:ext>
+            </a:extLst>
+          </p:cNvPr>
+          <p:cNvSpPr/>
+          <p:nvPr/>
+        </p:nvSpPr>
+        <p:spPr>
+          <a:xfrm>
+            <a:off x="2085975" y="2074466"/>
+            <a:ext cx="1187450" cy="227409"/>
+          </a:xfrm>
+          <a:custGeom>
+            <a:avLst/>
+            <a:gdLst>
+              <a:gd name="connsiteX0" fmla="*/ 0 w 1187450"/>
+              <a:gd name="connsiteY0" fmla="*/ 227409 h 227409"/>
+              <a:gd name="connsiteX1" fmla="*/ 273050 w 1187450"/>
+              <a:gd name="connsiteY1" fmla="*/ 24209 h 227409"/>
+              <a:gd name="connsiteX2" fmla="*/ 1006475 w 1187450"/>
+              <a:gd name="connsiteY2" fmla="*/ 14684 h 227409"/>
+              <a:gd name="connsiteX3" fmla="*/ 1187450 w 1187450"/>
+              <a:gd name="connsiteY3" fmla="*/ 122634 h 227409"/>
+            </a:gdLst>
+            <a:ahLst/>
+            <a:cxnLst>
+              <a:cxn ang="0">
+                <a:pos x="connsiteX0" y="connsiteY0"/>
+              </a:cxn>
+              <a:cxn ang="0">
+                <a:pos x="connsiteX1" y="connsiteY1"/>
+              </a:cxn>
+              <a:cxn ang="0">
+                <a:pos x="connsiteX2" y="connsiteY2"/>
+              </a:cxn>
+              <a:cxn ang="0">
+                <a:pos x="connsiteX3" y="connsiteY3"/>
+              </a:cxn>
+            </a:cxnLst>
+            <a:rect l="l" t="t" r="r" b="b"/>
+            <a:pathLst>
+              <a:path w="1187450" h="227409">
+                <a:moveTo>
+                  <a:pt x="0" y="227409"/>
+                </a:moveTo>
+                <a:cubicBezTo>
+                  <a:pt x="52652" y="143536"/>
+                  <a:pt x="105304" y="59663"/>
+                  <a:pt x="273050" y="24209"/>
+                </a:cubicBezTo>
+                <a:cubicBezTo>
+                  <a:pt x="440796" y="-11245"/>
+                  <a:pt x="854075" y="-1720"/>
+                  <a:pt x="1006475" y="14684"/>
+                </a:cubicBezTo>
+                <a:cubicBezTo>
+                  <a:pt x="1158875" y="31088"/>
+                  <a:pt x="1173162" y="76861"/>
+                  <a:pt x="1187450" y="122634"/>
+                </a:cubicBezTo>
+              </a:path>
+            </a:pathLst>
+          </a:custGeom>
+          <a:noFill/>
+          <a:ln w="19050">
+            <a:solidFill>
+              <a:srgbClr val="FF0000"/>
+            </a:solidFill>
+          </a:ln>
+        </p:spPr>
+        <p:style>
+          <a:lnRef idx="2">
+            <a:schemeClr val="accent1">
+              <a:shade val="15000"/>
+            </a:schemeClr>
+          </a:lnRef>
+          <a:fillRef idx="1">
+            <a:schemeClr val="accent1"/>
+          </a:fillRef>
+          <a:effectRef idx="0">
+            <a:schemeClr val="accent1"/>
+          </a:effectRef>
+          <a:fontRef idx="minor">
+            <a:schemeClr val="lt1"/>
+          </a:fontRef>
+        </p:style>
+        <p:txBody>
+          <a:bodyPr rtlCol="0" anchor="ctr"/>
+          <a:lstStyle/>
+          <a:p>
+            <a:pPr algn="ctr"/>
+            <a:endParaRPr lang="en-US"/>
+          </a:p>
+        </p:txBody>
+      </p:sp>
+      <p:sp>
+        <p:nvSpPr>
+          <p:cNvPr id="27" name="Freeform: Shape 26">
+            <a:extLst>
+              <a:ext uri="{FF2B5EF4-FFF2-40B4-BE49-F238E27FC236}">
+                <a16:creationId xmlns:a16="http://schemas.microsoft.com/office/drawing/2014/main" id="{2844AF93-91BA-8155-3AA0-4C866299F094}"/>
+              </a:ext>
+            </a:extLst>
+          </p:cNvPr>
+          <p:cNvSpPr/>
+          <p:nvPr/>
+        </p:nvSpPr>
+        <p:spPr>
+          <a:xfrm>
+            <a:off x="2070100" y="2306361"/>
+            <a:ext cx="1117600" cy="1624289"/>
+          </a:xfrm>
+          <a:custGeom>
+            <a:avLst/>
+            <a:gdLst>
+              <a:gd name="connsiteX0" fmla="*/ 0 w 1117600"/>
+              <a:gd name="connsiteY0" fmla="*/ 1864 h 1624289"/>
+              <a:gd name="connsiteX1" fmla="*/ 107950 w 1117600"/>
+              <a:gd name="connsiteY1" fmla="*/ 211414 h 1624289"/>
+              <a:gd name="connsiteX2" fmla="*/ 107950 w 1117600"/>
+              <a:gd name="connsiteY2" fmla="*/ 1329014 h 1624289"/>
+              <a:gd name="connsiteX3" fmla="*/ 561975 w 1117600"/>
+              <a:gd name="connsiteY3" fmla="*/ 1525864 h 1624289"/>
+              <a:gd name="connsiteX4" fmla="*/ 1016000 w 1117600"/>
+              <a:gd name="connsiteY4" fmla="*/ 1529039 h 1624289"/>
+              <a:gd name="connsiteX5" fmla="*/ 1117600 w 1117600"/>
+              <a:gd name="connsiteY5" fmla="*/ 1624289 h 1624289"/>
+            </a:gdLst>
+            <a:ahLst/>
+            <a:cxnLst>
+              <a:cxn ang="0">
+                <a:pos x="connsiteX0" y="connsiteY0"/>
+              </a:cxn>
+              <a:cxn ang="0">
+                <a:pos x="connsiteX1" y="connsiteY1"/>
+              </a:cxn>
+              <a:cxn ang="0">
+                <a:pos x="connsiteX2" y="connsiteY2"/>
+              </a:cxn>
+              <a:cxn ang="0">
+                <a:pos x="connsiteX3" y="connsiteY3"/>
+              </a:cxn>
+              <a:cxn ang="0">
+                <a:pos x="connsiteX4" y="connsiteY4"/>
+              </a:cxn>
+              <a:cxn ang="0">
+                <a:pos x="connsiteX5" y="connsiteY5"/>
+              </a:cxn>
+            </a:cxnLst>
+            <a:rect l="l" t="t" r="r" b="b"/>
+            <a:pathLst>
+              <a:path w="1117600" h="1624289">
+                <a:moveTo>
+                  <a:pt x="0" y="1864"/>
+                </a:moveTo>
+                <a:cubicBezTo>
+                  <a:pt x="44979" y="-3957"/>
+                  <a:pt x="89958" y="-9778"/>
+                  <a:pt x="107950" y="211414"/>
+                </a:cubicBezTo>
+                <a:cubicBezTo>
+                  <a:pt x="125942" y="432606"/>
+                  <a:pt x="32279" y="1109939"/>
+                  <a:pt x="107950" y="1329014"/>
+                </a:cubicBezTo>
+                <a:cubicBezTo>
+                  <a:pt x="183621" y="1548089"/>
+                  <a:pt x="410633" y="1492526"/>
+                  <a:pt x="561975" y="1525864"/>
+                </a:cubicBezTo>
+                <a:cubicBezTo>
+                  <a:pt x="713317" y="1559202"/>
+                  <a:pt x="923396" y="1512635"/>
+                  <a:pt x="1016000" y="1529039"/>
+                </a:cubicBezTo>
+                <a:cubicBezTo>
+                  <a:pt x="1108604" y="1545443"/>
+                  <a:pt x="1113102" y="1584866"/>
+                  <a:pt x="1117600" y="1624289"/>
+                </a:cubicBezTo>
+              </a:path>
+            </a:pathLst>
+          </a:custGeom>
+          <a:noFill/>
+          <a:ln w="19050">
+            <a:solidFill>
+              <a:srgbClr val="FF0000"/>
+            </a:solidFill>
+          </a:ln>
+        </p:spPr>
+        <p:style>
+          <a:lnRef idx="2">
+            <a:schemeClr val="accent1">
+              <a:shade val="15000"/>
+            </a:schemeClr>
+          </a:lnRef>
+          <a:fillRef idx="1">
+            <a:schemeClr val="accent1"/>
+          </a:fillRef>
+          <a:effectRef idx="0">
+            <a:schemeClr val="accent1"/>
+          </a:effectRef>
+          <a:fontRef idx="minor">
+            <a:schemeClr val="lt1"/>
+          </a:fontRef>
+        </p:style>
+        <p:txBody>
+          <a:bodyPr rtlCol="0" anchor="ctr"/>
+          <a:lstStyle/>
+          <a:p>
+            <a:pPr algn="ctr"/>
+            <a:endParaRPr lang="en-US"/>
+          </a:p>
+        </p:txBody>
+      </p:sp>
+      <p:sp>
+        <p:nvSpPr>
+          <p:cNvPr id="28" name="Freeform: Shape 27">
+            <a:extLst>
+              <a:ext uri="{FF2B5EF4-FFF2-40B4-BE49-F238E27FC236}">
+                <a16:creationId xmlns:a16="http://schemas.microsoft.com/office/drawing/2014/main" id="{6D58C014-0EC3-2D27-8DE3-EC28BDBCC886}"/>
+              </a:ext>
+            </a:extLst>
+          </p:cNvPr>
+          <p:cNvSpPr/>
+          <p:nvPr/>
+        </p:nvSpPr>
+        <p:spPr>
+          <a:xfrm>
+            <a:off x="2089150" y="2247900"/>
+            <a:ext cx="1136448" cy="253045"/>
+          </a:xfrm>
+          <a:custGeom>
+            <a:avLst/>
+            <a:gdLst>
+              <a:gd name="connsiteX0" fmla="*/ 0 w 1136448"/>
+              <a:gd name="connsiteY0" fmla="*/ 139700 h 253045"/>
+              <a:gd name="connsiteX1" fmla="*/ 561975 w 1136448"/>
+              <a:gd name="connsiteY1" fmla="*/ 250825 h 253045"/>
+              <a:gd name="connsiteX2" fmla="*/ 1089025 w 1136448"/>
+              <a:gd name="connsiteY2" fmla="*/ 196850 h 253045"/>
+              <a:gd name="connsiteX3" fmla="*/ 1123950 w 1136448"/>
+              <a:gd name="connsiteY3" fmla="*/ 0 h 253045"/>
+            </a:gdLst>
+            <a:ahLst/>
+            <a:cxnLst>
+              <a:cxn ang="0">
+                <a:pos x="connsiteX0" y="connsiteY0"/>
+              </a:cxn>
+              <a:cxn ang="0">
+                <a:pos x="connsiteX1" y="connsiteY1"/>
+              </a:cxn>
+              <a:cxn ang="0">
+                <a:pos x="connsiteX2" y="connsiteY2"/>
+              </a:cxn>
+              <a:cxn ang="0">
+                <a:pos x="connsiteX3" y="connsiteY3"/>
+              </a:cxn>
+            </a:cxnLst>
+            <a:rect l="l" t="t" r="r" b="b"/>
+            <a:pathLst>
+              <a:path w="1136448" h="253045">
+                <a:moveTo>
+                  <a:pt x="0" y="139700"/>
+                </a:moveTo>
+                <a:cubicBezTo>
+                  <a:pt x="190235" y="190500"/>
+                  <a:pt x="380471" y="241300"/>
+                  <a:pt x="561975" y="250825"/>
+                </a:cubicBezTo>
+                <a:cubicBezTo>
+                  <a:pt x="743479" y="260350"/>
+                  <a:pt x="995363" y="238654"/>
+                  <a:pt x="1089025" y="196850"/>
+                </a:cubicBezTo>
+                <a:cubicBezTo>
+                  <a:pt x="1182687" y="155046"/>
+                  <a:pt x="1105429" y="5292"/>
+                  <a:pt x="1123950" y="0"/>
+                </a:cubicBezTo>
+              </a:path>
+            </a:pathLst>
+          </a:custGeom>
+          <a:noFill/>
+          <a:ln w="19050">
+            <a:solidFill>
+              <a:schemeClr val="tx1"/>
+            </a:solidFill>
+          </a:ln>
+        </p:spPr>
+        <p:style>
+          <a:lnRef idx="2">
+            <a:schemeClr val="accent1">
+              <a:shade val="15000"/>
+            </a:schemeClr>
+          </a:lnRef>
+          <a:fillRef idx="1">
+            <a:schemeClr val="accent1"/>
+          </a:fillRef>
+          <a:effectRef idx="0">
+            <a:schemeClr val="accent1"/>
+          </a:effectRef>
+          <a:fontRef idx="minor">
+            <a:schemeClr val="lt1"/>
+          </a:fontRef>
+        </p:style>
+        <p:txBody>
+          <a:bodyPr rtlCol="0" anchor="ctr"/>
+          <a:lstStyle/>
+          <a:p>
+            <a:pPr algn="ctr"/>
+            <a:endParaRPr lang="en-US"/>
+          </a:p>
+        </p:txBody>
+      </p:sp>
+      <p:sp>
+        <p:nvSpPr>
+          <p:cNvPr id="30" name="Freeform: Shape 29">
+            <a:extLst>
+              <a:ext uri="{FF2B5EF4-FFF2-40B4-BE49-F238E27FC236}">
+                <a16:creationId xmlns:a16="http://schemas.microsoft.com/office/drawing/2014/main" id="{9E7A9BC4-40BF-BF2A-E4B5-801957B1D704}"/>
+              </a:ext>
+            </a:extLst>
+          </p:cNvPr>
+          <p:cNvSpPr/>
+          <p:nvPr/>
+        </p:nvSpPr>
+        <p:spPr>
+          <a:xfrm>
+            <a:off x="2034447" y="2397125"/>
+            <a:ext cx="505553" cy="1159027"/>
+          </a:xfrm>
+          <a:custGeom>
+            <a:avLst/>
+            <a:gdLst>
+              <a:gd name="connsiteX0" fmla="*/ 35653 w 505553"/>
+              <a:gd name="connsiteY0" fmla="*/ 0 h 1159027"/>
+              <a:gd name="connsiteX1" fmla="*/ 48353 w 505553"/>
+              <a:gd name="connsiteY1" fmla="*/ 1019175 h 1159027"/>
+              <a:gd name="connsiteX2" fmla="*/ 505553 w 505553"/>
+              <a:gd name="connsiteY2" fmla="*/ 1123950 h 1159027"/>
+            </a:gdLst>
+            <a:ahLst/>
+            <a:cxnLst>
+              <a:cxn ang="0">
+                <a:pos x="connsiteX0" y="connsiteY0"/>
+              </a:cxn>
+              <a:cxn ang="0">
+                <a:pos x="connsiteX1" y="connsiteY1"/>
+              </a:cxn>
+              <a:cxn ang="0">
+                <a:pos x="connsiteX2" y="connsiteY2"/>
+              </a:cxn>
+            </a:cxnLst>
+            <a:rect l="l" t="t" r="r" b="b"/>
+            <a:pathLst>
+              <a:path w="505553" h="1159027">
+                <a:moveTo>
+                  <a:pt x="35653" y="0"/>
+                </a:moveTo>
+                <a:cubicBezTo>
+                  <a:pt x="2844" y="415925"/>
+                  <a:pt x="-29964" y="831850"/>
+                  <a:pt x="48353" y="1019175"/>
+                </a:cubicBezTo>
+                <a:cubicBezTo>
+                  <a:pt x="126670" y="1206500"/>
+                  <a:pt x="316111" y="1165225"/>
+                  <a:pt x="505553" y="1123950"/>
+                </a:cubicBezTo>
+              </a:path>
+            </a:pathLst>
+          </a:custGeom>
+          <a:noFill/>
+          <a:ln w="19050">
+            <a:solidFill>
+              <a:schemeClr val="tx1"/>
+            </a:solidFill>
+          </a:ln>
+        </p:spPr>
+        <p:style>
+          <a:lnRef idx="2">
+            <a:schemeClr val="accent1">
+              <a:shade val="15000"/>
+            </a:schemeClr>
+          </a:lnRef>
+          <a:fillRef idx="1">
+            <a:schemeClr val="accent1"/>
+          </a:fillRef>
+          <a:effectRef idx="0">
+            <a:schemeClr val="accent1"/>
+          </a:effectRef>
+          <a:fontRef idx="minor">
+            <a:schemeClr val="lt1"/>
+          </a:fontRef>
+        </p:style>
+        <p:txBody>
+          <a:bodyPr rtlCol="0" anchor="ctr"/>
+          <a:lstStyle/>
+          <a:p>
+            <a:pPr algn="ctr"/>
+            <a:endParaRPr lang="en-US"/>
+          </a:p>
+        </p:txBody>
+      </p:sp>
+      <p:sp>
+        <p:nvSpPr>
+          <p:cNvPr id="31" name="Freeform: Shape 30">
+            <a:extLst>
+              <a:ext uri="{FF2B5EF4-FFF2-40B4-BE49-F238E27FC236}">
+                <a16:creationId xmlns:a16="http://schemas.microsoft.com/office/drawing/2014/main" id="{7D557BE8-0996-169F-85DF-E3A724E13884}"/>
+              </a:ext>
+            </a:extLst>
+          </p:cNvPr>
+          <p:cNvSpPr/>
+          <p:nvPr/>
+        </p:nvSpPr>
+        <p:spPr>
+          <a:xfrm flipH="1" flipV="1">
+            <a:off x="2444517" y="3004863"/>
+            <a:ext cx="839183" cy="427520"/>
+          </a:xfrm>
+          <a:custGeom>
+            <a:avLst/>
+            <a:gdLst>
+              <a:gd name="connsiteX0" fmla="*/ 733425 w 744972"/>
+              <a:gd name="connsiteY0" fmla="*/ 0 h 444500"/>
+              <a:gd name="connsiteX1" fmla="*/ 644525 w 744972"/>
+              <a:gd name="connsiteY1" fmla="*/ 254000 h 444500"/>
+              <a:gd name="connsiteX2" fmla="*/ 0 w 744972"/>
+              <a:gd name="connsiteY2" fmla="*/ 444500 h 444500"/>
+              <a:gd name="connsiteX0" fmla="*/ 0 w 658405"/>
+              <a:gd name="connsiteY0" fmla="*/ 0 h 1086231"/>
+              <a:gd name="connsiteX1" fmla="*/ 644952 w 658405"/>
+              <a:gd name="connsiteY1" fmla="*/ 895731 h 1086231"/>
+              <a:gd name="connsiteX2" fmla="*/ 427 w 658405"/>
+              <a:gd name="connsiteY2" fmla="*/ 1086231 h 1086231"/>
+              <a:gd name="connsiteX0" fmla="*/ 0 w 671363"/>
+              <a:gd name="connsiteY0" fmla="*/ 135 h 1086366"/>
+              <a:gd name="connsiteX1" fmla="*/ 644952 w 671363"/>
+              <a:gd name="connsiteY1" fmla="*/ 895866 h 1086366"/>
+              <a:gd name="connsiteX2" fmla="*/ 427 w 671363"/>
+              <a:gd name="connsiteY2" fmla="*/ 1086366 h 1086366"/>
+              <a:gd name="connsiteX0" fmla="*/ 0 w 499731"/>
+              <a:gd name="connsiteY0" fmla="*/ 318 h 1086549"/>
+              <a:gd name="connsiteX1" fmla="*/ 455928 w 499731"/>
+              <a:gd name="connsiteY1" fmla="*/ 412426 h 1086549"/>
+              <a:gd name="connsiteX2" fmla="*/ 427 w 499731"/>
+              <a:gd name="connsiteY2" fmla="*/ 1086549 h 1086549"/>
+              <a:gd name="connsiteX0" fmla="*/ 2534702 w 3034436"/>
+              <a:gd name="connsiteY0" fmla="*/ 318 h 626177"/>
+              <a:gd name="connsiteX1" fmla="*/ 2990630 w 3034436"/>
+              <a:gd name="connsiteY1" fmla="*/ 412426 h 626177"/>
+              <a:gd name="connsiteX2" fmla="*/ 0 w 3034436"/>
+              <a:gd name="connsiteY2" fmla="*/ 626177 h 626177"/>
+              <a:gd name="connsiteX0" fmla="*/ 2536922 w 3036656"/>
+              <a:gd name="connsiteY0" fmla="*/ 318 h 626177"/>
+              <a:gd name="connsiteX1" fmla="*/ 2992850 w 3036656"/>
+              <a:gd name="connsiteY1" fmla="*/ 412426 h 626177"/>
+              <a:gd name="connsiteX2" fmla="*/ 2220 w 3036656"/>
+              <a:gd name="connsiteY2" fmla="*/ 626177 h 626177"/>
+              <a:gd name="connsiteX0" fmla="*/ 2537017 w 2938546"/>
+              <a:gd name="connsiteY0" fmla="*/ 303 h 626162"/>
+              <a:gd name="connsiteX1" fmla="*/ 2870635 w 2938546"/>
+              <a:gd name="connsiteY1" fmla="*/ 431012 h 626162"/>
+              <a:gd name="connsiteX2" fmla="*/ 2315 w 2938546"/>
+              <a:gd name="connsiteY2" fmla="*/ 626162 h 626162"/>
+              <a:gd name="connsiteX0" fmla="*/ 2537381 w 2938914"/>
+              <a:gd name="connsiteY0" fmla="*/ 303 h 626162"/>
+              <a:gd name="connsiteX1" fmla="*/ 2870999 w 2938914"/>
+              <a:gd name="connsiteY1" fmla="*/ 431012 h 626162"/>
+              <a:gd name="connsiteX2" fmla="*/ 2679 w 2938914"/>
+              <a:gd name="connsiteY2" fmla="*/ 626162 h 626162"/>
+              <a:gd name="connsiteX0" fmla="*/ 2537325 w 2938854"/>
+              <a:gd name="connsiteY0" fmla="*/ 303 h 626162"/>
+              <a:gd name="connsiteX1" fmla="*/ 2870943 w 2938854"/>
+              <a:gd name="connsiteY1" fmla="*/ 431012 h 626162"/>
+              <a:gd name="connsiteX2" fmla="*/ 2623 w 2938854"/>
+              <a:gd name="connsiteY2" fmla="*/ 626162 h 626162"/>
+            </a:gdLst>
+            <a:ahLst/>
+            <a:cxnLst>
+              <a:cxn ang="0">
+                <a:pos x="connsiteX0" y="connsiteY0"/>
+              </a:cxn>
+              <a:cxn ang="0">
+                <a:pos x="connsiteX1" y="connsiteY1"/>
+              </a:cxn>
+              <a:cxn ang="0">
+                <a:pos x="connsiteX2" y="connsiteY2"/>
+              </a:cxn>
+            </a:cxnLst>
+            <a:rect l="l" t="t" r="r" b="b"/>
+            <a:pathLst>
+              <a:path w="2938854" h="626162">
+                <a:moveTo>
+                  <a:pt x="2537325" y="303"/>
+                </a:moveTo>
+                <a:cubicBezTo>
+                  <a:pt x="2987635" y="-12044"/>
+                  <a:pt x="2993180" y="356929"/>
+                  <a:pt x="2870943" y="431012"/>
+                </a:cubicBezTo>
+                <a:cubicBezTo>
+                  <a:pt x="2404019" y="681804"/>
+                  <a:pt x="-92041" y="321491"/>
+                  <a:pt x="2623" y="626162"/>
+                </a:cubicBezTo>
+              </a:path>
+            </a:pathLst>
+          </a:custGeom>
+          <a:noFill/>
+          <a:ln w="19050">
+            <a:solidFill>
+              <a:srgbClr val="FFC000"/>
+            </a:solidFill>
+          </a:ln>
+        </p:spPr>
+        <p:style>
+          <a:lnRef idx="2">
+            <a:schemeClr val="accent1">
+              <a:shade val="15000"/>
+            </a:schemeClr>
+          </a:lnRef>
+          <a:fillRef idx="1">
+            <a:schemeClr val="accent1"/>
+          </a:fillRef>
+          <a:effectRef idx="0">
+            <a:schemeClr val="accent1"/>
+          </a:effectRef>
+          <a:fontRef idx="minor">
+            <a:schemeClr val="lt1"/>
+          </a:fontRef>
+        </p:style>
+        <p:txBody>
+          <a:bodyPr rtlCol="0" anchor="ctr"/>
+          <a:lstStyle/>
+          <a:p>
+            <a:pPr algn="ctr"/>
+            <a:endParaRPr lang="en-US"/>
+          </a:p>
+        </p:txBody>
+      </p:sp>
+      <p:sp>
+        <p:nvSpPr>
+          <p:cNvPr id="32" name="Freeform: Shape 31">
+            <a:extLst>
+              <a:ext uri="{FF2B5EF4-FFF2-40B4-BE49-F238E27FC236}">
+                <a16:creationId xmlns:a16="http://schemas.microsoft.com/office/drawing/2014/main" id="{8E60B8EF-403B-83D7-6BB1-46701F48E3F9}"/>
+              </a:ext>
+            </a:extLst>
+          </p:cNvPr>
+          <p:cNvSpPr/>
+          <p:nvPr/>
+        </p:nvSpPr>
+        <p:spPr>
+          <a:xfrm>
+            <a:off x="3041650" y="3013075"/>
+            <a:ext cx="247650" cy="917575"/>
+          </a:xfrm>
+          <a:custGeom>
+            <a:avLst/>
+            <a:gdLst>
+              <a:gd name="connsiteX0" fmla="*/ 247650 w 247650"/>
+              <a:gd name="connsiteY0" fmla="*/ 917575 h 917575"/>
+              <a:gd name="connsiteX1" fmla="*/ 0 w 247650"/>
+              <a:gd name="connsiteY1" fmla="*/ 0 h 917575"/>
+            </a:gdLst>
+            <a:ahLst/>
+            <a:cxnLst>
+              <a:cxn ang="0">
+                <a:pos x="connsiteX0" y="connsiteY0"/>
+              </a:cxn>
+              <a:cxn ang="0">
+                <a:pos x="connsiteX1" y="connsiteY1"/>
+              </a:cxn>
+            </a:cxnLst>
+            <a:rect l="l" t="t" r="r" b="b"/>
+            <a:pathLst>
+              <a:path w="247650" h="917575">
+                <a:moveTo>
+                  <a:pt x="247650" y="917575"/>
+                </a:moveTo>
+                <a:lnTo>
+                  <a:pt x="0" y="0"/>
+                </a:lnTo>
+              </a:path>
+            </a:pathLst>
+          </a:custGeom>
+          <a:noFill/>
+          <a:ln w="19050">
+            <a:solidFill>
+              <a:srgbClr val="FFFF00"/>
+            </a:solidFill>
+          </a:ln>
+        </p:spPr>
+        <p:style>
+          <a:lnRef idx="2">
+            <a:schemeClr val="accent1">
+              <a:shade val="15000"/>
+            </a:schemeClr>
+          </a:lnRef>
+          <a:fillRef idx="1">
+            <a:schemeClr val="accent1"/>
+          </a:fillRef>
+          <a:effectRef idx="0">
+            <a:schemeClr val="accent1"/>
+          </a:effectRef>
+          <a:fontRef idx="minor">
+            <a:schemeClr val="lt1"/>
+          </a:fontRef>
+        </p:style>
+        <p:txBody>
+          <a:bodyPr rtlCol="0" anchor="ctr"/>
+          <a:lstStyle/>
+          <a:p>
+            <a:pPr algn="ctr"/>
+            <a:endParaRPr lang="en-US"/>
+          </a:p>
+        </p:txBody>
+      </p:sp>
+      <p:sp>
+        <p:nvSpPr>
+          <p:cNvPr id="33" name="Freeform: Shape 32">
+            <a:extLst>
+              <a:ext uri="{FF2B5EF4-FFF2-40B4-BE49-F238E27FC236}">
+                <a16:creationId xmlns:a16="http://schemas.microsoft.com/office/drawing/2014/main" id="{D49E5538-B2F4-0E70-298B-3806054ED250}"/>
+              </a:ext>
+            </a:extLst>
+          </p:cNvPr>
+          <p:cNvSpPr/>
+          <p:nvPr/>
+        </p:nvSpPr>
+        <p:spPr>
+          <a:xfrm>
+            <a:off x="3117850" y="2994025"/>
+            <a:ext cx="238125" cy="920750"/>
+          </a:xfrm>
+          <a:custGeom>
+            <a:avLst/>
+            <a:gdLst>
+              <a:gd name="connsiteX0" fmla="*/ 238125 w 238125"/>
+              <a:gd name="connsiteY0" fmla="*/ 920750 h 920750"/>
+              <a:gd name="connsiteX1" fmla="*/ 0 w 238125"/>
+              <a:gd name="connsiteY1" fmla="*/ 0 h 920750"/>
+            </a:gdLst>
+            <a:ahLst/>
+            <a:cxnLst>
+              <a:cxn ang="0">
+                <a:pos x="connsiteX0" y="connsiteY0"/>
+              </a:cxn>
+              <a:cxn ang="0">
+                <a:pos x="connsiteX1" y="connsiteY1"/>
+              </a:cxn>
+            </a:cxnLst>
+            <a:rect l="l" t="t" r="r" b="b"/>
+            <a:pathLst>
+              <a:path w="238125" h="920750">
+                <a:moveTo>
+                  <a:pt x="238125" y="920750"/>
+                </a:moveTo>
+                <a:lnTo>
+                  <a:pt x="0" y="0"/>
+                </a:lnTo>
+              </a:path>
+            </a:pathLst>
+          </a:custGeom>
+          <a:noFill/>
+          <a:ln w="19050">
+            <a:solidFill>
+              <a:srgbClr val="FFFF00"/>
+            </a:solidFill>
+          </a:ln>
+        </p:spPr>
+        <p:style>
+          <a:lnRef idx="2">
+            <a:schemeClr val="accent1">
+              <a:shade val="15000"/>
+            </a:schemeClr>
+          </a:lnRef>
+          <a:fillRef idx="1">
+            <a:schemeClr val="accent1"/>
+          </a:fillRef>
+          <a:effectRef idx="0">
+            <a:schemeClr val="accent1"/>
+          </a:effectRef>
+          <a:fontRef idx="minor">
+            <a:schemeClr val="lt1"/>
+          </a:fontRef>
+        </p:style>
+        <p:txBody>
+          <a:bodyPr rtlCol="0" anchor="ctr"/>
+          <a:lstStyle/>
+          <a:p>
+            <a:pPr algn="ctr"/>
+            <a:endParaRPr lang="en-US"/>
+          </a:p>
+        </p:txBody>
+      </p:sp>
+      <p:sp>
+        <p:nvSpPr>
+          <p:cNvPr id="34" name="Freeform: Shape 33">
+            <a:extLst>
+              <a:ext uri="{FF2B5EF4-FFF2-40B4-BE49-F238E27FC236}">
+                <a16:creationId xmlns:a16="http://schemas.microsoft.com/office/drawing/2014/main" id="{9F619C5B-3C54-0016-E7D8-FC2D86658304}"/>
+              </a:ext>
+            </a:extLst>
+          </p:cNvPr>
+          <p:cNvSpPr/>
+          <p:nvPr/>
+        </p:nvSpPr>
+        <p:spPr>
+          <a:xfrm>
+            <a:off x="2552773" y="2257425"/>
+            <a:ext cx="406327" cy="993775"/>
+          </a:xfrm>
+          <a:custGeom>
+            <a:avLst/>
+            <a:gdLst>
+              <a:gd name="connsiteX0" fmla="*/ 6277 w 406327"/>
+              <a:gd name="connsiteY0" fmla="*/ 993775 h 993775"/>
+              <a:gd name="connsiteX1" fmla="*/ 25327 w 406327"/>
+              <a:gd name="connsiteY1" fmla="*/ 403225 h 993775"/>
+              <a:gd name="connsiteX2" fmla="*/ 209477 w 406327"/>
+              <a:gd name="connsiteY2" fmla="*/ 292100 h 993775"/>
+              <a:gd name="connsiteX3" fmla="*/ 371402 w 406327"/>
+              <a:gd name="connsiteY3" fmla="*/ 288925 h 993775"/>
+              <a:gd name="connsiteX4" fmla="*/ 406327 w 406327"/>
+              <a:gd name="connsiteY4" fmla="*/ 0 h 993775"/>
+              <a:gd name="connsiteX0" fmla="*/ 6277 w 406327"/>
+              <a:gd name="connsiteY0" fmla="*/ 993775 h 993775"/>
+              <a:gd name="connsiteX1" fmla="*/ 25327 w 406327"/>
+              <a:gd name="connsiteY1" fmla="*/ 403225 h 993775"/>
+              <a:gd name="connsiteX2" fmla="*/ 209477 w 406327"/>
+              <a:gd name="connsiteY2" fmla="*/ 292100 h 993775"/>
+              <a:gd name="connsiteX3" fmla="*/ 346002 w 406327"/>
+              <a:gd name="connsiteY3" fmla="*/ 231775 h 993775"/>
+              <a:gd name="connsiteX4" fmla="*/ 406327 w 406327"/>
+              <a:gd name="connsiteY4" fmla="*/ 0 h 993775"/>
+            </a:gdLst>
+            <a:ahLst/>
+            <a:cxnLst>
+              <a:cxn ang="0">
+                <a:pos x="connsiteX0" y="connsiteY0"/>
+              </a:cxn>
+              <a:cxn ang="0">
+                <a:pos x="connsiteX1" y="connsiteY1"/>
+              </a:cxn>
+              <a:cxn ang="0">
+                <a:pos x="connsiteX2" y="connsiteY2"/>
+              </a:cxn>
+              <a:cxn ang="0">
+                <a:pos x="connsiteX3" y="connsiteY3"/>
+              </a:cxn>
+              <a:cxn ang="0">
+                <a:pos x="connsiteX4" y="connsiteY4"/>
+              </a:cxn>
+            </a:cxnLst>
+            <a:rect l="l" t="t" r="r" b="b"/>
+            <a:pathLst>
+              <a:path w="406327" h="993775">
+                <a:moveTo>
+                  <a:pt x="6277" y="993775"/>
+                </a:moveTo>
+                <a:cubicBezTo>
+                  <a:pt x="-1132" y="756973"/>
+                  <a:pt x="-8540" y="520171"/>
+                  <a:pt x="25327" y="403225"/>
+                </a:cubicBezTo>
+                <a:cubicBezTo>
+                  <a:pt x="59194" y="286279"/>
+                  <a:pt x="156031" y="320675"/>
+                  <a:pt x="209477" y="292100"/>
+                </a:cubicBezTo>
+                <a:cubicBezTo>
+                  <a:pt x="262923" y="263525"/>
+                  <a:pt x="313194" y="280458"/>
+                  <a:pt x="346002" y="231775"/>
+                </a:cubicBezTo>
+                <a:cubicBezTo>
+                  <a:pt x="378810" y="183092"/>
+                  <a:pt x="405268" y="120121"/>
+                  <a:pt x="406327" y="0"/>
+                </a:cubicBezTo>
+              </a:path>
+            </a:pathLst>
+          </a:custGeom>
+          <a:noFill/>
+          <a:ln w="19050">
+            <a:solidFill>
+              <a:srgbClr val="FFFF00"/>
+            </a:solidFill>
+          </a:ln>
+        </p:spPr>
+        <p:style>
+          <a:lnRef idx="2">
+            <a:schemeClr val="accent1">
+              <a:shade val="15000"/>
+            </a:schemeClr>
+          </a:lnRef>
+          <a:fillRef idx="1">
+            <a:schemeClr val="accent1"/>
+          </a:fillRef>
+          <a:effectRef idx="0">
+            <a:schemeClr val="accent1"/>
+          </a:effectRef>
+          <a:fontRef idx="minor">
+            <a:schemeClr val="lt1"/>
+          </a:fontRef>
+        </p:style>
+        <p:txBody>
+          <a:bodyPr rtlCol="0" anchor="ctr"/>
+          <a:lstStyle/>
+          <a:p>
+            <a:pPr algn="ctr"/>
+            <a:endParaRPr lang="en-US"/>
+          </a:p>
+        </p:txBody>
+      </p:sp>
+      <p:sp>
+        <p:nvSpPr>
+          <p:cNvPr id="35" name="Freeform: Shape 34">
+            <a:extLst>
+              <a:ext uri="{FF2B5EF4-FFF2-40B4-BE49-F238E27FC236}">
+                <a16:creationId xmlns:a16="http://schemas.microsoft.com/office/drawing/2014/main" id="{D892F7A8-FF50-9638-54A7-7CA0DD5E1EA4}"/>
+              </a:ext>
+            </a:extLst>
+          </p:cNvPr>
+          <p:cNvSpPr/>
+          <p:nvPr/>
+        </p:nvSpPr>
+        <p:spPr>
+          <a:xfrm>
+            <a:off x="2478953" y="2247900"/>
+            <a:ext cx="400000" cy="1101725"/>
+          </a:xfrm>
+          <a:custGeom>
+            <a:avLst/>
+            <a:gdLst>
+              <a:gd name="connsiteX0" fmla="*/ 67462 w 384189"/>
+              <a:gd name="connsiteY0" fmla="*/ 1101725 h 1101725"/>
+              <a:gd name="connsiteX1" fmla="*/ 10312 w 384189"/>
+              <a:gd name="connsiteY1" fmla="*/ 1063625 h 1101725"/>
+              <a:gd name="connsiteX2" fmla="*/ 787 w 384189"/>
+              <a:gd name="connsiteY2" fmla="*/ 962025 h 1101725"/>
+              <a:gd name="connsiteX3" fmla="*/ 13487 w 384189"/>
+              <a:gd name="connsiteY3" fmla="*/ 390525 h 1101725"/>
+              <a:gd name="connsiteX4" fmla="*/ 115087 w 384189"/>
+              <a:gd name="connsiteY4" fmla="*/ 282575 h 1101725"/>
+              <a:gd name="connsiteX5" fmla="*/ 296062 w 384189"/>
+              <a:gd name="connsiteY5" fmla="*/ 209550 h 1101725"/>
+              <a:gd name="connsiteX6" fmla="*/ 375437 w 384189"/>
+              <a:gd name="connsiteY6" fmla="*/ 142875 h 1101725"/>
+              <a:gd name="connsiteX7" fmla="*/ 378612 w 384189"/>
+              <a:gd name="connsiteY7" fmla="*/ 0 h 1101725"/>
+              <a:gd name="connsiteX0" fmla="*/ 78386 w 395113"/>
+              <a:gd name="connsiteY0" fmla="*/ 1101725 h 1101725"/>
+              <a:gd name="connsiteX1" fmla="*/ 21236 w 395113"/>
+              <a:gd name="connsiteY1" fmla="*/ 1063625 h 1101725"/>
+              <a:gd name="connsiteX2" fmla="*/ 11711 w 395113"/>
+              <a:gd name="connsiteY2" fmla="*/ 962025 h 1101725"/>
+              <a:gd name="connsiteX3" fmla="*/ 24411 w 395113"/>
+              <a:gd name="connsiteY3" fmla="*/ 390525 h 1101725"/>
+              <a:gd name="connsiteX4" fmla="*/ 126011 w 395113"/>
+              <a:gd name="connsiteY4" fmla="*/ 282575 h 1101725"/>
+              <a:gd name="connsiteX5" fmla="*/ 306986 w 395113"/>
+              <a:gd name="connsiteY5" fmla="*/ 209550 h 1101725"/>
+              <a:gd name="connsiteX6" fmla="*/ 386361 w 395113"/>
+              <a:gd name="connsiteY6" fmla="*/ 142875 h 1101725"/>
+              <a:gd name="connsiteX7" fmla="*/ 389536 w 395113"/>
+              <a:gd name="connsiteY7" fmla="*/ 0 h 1101725"/>
+              <a:gd name="connsiteX0" fmla="*/ 78386 w 395113"/>
+              <a:gd name="connsiteY0" fmla="*/ 1101725 h 1101725"/>
+              <a:gd name="connsiteX1" fmla="*/ 21236 w 395113"/>
+              <a:gd name="connsiteY1" fmla="*/ 1063625 h 1101725"/>
+              <a:gd name="connsiteX2" fmla="*/ 11711 w 395113"/>
+              <a:gd name="connsiteY2" fmla="*/ 962025 h 1101725"/>
+              <a:gd name="connsiteX3" fmla="*/ 24411 w 395113"/>
+              <a:gd name="connsiteY3" fmla="*/ 390525 h 1101725"/>
+              <a:gd name="connsiteX4" fmla="*/ 126011 w 395113"/>
+              <a:gd name="connsiteY4" fmla="*/ 282575 h 1101725"/>
+              <a:gd name="connsiteX5" fmla="*/ 306986 w 395113"/>
+              <a:gd name="connsiteY5" fmla="*/ 209550 h 1101725"/>
+              <a:gd name="connsiteX6" fmla="*/ 386361 w 395113"/>
+              <a:gd name="connsiteY6" fmla="*/ 142875 h 1101725"/>
+              <a:gd name="connsiteX7" fmla="*/ 389536 w 395113"/>
+              <a:gd name="connsiteY7" fmla="*/ 0 h 1101725"/>
+              <a:gd name="connsiteX0" fmla="*/ 71963 w 388690"/>
+              <a:gd name="connsiteY0" fmla="*/ 1101725 h 1101725"/>
+              <a:gd name="connsiteX1" fmla="*/ 14813 w 388690"/>
+              <a:gd name="connsiteY1" fmla="*/ 1063625 h 1101725"/>
+              <a:gd name="connsiteX2" fmla="*/ 5288 w 388690"/>
+              <a:gd name="connsiteY2" fmla="*/ 962025 h 1101725"/>
+              <a:gd name="connsiteX3" fmla="*/ 17988 w 388690"/>
+              <a:gd name="connsiteY3" fmla="*/ 390525 h 1101725"/>
+              <a:gd name="connsiteX4" fmla="*/ 119588 w 388690"/>
+              <a:gd name="connsiteY4" fmla="*/ 282575 h 1101725"/>
+              <a:gd name="connsiteX5" fmla="*/ 300563 w 388690"/>
+              <a:gd name="connsiteY5" fmla="*/ 209550 h 1101725"/>
+              <a:gd name="connsiteX6" fmla="*/ 379938 w 388690"/>
+              <a:gd name="connsiteY6" fmla="*/ 142875 h 1101725"/>
+              <a:gd name="connsiteX7" fmla="*/ 383113 w 388690"/>
+              <a:gd name="connsiteY7" fmla="*/ 0 h 1101725"/>
+              <a:gd name="connsiteX0" fmla="*/ 67615 w 384342"/>
+              <a:gd name="connsiteY0" fmla="*/ 1101725 h 1101725"/>
+              <a:gd name="connsiteX1" fmla="*/ 10465 w 384342"/>
+              <a:gd name="connsiteY1" fmla="*/ 1063625 h 1101725"/>
+              <a:gd name="connsiteX2" fmla="*/ 940 w 384342"/>
+              <a:gd name="connsiteY2" fmla="*/ 962025 h 1101725"/>
+              <a:gd name="connsiteX3" fmla="*/ 13640 w 384342"/>
+              <a:gd name="connsiteY3" fmla="*/ 390525 h 1101725"/>
+              <a:gd name="connsiteX4" fmla="*/ 118291 w 384342"/>
+              <a:gd name="connsiteY4" fmla="*/ 257175 h 1101725"/>
+              <a:gd name="connsiteX5" fmla="*/ 296215 w 384342"/>
+              <a:gd name="connsiteY5" fmla="*/ 209550 h 1101725"/>
+              <a:gd name="connsiteX6" fmla="*/ 375590 w 384342"/>
+              <a:gd name="connsiteY6" fmla="*/ 142875 h 1101725"/>
+              <a:gd name="connsiteX7" fmla="*/ 378765 w 384342"/>
+              <a:gd name="connsiteY7" fmla="*/ 0 h 1101725"/>
+            </a:gdLst>
+            <a:ahLst/>
+            <a:cxnLst>
+              <a:cxn ang="0">
+                <a:pos x="connsiteX0" y="connsiteY0"/>
+              </a:cxn>
+              <a:cxn ang="0">
+                <a:pos x="connsiteX1" y="connsiteY1"/>
+              </a:cxn>
+              <a:cxn ang="0">
+                <a:pos x="connsiteX2" y="connsiteY2"/>
+              </a:cxn>
+              <a:cxn ang="0">
+                <a:pos x="connsiteX3" y="connsiteY3"/>
+              </a:cxn>
+              <a:cxn ang="0">
+                <a:pos x="connsiteX4" y="connsiteY4"/>
+              </a:cxn>
+              <a:cxn ang="0">
+                <a:pos x="connsiteX5" y="connsiteY5"/>
+              </a:cxn>
+              <a:cxn ang="0">
+                <a:pos x="connsiteX6" y="connsiteY6"/>
+              </a:cxn>
+              <a:cxn ang="0">
+                <a:pos x="connsiteX7" y="connsiteY7"/>
+              </a:cxn>
+            </a:cxnLst>
+            <a:rect l="l" t="t" r="r" b="b"/>
+            <a:pathLst>
+              <a:path w="384342" h="1101725">
+                <a:moveTo>
+                  <a:pt x="67615" y="1101725"/>
+                </a:moveTo>
+                <a:cubicBezTo>
+                  <a:pt x="44596" y="1094316"/>
+                  <a:pt x="21577" y="1086908"/>
+                  <a:pt x="10465" y="1063625"/>
+                </a:cubicBezTo>
+                <a:cubicBezTo>
+                  <a:pt x="-647" y="1040342"/>
+                  <a:pt x="411" y="1074208"/>
+                  <a:pt x="940" y="962025"/>
+                </a:cubicBezTo>
+                <a:cubicBezTo>
+                  <a:pt x="1469" y="849842"/>
+                  <a:pt x="-5918" y="508000"/>
+                  <a:pt x="13640" y="390525"/>
+                </a:cubicBezTo>
+                <a:cubicBezTo>
+                  <a:pt x="33198" y="273050"/>
+                  <a:pt x="71195" y="287337"/>
+                  <a:pt x="118291" y="257175"/>
+                </a:cubicBezTo>
+                <a:cubicBezTo>
+                  <a:pt x="165387" y="227012"/>
+                  <a:pt x="253332" y="228600"/>
+                  <a:pt x="296215" y="209550"/>
+                </a:cubicBezTo>
+                <a:cubicBezTo>
+                  <a:pt x="339098" y="190500"/>
+                  <a:pt x="361832" y="177800"/>
+                  <a:pt x="375590" y="142875"/>
+                </a:cubicBezTo>
+                <a:cubicBezTo>
+                  <a:pt x="389348" y="107950"/>
+                  <a:pt x="384056" y="53975"/>
+                  <a:pt x="378765" y="0"/>
+                </a:cubicBezTo>
+              </a:path>
+            </a:pathLst>
+          </a:custGeom>
+          <a:noFill/>
+          <a:ln w="19050">
+            <a:solidFill>
+              <a:srgbClr val="FFFF00"/>
+            </a:solidFill>
+          </a:ln>
+        </p:spPr>
+        <p:style>
+          <a:lnRef idx="2">
+            <a:schemeClr val="accent1">
+              <a:shade val="15000"/>
+            </a:schemeClr>
+          </a:lnRef>
+          <a:fillRef idx="1">
+            <a:schemeClr val="accent1"/>
+          </a:fillRef>
+          <a:effectRef idx="0">
+            <a:schemeClr val="accent1"/>
+          </a:effectRef>
+          <a:fontRef idx="minor">
+            <a:schemeClr val="lt1"/>
+          </a:fontRef>
+        </p:style>
+        <p:txBody>
+          <a:bodyPr rtlCol="0" anchor="ctr"/>
+          <a:lstStyle/>
+          <a:p>
+            <a:pPr algn="ctr"/>
+            <a:endParaRPr lang="en-US"/>
+          </a:p>
+        </p:txBody>
+      </p:sp>
+    </p:spTree>
+    <p:extLst>
+      <p:ext uri="{BB962C8B-B14F-4D97-AF65-F5344CB8AC3E}">
+        <p14:creationId xmlns:p14="http://schemas.microsoft.com/office/powerpoint/2010/main" val="3659786731"/>
+      </p:ext>
+    </p:extLst>
+  </p:cSld>
+  <p:clrMapOvr>
+    <a:masterClrMapping/>
+  </p:clrMapOvr>
+</p:sld>
+</file>
+
+<file path=ppt/slides/slide3.xml><?xml version="1.0" encoding="utf-8"?>
+<p:sld xmlns:a="http://schemas.openxmlformats.org/drawingml/2006/main" xmlns:r="http://schemas.openxmlformats.org/officeDocument/2006/relationships" xmlns:p="http://schemas.openxmlformats.org/presentationml/2006/main">
+  <p:cSld>
+    <p:spTree>
+      <p:nvGrpSpPr>
+        <p:cNvPr id="1" name=""/>
+        <p:cNvGrpSpPr/>
+        <p:nvPr/>
+      </p:nvGrpSpPr>
+      <p:grpSpPr>
+        <a:xfrm>
+          <a:off x="0" y="0"/>
+          <a:ext cx="0" cy="0"/>
+          <a:chOff x="0" y="0"/>
+          <a:chExt cx="0" cy="0"/>
+        </a:xfrm>
+      </p:grpSpPr>
+      <p:pic>
+        <p:nvPicPr>
           <p:cNvPr id="4" name="Picture 3">
             <a:extLst>
               <a:ext uri="{FF2B5EF4-FFF2-40B4-BE49-F238E27FC236}">
@@ -17625,7 +19360,7 @@
     </p:spTree>
     <p:extLst>
       <p:ext uri="{BB962C8B-B14F-4D97-AF65-F5344CB8AC3E}">
-        <p14:creationId xmlns:p14="http://schemas.microsoft.com/office/powerpoint/2010/main" val="3659786731"/>
+        <p14:creationId xmlns:p14="http://schemas.microsoft.com/office/powerpoint/2010/main" val="1462997189"/>
       </p:ext>
     </p:extLst>
   </p:cSld>
@@ -17635,7 +19370,7 @@
 </p:sld>
 </file>
 
-<file path=ppt/slides/slide3.xml><?xml version="1.0" encoding="utf-8"?>
+<file path=ppt/slides/slide4.xml><?xml version="1.0" encoding="utf-8"?>
 <p:sld xmlns:a="http://schemas.openxmlformats.org/drawingml/2006/main" xmlns:r="http://schemas.openxmlformats.org/officeDocument/2006/relationships" xmlns:p="http://schemas.openxmlformats.org/presentationml/2006/main">
   <p:cSld>
     <p:spTree>
@@ -17963,7 +19698,40 @@
       </a:bgFillStyleLst>
     </a:fmtScheme>
   </a:themeElements>
-  <a:objectDefaults/>
+  <a:objectDefaults>
+    <a:spDef>
+      <a:spPr>
+        <a:noFill/>
+        <a:ln w="19050">
+          <a:solidFill>
+            <a:srgbClr val="FFFF00"/>
+          </a:solidFill>
+        </a:ln>
+      </a:spPr>
+      <a:bodyPr rtlCol="0" anchor="ctr"/>
+      <a:lstStyle>
+        <a:defPPr algn="ctr">
+          <a:defRPr/>
+        </a:defPPr>
+      </a:lstStyle>
+      <a:style>
+        <a:lnRef idx="2">
+          <a:schemeClr val="accent1">
+            <a:shade val="15000"/>
+          </a:schemeClr>
+        </a:lnRef>
+        <a:fillRef idx="1">
+          <a:schemeClr val="accent1"/>
+        </a:fillRef>
+        <a:effectRef idx="0">
+          <a:schemeClr val="accent1"/>
+        </a:effectRef>
+        <a:fontRef idx="minor">
+          <a:schemeClr val="lt1"/>
+        </a:fontRef>
+      </a:style>
+    </a:spDef>
+  </a:objectDefaults>
   <a:extraClrSchemeLst/>
   <a:extLst>
     <a:ext uri="{05A4C25C-085E-4340-85A3-A5531E510DB2}">

</xml_diff>